<commit_message>
Also the Fig6 fit well.
1. Changed  to 2% of original parameter for the IKKK activation.
</commit_message>
<xml_diff>
--- a/TNF_Slides.pptx
+++ b/TNF_Slides.pptx
@@ -199,7 +199,7 @@
           <a:p>
             <a:fld id="{C16E61BC-9AFB-7443-B919-0FEFC506D3C0}" type="datetimeFigureOut">
               <a:rPr lang="en-US" smtClean="0"/>
-              <a:t>12/16/13</a:t>
+              <a:t>12/17/13</a:t>
             </a:fld>
             <a:endParaRPr lang="en-US"/>
           </a:p>
@@ -1321,7 +1321,7 @@
             <a:fld id="{0DA042B0-5508-8A40-9A09-F8377543C8AB}" type="datetimeFigureOut">
               <a:rPr lang="en-US" smtClean="0"/>
               <a:pPr/>
-              <a:t>12/16/13</a:t>
+              <a:t>12/17/13</a:t>
             </a:fld>
             <a:endParaRPr lang="en-US" dirty="0"/>
           </a:p>
@@ -1493,7 +1493,7 @@
             <a:fld id="{0DA042B0-5508-8A40-9A09-F8377543C8AB}" type="datetimeFigureOut">
               <a:rPr lang="en-US" smtClean="0"/>
               <a:pPr/>
-              <a:t>12/16/13</a:t>
+              <a:t>12/17/13</a:t>
             </a:fld>
             <a:endParaRPr lang="en-US" dirty="0"/>
           </a:p>
@@ -1675,7 +1675,7 @@
             <a:fld id="{0DA042B0-5508-8A40-9A09-F8377543C8AB}" type="datetimeFigureOut">
               <a:rPr lang="en-US" smtClean="0"/>
               <a:pPr/>
-              <a:t>12/16/13</a:t>
+              <a:t>12/17/13</a:t>
             </a:fld>
             <a:endParaRPr lang="en-US" dirty="0"/>
           </a:p>
@@ -1847,7 +1847,7 @@
             <a:fld id="{0DA042B0-5508-8A40-9A09-F8377543C8AB}" type="datetimeFigureOut">
               <a:rPr lang="en-US" smtClean="0"/>
               <a:pPr/>
-              <a:t>12/16/13</a:t>
+              <a:t>12/17/13</a:t>
             </a:fld>
             <a:endParaRPr lang="en-US" dirty="0"/>
           </a:p>
@@ -2095,7 +2095,7 @@
             <a:fld id="{0DA042B0-5508-8A40-9A09-F8377543C8AB}" type="datetimeFigureOut">
               <a:rPr lang="en-US" smtClean="0"/>
               <a:pPr/>
-              <a:t>12/16/13</a:t>
+              <a:t>12/17/13</a:t>
             </a:fld>
             <a:endParaRPr lang="en-US" dirty="0"/>
           </a:p>
@@ -2385,7 +2385,7 @@
             <a:fld id="{0DA042B0-5508-8A40-9A09-F8377543C8AB}" type="datetimeFigureOut">
               <a:rPr lang="en-US" smtClean="0"/>
               <a:pPr/>
-              <a:t>12/16/13</a:t>
+              <a:t>12/17/13</a:t>
             </a:fld>
             <a:endParaRPr lang="en-US" dirty="0"/>
           </a:p>
@@ -2809,7 +2809,7 @@
             <a:fld id="{0DA042B0-5508-8A40-9A09-F8377543C8AB}" type="datetimeFigureOut">
               <a:rPr lang="en-US" smtClean="0"/>
               <a:pPr/>
-              <a:t>12/16/13</a:t>
+              <a:t>12/17/13</a:t>
             </a:fld>
             <a:endParaRPr lang="en-US" dirty="0"/>
           </a:p>
@@ -2929,7 +2929,7 @@
             <a:fld id="{0DA042B0-5508-8A40-9A09-F8377543C8AB}" type="datetimeFigureOut">
               <a:rPr lang="en-US" smtClean="0"/>
               <a:pPr/>
-              <a:t>12/16/13</a:t>
+              <a:t>12/17/13</a:t>
             </a:fld>
             <a:endParaRPr lang="en-US" dirty="0"/>
           </a:p>
@@ -3026,7 +3026,7 @@
             <a:fld id="{0DA042B0-5508-8A40-9A09-F8377543C8AB}" type="datetimeFigureOut">
               <a:rPr lang="en-US" smtClean="0"/>
               <a:pPr/>
-              <a:t>12/16/13</a:t>
+              <a:t>12/17/13</a:t>
             </a:fld>
             <a:endParaRPr lang="en-US" dirty="0"/>
           </a:p>
@@ -3305,7 +3305,7 @@
             <a:fld id="{0DA042B0-5508-8A40-9A09-F8377543C8AB}" type="datetimeFigureOut">
               <a:rPr lang="en-US" smtClean="0"/>
               <a:pPr/>
-              <a:t>12/16/13</a:t>
+              <a:t>12/17/13</a:t>
             </a:fld>
             <a:endParaRPr lang="en-US" dirty="0"/>
           </a:p>
@@ -3564,7 +3564,7 @@
             <a:fld id="{0DA042B0-5508-8A40-9A09-F8377543C8AB}" type="datetimeFigureOut">
               <a:rPr lang="en-US" smtClean="0"/>
               <a:pPr/>
-              <a:t>12/16/13</a:t>
+              <a:t>12/17/13</a:t>
             </a:fld>
             <a:endParaRPr lang="en-US" dirty="0"/>
           </a:p>
@@ -3779,7 +3779,7 @@
             <a:fld id="{0DA042B0-5508-8A40-9A09-F8377543C8AB}" type="datetimeFigureOut">
               <a:rPr lang="en-US" smtClean="0"/>
               <a:pPr/>
-              <a:t>12/16/13</a:t>
+              <a:t>12/17/13</a:t>
             </a:fld>
             <a:endParaRPr lang="en-US" dirty="0"/>
           </a:p>
@@ -12920,7 +12920,6 @@
               <a:rPr lang="en-US" sz="1200" i="1" dirty="0"/>
               <a:t>Same processing</a:t>
             </a:r>
-            <a:endParaRPr lang="en-US" sz="1200" i="1" dirty="0"/>
           </a:p>
         </p:txBody>
       </p:sp>
@@ -31566,7 +31565,7 @@
       </p:cxnSp>
       <p:pic>
         <p:nvPicPr>
-          <p:cNvPr id="12" name="Picture 11" descr="Fig5c.pdf"/>
+          <p:cNvPr id="13" name="Picture 12" descr="Fig5c.pdf"/>
           <p:cNvPicPr>
             <a:picLocks noChangeAspect="1"/>
           </p:cNvPicPr>
@@ -31586,7 +31585,7 @@
         </p:blipFill>
         <p:spPr>
           <a:xfrm>
-            <a:off x="3844636" y="0"/>
+            <a:off x="4147486" y="-15168"/>
             <a:ext cx="5299364" cy="6858000"/>
           </a:xfrm>
           <a:prstGeom prst="rect">

</xml_diff>

<commit_message>
Update the slides after improve fig5&6
Todo:
1. match the exp data after including TNF feedback for Fig. 5 (mainly
for CpG & the time frame between 120 min and 240 min)
</commit_message>
<xml_diff>
--- a/TNF_Slides.pptx
+++ b/TNF_Slides.pptx
@@ -36605,7 +36605,7 @@
       </p:sp>
       <p:pic>
         <p:nvPicPr>
-          <p:cNvPr id="108" name="Picture 107" descr="Fig6.pdf"/>
+          <p:cNvPr id="3" name="Picture 2" descr="Fig6.pdf"/>
           <p:cNvPicPr>
             <a:picLocks noChangeAspect="1"/>
           </p:cNvPicPr>
@@ -36625,7 +36625,7 @@
         </p:blipFill>
         <p:spPr>
           <a:xfrm>
-            <a:off x="4425476" y="284598"/>
+            <a:off x="4449816" y="-6458"/>
             <a:ext cx="5299364" cy="6858000"/>
           </a:xfrm>
           <a:prstGeom prst="rect">

</xml_diff>

<commit_message>
Put Error bar into Fig.2
</commit_message>
<xml_diff>
--- a/TNF_Slides.pptx
+++ b/TNF_Slides.pptx
@@ -199,7 +199,7 @@
           <a:p>
             <a:fld id="{C16E61BC-9AFB-7443-B919-0FEFC506D3C0}" type="datetimeFigureOut">
               <a:rPr lang="en-US" smtClean="0"/>
-              <a:t>12/17/13</a:t>
+              <a:t>1/2/14</a:t>
             </a:fld>
             <a:endParaRPr lang="en-US"/>
           </a:p>
@@ -629,7 +629,7 @@
           <a:p>
             <a:r>
               <a:rPr lang="en-US" dirty="0" smtClean="0"/>
-              <a:t>Same processing</a:t>
+              <a:t>(1)</a:t>
             </a:r>
             <a:endParaRPr lang="en-US" dirty="0"/>
           </a:p>
@@ -1321,7 +1321,7 @@
             <a:fld id="{0DA042B0-5508-8A40-9A09-F8377543C8AB}" type="datetimeFigureOut">
               <a:rPr lang="en-US" smtClean="0"/>
               <a:pPr/>
-              <a:t>12/17/13</a:t>
+              <a:t>1/2/14</a:t>
             </a:fld>
             <a:endParaRPr lang="en-US" dirty="0"/>
           </a:p>
@@ -1493,7 +1493,7 @@
             <a:fld id="{0DA042B0-5508-8A40-9A09-F8377543C8AB}" type="datetimeFigureOut">
               <a:rPr lang="en-US" smtClean="0"/>
               <a:pPr/>
-              <a:t>12/17/13</a:t>
+              <a:t>1/2/14</a:t>
             </a:fld>
             <a:endParaRPr lang="en-US" dirty="0"/>
           </a:p>
@@ -1675,7 +1675,7 @@
             <a:fld id="{0DA042B0-5508-8A40-9A09-F8377543C8AB}" type="datetimeFigureOut">
               <a:rPr lang="en-US" smtClean="0"/>
               <a:pPr/>
-              <a:t>12/17/13</a:t>
+              <a:t>1/2/14</a:t>
             </a:fld>
             <a:endParaRPr lang="en-US" dirty="0"/>
           </a:p>
@@ -1847,7 +1847,7 @@
             <a:fld id="{0DA042B0-5508-8A40-9A09-F8377543C8AB}" type="datetimeFigureOut">
               <a:rPr lang="en-US" smtClean="0"/>
               <a:pPr/>
-              <a:t>12/17/13</a:t>
+              <a:t>1/2/14</a:t>
             </a:fld>
             <a:endParaRPr lang="en-US" dirty="0"/>
           </a:p>
@@ -2095,7 +2095,7 @@
             <a:fld id="{0DA042B0-5508-8A40-9A09-F8377543C8AB}" type="datetimeFigureOut">
               <a:rPr lang="en-US" smtClean="0"/>
               <a:pPr/>
-              <a:t>12/17/13</a:t>
+              <a:t>1/2/14</a:t>
             </a:fld>
             <a:endParaRPr lang="en-US" dirty="0"/>
           </a:p>
@@ -2385,7 +2385,7 @@
             <a:fld id="{0DA042B0-5508-8A40-9A09-F8377543C8AB}" type="datetimeFigureOut">
               <a:rPr lang="en-US" smtClean="0"/>
               <a:pPr/>
-              <a:t>12/17/13</a:t>
+              <a:t>1/2/14</a:t>
             </a:fld>
             <a:endParaRPr lang="en-US" dirty="0"/>
           </a:p>
@@ -2809,7 +2809,7 @@
             <a:fld id="{0DA042B0-5508-8A40-9A09-F8377543C8AB}" type="datetimeFigureOut">
               <a:rPr lang="en-US" smtClean="0"/>
               <a:pPr/>
-              <a:t>12/17/13</a:t>
+              <a:t>1/2/14</a:t>
             </a:fld>
             <a:endParaRPr lang="en-US" dirty="0"/>
           </a:p>
@@ -2929,7 +2929,7 @@
             <a:fld id="{0DA042B0-5508-8A40-9A09-F8377543C8AB}" type="datetimeFigureOut">
               <a:rPr lang="en-US" smtClean="0"/>
               <a:pPr/>
-              <a:t>12/17/13</a:t>
+              <a:t>1/2/14</a:t>
             </a:fld>
             <a:endParaRPr lang="en-US" dirty="0"/>
           </a:p>
@@ -3026,7 +3026,7 @@
             <a:fld id="{0DA042B0-5508-8A40-9A09-F8377543C8AB}" type="datetimeFigureOut">
               <a:rPr lang="en-US" smtClean="0"/>
               <a:pPr/>
-              <a:t>12/17/13</a:t>
+              <a:t>1/2/14</a:t>
             </a:fld>
             <a:endParaRPr lang="en-US" dirty="0"/>
           </a:p>
@@ -3305,7 +3305,7 @@
             <a:fld id="{0DA042B0-5508-8A40-9A09-F8377543C8AB}" type="datetimeFigureOut">
               <a:rPr lang="en-US" smtClean="0"/>
               <a:pPr/>
-              <a:t>12/17/13</a:t>
+              <a:t>1/2/14</a:t>
             </a:fld>
             <a:endParaRPr lang="en-US" dirty="0"/>
           </a:p>
@@ -3564,7 +3564,7 @@
             <a:fld id="{0DA042B0-5508-8A40-9A09-F8377543C8AB}" type="datetimeFigureOut">
               <a:rPr lang="en-US" smtClean="0"/>
               <a:pPr/>
-              <a:t>12/17/13</a:t>
+              <a:t>1/2/14</a:t>
             </a:fld>
             <a:endParaRPr lang="en-US" dirty="0"/>
           </a:p>
@@ -3779,7 +3779,7 @@
             <a:fld id="{0DA042B0-5508-8A40-9A09-F8377543C8AB}" type="datetimeFigureOut">
               <a:rPr lang="en-US" smtClean="0"/>
               <a:pPr/>
-              <a:t>12/17/13</a:t>
+              <a:t>1/2/14</a:t>
             </a:fld>
             <a:endParaRPr lang="en-US" dirty="0"/>
           </a:p>
@@ -11026,7 +11026,7 @@
         </p:nvSpPr>
         <p:spPr bwMode="auto">
           <a:xfrm>
-            <a:off x="1738034" y="5500986"/>
+            <a:off x="1738034" y="4075159"/>
             <a:ext cx="377825" cy="274637"/>
           </a:xfrm>
           <a:prstGeom prst="rect">
@@ -11103,7 +11103,7 @@
         </p:nvGrpSpPr>
         <p:grpSpPr>
           <a:xfrm flipH="1">
-            <a:off x="1245909" y="5194598"/>
+            <a:off x="1245909" y="3768771"/>
             <a:ext cx="1143000" cy="322263"/>
             <a:chOff x="3101181" y="5965825"/>
             <a:chExt cx="1143000" cy="322263"/>
@@ -11399,7 +11399,7 @@
         </p:nvSpPr>
         <p:spPr bwMode="auto">
           <a:xfrm>
-            <a:off x="2515909" y="5143798"/>
+            <a:off x="2515909" y="3717971"/>
             <a:ext cx="528638" cy="304800"/>
           </a:xfrm>
           <a:prstGeom prst="rect">
@@ -11467,7 +11467,7 @@
         </p:nvSpPr>
         <p:spPr bwMode="auto">
           <a:xfrm flipV="1">
-            <a:off x="2171580" y="4594343"/>
+            <a:off x="2171580" y="3168516"/>
             <a:ext cx="234950" cy="449818"/>
           </a:xfrm>
           <a:prstGeom prst="line">
@@ -11536,7 +11536,7 @@
         </p:nvGrpSpPr>
         <p:grpSpPr>
           <a:xfrm>
-            <a:off x="1565234" y="4338281"/>
+            <a:off x="1565234" y="2912454"/>
             <a:ext cx="1901349" cy="95433"/>
             <a:chOff x="4591050" y="5183654"/>
             <a:chExt cx="1901349" cy="95433"/>
@@ -11978,7 +11978,7 @@
         </p:nvSpPr>
         <p:spPr bwMode="auto">
           <a:xfrm flipV="1">
-            <a:off x="2471329" y="3662257"/>
+            <a:off x="2471329" y="2236430"/>
             <a:ext cx="0" cy="519443"/>
           </a:xfrm>
           <a:prstGeom prst="line">
@@ -12047,7 +12047,7 @@
         </p:nvSpPr>
         <p:spPr>
           <a:xfrm>
-            <a:off x="2421704" y="4700256"/>
+            <a:off x="2421704" y="3274429"/>
             <a:ext cx="1571188" cy="276999"/>
           </a:xfrm>
           <a:prstGeom prst="rect">
@@ -12087,7 +12087,7 @@
         </p:nvSpPr>
         <p:spPr>
           <a:xfrm>
-            <a:off x="2506304" y="3812316"/>
+            <a:off x="2506304" y="2386489"/>
             <a:ext cx="1187895" cy="276999"/>
           </a:xfrm>
           <a:prstGeom prst="rect">
@@ -12118,7 +12118,7 @@
         </p:nvSpPr>
         <p:spPr bwMode="auto">
           <a:xfrm>
-            <a:off x="446136" y="4554675"/>
+            <a:off x="446136" y="3128848"/>
             <a:ext cx="242728" cy="200603"/>
           </a:xfrm>
           <a:prstGeom prst="ellipse">
@@ -12162,7 +12162,7 @@
         </p:nvSpPr>
         <p:spPr bwMode="auto">
           <a:xfrm>
-            <a:off x="634745" y="4609976"/>
+            <a:off x="634745" y="3184149"/>
             <a:ext cx="205901" cy="145302"/>
           </a:xfrm>
           <a:prstGeom prst="ellipse">
@@ -12206,7 +12206,7 @@
         </p:nvCxnSpPr>
         <p:spPr>
           <a:xfrm>
-            <a:off x="394587" y="4160543"/>
+            <a:off x="394587" y="2734716"/>
             <a:ext cx="7890" cy="381346"/>
           </a:xfrm>
           <a:prstGeom prst="straightConnector1">
@@ -12246,7 +12246,7 @@
         </p:nvGrpSpPr>
         <p:grpSpPr>
           <a:xfrm>
-            <a:off x="352585" y="3269211"/>
+            <a:off x="352585" y="1843384"/>
             <a:ext cx="544159" cy="563066"/>
             <a:chOff x="2925328" y="357827"/>
             <a:chExt cx="583027" cy="645514"/>
@@ -12382,7 +12382,7 @@
         </p:nvSpPr>
         <p:spPr>
           <a:xfrm flipH="1">
-            <a:off x="651484" y="3981566"/>
+            <a:off x="651484" y="2555739"/>
             <a:ext cx="403444" cy="175846"/>
           </a:xfrm>
           <a:prstGeom prst="snip2DiagRect">
@@ -12432,7 +12432,7 @@
         </p:nvSpPr>
         <p:spPr>
           <a:xfrm flipH="1">
-            <a:off x="582053" y="3984104"/>
+            <a:off x="582053" y="2558277"/>
             <a:ext cx="515570" cy="195575"/>
           </a:xfrm>
           <a:prstGeom prst="rect">
@@ -12468,7 +12468,7 @@
         </p:nvSpPr>
         <p:spPr>
           <a:xfrm>
-            <a:off x="189761" y="3987230"/>
+            <a:off x="189761" y="2561403"/>
             <a:ext cx="409651" cy="173313"/>
           </a:xfrm>
           <a:prstGeom prst="round2DiagRect">
@@ -12518,7 +12518,7 @@
         </p:nvSpPr>
         <p:spPr>
           <a:xfrm>
-            <a:off x="187278" y="3981566"/>
+            <a:off x="187278" y="2555739"/>
             <a:ext cx="414230" cy="195575"/>
           </a:xfrm>
           <a:prstGeom prst="rect">
@@ -12550,7 +12550,7 @@
         </p:nvSpPr>
         <p:spPr>
           <a:xfrm>
-            <a:off x="423883" y="4562572"/>
+            <a:off x="423883" y="3136745"/>
             <a:ext cx="434987" cy="205952"/>
           </a:xfrm>
           <a:prstGeom prst="rect">
@@ -12589,7 +12589,7 @@
         </p:nvCxnSpPr>
         <p:spPr>
           <a:xfrm flipH="1">
-            <a:off x="812870" y="4170837"/>
+            <a:off x="812870" y="2745010"/>
             <a:ext cx="3016" cy="398570"/>
           </a:xfrm>
           <a:prstGeom prst="straightConnector1">
@@ -12631,7 +12631,7 @@
         </p:nvSpPr>
         <p:spPr bwMode="auto">
           <a:xfrm>
-            <a:off x="858870" y="4857946"/>
+            <a:off x="858870" y="3432119"/>
             <a:ext cx="387039" cy="303396"/>
           </a:xfrm>
           <a:prstGeom prst="line">
@@ -12700,7 +12700,7 @@
         </p:nvSpPr>
         <p:spPr>
           <a:xfrm>
-            <a:off x="96081" y="3926755"/>
+            <a:off x="96081" y="2500928"/>
             <a:ext cx="1034606" cy="274320"/>
           </a:xfrm>
           <a:prstGeom prst="rect">
@@ -12747,7 +12747,7 @@
         </p:nvSpPr>
         <p:spPr bwMode="auto">
           <a:xfrm flipV="1">
-            <a:off x="1261149" y="4066628"/>
+            <a:off x="1261149" y="2640801"/>
             <a:ext cx="854710" cy="0"/>
           </a:xfrm>
           <a:prstGeom prst="line">
@@ -12845,7 +12845,7 @@
           <p:nvPr/>
         </p:nvPicPr>
         <p:blipFill>
-          <a:blip r:embed="rId3">
+          <a:blip r:embed="rId4">
             <a:extLst>
               <a:ext uri="{28A0092B-C50C-407E-A947-70E740481C1C}">
                 <a14:useLocalDpi xmlns:a14="http://schemas.microsoft.com/office/drawing/2010/main" val="0"/>
@@ -12858,7 +12858,7 @@
         </p:blipFill>
         <p:spPr>
           <a:xfrm>
-            <a:off x="3574631" y="909281"/>
+            <a:off x="4328566" y="909281"/>
             <a:ext cx="5299364" cy="6858000"/>
           </a:xfrm>
           <a:prstGeom prst="rect">
@@ -12875,7 +12875,7 @@
           <p:nvPr/>
         </p:nvPicPr>
         <p:blipFill rotWithShape="1">
-          <a:blip r:embed="rId4">
+          <a:blip r:embed="rId5">
             <a:extLst>
               <a:ext uri="{28A0092B-C50C-407E-A947-70E740481C1C}">
                 <a14:useLocalDpi xmlns:a14="http://schemas.microsoft.com/office/drawing/2010/main" val="0"/>
@@ -12887,7 +12887,7 @@
         </p:blipFill>
         <p:spPr>
           <a:xfrm>
-            <a:off x="4828301" y="719404"/>
+            <a:off x="5782510" y="719404"/>
             <a:ext cx="2468173" cy="2624393"/>
           </a:xfrm>
           <a:prstGeom prst="rect">
@@ -12949,6 +12949,96 @@
               <a:t>1.5 less processing in KOs</a:t>
             </a:r>
             <a:endParaRPr lang="en-US" sz="1200" i="1" dirty="0"/>
+          </a:p>
+        </p:txBody>
+      </p:sp>
+      <p:graphicFrame>
+        <p:nvGraphicFramePr>
+          <p:cNvPr id="12" name="Object 11"/>
+          <p:cNvGraphicFramePr>
+            <a:graphicFrameLocks noChangeAspect="1"/>
+          </p:cNvGraphicFramePr>
+          <p:nvPr>
+            <p:extLst>
+              <p:ext uri="{D42A27DB-BD31-4B8C-83A1-F6EECF244321}">
+                <p14:modId xmlns:p14="http://schemas.microsoft.com/office/powerpoint/2010/main" val="1986532967"/>
+              </p:ext>
+            </p:extLst>
+          </p:nvPr>
+        </p:nvGraphicFramePr>
+        <p:xfrm>
+          <a:off x="187278" y="4582446"/>
+          <a:ext cx="4218446" cy="620324"/>
+        </p:xfrm>
+        <a:graphic>
+          <a:graphicData uri="http://schemas.openxmlformats.org/presentationml/2006/ole">
+            <mc:AlternateContent xmlns:mc="http://schemas.openxmlformats.org/markup-compatibility/2006">
+              <mc:Choice xmlns:v="urn:schemas-microsoft-com:vml" Requires="v">
+                <p:oleObj spid="_x0000_s1025" name="Equation" r:id="rId6" imgW="3022600" imgH="444500" progId="Equation.3">
+                  <p:embed/>
+                </p:oleObj>
+              </mc:Choice>
+              <mc:Fallback>
+                <p:oleObj name="Equation" r:id="rId6" imgW="3022600" imgH="444500" progId="Equation.3">
+                  <p:embed/>
+                  <p:pic>
+                    <p:nvPicPr>
+                      <p:cNvPr id="0" name=""/>
+                      <p:cNvPicPr/>
+                      <p:nvPr/>
+                    </p:nvPicPr>
+                    <p:blipFill>
+                      <a:blip r:embed="rId7"/>
+                      <a:stretch>
+                        <a:fillRect/>
+                      </a:stretch>
+                    </p:blipFill>
+                    <p:spPr>
+                      <a:xfrm>
+                        <a:off x="187278" y="4582446"/>
+                        <a:ext cx="4218446" cy="620324"/>
+                      </a:xfrm>
+                      <a:prstGeom prst="rect">
+                        <a:avLst/>
+                      </a:prstGeom>
+                    </p:spPr>
+                  </p:pic>
+                </p:oleObj>
+              </mc:Fallback>
+            </mc:AlternateContent>
+          </a:graphicData>
+        </a:graphic>
+      </p:graphicFrame>
+      <p:sp>
+        <p:nvSpPr>
+          <p:cNvPr id="14" name="Rectangle 13"/>
+          <p:cNvSpPr/>
+          <p:nvPr/>
+        </p:nvSpPr>
+        <p:spPr>
+          <a:xfrm>
+            <a:off x="0" y="4213114"/>
+            <a:ext cx="503413" cy="369332"/>
+          </a:xfrm>
+          <a:prstGeom prst="rect">
+            <a:avLst/>
+          </a:prstGeom>
+        </p:spPr>
+        <p:txBody>
+          <a:bodyPr wrap="none">
+            <a:spAutoFit/>
+          </a:bodyPr>
+          <a:lstStyle/>
+          <a:p>
+            <a:r>
+              <a:rPr lang="en-US" dirty="0"/>
+              <a:t>(1</a:t>
+            </a:r>
+            <a:r>
+              <a:rPr lang="en-US" dirty="0" smtClean="0"/>
+              <a:t>):</a:t>
+            </a:r>
+            <a:endParaRPr lang="en-US" dirty="0"/>
           </a:p>
         </p:txBody>
       </p:sp>

</xml_diff>

<commit_message>
Got heatmap for fig2
TODO:
1. score not good as best score shows not best fit in quality
2. plotCI has some problem
</commit_message>
<xml_diff>
--- a/TNF_Slides.pptx
+++ b/TNF_Slides.pptx
@@ -5,17 +5,18 @@
     <p:sldMasterId id="2147483648" r:id="rId1"/>
   </p:sldMasterIdLst>
   <p:notesMasterIdLst>
-    <p:notesMasterId r:id="rId10"/>
+    <p:notesMasterId r:id="rId11"/>
   </p:notesMasterIdLst>
   <p:sldIdLst>
     <p:sldId id="257" r:id="rId2"/>
     <p:sldId id="258" r:id="rId3"/>
-    <p:sldId id="259" r:id="rId4"/>
-    <p:sldId id="260" r:id="rId5"/>
-    <p:sldId id="261" r:id="rId6"/>
-    <p:sldId id="262" r:id="rId7"/>
-    <p:sldId id="263" r:id="rId8"/>
-    <p:sldId id="264" r:id="rId9"/>
+    <p:sldId id="265" r:id="rId4"/>
+    <p:sldId id="259" r:id="rId5"/>
+    <p:sldId id="260" r:id="rId6"/>
+    <p:sldId id="261" r:id="rId7"/>
+    <p:sldId id="262" r:id="rId8"/>
+    <p:sldId id="263" r:id="rId9"/>
+    <p:sldId id="264" r:id="rId10"/>
   </p:sldIdLst>
   <p:sldSz cx="9144000" cy="6858000" type="screen4x3"/>
   <p:notesSz cx="6858000" cy="9144000"/>
@@ -752,7 +753,7 @@
           <a:p>
             <a:fld id="{837A9C9D-08EC-C64D-9F61-949AA1F45D5D}" type="slidenum">
               <a:rPr lang="en-US" smtClean="0"/>
-              <a:t>3</a:t>
+              <a:t>4</a:t>
             </a:fld>
             <a:endParaRPr lang="en-US"/>
           </a:p>
@@ -848,7 +849,7 @@
           <a:p>
             <a:fld id="{837A9C9D-08EC-C64D-9F61-949AA1F45D5D}" type="slidenum">
               <a:rPr lang="en-US" smtClean="0"/>
-              <a:t>4</a:t>
+              <a:t>5</a:t>
             </a:fld>
             <a:endParaRPr lang="en-US"/>
           </a:p>
@@ -944,7 +945,7 @@
           <a:p>
             <a:fld id="{837A9C9D-08EC-C64D-9F61-949AA1F45D5D}" type="slidenum">
               <a:rPr lang="en-US" smtClean="0"/>
-              <a:t>5</a:t>
+              <a:t>6</a:t>
             </a:fld>
             <a:endParaRPr lang="en-US"/>
           </a:p>
@@ -1032,7 +1033,7 @@
           <a:p>
             <a:fld id="{837A9C9D-08EC-C64D-9F61-949AA1F45D5D}" type="slidenum">
               <a:rPr lang="en-US" smtClean="0"/>
-              <a:t>6</a:t>
+              <a:t>7</a:t>
             </a:fld>
             <a:endParaRPr lang="en-US"/>
           </a:p>
@@ -1120,7 +1121,7 @@
           <a:p>
             <a:fld id="{837A9C9D-08EC-C64D-9F61-949AA1F45D5D}" type="slidenum">
               <a:rPr lang="en-US" smtClean="0"/>
-              <a:t>7</a:t>
+              <a:t>8</a:t>
             </a:fld>
             <a:endParaRPr lang="en-US"/>
           </a:p>
@@ -12903,7 +12904,7 @@
         </p:nvSpPr>
         <p:spPr>
           <a:xfrm>
-            <a:off x="5782510" y="770781"/>
+            <a:off x="5782510" y="783481"/>
             <a:ext cx="1252328" cy="276999"/>
           </a:xfrm>
           <a:prstGeom prst="rect">
@@ -12961,20 +12962,20 @@
           <p:nvPr>
             <p:extLst>
               <p:ext uri="{D42A27DB-BD31-4B8C-83A1-F6EECF244321}">
-                <p14:modId xmlns:p14="http://schemas.microsoft.com/office/powerpoint/2010/main" val="1986532967"/>
+                <p14:modId xmlns:p14="http://schemas.microsoft.com/office/powerpoint/2010/main" val="1928092505"/>
               </p:ext>
             </p:extLst>
           </p:nvPr>
         </p:nvGraphicFramePr>
         <p:xfrm>
-          <a:off x="187278" y="4582446"/>
+          <a:off x="6636" y="4892608"/>
           <a:ext cx="4218446" cy="620324"/>
         </p:xfrm>
         <a:graphic>
           <a:graphicData uri="http://schemas.openxmlformats.org/presentationml/2006/ole">
             <mc:AlternateContent xmlns:mc="http://schemas.openxmlformats.org/markup-compatibility/2006">
               <mc:Choice xmlns:v="urn:schemas-microsoft-com:vml" Requires="v">
-                <p:oleObj spid="_x0000_s1025" name="Equation" r:id="rId6" imgW="3022600" imgH="444500" progId="Equation.3">
+                <p:oleObj spid="_x0000_s1032" name="Equation" r:id="rId6" imgW="3022600" imgH="444500" progId="Equation.3">
                   <p:embed/>
                 </p:oleObj>
               </mc:Choice>
@@ -12995,7 +12996,7 @@
                     </p:blipFill>
                     <p:spPr>
                       <a:xfrm>
-                        <a:off x="187278" y="4582446"/>
+                        <a:off x="6636" y="4892608"/>
                         <a:ext cx="4218446" cy="620324"/>
                       </a:xfrm>
                       <a:prstGeom prst="rect">
@@ -13042,6 +13043,63 @@
           </a:p>
         </p:txBody>
       </p:sp>
+      <p:graphicFrame>
+        <p:nvGraphicFramePr>
+          <p:cNvPr id="16" name="Object 15"/>
+          <p:cNvGraphicFramePr>
+            <a:graphicFrameLocks noChangeAspect="1"/>
+          </p:cNvGraphicFramePr>
+          <p:nvPr>
+            <p:extLst>
+              <p:ext uri="{D42A27DB-BD31-4B8C-83A1-F6EECF244321}">
+                <p14:modId xmlns:p14="http://schemas.microsoft.com/office/powerpoint/2010/main" val="3533362092"/>
+              </p:ext>
+            </p:extLst>
+          </p:nvPr>
+        </p:nvGraphicFramePr>
+        <p:xfrm>
+          <a:off x="96081" y="5816599"/>
+          <a:ext cx="2419828" cy="241983"/>
+        </p:xfrm>
+        <a:graphic>
+          <a:graphicData uri="http://schemas.openxmlformats.org/presentationml/2006/ole">
+            <mc:AlternateContent xmlns:mc="http://schemas.openxmlformats.org/markup-compatibility/2006">
+              <mc:Choice xmlns:v="urn:schemas-microsoft-com:vml" Requires="v">
+                <p:oleObj spid="_x0000_s1033" name="Equation" r:id="rId8" imgW="2286000" imgH="228600" progId="Equation.3">
+                  <p:embed/>
+                </p:oleObj>
+              </mc:Choice>
+              <mc:Fallback>
+                <p:oleObj name="Equation" r:id="rId8" imgW="2286000" imgH="228600" progId="Equation.3">
+                  <p:embed/>
+                  <p:pic>
+                    <p:nvPicPr>
+                      <p:cNvPr id="0" name=""/>
+                      <p:cNvPicPr/>
+                      <p:nvPr/>
+                    </p:nvPicPr>
+                    <p:blipFill>
+                      <a:blip r:embed="rId9"/>
+                      <a:stretch>
+                        <a:fillRect/>
+                      </a:stretch>
+                    </p:blipFill>
+                    <p:spPr>
+                      <a:xfrm>
+                        <a:off x="96081" y="5816599"/>
+                        <a:ext cx="2419828" cy="241983"/>
+                      </a:xfrm>
+                      <a:prstGeom prst="rect">
+                        <a:avLst/>
+                      </a:prstGeom>
+                    </p:spPr>
+                  </p:pic>
+                </p:oleObj>
+              </mc:Fallback>
+            </mc:AlternateContent>
+          </a:graphicData>
+        </a:graphic>
+      </p:graphicFrame>
     </p:spTree>
     <p:extLst>
       <p:ext uri="{BB962C8B-B14F-4D97-AF65-F5344CB8AC3E}">
@@ -13079,6 +13137,96 @@
           <a:chExt cx="0" cy="0"/>
         </a:xfrm>
       </p:grpSpPr>
+      <p:pic>
+        <p:nvPicPr>
+          <p:cNvPr id="2" name="Picture 1" descr="fig2s.pdf"/>
+          <p:cNvPicPr>
+            <a:picLocks noChangeAspect="1"/>
+          </p:cNvPicPr>
+          <p:nvPr/>
+        </p:nvPicPr>
+        <p:blipFill>
+          <a:blip r:embed="rId2">
+            <a:extLst>
+              <a:ext uri="{28A0092B-C50C-407E-A947-70E740481C1C}">
+                <a14:useLocalDpi xmlns:a14="http://schemas.microsoft.com/office/drawing/2010/main" val="0"/>
+              </a:ext>
+            </a:extLst>
+          </a:blip>
+          <a:stretch>
+            <a:fillRect/>
+          </a:stretch>
+        </p:blipFill>
+        <p:spPr>
+          <a:xfrm>
+            <a:off x="0" y="0"/>
+            <a:ext cx="5299364" cy="6858000"/>
+          </a:xfrm>
+          <a:prstGeom prst="rect">
+            <a:avLst/>
+          </a:prstGeom>
+        </p:spPr>
+      </p:pic>
+      <p:pic>
+        <p:nvPicPr>
+          <p:cNvPr id="4" name="Picture 3" descr="fig2s_1.pdf"/>
+          <p:cNvPicPr>
+            <a:picLocks noChangeAspect="1"/>
+          </p:cNvPicPr>
+          <p:nvPr/>
+        </p:nvPicPr>
+        <p:blipFill>
+          <a:blip r:embed="rId3">
+            <a:extLst>
+              <a:ext uri="{28A0092B-C50C-407E-A947-70E740481C1C}">
+                <a14:useLocalDpi xmlns:a14="http://schemas.microsoft.com/office/drawing/2010/main" val="0"/>
+              </a:ext>
+            </a:extLst>
+          </a:blip>
+          <a:stretch>
+            <a:fillRect/>
+          </a:stretch>
+        </p:blipFill>
+        <p:spPr>
+          <a:xfrm>
+            <a:off x="4289136" y="0"/>
+            <a:ext cx="5299364" cy="6858000"/>
+          </a:xfrm>
+          <a:prstGeom prst="rect">
+            <a:avLst/>
+          </a:prstGeom>
+        </p:spPr>
+      </p:pic>
+    </p:spTree>
+    <p:extLst>
+      <p:ext uri="{BB962C8B-B14F-4D97-AF65-F5344CB8AC3E}">
+        <p14:creationId xmlns:p14="http://schemas.microsoft.com/office/powerpoint/2010/main" val="2864847045"/>
+      </p:ext>
+    </p:extLst>
+  </p:cSld>
+  <p:clrMapOvr>
+    <a:masterClrMapping/>
+  </p:clrMapOvr>
+</p:sld>
+</file>
+
+<file path=ppt/slides/slide4.xml><?xml version="1.0" encoding="utf-8"?>
+<p:sld xmlns:a="http://schemas.openxmlformats.org/drawingml/2006/main" xmlns:r="http://schemas.openxmlformats.org/officeDocument/2006/relationships" xmlns:p="http://schemas.openxmlformats.org/presentationml/2006/main">
+  <p:cSld>
+    <p:spTree>
+      <p:nvGrpSpPr>
+        <p:cNvPr id="1" name=""/>
+        <p:cNvGrpSpPr/>
+        <p:nvPr/>
+      </p:nvGrpSpPr>
+      <p:grpSpPr>
+        <a:xfrm>
+          <a:off x="0" y="0"/>
+          <a:ext cx="0" cy="0"/>
+          <a:chOff x="0" y="0"/>
+          <a:chExt cx="0" cy="0"/>
+        </a:xfrm>
+      </p:grpSpPr>
       <p:sp>
         <p:nvSpPr>
           <p:cNvPr id="2" name="Slide Number Placeholder 1"/>
@@ -13097,7 +13245,7 @@
             <a:fld id="{B374BE6F-4675-E040-83E7-950933BE75D0}" type="slidenum">
               <a:rPr lang="en-US" smtClean="0"/>
               <a:pPr/>
-              <a:t>3</a:t>
+              <a:t>4</a:t>
             </a:fld>
             <a:endParaRPr lang="en-US" dirty="0"/>
           </a:p>
@@ -14708,7 +14856,7 @@
 </p:sld>
 </file>
 
-<file path=ppt/slides/slide4.xml><?xml version="1.0" encoding="utf-8"?>
+<file path=ppt/slides/slide5.xml><?xml version="1.0" encoding="utf-8"?>
 <p:sld xmlns:a="http://schemas.openxmlformats.org/drawingml/2006/main" xmlns:r="http://schemas.openxmlformats.org/officeDocument/2006/relationships" xmlns:p="http://schemas.openxmlformats.org/presentationml/2006/main">
   <p:cSld>
     <p:spTree>
@@ -14743,7 +14891,7 @@
             <a:fld id="{B374BE6F-4675-E040-83E7-950933BE75D0}" type="slidenum">
               <a:rPr lang="en-US" smtClean="0"/>
               <a:pPr/>
-              <a:t>4</a:t>
+              <a:t>5</a:t>
             </a:fld>
             <a:endParaRPr lang="en-US" dirty="0"/>
           </a:p>
@@ -16737,7 +16885,7 @@
 </p:sld>
 </file>
 
-<file path=ppt/slides/slide5.xml><?xml version="1.0" encoding="utf-8"?>
+<file path=ppt/slides/slide6.xml><?xml version="1.0" encoding="utf-8"?>
 <p:sld xmlns:a="http://schemas.openxmlformats.org/drawingml/2006/main" xmlns:r="http://schemas.openxmlformats.org/officeDocument/2006/relationships" xmlns:p="http://schemas.openxmlformats.org/presentationml/2006/main">
   <p:cSld>
     <p:spTree>
@@ -16772,7 +16920,7 @@
             <a:fld id="{B374BE6F-4675-E040-83E7-950933BE75D0}" type="slidenum">
               <a:rPr lang="en-US" smtClean="0"/>
               <a:pPr/>
-              <a:t>5</a:t>
+              <a:t>6</a:t>
             </a:fld>
             <a:endParaRPr lang="en-US" dirty="0"/>
           </a:p>
@@ -20845,7 +20993,7 @@
 </p:sld>
 </file>
 
-<file path=ppt/slides/slide6.xml><?xml version="1.0" encoding="utf-8"?>
+<file path=ppt/slides/slide7.xml><?xml version="1.0" encoding="utf-8"?>
 <p:sld xmlns:a="http://schemas.openxmlformats.org/drawingml/2006/main" xmlns:r="http://schemas.openxmlformats.org/officeDocument/2006/relationships" xmlns:p="http://schemas.openxmlformats.org/presentationml/2006/main">
   <p:cSld>
     <p:spTree>
@@ -20880,7 +21028,7 @@
             <a:fld id="{B374BE6F-4675-E040-83E7-950933BE75D0}" type="slidenum">
               <a:rPr lang="en-US" smtClean="0"/>
               <a:pPr/>
-              <a:t>6</a:t>
+              <a:t>7</a:t>
             </a:fld>
             <a:endParaRPr lang="en-US" dirty="0"/>
           </a:p>
@@ -26837,7 +26985,7 @@
 </p:sld>
 </file>
 
-<file path=ppt/slides/slide7.xml><?xml version="1.0" encoding="utf-8"?>
+<file path=ppt/slides/slide8.xml><?xml version="1.0" encoding="utf-8"?>
 <p:sld xmlns:a="http://schemas.openxmlformats.org/drawingml/2006/main" xmlns:r="http://schemas.openxmlformats.org/officeDocument/2006/relationships" xmlns:p="http://schemas.openxmlformats.org/presentationml/2006/main">
   <p:cSld>
     <p:spTree>
@@ -26872,7 +27020,7 @@
             <a:fld id="{B374BE6F-4675-E040-83E7-950933BE75D0}" type="slidenum">
               <a:rPr lang="en-US" smtClean="0"/>
               <a:pPr/>
-              <a:t>7</a:t>
+              <a:t>8</a:t>
             </a:fld>
             <a:endParaRPr lang="en-US" dirty="0"/>
           </a:p>
@@ -31703,7 +31851,7 @@
 </p:sld>
 </file>
 
-<file path=ppt/slides/slide8.xml><?xml version="1.0" encoding="utf-8"?>
+<file path=ppt/slides/slide9.xml><?xml version="1.0" encoding="utf-8"?>
 <p:sld xmlns:a="http://schemas.openxmlformats.org/drawingml/2006/main" xmlns:r="http://schemas.openxmlformats.org/officeDocument/2006/relationships" xmlns:p="http://schemas.openxmlformats.org/presentationml/2006/main">
   <p:cSld>
     <p:spTree>
@@ -31738,7 +31886,7 @@
             <a:fld id="{B374BE6F-4675-E040-83E7-950933BE75D0}" type="slidenum">
               <a:rPr lang="en-US" smtClean="0"/>
               <a:pPr/>
-              <a:t>8</a:t>
+              <a:t>9</a:t>
             </a:fld>
             <a:endParaRPr lang="en-US" dirty="0"/>
           </a:p>

</xml_diff>

<commit_message>
finished Fig2s heat maps
Chose kpr and kd as two parameters to change.
</commit_message>
<xml_diff>
--- a/TNF_Slides.pptx
+++ b/TNF_Slides.pptx
@@ -10,8 +10,8 @@
   <p:sldIdLst>
     <p:sldId id="257" r:id="rId2"/>
     <p:sldId id="258" r:id="rId3"/>
-    <p:sldId id="265" r:id="rId4"/>
-    <p:sldId id="266" r:id="rId5"/>
+    <p:sldId id="266" r:id="rId4"/>
+    <p:sldId id="265" r:id="rId5"/>
     <p:sldId id="259" r:id="rId6"/>
     <p:sldId id="260" r:id="rId7"/>
     <p:sldId id="261" r:id="rId8"/>
@@ -719,7 +719,11 @@
           <a:p>
             <a:r>
               <a:rPr lang="en-US" dirty="0" smtClean="0"/>
-              <a:t>Best fit: </a:t>
+              <a:t>Score</a:t>
+            </a:r>
+            <a:r>
+              <a:rPr lang="en-US" baseline="0" dirty="0" smtClean="0"/>
+              <a:t> function:</a:t>
             </a:r>
             <a:endParaRPr lang="en-US" dirty="0"/>
           </a:p>
@@ -751,7 +755,7 @@
     </p:spTree>
     <p:extLst>
       <p:ext uri="{BB962C8B-B14F-4D97-AF65-F5344CB8AC3E}">
-        <p14:creationId xmlns:p14="http://schemas.microsoft.com/office/powerpoint/2010/main" val="2567831710"/>
+        <p14:creationId xmlns:p14="http://schemas.microsoft.com/office/powerpoint/2010/main" val="1155004988"/>
       </p:ext>
     </p:extLst>
   </p:cSld>
@@ -807,11 +811,7 @@
           <a:p>
             <a:r>
               <a:rPr lang="en-US" dirty="0" smtClean="0"/>
-              <a:t>Score</a:t>
-            </a:r>
-            <a:r>
-              <a:rPr lang="en-US" baseline="0" dirty="0" smtClean="0"/>
-              <a:t> function:</a:t>
+              <a:t>Best fit: </a:t>
             </a:r>
             <a:endParaRPr lang="en-US" dirty="0"/>
           </a:p>
@@ -843,7 +843,7 @@
     </p:spTree>
     <p:extLst>
       <p:ext uri="{BB962C8B-B14F-4D97-AF65-F5344CB8AC3E}">
-        <p14:creationId xmlns:p14="http://schemas.microsoft.com/office/powerpoint/2010/main" val="1155004988"/>
+        <p14:creationId xmlns:p14="http://schemas.microsoft.com/office/powerpoint/2010/main" val="2567831710"/>
       </p:ext>
     </p:extLst>
   </p:cSld>
@@ -18080,7 +18080,7 @@
           <a:graphicData uri="http://schemas.openxmlformats.org/presentationml/2006/ole">
             <mc:AlternateContent xmlns:mc="http://schemas.openxmlformats.org/markup-compatibility/2006">
               <mc:Choice xmlns:v="urn:schemas-microsoft-com:vml" Requires="v">
-                <p:oleObj spid="_x0000_s1046" name="Equation" r:id="rId4" imgW="3022600" imgH="444500" progId="Equation.3">
+                <p:oleObj spid="_x0000_s1050" name="Equation" r:id="rId4" imgW="3022600" imgH="444500" progId="Equation.3">
                   <p:embed/>
                 </p:oleObj>
               </mc:Choice>
@@ -18170,7 +18170,7 @@
           <a:graphicData uri="http://schemas.openxmlformats.org/presentationml/2006/ole">
             <mc:AlternateContent xmlns:mc="http://schemas.openxmlformats.org/markup-compatibility/2006">
               <mc:Choice xmlns:v="urn:schemas-microsoft-com:vml" Requires="v">
-                <p:oleObj spid="_x0000_s1047" name="Equation" r:id="rId6" imgW="2286000" imgH="228600" progId="Equation.3">
+                <p:oleObj spid="_x0000_s1051" name="Equation" r:id="rId6" imgW="2286000" imgH="228600" progId="Equation.3">
                   <p:embed/>
                 </p:oleObj>
               </mc:Choice>
@@ -18256,43 +18256,6 @@
 </file>
 
 <file path=ppt/slides/slide3.xml><?xml version="1.0" encoding="utf-8"?>
-<p:sld xmlns:a="http://schemas.openxmlformats.org/drawingml/2006/main" xmlns:r="http://schemas.openxmlformats.org/officeDocument/2006/relationships" xmlns:p="http://schemas.openxmlformats.org/presentationml/2006/main">
-  <p:cSld>
-    <p:spTree>
-      <p:nvGrpSpPr>
-        <p:cNvPr id="1" name=""/>
-        <p:cNvGrpSpPr/>
-        <p:nvPr/>
-      </p:nvGrpSpPr>
-      <p:grpSpPr>
-        <a:xfrm>
-          <a:off x="0" y="0"/>
-          <a:ext cx="0" cy="0"/>
-          <a:chOff x="0" y="0"/>
-          <a:chExt cx="0" cy="0"/>
-        </a:xfrm>
-      </p:grpSpPr>
-    </p:spTree>
-    <p:extLst>
-      <p:ext uri="{BB962C8B-B14F-4D97-AF65-F5344CB8AC3E}">
-        <p14:creationId xmlns:p14="http://schemas.microsoft.com/office/powerpoint/2010/main" val="2864847045"/>
-      </p:ext>
-    </p:extLst>
-  </p:cSld>
-  <p:clrMapOvr>
-    <a:masterClrMapping/>
-  </p:clrMapOvr>
-  <p:timing>
-    <p:tnLst>
-      <p:par>
-        <p:cTn xmlns:p14="http://schemas.microsoft.com/office/powerpoint/2010/main" id="1" dur="indefinite" restart="never" nodeType="tmRoot"/>
-      </p:par>
-    </p:tnLst>
-  </p:timing>
-</p:sld>
-</file>
-
-<file path=ppt/slides/slide4.xml><?xml version="1.0" encoding="utf-8"?>
 <p:sld xmlns:a="http://schemas.openxmlformats.org/drawingml/2006/main" xmlns:r="http://schemas.openxmlformats.org/officeDocument/2006/relationships" xmlns:p="http://schemas.openxmlformats.org/presentationml/2006/main">
   <p:cSld>
     <p:spTree>
@@ -18521,7 +18484,7 @@
             </a:r>
             <a:r>
               <a:rPr lang="en-US" dirty="0" smtClean="0"/>
-              <a:t> = 25 +/- </a:t>
+              <a:t> = 25 +/- 2</a:t>
             </a:r>
             <a:endParaRPr lang="en-US" dirty="0"/>
           </a:p>
@@ -18537,6 +18500,110 @@
   <p:clrMapOvr>
     <a:masterClrMapping/>
   </p:clrMapOvr>
+  <p:timing>
+    <p:tnLst>
+      <p:par>
+        <p:cTn xmlns:p14="http://schemas.microsoft.com/office/powerpoint/2010/main" id="1" dur="indefinite" restart="never" nodeType="tmRoot"/>
+      </p:par>
+    </p:tnLst>
+  </p:timing>
+</p:sld>
+</file>
+
+<file path=ppt/slides/slide4.xml><?xml version="1.0" encoding="utf-8"?>
+<p:sld xmlns:a="http://schemas.openxmlformats.org/drawingml/2006/main" xmlns:r="http://schemas.openxmlformats.org/officeDocument/2006/relationships" xmlns:p="http://schemas.openxmlformats.org/presentationml/2006/main">
+  <p:cSld>
+    <p:spTree>
+      <p:nvGrpSpPr>
+        <p:cNvPr id="1" name=""/>
+        <p:cNvGrpSpPr/>
+        <p:nvPr/>
+      </p:nvGrpSpPr>
+      <p:grpSpPr>
+        <a:xfrm>
+          <a:off x="0" y="0"/>
+          <a:ext cx="0" cy="0"/>
+          <a:chOff x="0" y="0"/>
+          <a:chExt cx="0" cy="0"/>
+        </a:xfrm>
+      </p:grpSpPr>
+      <p:pic>
+        <p:nvPicPr>
+          <p:cNvPr id="6" name="Picture 5" descr="fig2s.pdf"/>
+          <p:cNvPicPr>
+            <a:picLocks noChangeAspect="1"/>
+          </p:cNvPicPr>
+          <p:nvPr/>
+        </p:nvPicPr>
+        <p:blipFill>
+          <a:blip r:embed="rId3">
+            <a:extLst>
+              <a:ext uri="{28A0092B-C50C-407E-A947-70E740481C1C}">
+                <a14:useLocalDpi xmlns:a14="http://schemas.microsoft.com/office/drawing/2010/main" val="0"/>
+              </a:ext>
+            </a:extLst>
+          </a:blip>
+          <a:stretch>
+            <a:fillRect/>
+          </a:stretch>
+        </p:blipFill>
+        <p:spPr>
+          <a:xfrm>
+            <a:off x="0" y="0"/>
+            <a:ext cx="5299364" cy="6858000"/>
+          </a:xfrm>
+          <a:prstGeom prst="rect">
+            <a:avLst/>
+          </a:prstGeom>
+        </p:spPr>
+      </p:pic>
+      <p:pic>
+        <p:nvPicPr>
+          <p:cNvPr id="8" name="Picture 7" descr="fig2s_2.pdf"/>
+          <p:cNvPicPr>
+            <a:picLocks noChangeAspect="1"/>
+          </p:cNvPicPr>
+          <p:nvPr/>
+        </p:nvPicPr>
+        <p:blipFill>
+          <a:blip r:embed="rId4">
+            <a:extLst>
+              <a:ext uri="{28A0092B-C50C-407E-A947-70E740481C1C}">
+                <a14:useLocalDpi xmlns:a14="http://schemas.microsoft.com/office/drawing/2010/main" val="0"/>
+              </a:ext>
+            </a:extLst>
+          </a:blip>
+          <a:stretch>
+            <a:fillRect/>
+          </a:stretch>
+        </p:blipFill>
+        <p:spPr>
+          <a:xfrm>
+            <a:off x="4436918" y="0"/>
+            <a:ext cx="5299364" cy="6858000"/>
+          </a:xfrm>
+          <a:prstGeom prst="rect">
+            <a:avLst/>
+          </a:prstGeom>
+        </p:spPr>
+      </p:pic>
+    </p:spTree>
+    <p:extLst>
+      <p:ext uri="{BB962C8B-B14F-4D97-AF65-F5344CB8AC3E}">
+        <p14:creationId xmlns:p14="http://schemas.microsoft.com/office/powerpoint/2010/main" val="2864847045"/>
+      </p:ext>
+    </p:extLst>
+  </p:cSld>
+  <p:clrMapOvr>
+    <a:masterClrMapping/>
+  </p:clrMapOvr>
+  <p:timing>
+    <p:tnLst>
+      <p:par>
+        <p:cTn xmlns:p14="http://schemas.microsoft.com/office/powerpoint/2010/main" id="1" dur="indefinite" restart="never" nodeType="tmRoot"/>
+      </p:par>
+    </p:tnLst>
+  </p:timing>
 </p:sld>
 </file>
 
@@ -20158,7 +20225,7 @@
           <a:graphicData uri="http://schemas.openxmlformats.org/presentationml/2006/ole">
             <mc:AlternateContent xmlns:mc="http://schemas.openxmlformats.org/markup-compatibility/2006">
               <mc:Choice xmlns:v="urn:schemas-microsoft-com:vml" Requires="v">
-                <p:oleObj spid="_x0000_s2061" name="Equation" r:id="rId4" imgW="2641600" imgH="393700" progId="Equation.3">
+                <p:oleObj spid="_x0000_s2065" name="Equation" r:id="rId4" imgW="2641600" imgH="393700" progId="Equation.3">
                   <p:embed/>
                 </p:oleObj>
               </mc:Choice>
@@ -20215,7 +20282,7 @@
           <a:graphicData uri="http://schemas.openxmlformats.org/presentationml/2006/ole">
             <mc:AlternateContent xmlns:mc="http://schemas.openxmlformats.org/markup-compatibility/2006">
               <mc:Choice xmlns:v="urn:schemas-microsoft-com:vml" Requires="v">
-                <p:oleObj spid="_x0000_s2062" name="Equation" r:id="rId6" imgW="1168400" imgH="228600" progId="Equation.3">
+                <p:oleObj spid="_x0000_s2066" name="Equation" r:id="rId6" imgW="1168400" imgH="228600" progId="Equation.3">
                   <p:embed/>
                 </p:oleObj>
               </mc:Choice>

</xml_diff>

<commit_message>
Fig3s score function-- R = RMSD/RMSD_linear
Problem is: Only a slightly better than the linear fitting.
</commit_message>
<xml_diff>
--- a/TNF_Slides.pptx
+++ b/TNF_Slides.pptx
@@ -15978,36 +15978,6 @@
           </a:fontRef>
         </p:style>
       </p:cxnSp>
-      <p:pic>
-        <p:nvPicPr>
-          <p:cNvPr id="12" name="Picture 11" descr="Fig5c.pdf"/>
-          <p:cNvPicPr>
-            <a:picLocks noChangeAspect="1"/>
-          </p:cNvPicPr>
-          <p:nvPr/>
-        </p:nvPicPr>
-        <p:blipFill>
-          <a:blip r:embed="rId3">
-            <a:extLst>
-              <a:ext uri="{28A0092B-C50C-407E-A947-70E740481C1C}">
-                <a14:useLocalDpi xmlns:a14="http://schemas.microsoft.com/office/drawing/2010/main" val="0"/>
-              </a:ext>
-            </a:extLst>
-          </a:blip>
-          <a:stretch>
-            <a:fillRect/>
-          </a:stretch>
-        </p:blipFill>
-        <p:spPr>
-          <a:xfrm>
-            <a:off x="4108123" y="69199"/>
-            <a:ext cx="5299364" cy="6858000"/>
-          </a:xfrm>
-          <a:prstGeom prst="rect">
-            <a:avLst/>
-          </a:prstGeom>
-        </p:spPr>
-      </p:pic>
       <p:sp>
         <p:nvSpPr>
           <p:cNvPr id="14" name="Rectangle 13"/>
@@ -16041,6 +16011,36 @@
           </a:p>
         </p:txBody>
       </p:sp>
+      <p:pic>
+        <p:nvPicPr>
+          <p:cNvPr id="16" name="Picture 15" descr="Fig5c.pdf"/>
+          <p:cNvPicPr>
+            <a:picLocks noChangeAspect="1"/>
+          </p:cNvPicPr>
+          <p:nvPr/>
+        </p:nvPicPr>
+        <p:blipFill>
+          <a:blip r:embed="rId3">
+            <a:extLst>
+              <a:ext uri="{28A0092B-C50C-407E-A947-70E740481C1C}">
+                <a14:useLocalDpi xmlns:a14="http://schemas.microsoft.com/office/drawing/2010/main" val="0"/>
+              </a:ext>
+            </a:extLst>
+          </a:blip>
+          <a:stretch>
+            <a:fillRect/>
+          </a:stretch>
+        </p:blipFill>
+        <p:spPr>
+          <a:xfrm>
+            <a:off x="4217590" y="216964"/>
+            <a:ext cx="5299364" cy="6858000"/>
+          </a:xfrm>
+          <a:prstGeom prst="rect">
+            <a:avLst/>
+          </a:prstGeom>
+        </p:spPr>
+      </p:pic>
     </p:spTree>
     <p:extLst>
       <p:ext uri="{BB962C8B-B14F-4D97-AF65-F5344CB8AC3E}">
@@ -22984,7 +22984,7 @@
           <a:graphicData uri="http://schemas.openxmlformats.org/presentationml/2006/ole">
             <mc:AlternateContent xmlns:mc="http://schemas.openxmlformats.org/markup-compatibility/2006">
               <mc:Choice xmlns:v="urn:schemas-microsoft-com:vml" Requires="v">
-                <p:oleObj spid="_x0000_s1062" name="Equation" r:id="rId4" imgW="3022600" imgH="444500" progId="Equation.3">
+                <p:oleObj spid="_x0000_s1070" name="Equation" r:id="rId4" imgW="3022600" imgH="444500" progId="Equation.3">
                   <p:embed/>
                 </p:oleObj>
               </mc:Choice>
@@ -23074,7 +23074,7 @@
           <a:graphicData uri="http://schemas.openxmlformats.org/presentationml/2006/ole">
             <mc:AlternateContent xmlns:mc="http://schemas.openxmlformats.org/markup-compatibility/2006">
               <mc:Choice xmlns:v="urn:schemas-microsoft-com:vml" Requires="v">
-                <p:oleObj spid="_x0000_s1063" name="Equation" r:id="rId6" imgW="2628900" imgH="254000" progId="Equation.3">
+                <p:oleObj spid="_x0000_s1071" name="Equation" r:id="rId6" imgW="2628900" imgH="254000" progId="Equation.3">
                   <p:embed/>
                 </p:oleObj>
               </mc:Choice>
@@ -25129,7 +25129,7 @@
           <a:graphicData uri="http://schemas.openxmlformats.org/presentationml/2006/ole">
             <mc:AlternateContent xmlns:mc="http://schemas.openxmlformats.org/markup-compatibility/2006">
               <mc:Choice xmlns:v="urn:schemas-microsoft-com:vml" Requires="v">
-                <p:oleObj spid="_x0000_s2079" name="Equation" r:id="rId4" imgW="2641600" imgH="393700" progId="Equation.3">
+                <p:oleObj spid="_x0000_s2087" name="Equation" r:id="rId4" imgW="2641600" imgH="393700" progId="Equation.3">
                   <p:embed/>
                 </p:oleObj>
               </mc:Choice>
@@ -25173,7 +25173,7 @@
           <p:nvPr>
             <p:extLst>
               <p:ext uri="{D42A27DB-BD31-4B8C-83A1-F6EECF244321}">
-                <p14:modId xmlns:p14="http://schemas.microsoft.com/office/powerpoint/2010/main" val="660104307"/>
+                <p14:modId xmlns:p14="http://schemas.microsoft.com/office/powerpoint/2010/main" val="645910813"/>
               </p:ext>
             </p:extLst>
           </p:nvPr>
@@ -25186,7 +25186,7 @@
           <a:graphicData uri="http://schemas.openxmlformats.org/presentationml/2006/ole">
             <mc:AlternateContent xmlns:mc="http://schemas.openxmlformats.org/markup-compatibility/2006">
               <mc:Choice xmlns:v="urn:schemas-microsoft-com:vml" Requires="v">
-                <p:oleObj spid="_x0000_s2080" name="Equation" r:id="rId6" imgW="3429000" imgH="584200" progId="Equation.3">
+                <p:oleObj spid="_x0000_s2088" name="Equation" r:id="rId6" imgW="3429000" imgH="584200" progId="Equation.3">
                   <p:embed/>
                 </p:oleObj>
               </mc:Choice>
@@ -25337,8 +25337,119 @@
         </p:blipFill>
         <p:spPr>
           <a:xfrm>
-            <a:off x="2768600" y="482599"/>
+            <a:off x="2674707" y="77497"/>
             <a:ext cx="3276600" cy="3322107"/>
+          </a:xfrm>
+          <a:prstGeom prst="rect">
+            <a:avLst/>
+          </a:prstGeom>
+        </p:spPr>
+      </p:pic>
+      <p:sp>
+        <p:nvSpPr>
+          <p:cNvPr id="4" name="Rectangle 3"/>
+          <p:cNvSpPr/>
+          <p:nvPr/>
+        </p:nvSpPr>
+        <p:spPr>
+          <a:xfrm>
+            <a:off x="582515" y="3012320"/>
+            <a:ext cx="2339102" cy="646331"/>
+          </a:xfrm>
+          <a:prstGeom prst="rect">
+            <a:avLst/>
+          </a:prstGeom>
+        </p:spPr>
+        <p:txBody>
+          <a:bodyPr wrap="none">
+            <a:spAutoFit/>
+          </a:bodyPr>
+          <a:lstStyle/>
+          <a:p>
+            <a:r>
+              <a:rPr lang="en-US" dirty="0"/>
+              <a:t>Score function</a:t>
+            </a:r>
+            <a:r>
+              <a:rPr lang="en-US" dirty="0" smtClean="0"/>
+              <a:t>:</a:t>
+            </a:r>
+          </a:p>
+          <a:p>
+            <a:pPr marL="342900" indent="-342900">
+              <a:buFont typeface="Arial"/>
+              <a:buChar char="•"/>
+            </a:pPr>
+            <a:r>
+              <a:rPr lang="en-US" dirty="0" smtClean="0"/>
+              <a:t>RMSD/(</a:t>
+            </a:r>
+            <a:r>
+              <a:rPr lang="en-US" dirty="0" err="1" smtClean="0"/>
+              <a:t>RMSD_line</a:t>
+            </a:r>
+            <a:r>
+              <a:rPr lang="en-US" dirty="0" smtClean="0"/>
+              <a:t>)</a:t>
+            </a:r>
+            <a:endParaRPr lang="en-US" dirty="0"/>
+          </a:p>
+        </p:txBody>
+      </p:sp>
+      <p:pic>
+        <p:nvPicPr>
+          <p:cNvPr id="5" name="Picture 4" descr="fig3s.pdf"/>
+          <p:cNvPicPr>
+            <a:picLocks noChangeAspect="1"/>
+          </p:cNvPicPr>
+          <p:nvPr/>
+        </p:nvPicPr>
+        <p:blipFill>
+          <a:blip r:embed="rId3">
+            <a:extLst>
+              <a:ext uri="{28A0092B-C50C-407E-A947-70E740481C1C}">
+                <a14:useLocalDpi xmlns:a14="http://schemas.microsoft.com/office/drawing/2010/main" val="0"/>
+              </a:ext>
+            </a:extLst>
+          </a:blip>
+          <a:stretch>
+            <a:fillRect/>
+          </a:stretch>
+        </p:blipFill>
+        <p:spPr>
+          <a:xfrm>
+            <a:off x="4313007" y="1631356"/>
+            <a:ext cx="5299364" cy="6858000"/>
+          </a:xfrm>
+          <a:prstGeom prst="rect">
+            <a:avLst/>
+          </a:prstGeom>
+        </p:spPr>
+      </p:pic>
+      <p:pic>
+        <p:nvPicPr>
+          <p:cNvPr id="6" name="Picture 5" descr="bestFit.pdf"/>
+          <p:cNvPicPr>
+            <a:picLocks noChangeAspect="1"/>
+          </p:cNvPicPr>
+          <p:nvPr/>
+        </p:nvPicPr>
+        <p:blipFill>
+          <a:blip r:embed="rId4">
+            <a:extLst>
+              <a:ext uri="{28A0092B-C50C-407E-A947-70E740481C1C}">
+                <a14:useLocalDpi xmlns:a14="http://schemas.microsoft.com/office/drawing/2010/main" val="0"/>
+              </a:ext>
+            </a:extLst>
+          </a:blip>
+          <a:stretch>
+            <a:fillRect/>
+          </a:stretch>
+        </p:blipFill>
+        <p:spPr>
+          <a:xfrm>
+            <a:off x="434923" y="2519628"/>
+            <a:ext cx="4173033" cy="5400395"/>
           </a:xfrm>
           <a:prstGeom prst="rect">
             <a:avLst/>
@@ -27389,7 +27500,7 @@
           <a:graphicData uri="http://schemas.openxmlformats.org/presentationml/2006/ole">
             <mc:AlternateContent xmlns:mc="http://schemas.openxmlformats.org/markup-compatibility/2006">
               <mc:Choice xmlns:v="urn:schemas-microsoft-com:vml" Requires="v">
-                <p:oleObj spid="_x0000_s5126" name="Equation" r:id="rId5" imgW="3479800" imgH="800100" progId="Equation.3">
+                <p:oleObj spid="_x0000_s5134" name="Equation" r:id="rId5" imgW="3479800" imgH="800100" progId="Equation.3">
                   <p:embed/>
                 </p:oleObj>
               </mc:Choice>
@@ -27446,7 +27557,7 @@
           <a:graphicData uri="http://schemas.openxmlformats.org/presentationml/2006/ole">
             <mc:AlternateContent xmlns:mc="http://schemas.openxmlformats.org/markup-compatibility/2006">
               <mc:Choice xmlns:v="urn:schemas-microsoft-com:vml" Requires="v">
-                <p:oleObj spid="_x0000_s5127" name="Equation" r:id="rId7" imgW="3086100" imgH="254000" progId="Equation.3">
+                <p:oleObj spid="_x0000_s5135" name="Equation" r:id="rId7" imgW="3086100" imgH="254000" progId="Equation.3">
                   <p:embed/>
                 </p:oleObj>
               </mc:Choice>

</xml_diff>

<commit_message>
Fig4. Update the calculation of secreted TNF
Use cumsum function now.
</commit_message>
<xml_diff>
--- a/TNF_Slides.pptx
+++ b/TNF_Slides.pptx
@@ -22984,7 +22984,7 @@
           <a:graphicData uri="http://schemas.openxmlformats.org/presentationml/2006/ole">
             <mc:AlternateContent xmlns:mc="http://schemas.openxmlformats.org/markup-compatibility/2006">
               <mc:Choice xmlns:v="urn:schemas-microsoft-com:vml" Requires="v">
-                <p:oleObj spid="_x0000_s1070" name="Equation" r:id="rId4" imgW="3022600" imgH="444500" progId="Equation.3">
+                <p:oleObj spid="_x0000_s1072" name="Equation" r:id="rId4" imgW="3022600" imgH="444500" progId="Equation.3">
                   <p:embed/>
                 </p:oleObj>
               </mc:Choice>
@@ -23074,7 +23074,7 @@
           <a:graphicData uri="http://schemas.openxmlformats.org/presentationml/2006/ole">
             <mc:AlternateContent xmlns:mc="http://schemas.openxmlformats.org/markup-compatibility/2006">
               <mc:Choice xmlns:v="urn:schemas-microsoft-com:vml" Requires="v">
-                <p:oleObj spid="_x0000_s1071" name="Equation" r:id="rId6" imgW="2628900" imgH="254000" progId="Equation.3">
+                <p:oleObj spid="_x0000_s1073" name="Equation" r:id="rId6" imgW="2628900" imgH="254000" progId="Equation.3">
                   <p:embed/>
                 </p:oleObj>
               </mc:Choice>
@@ -25129,7 +25129,7 @@
           <a:graphicData uri="http://schemas.openxmlformats.org/presentationml/2006/ole">
             <mc:AlternateContent xmlns:mc="http://schemas.openxmlformats.org/markup-compatibility/2006">
               <mc:Choice xmlns:v="urn:schemas-microsoft-com:vml" Requires="v">
-                <p:oleObj spid="_x0000_s2087" name="Equation" r:id="rId4" imgW="2641600" imgH="393700" progId="Equation.3">
+                <p:oleObj spid="_x0000_s2089" name="Equation" r:id="rId4" imgW="2641600" imgH="393700" progId="Equation.3">
                   <p:embed/>
                 </p:oleObj>
               </mc:Choice>
@@ -25186,7 +25186,7 @@
           <a:graphicData uri="http://schemas.openxmlformats.org/presentationml/2006/ole">
             <mc:AlternateContent xmlns:mc="http://schemas.openxmlformats.org/markup-compatibility/2006">
               <mc:Choice xmlns:v="urn:schemas-microsoft-com:vml" Requires="v">
-                <p:oleObj spid="_x0000_s2088" name="Equation" r:id="rId6" imgW="3429000" imgH="584200" progId="Equation.3">
+                <p:oleObj spid="_x0000_s2090" name="Equation" r:id="rId6" imgW="3429000" imgH="584200" progId="Equation.3">
                   <p:embed/>
                 </p:oleObj>
               </mc:Choice>
@@ -27449,35 +27449,6 @@
           </a:p>
         </p:txBody>
       </p:sp>
-      <p:pic>
-        <p:nvPicPr>
-          <p:cNvPr id="5" name="Picture 4" descr="fig4.pdf"/>
-          <p:cNvPicPr>
-            <a:picLocks noChangeAspect="1"/>
-          </p:cNvPicPr>
-          <p:nvPr/>
-        </p:nvPicPr>
-        <p:blipFill rotWithShape="1">
-          <a:blip r:embed="rId4">
-            <a:extLst>
-              <a:ext uri="{28A0092B-C50C-407E-A947-70E740481C1C}">
-                <a14:useLocalDpi xmlns:a14="http://schemas.microsoft.com/office/drawing/2010/main" val="0"/>
-              </a:ext>
-            </a:extLst>
-          </a:blip>
-          <a:srcRect t="31131" b="28703"/>
-          <a:stretch/>
-        </p:blipFill>
-        <p:spPr>
-          <a:xfrm>
-            <a:off x="1410486" y="3309836"/>
-            <a:ext cx="6563615" cy="3411747"/>
-          </a:xfrm>
-          <a:prstGeom prst="rect">
-            <a:avLst/>
-          </a:prstGeom>
-        </p:spPr>
-      </p:pic>
       <p:graphicFrame>
         <p:nvGraphicFramePr>
           <p:cNvPr id="47" name="Object 46"/>
@@ -27500,12 +27471,12 @@
           <a:graphicData uri="http://schemas.openxmlformats.org/presentationml/2006/ole">
             <mc:AlternateContent xmlns:mc="http://schemas.openxmlformats.org/markup-compatibility/2006">
               <mc:Choice xmlns:v="urn:schemas-microsoft-com:vml" Requires="v">
-                <p:oleObj spid="_x0000_s5134" name="Equation" r:id="rId5" imgW="3479800" imgH="800100" progId="Equation.3">
+                <p:oleObj spid="_x0000_s5136" name="Equation" r:id="rId4" imgW="3479800" imgH="800100" progId="Equation.3">
                   <p:embed/>
                 </p:oleObj>
               </mc:Choice>
               <mc:Fallback>
-                <p:oleObj name="Equation" r:id="rId5" imgW="3479800" imgH="800100" progId="Equation.3">
+                <p:oleObj name="Equation" r:id="rId4" imgW="3479800" imgH="800100" progId="Equation.3">
                   <p:embed/>
                   <p:pic>
                     <p:nvPicPr>
@@ -27514,7 +27485,7 @@
                       <p:nvPr/>
                     </p:nvPicPr>
                     <p:blipFill>
-                      <a:blip r:embed="rId6"/>
+                      <a:blip r:embed="rId5"/>
                       <a:stretch>
                         <a:fillRect/>
                       </a:stretch>
@@ -27557,12 +27528,12 @@
           <a:graphicData uri="http://schemas.openxmlformats.org/presentationml/2006/ole">
             <mc:AlternateContent xmlns:mc="http://schemas.openxmlformats.org/markup-compatibility/2006">
               <mc:Choice xmlns:v="urn:schemas-microsoft-com:vml" Requires="v">
-                <p:oleObj spid="_x0000_s5135" name="Equation" r:id="rId7" imgW="3086100" imgH="254000" progId="Equation.3">
+                <p:oleObj spid="_x0000_s5137" name="Equation" r:id="rId6" imgW="3086100" imgH="254000" progId="Equation.3">
                   <p:embed/>
                 </p:oleObj>
               </mc:Choice>
               <mc:Fallback>
-                <p:oleObj name="Equation" r:id="rId7" imgW="3086100" imgH="254000" progId="Equation.3">
+                <p:oleObj name="Equation" r:id="rId6" imgW="3086100" imgH="254000" progId="Equation.3">
                   <p:embed/>
                   <p:pic>
                     <p:nvPicPr>
@@ -27571,7 +27542,7 @@
                       <p:nvPr/>
                     </p:nvPicPr>
                     <p:blipFill>
-                      <a:blip r:embed="rId8"/>
+                      <a:blip r:embed="rId7"/>
                       <a:stretch>
                         <a:fillRect/>
                       </a:stretch>
@@ -27592,6 +27563,35 @@
           </a:graphicData>
         </a:graphic>
       </p:graphicFrame>
+      <p:pic>
+        <p:nvPicPr>
+          <p:cNvPr id="4" name="Picture 3" descr="fig4.pdf"/>
+          <p:cNvPicPr>
+            <a:picLocks noChangeAspect="1"/>
+          </p:cNvPicPr>
+          <p:nvPr/>
+        </p:nvPicPr>
+        <p:blipFill rotWithShape="1">
+          <a:blip r:embed="rId8">
+            <a:extLst>
+              <a:ext uri="{28A0092B-C50C-407E-A947-70E740481C1C}">
+                <a14:useLocalDpi xmlns:a14="http://schemas.microsoft.com/office/drawing/2010/main" val="0"/>
+              </a:ext>
+            </a:extLst>
+          </a:blip>
+          <a:srcRect t="30634" b="30412"/>
+          <a:stretch/>
+        </p:blipFill>
+        <p:spPr>
+          <a:xfrm>
+            <a:off x="1332231" y="3481691"/>
+            <a:ext cx="6644744" cy="3349712"/>
+          </a:xfrm>
+          <a:prstGeom prst="rect">
+            <a:avLst/>
+          </a:prstGeom>
+        </p:spPr>
+      </p:pic>
     </p:spTree>
     <p:extLst>
       <p:ext uri="{BB962C8B-B14F-4D97-AF65-F5344CB8AC3E}">

</xml_diff>

<commit_message>
Corrected the expData file
1. Use the unmodified data file nascent.csv.
2. More edit in the slides about the score function. Use a modified
chi-square.
3. Still use rmsd right now.
TODO:
</commit_message>
<xml_diff>
--- a/TNF_Slides.pptx
+++ b/TNF_Slides.pptx
@@ -203,7 +203,7 @@
           <a:p>
             <a:fld id="{C16E61BC-9AFB-7443-B919-0FEFC506D3C0}" type="datetimeFigureOut">
               <a:rPr lang="en-US" smtClean="0"/>
-              <a:t>1/2/14</a:t>
+              <a:t>1/9/14</a:t>
             </a:fld>
             <a:endParaRPr lang="en-US"/>
           </a:p>
@@ -725,7 +725,7 @@
           <a:p>
             <a:r>
               <a:rPr lang="en-US" dirty="0" smtClean="0"/>
-              <a:t>(1)</a:t>
+              <a:t>Equation</a:t>
             </a:r>
             <a:endParaRPr lang="en-US" dirty="0"/>
           </a:p>
@@ -811,15 +811,137 @@
           <a:bodyPr/>
           <a:lstStyle/>
           <a:p>
+            <a:pPr marL="0" marR="0" indent="0" algn="l" defTabSz="457200" rtl="0" eaLnBrk="1" fontAlgn="auto" latinLnBrk="0" hangingPunct="1">
+              <a:lnSpc>
+                <a:spcPct val="100000"/>
+              </a:lnSpc>
+              <a:spcBef>
+                <a:spcPts val="0"/>
+              </a:spcBef>
+              <a:spcAft>
+                <a:spcPts val="0"/>
+              </a:spcAft>
+              <a:buClrTx/>
+              <a:buSzTx/>
+              <a:buFontTx/>
+              <a:buNone/>
+              <a:tabLst/>
+              <a:defRPr/>
+            </a:pPr>
             <a:r>
               <a:rPr lang="en-US" dirty="0" smtClean="0"/>
-              <a:t>Score</a:t>
+              <a:t>http://</a:t>
+            </a:r>
+            <a:r>
+              <a:rPr lang="en-US" dirty="0" err="1" smtClean="0"/>
+              <a:t>en.wikipedia.org</a:t>
+            </a:r>
+            <a:r>
+              <a:rPr lang="en-US" dirty="0" smtClean="0"/>
+              <a:t>/wiki/</a:t>
+            </a:r>
+            <a:r>
+              <a:rPr lang="en-US" dirty="0" err="1" smtClean="0"/>
+              <a:t>Goodness_of_fit</a:t>
+            </a:r>
+            <a:r>
+              <a:rPr lang="en-US" dirty="0" smtClean="0"/>
+              <a:t>; </a:t>
+            </a:r>
+            <a:r>
+              <a:rPr lang="en-US" dirty="0" err="1" smtClean="0"/>
+              <a:t>chi_square</a:t>
             </a:r>
             <a:r>
               <a:rPr lang="en-US" baseline="0" dirty="0" smtClean="0"/>
-              <a:t> function:</a:t>
+              <a:t> &lt;1:</a:t>
             </a:r>
-            <a:endParaRPr lang="en-US" dirty="0"/>
+            <a:r>
+              <a:rPr lang="en-US" dirty="0" smtClean="0"/>
+              <a:t>indicates that the model is 'over-fitting' the data (either the model is improperly fitting noise, or the error variance has been overestimated). </a:t>
+            </a:r>
+          </a:p>
+          <a:p>
+            <a:pPr marL="0" marR="0" indent="0" algn="l" defTabSz="457200" rtl="0" eaLnBrk="1" fontAlgn="auto" latinLnBrk="0" hangingPunct="1">
+              <a:lnSpc>
+                <a:spcPct val="100000"/>
+              </a:lnSpc>
+              <a:spcBef>
+                <a:spcPts val="0"/>
+              </a:spcBef>
+              <a:spcAft>
+                <a:spcPts val="0"/>
+              </a:spcAft>
+              <a:buClrTx/>
+              <a:buSzTx/>
+              <a:buFontTx/>
+              <a:buNone/>
+              <a:tabLst/>
+              <a:defRPr/>
+            </a:pPr>
+            <a:r>
+              <a:rPr lang="en-US" dirty="0" err="1" smtClean="0"/>
+              <a:t>Chi_square</a:t>
+            </a:r>
+            <a:r>
+              <a:rPr lang="en-US" dirty="0" smtClean="0"/>
+              <a:t> &gt;1: indicates that the fit has not fully captured the data (or that the error variance has been underestimated). </a:t>
+            </a:r>
+          </a:p>
+          <a:p>
+            <a:pPr marL="0" marR="0" indent="0" algn="l" defTabSz="457200" rtl="0" eaLnBrk="1" fontAlgn="auto" latinLnBrk="0" hangingPunct="1">
+              <a:lnSpc>
+                <a:spcPct val="100000"/>
+              </a:lnSpc>
+              <a:spcBef>
+                <a:spcPts val="0"/>
+              </a:spcBef>
+              <a:spcAft>
+                <a:spcPts val="0"/>
+              </a:spcAft>
+              <a:buClrTx/>
+              <a:buSzTx/>
+              <a:buFontTx/>
+              <a:buNone/>
+              <a:tabLst/>
+              <a:defRPr/>
+            </a:pPr>
+            <a:r>
+              <a:rPr lang="en-US" dirty="0" err="1" smtClean="0"/>
+              <a:t>Chi_square</a:t>
+            </a:r>
+            <a:r>
+              <a:rPr lang="en-US" baseline="0" dirty="0" smtClean="0"/>
+              <a:t> =</a:t>
+            </a:r>
+            <a:r>
+              <a:rPr lang="en-US" baseline="0" smtClean="0"/>
+              <a:t>1:</a:t>
+            </a:r>
+            <a:r>
+              <a:rPr lang="en-US" smtClean="0"/>
+              <a:t>extent of the match between observations and estimates is in accord with the error variance.</a:t>
+            </a:r>
+          </a:p>
+          <a:p>
+            <a:pPr marL="0" marR="0" indent="0" algn="l" defTabSz="457200" rtl="0" eaLnBrk="1" fontAlgn="auto" latinLnBrk="0" hangingPunct="1">
+              <a:lnSpc>
+                <a:spcPct val="100000"/>
+              </a:lnSpc>
+              <a:spcBef>
+                <a:spcPts val="0"/>
+              </a:spcBef>
+              <a:spcAft>
+                <a:spcPts val="0"/>
+              </a:spcAft>
+              <a:buClrTx/>
+              <a:buSzTx/>
+              <a:buFontTx/>
+              <a:buNone/>
+              <a:tabLst/>
+              <a:defRPr/>
+            </a:pPr>
+            <a:endParaRPr lang="en-US" dirty="0" smtClean="0"/>
           </a:p>
         </p:txBody>
       </p:sp>
@@ -1605,7 +1727,7 @@
             <a:fld id="{0DA042B0-5508-8A40-9A09-F8377543C8AB}" type="datetimeFigureOut">
               <a:rPr lang="en-US" smtClean="0"/>
               <a:pPr/>
-              <a:t>1/2/14</a:t>
+              <a:t>1/9/14</a:t>
             </a:fld>
             <a:endParaRPr lang="en-US" dirty="0"/>
           </a:p>
@@ -1777,7 +1899,7 @@
             <a:fld id="{0DA042B0-5508-8A40-9A09-F8377543C8AB}" type="datetimeFigureOut">
               <a:rPr lang="en-US" smtClean="0"/>
               <a:pPr/>
-              <a:t>1/2/14</a:t>
+              <a:t>1/9/14</a:t>
             </a:fld>
             <a:endParaRPr lang="en-US" dirty="0"/>
           </a:p>
@@ -1959,7 +2081,7 @@
             <a:fld id="{0DA042B0-5508-8A40-9A09-F8377543C8AB}" type="datetimeFigureOut">
               <a:rPr lang="en-US" smtClean="0"/>
               <a:pPr/>
-              <a:t>1/2/14</a:t>
+              <a:t>1/9/14</a:t>
             </a:fld>
             <a:endParaRPr lang="en-US" dirty="0"/>
           </a:p>
@@ -2131,7 +2253,7 @@
             <a:fld id="{0DA042B0-5508-8A40-9A09-F8377543C8AB}" type="datetimeFigureOut">
               <a:rPr lang="en-US" smtClean="0"/>
               <a:pPr/>
-              <a:t>1/2/14</a:t>
+              <a:t>1/9/14</a:t>
             </a:fld>
             <a:endParaRPr lang="en-US" dirty="0"/>
           </a:p>
@@ -2379,7 +2501,7 @@
             <a:fld id="{0DA042B0-5508-8A40-9A09-F8377543C8AB}" type="datetimeFigureOut">
               <a:rPr lang="en-US" smtClean="0"/>
               <a:pPr/>
-              <a:t>1/2/14</a:t>
+              <a:t>1/9/14</a:t>
             </a:fld>
             <a:endParaRPr lang="en-US" dirty="0"/>
           </a:p>
@@ -2669,7 +2791,7 @@
             <a:fld id="{0DA042B0-5508-8A40-9A09-F8377543C8AB}" type="datetimeFigureOut">
               <a:rPr lang="en-US" smtClean="0"/>
               <a:pPr/>
-              <a:t>1/2/14</a:t>
+              <a:t>1/9/14</a:t>
             </a:fld>
             <a:endParaRPr lang="en-US" dirty="0"/>
           </a:p>
@@ -3093,7 +3215,7 @@
             <a:fld id="{0DA042B0-5508-8A40-9A09-F8377543C8AB}" type="datetimeFigureOut">
               <a:rPr lang="en-US" smtClean="0"/>
               <a:pPr/>
-              <a:t>1/2/14</a:t>
+              <a:t>1/9/14</a:t>
             </a:fld>
             <a:endParaRPr lang="en-US" dirty="0"/>
           </a:p>
@@ -3213,7 +3335,7 @@
             <a:fld id="{0DA042B0-5508-8A40-9A09-F8377543C8AB}" type="datetimeFigureOut">
               <a:rPr lang="en-US" smtClean="0"/>
               <a:pPr/>
-              <a:t>1/2/14</a:t>
+              <a:t>1/9/14</a:t>
             </a:fld>
             <a:endParaRPr lang="en-US" dirty="0"/>
           </a:p>
@@ -3310,7 +3432,7 @@
             <a:fld id="{0DA042B0-5508-8A40-9A09-F8377543C8AB}" type="datetimeFigureOut">
               <a:rPr lang="en-US" smtClean="0"/>
               <a:pPr/>
-              <a:t>1/2/14</a:t>
+              <a:t>1/9/14</a:t>
             </a:fld>
             <a:endParaRPr lang="en-US" dirty="0"/>
           </a:p>
@@ -3589,7 +3711,7 @@
             <a:fld id="{0DA042B0-5508-8A40-9A09-F8377543C8AB}" type="datetimeFigureOut">
               <a:rPr lang="en-US" smtClean="0"/>
               <a:pPr/>
-              <a:t>1/2/14</a:t>
+              <a:t>1/9/14</a:t>
             </a:fld>
             <a:endParaRPr lang="en-US" dirty="0"/>
           </a:p>
@@ -3848,7 +3970,7 @@
             <a:fld id="{0DA042B0-5508-8A40-9A09-F8377543C8AB}" type="datetimeFigureOut">
               <a:rPr lang="en-US" smtClean="0"/>
               <a:pPr/>
-              <a:t>1/2/14</a:t>
+              <a:t>1/9/14</a:t>
             </a:fld>
             <a:endParaRPr lang="en-US" dirty="0"/>
           </a:p>
@@ -4063,7 +4185,7 @@
             <a:fld id="{0DA042B0-5508-8A40-9A09-F8377543C8AB}" type="datetimeFigureOut">
               <a:rPr lang="en-US" smtClean="0"/>
               <a:pPr/>
-              <a:t>1/2/14</a:t>
+              <a:t>1/9/14</a:t>
             </a:fld>
             <a:endParaRPr lang="en-US" dirty="0"/>
           </a:p>
@@ -22096,7 +22218,6 @@
               <a:rPr lang="en-US" sz="1200" dirty="0"/>
               <a:t>synthesis </a:t>
             </a:r>
-            <a:endParaRPr lang="en-US" sz="1200" dirty="0"/>
           </a:p>
         </p:txBody>
       </p:sp>
@@ -27241,7 +27362,7 @@
         </p:nvSpPr>
         <p:spPr bwMode="auto">
           <a:xfrm>
-            <a:off x="1738034" y="4075159"/>
+            <a:off x="2572345" y="3252977"/>
             <a:ext cx="377825" cy="274637"/>
           </a:xfrm>
           <a:prstGeom prst="rect">
@@ -27318,7 +27439,7 @@
         </p:nvGrpSpPr>
         <p:grpSpPr>
           <a:xfrm flipH="1">
-            <a:off x="1245909" y="3768771"/>
+            <a:off x="2080220" y="2946589"/>
             <a:ext cx="1143000" cy="322263"/>
             <a:chOff x="3101181" y="5965825"/>
             <a:chExt cx="1143000" cy="322263"/>
@@ -27614,7 +27735,7 @@
         </p:nvSpPr>
         <p:spPr bwMode="auto">
           <a:xfrm>
-            <a:off x="2515909" y="3717971"/>
+            <a:off x="3350220" y="2895789"/>
             <a:ext cx="528638" cy="304800"/>
           </a:xfrm>
           <a:prstGeom prst="rect">
@@ -27682,7 +27803,7 @@
         </p:nvSpPr>
         <p:spPr bwMode="auto">
           <a:xfrm flipV="1">
-            <a:off x="2171580" y="3168516"/>
+            <a:off x="3005891" y="2346334"/>
             <a:ext cx="234950" cy="449818"/>
           </a:xfrm>
           <a:prstGeom prst="line">
@@ -27751,7 +27872,7 @@
         </p:nvGrpSpPr>
         <p:grpSpPr>
           <a:xfrm>
-            <a:off x="1565234" y="2912454"/>
+            <a:off x="2399545" y="2090272"/>
             <a:ext cx="1901349" cy="95433"/>
             <a:chOff x="4591050" y="5183654"/>
             <a:chExt cx="1901349" cy="95433"/>
@@ -28193,7 +28314,7 @@
         </p:nvSpPr>
         <p:spPr bwMode="auto">
           <a:xfrm flipV="1">
-            <a:off x="2471329" y="2236430"/>
+            <a:off x="3305640" y="1414248"/>
             <a:ext cx="0" cy="519443"/>
           </a:xfrm>
           <a:prstGeom prst="line">
@@ -28262,7 +28383,7 @@
         </p:nvSpPr>
         <p:spPr>
           <a:xfrm>
-            <a:off x="2421704" y="3274429"/>
+            <a:off x="3127109" y="2613379"/>
             <a:ext cx="1571188" cy="276999"/>
           </a:xfrm>
           <a:prstGeom prst="rect">
@@ -28302,7 +28423,7 @@
         </p:nvSpPr>
         <p:spPr>
           <a:xfrm>
-            <a:off x="2506304" y="2386489"/>
+            <a:off x="3340615" y="1564307"/>
             <a:ext cx="1187895" cy="276999"/>
           </a:xfrm>
           <a:prstGeom prst="rect">
@@ -28333,7 +28454,7 @@
         </p:nvSpPr>
         <p:spPr bwMode="auto">
           <a:xfrm>
-            <a:off x="446136" y="3128848"/>
+            <a:off x="1280447" y="2306666"/>
             <a:ext cx="242728" cy="200603"/>
           </a:xfrm>
           <a:prstGeom prst="ellipse">
@@ -28377,7 +28498,7 @@
         </p:nvSpPr>
         <p:spPr bwMode="auto">
           <a:xfrm>
-            <a:off x="634745" y="3184149"/>
+            <a:off x="1469056" y="2361967"/>
             <a:ext cx="205901" cy="145302"/>
           </a:xfrm>
           <a:prstGeom prst="ellipse">
@@ -28421,7 +28542,7 @@
         </p:nvCxnSpPr>
         <p:spPr>
           <a:xfrm>
-            <a:off x="394587" y="2734716"/>
+            <a:off x="1228898" y="1912534"/>
             <a:ext cx="7890" cy="381346"/>
           </a:xfrm>
           <a:prstGeom prst="straightConnector1">
@@ -28461,7 +28582,7 @@
         </p:nvGrpSpPr>
         <p:grpSpPr>
           <a:xfrm>
-            <a:off x="352585" y="1843384"/>
+            <a:off x="1186896" y="1021202"/>
             <a:ext cx="544159" cy="563066"/>
             <a:chOff x="2925328" y="357827"/>
             <a:chExt cx="583027" cy="645514"/>
@@ -28597,7 +28718,7 @@
         </p:nvSpPr>
         <p:spPr>
           <a:xfrm flipH="1">
-            <a:off x="651484" y="2555739"/>
+            <a:off x="1485795" y="1733557"/>
             <a:ext cx="403444" cy="175846"/>
           </a:xfrm>
           <a:prstGeom prst="snip2DiagRect">
@@ -28647,7 +28768,7 @@
         </p:nvSpPr>
         <p:spPr>
           <a:xfrm flipH="1">
-            <a:off x="582053" y="2558277"/>
+            <a:off x="1416364" y="1736095"/>
             <a:ext cx="515570" cy="195575"/>
           </a:xfrm>
           <a:prstGeom prst="rect">
@@ -28683,7 +28804,7 @@
         </p:nvSpPr>
         <p:spPr>
           <a:xfrm>
-            <a:off x="189761" y="2561403"/>
+            <a:off x="1024072" y="1739221"/>
             <a:ext cx="409651" cy="173313"/>
           </a:xfrm>
           <a:prstGeom prst="round2DiagRect">
@@ -28733,7 +28854,7 @@
         </p:nvSpPr>
         <p:spPr>
           <a:xfrm>
-            <a:off x="187278" y="2555739"/>
+            <a:off x="1021589" y="1733557"/>
             <a:ext cx="414230" cy="195575"/>
           </a:xfrm>
           <a:prstGeom prst="rect">
@@ -28765,7 +28886,7 @@
         </p:nvSpPr>
         <p:spPr>
           <a:xfrm>
-            <a:off x="423883" y="3136745"/>
+            <a:off x="1258194" y="2314563"/>
             <a:ext cx="434987" cy="205952"/>
           </a:xfrm>
           <a:prstGeom prst="rect">
@@ -28804,7 +28925,7 @@
         </p:nvCxnSpPr>
         <p:spPr>
           <a:xfrm flipH="1">
-            <a:off x="812870" y="2745010"/>
+            <a:off x="1647181" y="1922828"/>
             <a:ext cx="3016" cy="398570"/>
           </a:xfrm>
           <a:prstGeom prst="straightConnector1">
@@ -28846,7 +28967,7 @@
         </p:nvSpPr>
         <p:spPr bwMode="auto">
           <a:xfrm>
-            <a:off x="858870" y="3432119"/>
+            <a:off x="1693181" y="2609937"/>
             <a:ext cx="387039" cy="303396"/>
           </a:xfrm>
           <a:prstGeom prst="line">
@@ -28915,7 +29036,7 @@
         </p:nvSpPr>
         <p:spPr>
           <a:xfrm>
-            <a:off x="96081" y="2500928"/>
+            <a:off x="930392" y="1678746"/>
             <a:ext cx="1034606" cy="274320"/>
           </a:xfrm>
           <a:prstGeom prst="rect">
@@ -28962,7 +29083,7 @@
         </p:nvSpPr>
         <p:spPr bwMode="auto">
           <a:xfrm flipV="1">
-            <a:off x="1261149" y="2640801"/>
+            <a:off x="2095460" y="1818619"/>
             <a:ext cx="854710" cy="0"/>
           </a:xfrm>
           <a:prstGeom prst="line">
@@ -29032,7 +29153,7 @@
         <p:spPr>
           <a:xfrm>
             <a:off x="510135" y="123487"/>
-            <a:ext cx="5009304" cy="461665"/>
+            <a:ext cx="5506636" cy="461665"/>
           </a:xfrm>
           <a:prstGeom prst="rect">
             <a:avLst/>
@@ -29045,9 +29166,14 @@
           <a:lstStyle/>
           <a:p>
             <a:r>
+              <a:rPr lang="en-US" altLang="zh-CN" sz="2400" b="1" dirty="0"/>
+              <a:t>Module1 </a:t>
+            </a:r>
+            <a:r>
               <a:rPr lang="en-US" sz="2400" b="1" dirty="0"/>
-              <a:t>Step1: Transcription + RNA processing</a:t>
+              <a:t>: Transcription + RNA processing</a:t>
             </a:r>
+            <a:endParaRPr lang="en-US" sz="2400" b="1" dirty="0"/>
           </a:p>
         </p:txBody>
       </p:sp>
@@ -29060,20 +29186,20 @@
           <p:nvPr>
             <p:extLst>
               <p:ext uri="{D42A27DB-BD31-4B8C-83A1-F6EECF244321}">
-                <p14:modId xmlns:p14="http://schemas.microsoft.com/office/powerpoint/2010/main" val="1928092505"/>
+                <p14:modId xmlns:p14="http://schemas.microsoft.com/office/powerpoint/2010/main" val="3786493024"/>
               </p:ext>
             </p:extLst>
           </p:nvPr>
         </p:nvGraphicFramePr>
         <p:xfrm>
-          <a:off x="6636" y="4892608"/>
+          <a:off x="662464" y="4125524"/>
           <a:ext cx="4218446" cy="620324"/>
         </p:xfrm>
         <a:graphic>
           <a:graphicData uri="http://schemas.openxmlformats.org/presentationml/2006/ole">
             <mc:AlternateContent xmlns:mc="http://schemas.openxmlformats.org/markup-compatibility/2006">
               <mc:Choice xmlns:v="urn:schemas-microsoft-com:vml" Requires="v">
-                <p:oleObj spid="_x0000_s1082" name="Equation" r:id="rId4" imgW="3022600" imgH="444500" progId="Equation.3">
+                <p:oleObj spid="_x0000_s1105" name="Equation" r:id="rId4" imgW="3022600" imgH="444500" progId="Equation.3">
                   <p:embed/>
                 </p:oleObj>
               </mc:Choice>
@@ -29094,7 +29220,7 @@
                     </p:blipFill>
                     <p:spPr>
                       <a:xfrm>
-                        <a:off x="6636" y="4892608"/>
+                        <a:off x="662464" y="4125524"/>
                         <a:ext cx="4218446" cy="620324"/>
                       </a:xfrm>
                       <a:prstGeom prst="rect">
@@ -29108,39 +29234,6 @@
           </a:graphicData>
         </a:graphic>
       </p:graphicFrame>
-      <p:sp>
-        <p:nvSpPr>
-          <p:cNvPr id="14" name="Rectangle 13"/>
-          <p:cNvSpPr/>
-          <p:nvPr/>
-        </p:nvSpPr>
-        <p:spPr>
-          <a:xfrm>
-            <a:off x="0" y="4213114"/>
-            <a:ext cx="503413" cy="369332"/>
-          </a:xfrm>
-          <a:prstGeom prst="rect">
-            <a:avLst/>
-          </a:prstGeom>
-        </p:spPr>
-        <p:txBody>
-          <a:bodyPr wrap="none">
-            <a:spAutoFit/>
-          </a:bodyPr>
-          <a:lstStyle/>
-          <a:p>
-            <a:r>
-              <a:rPr lang="en-US" dirty="0"/>
-              <a:t>(1</a:t>
-            </a:r>
-            <a:r>
-              <a:rPr lang="en-US" dirty="0" smtClean="0"/>
-              <a:t>):</a:t>
-            </a:r>
-            <a:endParaRPr lang="en-US" dirty="0"/>
-          </a:p>
-        </p:txBody>
-      </p:sp>
       <p:graphicFrame>
         <p:nvGraphicFramePr>
           <p:cNvPr id="16" name="Object 15"/>
@@ -29150,25 +29243,25 @@
           <p:nvPr>
             <p:extLst>
               <p:ext uri="{D42A27DB-BD31-4B8C-83A1-F6EECF244321}">
-                <p14:modId xmlns:p14="http://schemas.microsoft.com/office/powerpoint/2010/main" val="355392860"/>
+                <p14:modId xmlns:p14="http://schemas.microsoft.com/office/powerpoint/2010/main" val="460502291"/>
               </p:ext>
             </p:extLst>
           </p:nvPr>
         </p:nvGraphicFramePr>
         <p:xfrm>
-          <a:off x="14381" y="5795963"/>
-          <a:ext cx="4210702" cy="407339"/>
+          <a:off x="326373" y="6111875"/>
+          <a:ext cx="4554537" cy="407988"/>
         </p:xfrm>
         <a:graphic>
           <a:graphicData uri="http://schemas.openxmlformats.org/presentationml/2006/ole">
             <mc:AlternateContent xmlns:mc="http://schemas.openxmlformats.org/markup-compatibility/2006">
               <mc:Choice xmlns:v="urn:schemas-microsoft-com:vml" Requires="v">
-                <p:oleObj spid="_x0000_s1083" name="Equation" r:id="rId6" imgW="2628900" imgH="254000" progId="Equation.3">
+                <p:oleObj spid="_x0000_s1106" name="Equation" r:id="rId6" imgW="2844800" imgH="254000" progId="Equation.3">
                   <p:embed/>
                 </p:oleObj>
               </mc:Choice>
               <mc:Fallback>
-                <p:oleObj name="Equation" r:id="rId6" imgW="2628900" imgH="254000" progId="Equation.3">
+                <p:oleObj name="Equation" r:id="rId6" imgW="2844800" imgH="254000" progId="Equation.3">
                   <p:embed/>
                   <p:pic>
                     <p:nvPicPr>
@@ -29184,8 +29277,65 @@
                     </p:blipFill>
                     <p:spPr>
                       <a:xfrm>
-                        <a:off x="14381" y="5795963"/>
-                        <a:ext cx="4210702" cy="407339"/>
+                        <a:off x="326373" y="6111875"/>
+                        <a:ext cx="4554537" cy="407988"/>
+                      </a:xfrm>
+                      <a:prstGeom prst="rect">
+                        <a:avLst/>
+                      </a:prstGeom>
+                    </p:spPr>
+                  </p:pic>
+                </p:oleObj>
+              </mc:Fallback>
+            </mc:AlternateContent>
+          </a:graphicData>
+        </a:graphic>
+      </p:graphicFrame>
+      <p:graphicFrame>
+        <p:nvGraphicFramePr>
+          <p:cNvPr id="43" name="Object 42"/>
+          <p:cNvGraphicFramePr>
+            <a:graphicFrameLocks noChangeAspect="1"/>
+          </p:cNvGraphicFramePr>
+          <p:nvPr>
+            <p:extLst>
+              <p:ext uri="{D42A27DB-BD31-4B8C-83A1-F6EECF244321}">
+                <p14:modId xmlns:p14="http://schemas.microsoft.com/office/powerpoint/2010/main" val="1641104705"/>
+              </p:ext>
+            </p:extLst>
+          </p:nvPr>
+        </p:nvGraphicFramePr>
+        <p:xfrm>
+          <a:off x="836679" y="5072851"/>
+          <a:ext cx="3065463" cy="638175"/>
+        </p:xfrm>
+        <a:graphic>
+          <a:graphicData uri="http://schemas.openxmlformats.org/presentationml/2006/ole">
+            <mc:AlternateContent xmlns:mc="http://schemas.openxmlformats.org/markup-compatibility/2006">
+              <mc:Choice xmlns:v="urn:schemas-microsoft-com:vml" Requires="v">
+                <p:oleObj spid="_x0000_s1107" name="Equation" r:id="rId8" imgW="2197100" imgH="457200" progId="Equation.3">
+                  <p:embed/>
+                </p:oleObj>
+              </mc:Choice>
+              <mc:Fallback>
+                <p:oleObj name="Equation" r:id="rId8" imgW="2197100" imgH="457200" progId="Equation.3">
+                  <p:embed/>
+                  <p:pic>
+                    <p:nvPicPr>
+                      <p:cNvPr id="0" name=""/>
+                      <p:cNvPicPr/>
+                      <p:nvPr/>
+                    </p:nvPicPr>
+                    <p:blipFill>
+                      <a:blip r:embed="rId9"/>
+                      <a:stretch>
+                        <a:fillRect/>
+                      </a:stretch>
+                    </p:blipFill>
+                    <p:spPr>
+                      <a:xfrm>
+                        <a:off x="836679" y="5072851"/>
+                        <a:ext cx="3065463" cy="638175"/>
                       </a:xfrm>
                       <a:prstGeom prst="rect">
                         <a:avLst/>
@@ -29200,14 +29350,14 @@
       </p:graphicFrame>
       <p:pic>
         <p:nvPicPr>
-          <p:cNvPr id="20" name="Picture 19" descr="fig2.pdf"/>
+          <p:cNvPr id="44" name="Picture 43" descr="fig2.pdf"/>
           <p:cNvPicPr>
             <a:picLocks noChangeAspect="1"/>
           </p:cNvPicPr>
           <p:nvPr/>
         </p:nvPicPr>
         <p:blipFill>
-          <a:blip r:embed="rId8">
+          <a:blip r:embed="rId10">
             <a:extLst>
               <a:ext uri="{28A0092B-C50C-407E-A947-70E740481C1C}">
                 <a14:useLocalDpi xmlns:a14="http://schemas.microsoft.com/office/drawing/2010/main" val="0"/>
@@ -29220,14 +29370,197 @@
         </p:blipFill>
         <p:spPr>
           <a:xfrm>
-            <a:off x="3844636" y="0"/>
-            <a:ext cx="5299364" cy="6858000"/>
+            <a:off x="5672706" y="1033346"/>
+            <a:ext cx="2743200" cy="5486400"/>
           </a:xfrm>
           <a:prstGeom prst="rect">
             <a:avLst/>
           </a:prstGeom>
         </p:spPr>
       </p:pic>
+      <p:sp>
+        <p:nvSpPr>
+          <p:cNvPr id="10" name="Rectangle 9"/>
+          <p:cNvSpPr/>
+          <p:nvPr/>
+        </p:nvSpPr>
+        <p:spPr>
+          <a:xfrm>
+            <a:off x="153100" y="3679145"/>
+            <a:ext cx="1018728" cy="369332"/>
+          </a:xfrm>
+          <a:prstGeom prst="rect">
+            <a:avLst/>
+          </a:prstGeom>
+        </p:spPr>
+        <p:txBody>
+          <a:bodyPr wrap="none">
+            <a:spAutoFit/>
+          </a:bodyPr>
+          <a:lstStyle/>
+          <a:p>
+            <a:r>
+              <a:rPr lang="en-US" dirty="0">
+                <a:solidFill>
+                  <a:srgbClr val="0000FF"/>
+                </a:solidFill>
+              </a:rPr>
+              <a:t>Equation</a:t>
+            </a:r>
+            <a:endParaRPr lang="en-US" dirty="0">
+              <a:solidFill>
+                <a:srgbClr val="0000FF"/>
+              </a:solidFill>
+            </a:endParaRPr>
+          </a:p>
+        </p:txBody>
+      </p:sp>
+      <p:sp>
+        <p:nvSpPr>
+          <p:cNvPr id="46" name="Rectangle 45"/>
+          <p:cNvSpPr/>
+          <p:nvPr/>
+        </p:nvSpPr>
+        <p:spPr>
+          <a:xfrm>
+            <a:off x="231957" y="4703519"/>
+            <a:ext cx="1645966" cy="369332"/>
+          </a:xfrm>
+          <a:prstGeom prst="rect">
+            <a:avLst/>
+          </a:prstGeom>
+        </p:spPr>
+        <p:txBody>
+          <a:bodyPr wrap="none">
+            <a:spAutoFit/>
+          </a:bodyPr>
+          <a:lstStyle/>
+          <a:p>
+            <a:r>
+              <a:rPr lang="en-US" dirty="0" smtClean="0">
+                <a:solidFill>
+                  <a:srgbClr val="0000FF"/>
+                </a:solidFill>
+              </a:rPr>
+              <a:t>Initial condition</a:t>
+            </a:r>
+            <a:endParaRPr lang="en-US" dirty="0">
+              <a:solidFill>
+                <a:srgbClr val="0000FF"/>
+              </a:solidFill>
+            </a:endParaRPr>
+          </a:p>
+        </p:txBody>
+      </p:sp>
+      <p:sp>
+        <p:nvSpPr>
+          <p:cNvPr id="47" name="Rectangle 46"/>
+          <p:cNvSpPr/>
+          <p:nvPr/>
+        </p:nvSpPr>
+        <p:spPr>
+          <a:xfrm>
+            <a:off x="295701" y="5742150"/>
+            <a:ext cx="1969221" cy="369332"/>
+          </a:xfrm>
+          <a:prstGeom prst="rect">
+            <a:avLst/>
+          </a:prstGeom>
+        </p:spPr>
+        <p:txBody>
+          <a:bodyPr wrap="none">
+            <a:spAutoFit/>
+          </a:bodyPr>
+          <a:lstStyle/>
+          <a:p>
+            <a:r>
+              <a:rPr lang="en-US" dirty="0" smtClean="0">
+                <a:solidFill>
+                  <a:srgbClr val="0000FF"/>
+                </a:solidFill>
+              </a:rPr>
+              <a:t>Parameters (</a:t>
+            </a:r>
+            <a:r>
+              <a:rPr lang="en-US" dirty="0" err="1" smtClean="0">
+                <a:solidFill>
+                  <a:srgbClr val="0000FF"/>
+                </a:solidFill>
+              </a:rPr>
+              <a:t>n</a:t>
+            </a:r>
+            <a:r>
+              <a:rPr lang="en-US" baseline="-25000" dirty="0" err="1" smtClean="0">
+                <a:solidFill>
+                  <a:srgbClr val="0000FF"/>
+                </a:solidFill>
+              </a:rPr>
+              <a:t>p</a:t>
+            </a:r>
+            <a:r>
+              <a:rPr lang="en-US" dirty="0" smtClean="0">
+                <a:solidFill>
+                  <a:srgbClr val="0000FF"/>
+                </a:solidFill>
+              </a:rPr>
+              <a:t>= 5)</a:t>
+            </a:r>
+            <a:endParaRPr lang="en-US" dirty="0">
+              <a:solidFill>
+                <a:srgbClr val="0000FF"/>
+              </a:solidFill>
+            </a:endParaRPr>
+          </a:p>
+        </p:txBody>
+      </p:sp>
+      <p:sp>
+        <p:nvSpPr>
+          <p:cNvPr id="11" name="Rectangle 10"/>
+          <p:cNvSpPr/>
+          <p:nvPr/>
+        </p:nvSpPr>
+        <p:spPr>
+          <a:xfrm>
+            <a:off x="416010" y="843051"/>
+            <a:ext cx="4464900" cy="2684563"/>
+          </a:xfrm>
+          <a:prstGeom prst="rect">
+            <a:avLst/>
+          </a:prstGeom>
+          <a:noFill/>
+          <a:ln w="38100" cmpd="sng">
+            <a:solidFill>
+              <a:srgbClr val="000000"/>
+            </a:solidFill>
+          </a:ln>
+        </p:spPr>
+        <p:style>
+          <a:lnRef idx="1">
+            <a:schemeClr val="accent1"/>
+          </a:lnRef>
+          <a:fillRef idx="3">
+            <a:schemeClr val="accent1"/>
+          </a:fillRef>
+          <a:effectRef idx="2">
+            <a:schemeClr val="accent1"/>
+          </a:effectRef>
+          <a:fontRef idx="minor">
+            <a:schemeClr val="lt1"/>
+          </a:fontRef>
+        </p:style>
+        <p:txBody>
+          <a:bodyPr rtlCol="0" anchor="ctr"/>
+          <a:lstStyle/>
+          <a:p>
+            <a:pPr algn="ctr"/>
+            <a:endParaRPr lang="en-US">
+              <a:solidFill>
+                <a:srgbClr val="0000FF"/>
+              </a:solidFill>
+            </a:endParaRPr>
+          </a:p>
+        </p:txBody>
+      </p:sp>
     </p:spTree>
     <p:extLst>
       <p:ext uri="{BB962C8B-B14F-4D97-AF65-F5344CB8AC3E}">
@@ -29274,7 +29607,7 @@
           <p:nvPr/>
         </p:nvPicPr>
         <p:blipFill rotWithShape="1">
-          <a:blip r:embed="rId3">
+          <a:blip r:embed="rId4">
             <a:extLst>
               <a:ext uri="{28A0092B-C50C-407E-A947-70E740481C1C}">
                 <a14:useLocalDpi xmlns:a14="http://schemas.microsoft.com/office/drawing/2010/main" val="0"/>
@@ -29286,24 +29619,742 @@
         </p:blipFill>
         <p:spPr>
           <a:xfrm>
-            <a:off x="2336799" y="0"/>
-            <a:ext cx="4188091" cy="3441699"/>
+            <a:off x="2335691" y="-72781"/>
+            <a:ext cx="4231772" cy="3477596"/>
           </a:xfrm>
           <a:prstGeom prst="rect">
             <a:avLst/>
           </a:prstGeom>
         </p:spPr>
       </p:pic>
+      <p:graphicFrame>
+        <p:nvGraphicFramePr>
+          <p:cNvPr id="3" name="Table 2"/>
+          <p:cNvGraphicFramePr>
+            <a:graphicFrameLocks noGrp="1"/>
+          </p:cNvGraphicFramePr>
+          <p:nvPr>
+            <p:extLst>
+              <p:ext uri="{D42A27DB-BD31-4B8C-83A1-F6EECF244321}">
+                <p14:modId xmlns:p14="http://schemas.microsoft.com/office/powerpoint/2010/main" val="3024420232"/>
+              </p:ext>
+            </p:extLst>
+          </p:nvPr>
+        </p:nvGraphicFramePr>
+        <p:xfrm>
+          <a:off x="218954" y="3502039"/>
+          <a:ext cx="5013338" cy="3132881"/>
+        </p:xfrm>
+        <a:graphic>
+          <a:graphicData uri="http://schemas.openxmlformats.org/drawingml/2006/table">
+            <a:tbl>
+              <a:tblPr firstRow="1" bandRow="1">
+                <a:tableStyleId>{5C22544A-7EE6-4342-B048-85BDC9FD1C3A}</a:tableStyleId>
+              </a:tblPr>
+              <a:tblGrid>
+                <a:gridCol w="824131"/>
+                <a:gridCol w="2339995"/>
+                <a:gridCol w="973256"/>
+                <a:gridCol w="875956"/>
+              </a:tblGrid>
+              <a:tr h="330934">
+                <a:tc>
+                  <a:txBody>
+                    <a:bodyPr/>
+                    <a:lstStyle/>
+                    <a:p>
+                      <a:r>
+                        <a:rPr lang="en-US" sz="1600" dirty="0" smtClean="0"/>
+                        <a:t>Index(</a:t>
+                      </a:r>
+                      <a:r>
+                        <a:rPr lang="en-US" sz="1600" dirty="0" err="1" smtClean="0"/>
+                        <a:t>i</a:t>
+                      </a:r>
+                      <a:r>
+                        <a:rPr lang="en-US" sz="1600" dirty="0" smtClean="0"/>
+                        <a:t>)</a:t>
+                      </a:r>
+                      <a:endParaRPr lang="en-US" sz="1600" dirty="0"/>
+                    </a:p>
+                  </a:txBody>
+                  <a:tcPr/>
+                </a:tc>
+                <a:tc>
+                  <a:txBody>
+                    <a:bodyPr/>
+                    <a:lstStyle/>
+                    <a:p>
+                      <a:r>
+                        <a:rPr lang="en-US" sz="1600" dirty="0" smtClean="0"/>
+                        <a:t>Feature</a:t>
+                      </a:r>
+                      <a:endParaRPr lang="en-US" sz="1600" dirty="0"/>
+                    </a:p>
+                  </a:txBody>
+                  <a:tcPr/>
+                </a:tc>
+                <a:tc>
+                  <a:txBody>
+                    <a:bodyPr/>
+                    <a:lstStyle/>
+                    <a:p>
+                      <a:pPr algn="l"/>
+                      <a:r>
+                        <a:rPr lang="en-US" sz="1600" dirty="0" smtClean="0"/>
+                        <a:t>Value(</a:t>
+                      </a:r>
+                      <a:r>
+                        <a:rPr lang="en-US" sz="1600" dirty="0" err="1" smtClean="0"/>
+                        <a:t>F</a:t>
+                      </a:r>
+                      <a:r>
+                        <a:rPr lang="en-US" sz="1600" baseline="30000" dirty="0" err="1" smtClean="0"/>
+                        <a:t>s</a:t>
+                      </a:r>
+                      <a:r>
+                        <a:rPr lang="en-US" sz="1600" baseline="-25000" dirty="0" err="1" smtClean="0"/>
+                        <a:t>i</a:t>
+                      </a:r>
+                      <a:r>
+                        <a:rPr lang="en-US" sz="1600" baseline="0" dirty="0" smtClean="0"/>
+                        <a:t>)</a:t>
+                      </a:r>
+                      <a:endParaRPr lang="en-US" sz="1600" dirty="0"/>
+                    </a:p>
+                  </a:txBody>
+                  <a:tcPr/>
+                </a:tc>
+                <a:tc>
+                  <a:txBody>
+                    <a:bodyPr/>
+                    <a:lstStyle/>
+                    <a:p>
+                      <a:r>
+                        <a:rPr lang="en-US" sz="1600" dirty="0" smtClean="0"/>
+                        <a:t>Error(</a:t>
+                      </a:r>
+                      <a:r>
+                        <a:rPr lang="en-US" sz="1600" dirty="0" err="1" smtClean="0"/>
+                        <a:t>σ</a:t>
+                      </a:r>
+                      <a:r>
+                        <a:rPr lang="en-US" sz="1600" baseline="-25000" dirty="0" err="1" smtClean="0"/>
+                        <a:t>i</a:t>
+                      </a:r>
+                      <a:r>
+                        <a:rPr lang="en-US" sz="1600" dirty="0" smtClean="0"/>
+                        <a:t>)</a:t>
+                      </a:r>
+                      <a:endParaRPr lang="en-US" sz="1600" dirty="0"/>
+                    </a:p>
+                  </a:txBody>
+                  <a:tcPr/>
+                </a:tc>
+              </a:tr>
+              <a:tr h="330934">
+                <a:tc>
+                  <a:txBody>
+                    <a:bodyPr/>
+                    <a:lstStyle/>
+                    <a:p>
+                      <a:r>
+                        <a:rPr lang="en-US" sz="1600" dirty="0" smtClean="0"/>
+                        <a:t>1</a:t>
+                      </a:r>
+                      <a:endParaRPr lang="en-US" sz="1600" dirty="0"/>
+                    </a:p>
+                  </a:txBody>
+                  <a:tcPr/>
+                </a:tc>
+                <a:tc>
+                  <a:txBody>
+                    <a:bodyPr/>
+                    <a:lstStyle/>
+                    <a:p>
+                      <a:r>
+                        <a:rPr lang="en-US" sz="1600" dirty="0" smtClean="0"/>
+                        <a:t>Peak time (</a:t>
+                      </a:r>
+                      <a:r>
+                        <a:rPr lang="en-US" sz="1600" dirty="0" err="1" smtClean="0"/>
+                        <a:t>wt</a:t>
+                      </a:r>
+                      <a:r>
+                        <a:rPr lang="en-US" sz="1600" dirty="0" smtClean="0"/>
+                        <a:t>)</a:t>
+                      </a:r>
+                      <a:endParaRPr lang="en-US" sz="1600" dirty="0"/>
+                    </a:p>
+                  </a:txBody>
+                  <a:tcPr/>
+                </a:tc>
+                <a:tc>
+                  <a:txBody>
+                    <a:bodyPr/>
+                    <a:lstStyle/>
+                    <a:p>
+                      <a:r>
+                        <a:rPr lang="en-US" sz="1600" dirty="0" smtClean="0"/>
+                        <a:t>30 min</a:t>
+                      </a:r>
+                      <a:endParaRPr lang="en-US" sz="1600" dirty="0"/>
+                    </a:p>
+                  </a:txBody>
+                  <a:tcPr/>
+                </a:tc>
+                <a:tc>
+                  <a:txBody>
+                    <a:bodyPr/>
+                    <a:lstStyle/>
+                    <a:p>
+                      <a:r>
+                        <a:rPr lang="en-US" sz="1600" dirty="0" smtClean="0"/>
+                        <a:t>10 min</a:t>
+                      </a:r>
+                      <a:endParaRPr lang="en-US" sz="1600" dirty="0"/>
+                    </a:p>
+                  </a:txBody>
+                  <a:tcPr/>
+                </a:tc>
+              </a:tr>
+              <a:tr h="330934">
+                <a:tc>
+                  <a:txBody>
+                    <a:bodyPr/>
+                    <a:lstStyle/>
+                    <a:p>
+                      <a:r>
+                        <a:rPr lang="en-US" sz="1600" dirty="0" smtClean="0"/>
+                        <a:t>2</a:t>
+                      </a:r>
+                      <a:endParaRPr lang="en-US" sz="1600" dirty="0"/>
+                    </a:p>
+                  </a:txBody>
+                  <a:tcPr/>
+                </a:tc>
+                <a:tc>
+                  <a:txBody>
+                    <a:bodyPr/>
+                    <a:lstStyle/>
+                    <a:p>
+                      <a:r>
+                        <a:rPr lang="en-US" sz="1600" dirty="0" smtClean="0"/>
+                        <a:t>Peak</a:t>
+                      </a:r>
+                      <a:r>
+                        <a:rPr lang="en-US" sz="1600" baseline="0" dirty="0" smtClean="0"/>
+                        <a:t> time (</a:t>
+                      </a:r>
+                      <a:r>
+                        <a:rPr lang="en-US" sz="1600" baseline="0" dirty="0" err="1" smtClean="0"/>
+                        <a:t>mko</a:t>
+                      </a:r>
+                      <a:r>
+                        <a:rPr lang="en-US" sz="1600" baseline="0" dirty="0" smtClean="0"/>
+                        <a:t>)</a:t>
+                      </a:r>
+                      <a:endParaRPr lang="en-US" sz="1600" dirty="0"/>
+                    </a:p>
+                  </a:txBody>
+                  <a:tcPr/>
+                </a:tc>
+                <a:tc>
+                  <a:txBody>
+                    <a:bodyPr/>
+                    <a:lstStyle/>
+                    <a:p>
+                      <a:r>
+                        <a:rPr lang="en-US" sz="1600" dirty="0" smtClean="0"/>
+                        <a:t>60 min</a:t>
+                      </a:r>
+                      <a:endParaRPr lang="en-US" sz="1600" dirty="0"/>
+                    </a:p>
+                  </a:txBody>
+                  <a:tcPr/>
+                </a:tc>
+                <a:tc>
+                  <a:txBody>
+                    <a:bodyPr/>
+                    <a:lstStyle/>
+                    <a:p>
+                      <a:r>
+                        <a:rPr lang="en-US" sz="1600" dirty="0" smtClean="0"/>
+                        <a:t>20 min</a:t>
+                      </a:r>
+                      <a:endParaRPr lang="en-US" sz="1600" dirty="0"/>
+                    </a:p>
+                  </a:txBody>
+                  <a:tcPr/>
+                </a:tc>
+              </a:tr>
+              <a:tr h="330934">
+                <a:tc>
+                  <a:txBody>
+                    <a:bodyPr/>
+                    <a:lstStyle/>
+                    <a:p>
+                      <a:r>
+                        <a:rPr lang="en-US" sz="1600" dirty="0" smtClean="0"/>
+                        <a:t>3</a:t>
+                      </a:r>
+                      <a:endParaRPr lang="en-US" sz="1600" dirty="0"/>
+                    </a:p>
+                  </a:txBody>
+                  <a:tcPr/>
+                </a:tc>
+                <a:tc>
+                  <a:txBody>
+                    <a:bodyPr/>
+                    <a:lstStyle/>
+                    <a:p>
+                      <a:r>
+                        <a:rPr lang="en-US" sz="1600" dirty="0" smtClean="0"/>
+                        <a:t>Peak time (</a:t>
+                      </a:r>
+                      <a:r>
+                        <a:rPr lang="en-US" sz="1600" dirty="0" err="1" smtClean="0"/>
+                        <a:t>tko</a:t>
+                      </a:r>
+                      <a:r>
+                        <a:rPr lang="en-US" sz="1600" dirty="0" smtClean="0"/>
+                        <a:t>) </a:t>
+                      </a:r>
+                      <a:endParaRPr lang="en-US" sz="1600" dirty="0"/>
+                    </a:p>
+                  </a:txBody>
+                  <a:tcPr/>
+                </a:tc>
+                <a:tc>
+                  <a:txBody>
+                    <a:bodyPr/>
+                    <a:lstStyle/>
+                    <a:p>
+                      <a:r>
+                        <a:rPr lang="en-US" sz="1600" dirty="0" smtClean="0"/>
+                        <a:t>30</a:t>
+                      </a:r>
+                      <a:r>
+                        <a:rPr lang="en-US" sz="1600" baseline="0" dirty="0" smtClean="0"/>
+                        <a:t> min</a:t>
+                      </a:r>
+                      <a:endParaRPr lang="en-US" sz="1600" dirty="0"/>
+                    </a:p>
+                  </a:txBody>
+                  <a:tcPr/>
+                </a:tc>
+                <a:tc>
+                  <a:txBody>
+                    <a:bodyPr/>
+                    <a:lstStyle/>
+                    <a:p>
+                      <a:r>
+                        <a:rPr lang="en-US" sz="1600" dirty="0" smtClean="0"/>
+                        <a:t>10 min</a:t>
+                      </a:r>
+                      <a:endParaRPr lang="en-US" sz="1600" dirty="0"/>
+                    </a:p>
+                  </a:txBody>
+                  <a:tcPr/>
+                </a:tc>
+              </a:tr>
+              <a:tr h="355134">
+                <a:tc>
+                  <a:txBody>
+                    <a:bodyPr/>
+                    <a:lstStyle/>
+                    <a:p>
+                      <a:r>
+                        <a:rPr lang="en-US" sz="1600" dirty="0" smtClean="0"/>
+                        <a:t>4</a:t>
+                      </a:r>
+                      <a:endParaRPr lang="en-US" sz="1600" dirty="0"/>
+                    </a:p>
+                  </a:txBody>
+                  <a:tcPr/>
+                </a:tc>
+                <a:tc>
+                  <a:txBody>
+                    <a:bodyPr/>
+                    <a:lstStyle/>
+                    <a:p>
+                      <a:r>
+                        <a:rPr lang="en-US" sz="1600" dirty="0" err="1" smtClean="0"/>
+                        <a:t>Peak_tko</a:t>
+                      </a:r>
+                      <a:r>
+                        <a:rPr lang="en-US" sz="1600" dirty="0" smtClean="0"/>
+                        <a:t>/</a:t>
+                      </a:r>
+                      <a:r>
+                        <a:rPr lang="en-US" sz="1600" dirty="0" err="1" smtClean="0"/>
+                        <a:t>Peak_wt</a:t>
+                      </a:r>
+                      <a:endParaRPr lang="en-US" sz="1600" dirty="0"/>
+                    </a:p>
+                  </a:txBody>
+                  <a:tcPr/>
+                </a:tc>
+                <a:tc>
+                  <a:txBody>
+                    <a:bodyPr/>
+                    <a:lstStyle/>
+                    <a:p>
+                      <a:r>
+                        <a:rPr lang="en-US" sz="1600" dirty="0" smtClean="0"/>
+                        <a:t>1.25</a:t>
+                      </a:r>
+                      <a:endParaRPr lang="en-US" sz="1600" dirty="0"/>
+                    </a:p>
+                  </a:txBody>
+                  <a:tcPr/>
+                </a:tc>
+                <a:tc>
+                  <a:txBody>
+                    <a:bodyPr/>
+                    <a:lstStyle/>
+                    <a:p>
+                      <a:r>
+                        <a:rPr lang="en-US" sz="1600" dirty="0" smtClean="0"/>
+                        <a:t>0.1</a:t>
+                      </a:r>
+                      <a:endParaRPr lang="en-US" sz="1600" dirty="0"/>
+                    </a:p>
+                  </a:txBody>
+                  <a:tcPr/>
+                </a:tc>
+              </a:tr>
+              <a:tr h="346717">
+                <a:tc>
+                  <a:txBody>
+                    <a:bodyPr/>
+                    <a:lstStyle/>
+                    <a:p>
+                      <a:r>
+                        <a:rPr lang="en-US" sz="1600" dirty="0" smtClean="0"/>
+                        <a:t>5</a:t>
+                      </a:r>
+                      <a:endParaRPr lang="en-US" sz="1600" dirty="0"/>
+                    </a:p>
+                  </a:txBody>
+                  <a:tcPr/>
+                </a:tc>
+                <a:tc>
+                  <a:txBody>
+                    <a:bodyPr/>
+                    <a:lstStyle/>
+                    <a:p>
+                      <a:r>
+                        <a:rPr lang="en-US" sz="1600" dirty="0" err="1" smtClean="0"/>
+                        <a:t>Peak_mko</a:t>
+                      </a:r>
+                      <a:r>
+                        <a:rPr lang="en-US" sz="1600" dirty="0" smtClean="0"/>
+                        <a:t>/</a:t>
+                      </a:r>
+                      <a:r>
+                        <a:rPr lang="en-US" sz="1600" dirty="0" err="1" smtClean="0"/>
+                        <a:t>peak_tko</a:t>
+                      </a:r>
+                      <a:endParaRPr lang="en-US" sz="1600" dirty="0"/>
+                    </a:p>
+                  </a:txBody>
+                  <a:tcPr/>
+                </a:tc>
+                <a:tc>
+                  <a:txBody>
+                    <a:bodyPr/>
+                    <a:lstStyle/>
+                    <a:p>
+                      <a:r>
+                        <a:rPr lang="en-US" sz="1600" dirty="0" smtClean="0"/>
+                        <a:t>1.05</a:t>
+                      </a:r>
+                      <a:endParaRPr lang="en-US" sz="1600" dirty="0"/>
+                    </a:p>
+                  </a:txBody>
+                  <a:tcPr/>
+                </a:tc>
+                <a:tc>
+                  <a:txBody>
+                    <a:bodyPr/>
+                    <a:lstStyle/>
+                    <a:p>
+                      <a:r>
+                        <a:rPr lang="en-US" sz="1600" dirty="0" smtClean="0"/>
+                        <a:t>0.01</a:t>
+                      </a:r>
+                      <a:endParaRPr lang="en-US" sz="1600" dirty="0"/>
+                    </a:p>
+                  </a:txBody>
+                  <a:tcPr/>
+                </a:tc>
+              </a:tr>
+              <a:tr h="377315">
+                <a:tc>
+                  <a:txBody>
+                    <a:bodyPr/>
+                    <a:lstStyle/>
+                    <a:p>
+                      <a:r>
+                        <a:rPr lang="en-US" sz="1600" dirty="0" smtClean="0"/>
+                        <a:t>6</a:t>
+                      </a:r>
+                      <a:endParaRPr lang="en-US" sz="1600" dirty="0"/>
+                    </a:p>
+                  </a:txBody>
+                  <a:tcPr/>
+                </a:tc>
+                <a:tc>
+                  <a:txBody>
+                    <a:bodyPr/>
+                    <a:lstStyle/>
+                    <a:p>
+                      <a:r>
+                        <a:rPr lang="en-US" sz="1600" dirty="0" smtClean="0"/>
+                        <a:t>Wt_60/</a:t>
+                      </a:r>
+                      <a:r>
+                        <a:rPr lang="en-US" sz="1600" dirty="0" err="1" smtClean="0"/>
+                        <a:t>mean_kos</a:t>
+                      </a:r>
+                      <a:r>
+                        <a:rPr lang="en-US" sz="1600" dirty="0" smtClean="0"/>
+                        <a:t>(60)</a:t>
+                      </a:r>
+                      <a:endParaRPr lang="en-US" sz="1600" dirty="0"/>
+                    </a:p>
+                  </a:txBody>
+                  <a:tcPr/>
+                </a:tc>
+                <a:tc>
+                  <a:txBody>
+                    <a:bodyPr/>
+                    <a:lstStyle/>
+                    <a:p>
+                      <a:r>
+                        <a:rPr lang="en-US" sz="1600" dirty="0" smtClean="0"/>
+                        <a:t>0.75</a:t>
+                      </a:r>
+                      <a:endParaRPr lang="en-US" sz="1600" dirty="0"/>
+                    </a:p>
+                  </a:txBody>
+                  <a:tcPr/>
+                </a:tc>
+                <a:tc>
+                  <a:txBody>
+                    <a:bodyPr/>
+                    <a:lstStyle/>
+                    <a:p>
+                      <a:r>
+                        <a:rPr lang="en-US" sz="1600" dirty="0" smtClean="0"/>
+                        <a:t>0.15</a:t>
+                      </a:r>
+                      <a:endParaRPr lang="en-US" sz="1600" dirty="0"/>
+                    </a:p>
+                  </a:txBody>
+                  <a:tcPr/>
+                </a:tc>
+              </a:tr>
+              <a:tr h="377315">
+                <a:tc>
+                  <a:txBody>
+                    <a:bodyPr/>
+                    <a:lstStyle/>
+                    <a:p>
+                      <a:r>
+                        <a:rPr lang="en-US" sz="1600" dirty="0" smtClean="0"/>
+                        <a:t>7</a:t>
+                      </a:r>
+                      <a:endParaRPr lang="en-US" sz="1600" dirty="0"/>
+                    </a:p>
+                  </a:txBody>
+                  <a:tcPr/>
+                </a:tc>
+                <a:tc>
+                  <a:txBody>
+                    <a:bodyPr/>
+                    <a:lstStyle/>
+                    <a:p>
+                      <a:r>
+                        <a:rPr lang="en-US" sz="1600" dirty="0" smtClean="0"/>
+                        <a:t>Wt_120/</a:t>
+                      </a:r>
+                      <a:r>
+                        <a:rPr lang="en-US" sz="1600" dirty="0" err="1" smtClean="0"/>
+                        <a:t>mean_kos</a:t>
+                      </a:r>
+                      <a:r>
+                        <a:rPr lang="en-US" sz="1600" dirty="0" smtClean="0"/>
+                        <a:t>(120)</a:t>
+                      </a:r>
+                      <a:endParaRPr lang="en-US" sz="1600" dirty="0"/>
+                    </a:p>
+                  </a:txBody>
+                  <a:tcPr/>
+                </a:tc>
+                <a:tc>
+                  <a:txBody>
+                    <a:bodyPr/>
+                    <a:lstStyle/>
+                    <a:p>
+                      <a:r>
+                        <a:rPr lang="en-US" sz="1600" dirty="0" smtClean="0"/>
+                        <a:t>0.75</a:t>
+                      </a:r>
+                      <a:endParaRPr lang="en-US" sz="1600" dirty="0"/>
+                    </a:p>
+                  </a:txBody>
+                  <a:tcPr/>
+                </a:tc>
+                <a:tc>
+                  <a:txBody>
+                    <a:bodyPr/>
+                    <a:lstStyle/>
+                    <a:p>
+                      <a:r>
+                        <a:rPr lang="en-US" sz="1600" dirty="0" smtClean="0"/>
+                        <a:t>0</a:t>
+                      </a:r>
+                      <a:endParaRPr lang="en-US" sz="1600" dirty="0"/>
+                    </a:p>
+                  </a:txBody>
+                  <a:tcPr/>
+                </a:tc>
+              </a:tr>
+              <a:tr h="274291">
+                <a:tc>
+                  <a:txBody>
+                    <a:bodyPr/>
+                    <a:lstStyle/>
+                    <a:p>
+                      <a:r>
+                        <a:rPr lang="en-US" sz="1600" dirty="0" smtClean="0"/>
+                        <a:t>8</a:t>
+                      </a:r>
+                      <a:endParaRPr lang="en-US" sz="1600" dirty="0"/>
+                    </a:p>
+                  </a:txBody>
+                  <a:tcPr/>
+                </a:tc>
+                <a:tc>
+                  <a:txBody>
+                    <a:bodyPr/>
+                    <a:lstStyle/>
+                    <a:p>
+                      <a:r>
+                        <a:rPr lang="en-US" sz="1600" dirty="0" smtClean="0"/>
+                        <a:t>Wt_120/</a:t>
+                      </a:r>
+                      <a:r>
+                        <a:rPr lang="en-US" sz="1600" dirty="0" err="1" smtClean="0"/>
+                        <a:t>wt_peak</a:t>
+                      </a:r>
+                      <a:endParaRPr lang="en-US" sz="1600" dirty="0"/>
+                    </a:p>
+                  </a:txBody>
+                  <a:tcPr/>
+                </a:tc>
+                <a:tc>
+                  <a:txBody>
+                    <a:bodyPr/>
+                    <a:lstStyle/>
+                    <a:p>
+                      <a:r>
+                        <a:rPr lang="en-US" sz="1600" dirty="0" smtClean="0"/>
+                        <a:t>6</a:t>
+                      </a:r>
+                      <a:endParaRPr lang="en-US" sz="1600" dirty="0"/>
+                    </a:p>
+                  </a:txBody>
+                  <a:tcPr/>
+                </a:tc>
+                <a:tc>
+                  <a:txBody>
+                    <a:bodyPr/>
+                    <a:lstStyle/>
+                    <a:p>
+                      <a:r>
+                        <a:rPr lang="en-US" sz="1600" dirty="0" smtClean="0"/>
+                        <a:t>1</a:t>
+                      </a:r>
+                      <a:endParaRPr lang="en-US" sz="1600" dirty="0"/>
+                    </a:p>
+                  </a:txBody>
+                  <a:tcPr/>
+                </a:tc>
+              </a:tr>
+            </a:tbl>
+          </a:graphicData>
+        </a:graphic>
+      </p:graphicFrame>
+      <p:graphicFrame>
+        <p:nvGraphicFramePr>
+          <p:cNvPr id="6" name="Object 5"/>
+          <p:cNvGraphicFramePr>
+            <a:graphicFrameLocks noChangeAspect="1"/>
+          </p:cNvGraphicFramePr>
+          <p:nvPr>
+            <p:extLst>
+              <p:ext uri="{D42A27DB-BD31-4B8C-83A1-F6EECF244321}">
+                <p14:modId xmlns:p14="http://schemas.microsoft.com/office/powerpoint/2010/main" val="967887228"/>
+              </p:ext>
+            </p:extLst>
+          </p:nvPr>
+        </p:nvGraphicFramePr>
+        <p:xfrm>
+          <a:off x="5560536" y="3533148"/>
+          <a:ext cx="3055927" cy="801211"/>
+        </p:xfrm>
+        <a:graphic>
+          <a:graphicData uri="http://schemas.openxmlformats.org/presentationml/2006/ole">
+            <mc:AlternateContent xmlns:mc="http://schemas.openxmlformats.org/markup-compatibility/2006">
+              <mc:Choice xmlns:v="urn:schemas-microsoft-com:vml" Requires="v">
+                <p:oleObj spid="_x0000_s6153" name="Equation" r:id="rId5" imgW="1790700" imgH="469900" progId="Equation.3">
+                  <p:embed/>
+                </p:oleObj>
+              </mc:Choice>
+              <mc:Fallback>
+                <p:oleObj name="Equation" r:id="rId5" imgW="1790700" imgH="469900" progId="Equation.3">
+                  <p:embed/>
+                  <p:pic>
+                    <p:nvPicPr>
+                      <p:cNvPr id="0" name=""/>
+                      <p:cNvPicPr/>
+                      <p:nvPr/>
+                    </p:nvPicPr>
+                    <p:blipFill>
+                      <a:blip r:embed="rId6"/>
+                      <a:stretch>
+                        <a:fillRect/>
+                      </a:stretch>
+                    </p:blipFill>
+                    <p:spPr>
+                      <a:xfrm>
+                        <a:off x="5560536" y="3533148"/>
+                        <a:ext cx="3055927" cy="801211"/>
+                      </a:xfrm>
+                      <a:prstGeom prst="rect">
+                        <a:avLst/>
+                      </a:prstGeom>
+                    </p:spPr>
+                  </p:pic>
+                </p:oleObj>
+              </mc:Fallback>
+            </mc:AlternateContent>
+          </a:graphicData>
+        </a:graphic>
+      </p:graphicFrame>
       <p:sp>
         <p:nvSpPr>
-          <p:cNvPr id="4" name="Rectangle 3"/>
+          <p:cNvPr id="7" name="Rectangle 6"/>
           <p:cNvSpPr/>
           <p:nvPr/>
         </p:nvSpPr>
         <p:spPr>
           <a:xfrm>
-            <a:off x="878101" y="3258133"/>
-            <a:ext cx="7301999" cy="2308324"/>
+            <a:off x="218954" y="2968476"/>
+            <a:ext cx="2404812" cy="369332"/>
           </a:xfrm>
           <a:prstGeom prst="rect">
             <a:avLst/>
@@ -29316,173 +30367,139 @@
           <a:lstStyle/>
           <a:p>
             <a:r>
-              <a:rPr lang="en-US" dirty="0"/>
-              <a:t>Score function</a:t>
+              <a:rPr lang="en-US" b="1" dirty="0" smtClean="0">
+                <a:solidFill>
+                  <a:srgbClr val="0000FF"/>
+                </a:solidFill>
+              </a:rPr>
+              <a:t>Table of features (</a:t>
             </a:r>
             <a:r>
-              <a:rPr lang="en-US" dirty="0" smtClean="0"/>
-              <a:t>:</a:t>
-            </a:r>
-          </a:p>
-          <a:p>
-            <a:pPr marL="342900" indent="-342900">
-              <a:buAutoNum type="arabicPeriod"/>
-            </a:pPr>
-            <a:r>
-              <a:rPr lang="en-US" dirty="0" smtClean="0"/>
-              <a:t>Peak: </a:t>
+              <a:rPr lang="en-US" b="1" dirty="0" err="1" smtClean="0">
+                <a:solidFill>
+                  <a:srgbClr val="0000FF"/>
+                </a:solidFill>
+              </a:rPr>
+              <a:t>n</a:t>
             </a:r>
             <a:r>
-              <a:rPr lang="en-US" dirty="0" err="1" smtClean="0"/>
-              <a:t>wt</a:t>
+              <a:rPr lang="en-US" b="1" baseline="-25000" dirty="0" err="1" smtClean="0">
+                <a:solidFill>
+                  <a:srgbClr val="0000FF"/>
+                </a:solidFill>
+              </a:rPr>
+              <a:t>F</a:t>
             </a:r>
             <a:r>
-              <a:rPr lang="en-US" dirty="0" smtClean="0"/>
-              <a:t> (30 min +/- 10 min), </a:t>
+              <a:rPr lang="en-US" b="1" dirty="0" smtClean="0">
+                <a:solidFill>
+                  <a:srgbClr val="0000FF"/>
+                </a:solidFill>
+              </a:rPr>
+              <a:t>=9)</a:t>
             </a:r>
-            <a:r>
-              <a:rPr lang="en-US" dirty="0" err="1" smtClean="0"/>
-              <a:t>mko</a:t>
-            </a:r>
-            <a:r>
-              <a:rPr lang="en-US" dirty="0" smtClean="0"/>
-              <a:t> (60min +/- 20min), </a:t>
-            </a:r>
-            <a:r>
-              <a:rPr lang="en-US" dirty="0" err="1" smtClean="0"/>
-              <a:t>tko</a:t>
-            </a:r>
-            <a:r>
-              <a:rPr lang="en-US" dirty="0" smtClean="0"/>
-              <a:t> (30 +/- 10 min)</a:t>
-            </a:r>
-          </a:p>
-          <a:p>
-            <a:pPr marL="342900" indent="-342900">
-              <a:buAutoNum type="arabicPeriod"/>
-            </a:pPr>
-            <a:r>
-              <a:rPr lang="en-US" dirty="0" err="1" smtClean="0"/>
-              <a:t>Peak_tko</a:t>
-            </a:r>
-            <a:r>
-              <a:rPr lang="en-US" dirty="0" smtClean="0"/>
-              <a:t> / </a:t>
-            </a:r>
-            <a:r>
-              <a:rPr lang="en-US" dirty="0" err="1" smtClean="0"/>
-              <a:t>peak_wt</a:t>
-            </a:r>
-            <a:r>
-              <a:rPr lang="en-US" dirty="0" smtClean="0"/>
-              <a:t> = 1.25 +/- 0.1 fold </a:t>
-            </a:r>
-          </a:p>
-          <a:p>
-            <a:pPr marL="342900" indent="-342900">
-              <a:buAutoNum type="arabicPeriod"/>
-            </a:pPr>
-            <a:r>
-              <a:rPr lang="en-US" dirty="0" err="1" smtClean="0"/>
-              <a:t>Peak_mko</a:t>
-            </a:r>
-            <a:r>
-              <a:rPr lang="en-US" dirty="0" smtClean="0"/>
-              <a:t>/</a:t>
-            </a:r>
-            <a:r>
-              <a:rPr lang="en-US" dirty="0" err="1" smtClean="0"/>
-              <a:t>peak_tko</a:t>
-            </a:r>
-            <a:r>
-              <a:rPr lang="en-US" dirty="0" smtClean="0"/>
-              <a:t> = 1.05 -/+ 0.01</a:t>
-            </a:r>
-          </a:p>
-          <a:p>
-            <a:pPr marL="342900" indent="-342900">
-              <a:buAutoNum type="arabicPeriod"/>
-            </a:pPr>
-            <a:r>
-              <a:rPr lang="en-US" dirty="0" err="1" smtClean="0"/>
-              <a:t>Wt</a:t>
-            </a:r>
-            <a:r>
-              <a:rPr lang="en-US" dirty="0" smtClean="0"/>
-              <a:t>(60)/</a:t>
-            </a:r>
-            <a:r>
-              <a:rPr lang="en-US" dirty="0" err="1" smtClean="0"/>
-              <a:t>mean_kos</a:t>
-            </a:r>
-            <a:r>
-              <a:rPr lang="en-US" dirty="0" smtClean="0"/>
-              <a:t>(60) = 0.75 +/- 0.15</a:t>
-            </a:r>
-          </a:p>
-          <a:p>
-            <a:pPr marL="342900" indent="-342900">
-              <a:buFontTx/>
-              <a:buAutoNum type="arabicPeriod"/>
-            </a:pPr>
-            <a:r>
-              <a:rPr lang="en-US" dirty="0" err="1" smtClean="0"/>
-              <a:t>Wt</a:t>
-            </a:r>
-            <a:r>
-              <a:rPr lang="en-US" dirty="0" smtClean="0"/>
-              <a:t>(120</a:t>
-            </a:r>
-            <a:r>
-              <a:rPr lang="en-US" dirty="0"/>
-              <a:t>)/</a:t>
-            </a:r>
-            <a:r>
-              <a:rPr lang="en-US" dirty="0" err="1"/>
-              <a:t>mean_kos</a:t>
-            </a:r>
-            <a:r>
-              <a:rPr lang="en-US" dirty="0" smtClean="0"/>
-              <a:t>(120</a:t>
-            </a:r>
-            <a:r>
-              <a:rPr lang="en-US" dirty="0"/>
-              <a:t>) = 0.75 +/- 0.15</a:t>
-            </a:r>
-          </a:p>
-          <a:p>
-            <a:pPr marL="342900" indent="-342900">
-              <a:buAutoNum type="arabicPeriod"/>
-            </a:pPr>
-            <a:r>
-              <a:rPr lang="en-US" dirty="0" smtClean="0"/>
-              <a:t>60min ~ 120 min: </a:t>
-            </a:r>
-            <a:r>
-              <a:rPr lang="en-US" dirty="0" err="1" smtClean="0"/>
-              <a:t>wt</a:t>
-            </a:r>
-            <a:r>
-              <a:rPr lang="en-US" dirty="0" smtClean="0"/>
-              <a:t> decrease 6+/-1</a:t>
-            </a:r>
-          </a:p>
-          <a:p>
-            <a:pPr marL="342900" indent="-342900">
-              <a:buAutoNum type="arabicPeriod"/>
-            </a:pPr>
-            <a:r>
-              <a:rPr lang="en-US" dirty="0" err="1" smtClean="0"/>
-              <a:t>Peak_tko</a:t>
-            </a:r>
-            <a:r>
-              <a:rPr lang="en-US" dirty="0" smtClean="0"/>
-              <a:t> = 25 +/- 2</a:t>
-            </a:r>
-            <a:endParaRPr lang="en-US" dirty="0"/>
+            <a:endParaRPr lang="en-US" b="1" dirty="0">
+              <a:solidFill>
+                <a:srgbClr val="0000FF"/>
+              </a:solidFill>
+            </a:endParaRPr>
           </a:p>
         </p:txBody>
       </p:sp>
+      <p:sp>
+        <p:nvSpPr>
+          <p:cNvPr id="8" name="Rectangle 7"/>
+          <p:cNvSpPr/>
+          <p:nvPr/>
+        </p:nvSpPr>
+        <p:spPr>
+          <a:xfrm>
+            <a:off x="5560536" y="3035483"/>
+            <a:ext cx="3649068" cy="369332"/>
+          </a:xfrm>
+          <a:prstGeom prst="rect">
+            <a:avLst/>
+          </a:prstGeom>
+        </p:spPr>
+        <p:txBody>
+          <a:bodyPr wrap="none">
+            <a:spAutoFit/>
+          </a:bodyPr>
+          <a:lstStyle/>
+          <a:p>
+            <a:r>
+              <a:rPr lang="en-US" b="1" dirty="0" smtClean="0">
+                <a:solidFill>
+                  <a:srgbClr val="0000FF"/>
+                </a:solidFill>
+              </a:rPr>
+              <a:t>Score function (modified chi square)</a:t>
+            </a:r>
+            <a:endParaRPr lang="en-US" b="1" dirty="0">
+              <a:solidFill>
+                <a:srgbClr val="0000FF"/>
+              </a:solidFill>
+            </a:endParaRPr>
+          </a:p>
+        </p:txBody>
+      </p:sp>
+      <p:graphicFrame>
+        <p:nvGraphicFramePr>
+          <p:cNvPr id="9" name="Object 8"/>
+          <p:cNvGraphicFramePr>
+            <a:graphicFrameLocks noChangeAspect="1"/>
+          </p:cNvGraphicFramePr>
+          <p:nvPr>
+            <p:extLst>
+              <p:ext uri="{D42A27DB-BD31-4B8C-83A1-F6EECF244321}">
+                <p14:modId xmlns:p14="http://schemas.microsoft.com/office/powerpoint/2010/main" val="891169457"/>
+              </p:ext>
+            </p:extLst>
+          </p:nvPr>
+        </p:nvGraphicFramePr>
+        <p:xfrm>
+          <a:off x="5548479" y="4681881"/>
+          <a:ext cx="3055927" cy="801211"/>
+        </p:xfrm>
+        <a:graphic>
+          <a:graphicData uri="http://schemas.openxmlformats.org/presentationml/2006/ole">
+            <mc:AlternateContent xmlns:mc="http://schemas.openxmlformats.org/markup-compatibility/2006">
+              <mc:Choice xmlns:v="urn:schemas-microsoft-com:vml" Requires="v">
+                <p:oleObj spid="_x0000_s6154" name="Equation" r:id="rId7" imgW="1790700" imgH="469900" progId="Equation.3">
+                  <p:embed/>
+                </p:oleObj>
+              </mc:Choice>
+              <mc:Fallback>
+                <p:oleObj name="Equation" r:id="rId7" imgW="1790700" imgH="469900" progId="Equation.3">
+                  <p:embed/>
+                  <p:pic>
+                    <p:nvPicPr>
+                      <p:cNvPr id="0" name=""/>
+                      <p:cNvPicPr/>
+                      <p:nvPr/>
+                    </p:nvPicPr>
+                    <p:blipFill>
+                      <a:blip r:embed="rId6"/>
+                      <a:stretch>
+                        <a:fillRect/>
+                      </a:stretch>
+                    </p:blipFill>
+                    <p:spPr>
+                      <a:xfrm>
+                        <a:off x="5548479" y="4681881"/>
+                        <a:ext cx="3055927" cy="801211"/>
+                      </a:xfrm>
+                      <a:prstGeom prst="rect">
+                        <a:avLst/>
+                      </a:prstGeom>
+                    </p:spPr>
+                  </p:pic>
+                </p:oleObj>
+              </mc:Fallback>
+            </mc:AlternateContent>
+          </a:graphicData>
+        </a:graphic>
+      </p:graphicFrame>
     </p:spTree>
     <p:extLst>
       <p:ext uri="{BB962C8B-B14F-4D97-AF65-F5344CB8AC3E}">
@@ -31218,7 +32235,7 @@
           <a:graphicData uri="http://schemas.openxmlformats.org/presentationml/2006/ole">
             <mc:AlternateContent xmlns:mc="http://schemas.openxmlformats.org/markup-compatibility/2006">
               <mc:Choice xmlns:v="urn:schemas-microsoft-com:vml" Requires="v">
-                <p:oleObj spid="_x0000_s2099" name="Equation" r:id="rId4" imgW="2641600" imgH="393700" progId="Equation.3">
+                <p:oleObj spid="_x0000_s2110" name="Equation" r:id="rId4" imgW="2641600" imgH="393700" progId="Equation.3">
                   <p:embed/>
                 </p:oleObj>
               </mc:Choice>
@@ -31275,7 +32292,7 @@
           <a:graphicData uri="http://schemas.openxmlformats.org/presentationml/2006/ole">
             <mc:AlternateContent xmlns:mc="http://schemas.openxmlformats.org/markup-compatibility/2006">
               <mc:Choice xmlns:v="urn:schemas-microsoft-com:vml" Requires="v">
-                <p:oleObj spid="_x0000_s2100" name="Equation" r:id="rId6" imgW="3429000" imgH="584200" progId="Equation.3">
+                <p:oleObj spid="_x0000_s2111" name="Equation" r:id="rId6" imgW="3429000" imgH="584200" progId="Equation.3">
                   <p:embed/>
                 </p:oleObj>
               </mc:Choice>
@@ -33560,7 +34577,7 @@
           <a:graphicData uri="http://schemas.openxmlformats.org/presentationml/2006/ole">
             <mc:AlternateContent xmlns:mc="http://schemas.openxmlformats.org/markup-compatibility/2006">
               <mc:Choice xmlns:v="urn:schemas-microsoft-com:vml" Requires="v">
-                <p:oleObj spid="_x0000_s5146" name="Equation" r:id="rId4" imgW="3479800" imgH="800100" progId="Equation.3">
+                <p:oleObj spid="_x0000_s5157" name="Equation" r:id="rId4" imgW="3479800" imgH="800100" progId="Equation.3">
                   <p:embed/>
                 </p:oleObj>
               </mc:Choice>
@@ -33617,7 +34634,7 @@
           <a:graphicData uri="http://schemas.openxmlformats.org/presentationml/2006/ole">
             <mc:AlternateContent xmlns:mc="http://schemas.openxmlformats.org/markup-compatibility/2006">
               <mc:Choice xmlns:v="urn:schemas-microsoft-com:vml" Requires="v">
-                <p:oleObj spid="_x0000_s5147" name="Equation" r:id="rId6" imgW="3086100" imgH="254000" progId="Equation.3">
+                <p:oleObj spid="_x0000_s5158" name="Equation" r:id="rId6" imgW="3086100" imgH="254000" progId="Equation.3">
                   <p:embed/>
                 </p:oleObj>
               </mc:Choice>

</xml_diff>

<commit_message>
Begin fit Fig2 by using feature matrics.
</commit_message>
<xml_diff>
--- a/TNF_Slides.pptx
+++ b/TNF_Slides.pptx
@@ -912,14 +912,10 @@
             </a:r>
             <a:r>
               <a:rPr lang="en-US" baseline="0" dirty="0" smtClean="0"/>
-              <a:t> =</a:t>
+              <a:t> =1:</a:t>
             </a:r>
             <a:r>
-              <a:rPr lang="en-US" baseline="0" smtClean="0"/>
-              <a:t>1:</a:t>
-            </a:r>
-            <a:r>
-              <a:rPr lang="en-US" smtClean="0"/>
+              <a:rPr lang="en-US" dirty="0" smtClean="0"/>
               <a:t>extent of the match between observations and estimates is in accord with the error variance.</a:t>
             </a:r>
           </a:p>
@@ -29199,7 +29195,7 @@
           <a:graphicData uri="http://schemas.openxmlformats.org/presentationml/2006/ole">
             <mc:AlternateContent xmlns:mc="http://schemas.openxmlformats.org/markup-compatibility/2006">
               <mc:Choice xmlns:v="urn:schemas-microsoft-com:vml" Requires="v">
-                <p:oleObj spid="_x0000_s1105" name="Equation" r:id="rId4" imgW="3022600" imgH="444500" progId="Equation.3">
+                <p:oleObj spid="_x0000_s1114" name="Equation" r:id="rId4" imgW="3022600" imgH="444500" progId="Equation.3">
                   <p:embed/>
                 </p:oleObj>
               </mc:Choice>
@@ -29243,25 +29239,25 @@
           <p:nvPr>
             <p:extLst>
               <p:ext uri="{D42A27DB-BD31-4B8C-83A1-F6EECF244321}">
-                <p14:modId xmlns:p14="http://schemas.microsoft.com/office/powerpoint/2010/main" val="460502291"/>
+                <p14:modId xmlns:p14="http://schemas.microsoft.com/office/powerpoint/2010/main" val="2773236580"/>
               </p:ext>
             </p:extLst>
           </p:nvPr>
         </p:nvGraphicFramePr>
         <p:xfrm>
-          <a:off x="326373" y="6111875"/>
-          <a:ext cx="4554537" cy="407988"/>
+          <a:off x="488108" y="6234414"/>
+          <a:ext cx="5265738" cy="407988"/>
         </p:xfrm>
         <a:graphic>
           <a:graphicData uri="http://schemas.openxmlformats.org/presentationml/2006/ole">
             <mc:AlternateContent xmlns:mc="http://schemas.openxmlformats.org/markup-compatibility/2006">
               <mc:Choice xmlns:v="urn:schemas-microsoft-com:vml" Requires="v">
-                <p:oleObj spid="_x0000_s1106" name="Equation" r:id="rId6" imgW="2844800" imgH="254000" progId="Equation.3">
+                <p:oleObj spid="_x0000_s1115" name="Equation" r:id="rId6" imgW="3289300" imgH="254000" progId="Equation.3">
                   <p:embed/>
                 </p:oleObj>
               </mc:Choice>
               <mc:Fallback>
-                <p:oleObj name="Equation" r:id="rId6" imgW="2844800" imgH="254000" progId="Equation.3">
+                <p:oleObj name="Equation" r:id="rId6" imgW="3289300" imgH="254000" progId="Equation.3">
                   <p:embed/>
                   <p:pic>
                     <p:nvPicPr>
@@ -29277,8 +29273,8 @@
                     </p:blipFill>
                     <p:spPr>
                       <a:xfrm>
-                        <a:off x="326373" y="6111875"/>
-                        <a:ext cx="4554537" cy="407988"/>
+                        <a:off x="488108" y="6234414"/>
+                        <a:ext cx="5265738" cy="407988"/>
                       </a:xfrm>
                       <a:prstGeom prst="rect">
                         <a:avLst/>
@@ -29313,7 +29309,7 @@
           <a:graphicData uri="http://schemas.openxmlformats.org/presentationml/2006/ole">
             <mc:AlternateContent xmlns:mc="http://schemas.openxmlformats.org/markup-compatibility/2006">
               <mc:Choice xmlns:v="urn:schemas-microsoft-com:vml" Requires="v">
-                <p:oleObj spid="_x0000_s1107" name="Equation" r:id="rId8" imgW="2197100" imgH="457200" progId="Equation.3">
+                <p:oleObj spid="_x0000_s1116" name="Equation" r:id="rId8" imgW="2197100" imgH="457200" progId="Equation.3">
                   <p:embed/>
                 </p:oleObj>
               </mc:Choice>
@@ -29348,36 +29344,6 @@
           </a:graphicData>
         </a:graphic>
       </p:graphicFrame>
-      <p:pic>
-        <p:nvPicPr>
-          <p:cNvPr id="44" name="Picture 43" descr="fig2.pdf"/>
-          <p:cNvPicPr>
-            <a:picLocks noChangeAspect="1"/>
-          </p:cNvPicPr>
-          <p:nvPr/>
-        </p:nvPicPr>
-        <p:blipFill>
-          <a:blip r:embed="rId10">
-            <a:extLst>
-              <a:ext uri="{28A0092B-C50C-407E-A947-70E740481C1C}">
-                <a14:useLocalDpi xmlns:a14="http://schemas.microsoft.com/office/drawing/2010/main" val="0"/>
-              </a:ext>
-            </a:extLst>
-          </a:blip>
-          <a:stretch>
-            <a:fillRect/>
-          </a:stretch>
-        </p:blipFill>
-        <p:spPr>
-          <a:xfrm>
-            <a:off x="5672706" y="1033346"/>
-            <a:ext cx="2743200" cy="5486400"/>
-          </a:xfrm>
-          <a:prstGeom prst="rect">
-            <a:avLst/>
-          </a:prstGeom>
-        </p:spPr>
-      </p:pic>
       <p:sp>
         <p:nvSpPr>
           <p:cNvPr id="10" name="Rectangle 9"/>
@@ -29561,6 +29527,36 @@
           </a:p>
         </p:txBody>
       </p:sp>
+      <p:pic>
+        <p:nvPicPr>
+          <p:cNvPr id="17" name="Picture 16" descr="fig2.pdf"/>
+          <p:cNvPicPr>
+            <a:picLocks noChangeAspect="1"/>
+          </p:cNvPicPr>
+          <p:nvPr/>
+        </p:nvPicPr>
+        <p:blipFill>
+          <a:blip r:embed="rId10">
+            <a:extLst>
+              <a:ext uri="{28A0092B-C50C-407E-A947-70E740481C1C}">
+                <a14:useLocalDpi xmlns:a14="http://schemas.microsoft.com/office/drawing/2010/main" val="0"/>
+              </a:ext>
+            </a:extLst>
+          </a:blip>
+          <a:stretch>
+            <a:fillRect/>
+          </a:stretch>
+        </p:blipFill>
+        <p:spPr>
+          <a:xfrm>
+            <a:off x="5569261" y="625475"/>
+            <a:ext cx="2743200" cy="5486400"/>
+          </a:xfrm>
+          <a:prstGeom prst="rect">
+            <a:avLst/>
+          </a:prstGeom>
+        </p:spPr>
+      </p:pic>
     </p:spTree>
     <p:extLst>
       <p:ext uri="{BB962C8B-B14F-4D97-AF65-F5344CB8AC3E}">
@@ -29598,35 +29594,6 @@
           <a:chExt cx="0" cy="0"/>
         </a:xfrm>
       </p:grpSpPr>
-      <p:pic>
-        <p:nvPicPr>
-          <p:cNvPr id="2" name="Picture 1" descr="fig2.pdf"/>
-          <p:cNvPicPr>
-            <a:picLocks noChangeAspect="1"/>
-          </p:cNvPicPr>
-          <p:nvPr/>
-        </p:nvPicPr>
-        <p:blipFill rotWithShape="1">
-          <a:blip r:embed="rId4">
-            <a:extLst>
-              <a:ext uri="{28A0092B-C50C-407E-A947-70E740481C1C}">
-                <a14:useLocalDpi xmlns:a14="http://schemas.microsoft.com/office/drawing/2010/main" val="0"/>
-              </a:ext>
-            </a:extLst>
-          </a:blip>
-          <a:srcRect l="25404" t="67862" r="26187" b="1397"/>
-          <a:stretch/>
-        </p:blipFill>
-        <p:spPr>
-          <a:xfrm>
-            <a:off x="2335691" y="-72781"/>
-            <a:ext cx="4231772" cy="3477596"/>
-          </a:xfrm>
-          <a:prstGeom prst="rect">
-            <a:avLst/>
-          </a:prstGeom>
-        </p:spPr>
-      </p:pic>
       <p:graphicFrame>
         <p:nvGraphicFramePr>
           <p:cNvPr id="3" name="Table 2"/>
@@ -29636,7 +29603,7 @@
           <p:nvPr>
             <p:extLst>
               <p:ext uri="{D42A27DB-BD31-4B8C-83A1-F6EECF244321}">
-                <p14:modId xmlns:p14="http://schemas.microsoft.com/office/powerpoint/2010/main" val="3024420232"/>
+                <p14:modId xmlns:p14="http://schemas.microsoft.com/office/powerpoint/2010/main" val="2496978708"/>
               </p:ext>
             </p:extLst>
           </p:nvPr>
@@ -29810,7 +29777,7 @@
                     <a:p>
                       <a:r>
                         <a:rPr lang="en-US" sz="1600" dirty="0" smtClean="0"/>
-                        <a:t>10 min</a:t>
+                        <a:t>5 min</a:t>
                       </a:r>
                       <a:endParaRPr lang="en-US" sz="1600" dirty="0"/>
                     </a:p>
@@ -29880,7 +29847,7 @@
                     <a:p>
                       <a:r>
                         <a:rPr lang="en-US" sz="1600" dirty="0" smtClean="0"/>
-                        <a:t>20 min</a:t>
+                        <a:t>10 min</a:t>
                       </a:r>
                       <a:endParaRPr lang="en-US" sz="1600" dirty="0"/>
                     </a:p>
@@ -29950,7 +29917,7 @@
                     <a:p>
                       <a:r>
                         <a:rPr lang="en-US" sz="1600" dirty="0" smtClean="0"/>
-                        <a:t>10 min</a:t>
+                        <a:t>5 min</a:t>
                       </a:r>
                       <a:endParaRPr lang="en-US" sz="1600" dirty="0"/>
                     </a:p>
@@ -30002,7 +29969,7 @@
                     <a:p>
                       <a:r>
                         <a:rPr lang="en-US" sz="1600" dirty="0" smtClean="0"/>
-                        <a:t>1.25</a:t>
+                        <a:t>1.4</a:t>
                       </a:r>
                       <a:endParaRPr lang="en-US" sz="1600" dirty="0"/>
                     </a:p>
@@ -30016,7 +29983,7 @@
                     <a:p>
                       <a:r>
                         <a:rPr lang="en-US" sz="1600" dirty="0" smtClean="0"/>
-                        <a:t>0.1</a:t>
+                        <a:t>0.4</a:t>
                       </a:r>
                       <a:endParaRPr lang="en-US" sz="1600" dirty="0"/>
                     </a:p>
@@ -30310,12 +30277,12 @@
           <a:graphicData uri="http://schemas.openxmlformats.org/presentationml/2006/ole">
             <mc:AlternateContent xmlns:mc="http://schemas.openxmlformats.org/markup-compatibility/2006">
               <mc:Choice xmlns:v="urn:schemas-microsoft-com:vml" Requires="v">
-                <p:oleObj spid="_x0000_s6153" name="Equation" r:id="rId5" imgW="1790700" imgH="469900" progId="Equation.3">
+                <p:oleObj spid="_x0000_s6157" name="Equation" r:id="rId4" imgW="1790700" imgH="469900" progId="Equation.3">
                   <p:embed/>
                 </p:oleObj>
               </mc:Choice>
               <mc:Fallback>
-                <p:oleObj name="Equation" r:id="rId5" imgW="1790700" imgH="469900" progId="Equation.3">
+                <p:oleObj name="Equation" r:id="rId4" imgW="1790700" imgH="469900" progId="Equation.3">
                   <p:embed/>
                   <p:pic>
                     <p:nvPicPr>
@@ -30324,7 +30291,7 @@
                       <p:nvPr/>
                     </p:nvPicPr>
                     <p:blipFill>
-                      <a:blip r:embed="rId6"/>
+                      <a:blip r:embed="rId5"/>
                       <a:stretch>
                         <a:fillRect/>
                       </a:stretch>
@@ -30452,25 +30419,25 @@
           <p:nvPr>
             <p:extLst>
               <p:ext uri="{D42A27DB-BD31-4B8C-83A1-F6EECF244321}">
-                <p14:modId xmlns:p14="http://schemas.microsoft.com/office/powerpoint/2010/main" val="891169457"/>
+                <p14:modId xmlns:p14="http://schemas.microsoft.com/office/powerpoint/2010/main" val="3042324749"/>
               </p:ext>
             </p:extLst>
           </p:nvPr>
         </p:nvGraphicFramePr>
         <p:xfrm>
-          <a:off x="5548479" y="4681881"/>
+          <a:off x="5553876" y="4804420"/>
           <a:ext cx="3055927" cy="801211"/>
         </p:xfrm>
         <a:graphic>
           <a:graphicData uri="http://schemas.openxmlformats.org/presentationml/2006/ole">
             <mc:AlternateContent xmlns:mc="http://schemas.openxmlformats.org/markup-compatibility/2006">
               <mc:Choice xmlns:v="urn:schemas-microsoft-com:vml" Requires="v">
-                <p:oleObj spid="_x0000_s6154" name="Equation" r:id="rId7" imgW="1790700" imgH="469900" progId="Equation.3">
+                <p:oleObj spid="_x0000_s6158" name="Equation" r:id="rId6" imgW="1790700" imgH="469900" progId="Equation.3">
                   <p:embed/>
                 </p:oleObj>
               </mc:Choice>
               <mc:Fallback>
-                <p:oleObj name="Equation" r:id="rId7" imgW="1790700" imgH="469900" progId="Equation.3">
+                <p:oleObj name="Equation" r:id="rId6" imgW="1790700" imgH="469900" progId="Equation.3">
                   <p:embed/>
                   <p:pic>
                     <p:nvPicPr>
@@ -30479,14 +30446,14 @@
                       <p:nvPr/>
                     </p:nvPicPr>
                     <p:blipFill>
-                      <a:blip r:embed="rId6"/>
+                      <a:blip r:embed="rId5"/>
                       <a:stretch>
                         <a:fillRect/>
                       </a:stretch>
                     </p:blipFill>
                     <p:spPr>
                       <a:xfrm>
-                        <a:off x="5548479" y="4681881"/>
+                        <a:off x="5553876" y="4804420"/>
                         <a:ext cx="3055927" cy="801211"/>
                       </a:xfrm>
                       <a:prstGeom prst="rect">
@@ -30500,6 +30467,35 @@
           </a:graphicData>
         </a:graphic>
       </p:graphicFrame>
+      <p:pic>
+        <p:nvPicPr>
+          <p:cNvPr id="13" name="Picture 12" descr="fig2.pdf"/>
+          <p:cNvPicPr>
+            <a:picLocks noChangeAspect="1"/>
+          </p:cNvPicPr>
+          <p:nvPr/>
+        </p:nvPicPr>
+        <p:blipFill rotWithShape="1">
+          <a:blip r:embed="rId7">
+            <a:extLst>
+              <a:ext uri="{28A0092B-C50C-407E-A947-70E740481C1C}">
+                <a14:useLocalDpi xmlns:a14="http://schemas.microsoft.com/office/drawing/2010/main" val="0"/>
+              </a:ext>
+            </a:extLst>
+          </a:blip>
+          <a:srcRect t="52478"/>
+          <a:stretch/>
+        </p:blipFill>
+        <p:spPr>
+          <a:xfrm>
+            <a:off x="1008496" y="-177134"/>
+            <a:ext cx="3616193" cy="3436962"/>
+          </a:xfrm>
+          <a:prstGeom prst="rect">
+            <a:avLst/>
+          </a:prstGeom>
+        </p:spPr>
+      </p:pic>
     </p:spTree>
     <p:extLst>
       <p:ext uri="{BB962C8B-B14F-4D97-AF65-F5344CB8AC3E}">
@@ -32235,7 +32231,7 @@
           <a:graphicData uri="http://schemas.openxmlformats.org/presentationml/2006/ole">
             <mc:AlternateContent xmlns:mc="http://schemas.openxmlformats.org/markup-compatibility/2006">
               <mc:Choice xmlns:v="urn:schemas-microsoft-com:vml" Requires="v">
-                <p:oleObj spid="_x0000_s2110" name="Equation" r:id="rId4" imgW="2641600" imgH="393700" progId="Equation.3">
+                <p:oleObj spid="_x0000_s2112" name="Equation" r:id="rId4" imgW="2641600" imgH="393700" progId="Equation.3">
                   <p:embed/>
                 </p:oleObj>
               </mc:Choice>
@@ -32292,7 +32288,7 @@
           <a:graphicData uri="http://schemas.openxmlformats.org/presentationml/2006/ole">
             <mc:AlternateContent xmlns:mc="http://schemas.openxmlformats.org/markup-compatibility/2006">
               <mc:Choice xmlns:v="urn:schemas-microsoft-com:vml" Requires="v">
-                <p:oleObj spid="_x0000_s2111" name="Equation" r:id="rId6" imgW="3429000" imgH="584200" progId="Equation.3">
+                <p:oleObj spid="_x0000_s2113" name="Equation" r:id="rId6" imgW="3429000" imgH="584200" progId="Equation.3">
                   <p:embed/>
                 </p:oleObj>
               </mc:Choice>
@@ -34577,7 +34573,7 @@
           <a:graphicData uri="http://schemas.openxmlformats.org/presentationml/2006/ole">
             <mc:AlternateContent xmlns:mc="http://schemas.openxmlformats.org/markup-compatibility/2006">
               <mc:Choice xmlns:v="urn:schemas-microsoft-com:vml" Requires="v">
-                <p:oleObj spid="_x0000_s5157" name="Equation" r:id="rId4" imgW="3479800" imgH="800100" progId="Equation.3">
+                <p:oleObj spid="_x0000_s5159" name="Equation" r:id="rId4" imgW="3479800" imgH="800100" progId="Equation.3">
                   <p:embed/>
                 </p:oleObj>
               </mc:Choice>
@@ -34634,7 +34630,7 @@
           <a:graphicData uri="http://schemas.openxmlformats.org/presentationml/2006/ole">
             <mc:AlternateContent xmlns:mc="http://schemas.openxmlformats.org/markup-compatibility/2006">
               <mc:Choice xmlns:v="urn:schemas-microsoft-com:vml" Requires="v">
-                <p:oleObj spid="_x0000_s5158" name="Equation" r:id="rId6" imgW="3086100" imgH="254000" progId="Equation.3">
+                <p:oleObj spid="_x0000_s5160" name="Equation" r:id="rId6" imgW="3086100" imgH="254000" progId="Equation.3">
                   <p:embed/>
                 </p:oleObj>
               </mc:Choice>

</xml_diff>

<commit_message>
Now wt nascent is in between 60-120
TODO:
1. Reduce wt nascent peak.
</commit_message>
<xml_diff>
--- a/TNF_Slides.pptx
+++ b/TNF_Slides.pptx
@@ -203,7 +203,7 @@
           <a:p>
             <a:fld id="{C16E61BC-9AFB-7443-B919-0FEFC506D3C0}" type="datetimeFigureOut">
               <a:rPr lang="en-US" smtClean="0"/>
-              <a:t>1/9/14</a:t>
+              <a:t>1/13/14</a:t>
             </a:fld>
             <a:endParaRPr lang="en-US"/>
           </a:p>
@@ -1723,7 +1723,7 @@
             <a:fld id="{0DA042B0-5508-8A40-9A09-F8377543C8AB}" type="datetimeFigureOut">
               <a:rPr lang="en-US" smtClean="0"/>
               <a:pPr/>
-              <a:t>1/9/14</a:t>
+              <a:t>1/13/14</a:t>
             </a:fld>
             <a:endParaRPr lang="en-US" dirty="0"/>
           </a:p>
@@ -1895,7 +1895,7 @@
             <a:fld id="{0DA042B0-5508-8A40-9A09-F8377543C8AB}" type="datetimeFigureOut">
               <a:rPr lang="en-US" smtClean="0"/>
               <a:pPr/>
-              <a:t>1/9/14</a:t>
+              <a:t>1/13/14</a:t>
             </a:fld>
             <a:endParaRPr lang="en-US" dirty="0"/>
           </a:p>
@@ -2077,7 +2077,7 @@
             <a:fld id="{0DA042B0-5508-8A40-9A09-F8377543C8AB}" type="datetimeFigureOut">
               <a:rPr lang="en-US" smtClean="0"/>
               <a:pPr/>
-              <a:t>1/9/14</a:t>
+              <a:t>1/13/14</a:t>
             </a:fld>
             <a:endParaRPr lang="en-US" dirty="0"/>
           </a:p>
@@ -2249,7 +2249,7 @@
             <a:fld id="{0DA042B0-5508-8A40-9A09-F8377543C8AB}" type="datetimeFigureOut">
               <a:rPr lang="en-US" smtClean="0"/>
               <a:pPr/>
-              <a:t>1/9/14</a:t>
+              <a:t>1/13/14</a:t>
             </a:fld>
             <a:endParaRPr lang="en-US" dirty="0"/>
           </a:p>
@@ -2497,7 +2497,7 @@
             <a:fld id="{0DA042B0-5508-8A40-9A09-F8377543C8AB}" type="datetimeFigureOut">
               <a:rPr lang="en-US" smtClean="0"/>
               <a:pPr/>
-              <a:t>1/9/14</a:t>
+              <a:t>1/13/14</a:t>
             </a:fld>
             <a:endParaRPr lang="en-US" dirty="0"/>
           </a:p>
@@ -2787,7 +2787,7 @@
             <a:fld id="{0DA042B0-5508-8A40-9A09-F8377543C8AB}" type="datetimeFigureOut">
               <a:rPr lang="en-US" smtClean="0"/>
               <a:pPr/>
-              <a:t>1/9/14</a:t>
+              <a:t>1/13/14</a:t>
             </a:fld>
             <a:endParaRPr lang="en-US" dirty="0"/>
           </a:p>
@@ -3211,7 +3211,7 @@
             <a:fld id="{0DA042B0-5508-8A40-9A09-F8377543C8AB}" type="datetimeFigureOut">
               <a:rPr lang="en-US" smtClean="0"/>
               <a:pPr/>
-              <a:t>1/9/14</a:t>
+              <a:t>1/13/14</a:t>
             </a:fld>
             <a:endParaRPr lang="en-US" dirty="0"/>
           </a:p>
@@ -3331,7 +3331,7 @@
             <a:fld id="{0DA042B0-5508-8A40-9A09-F8377543C8AB}" type="datetimeFigureOut">
               <a:rPr lang="en-US" smtClean="0"/>
               <a:pPr/>
-              <a:t>1/9/14</a:t>
+              <a:t>1/13/14</a:t>
             </a:fld>
             <a:endParaRPr lang="en-US" dirty="0"/>
           </a:p>
@@ -3428,7 +3428,7 @@
             <a:fld id="{0DA042B0-5508-8A40-9A09-F8377543C8AB}" type="datetimeFigureOut">
               <a:rPr lang="en-US" smtClean="0"/>
               <a:pPr/>
-              <a:t>1/9/14</a:t>
+              <a:t>1/13/14</a:t>
             </a:fld>
             <a:endParaRPr lang="en-US" dirty="0"/>
           </a:p>
@@ -3707,7 +3707,7 @@
             <a:fld id="{0DA042B0-5508-8A40-9A09-F8377543C8AB}" type="datetimeFigureOut">
               <a:rPr lang="en-US" smtClean="0"/>
               <a:pPr/>
-              <a:t>1/9/14</a:t>
+              <a:t>1/13/14</a:t>
             </a:fld>
             <a:endParaRPr lang="en-US" dirty="0"/>
           </a:p>
@@ -3966,7 +3966,7 @@
             <a:fld id="{0DA042B0-5508-8A40-9A09-F8377543C8AB}" type="datetimeFigureOut">
               <a:rPr lang="en-US" smtClean="0"/>
               <a:pPr/>
-              <a:t>1/9/14</a:t>
+              <a:t>1/13/14</a:t>
             </a:fld>
             <a:endParaRPr lang="en-US" dirty="0"/>
           </a:p>
@@ -4181,7 +4181,7 @@
             <a:fld id="{0DA042B0-5508-8A40-9A09-F8377543C8AB}" type="datetimeFigureOut">
               <a:rPr lang="en-US" smtClean="0"/>
               <a:pPr/>
-              <a:t>1/9/14</a:t>
+              <a:t>1/13/14</a:t>
             </a:fld>
             <a:endParaRPr lang="en-US" dirty="0"/>
           </a:p>
@@ -29169,7 +29169,6 @@
               <a:rPr lang="en-US" sz="2400" b="1" dirty="0"/>
               <a:t>: Transcription + RNA processing</a:t>
             </a:r>
-            <a:endParaRPr lang="en-US" sz="2400" b="1" dirty="0"/>
           </a:p>
         </p:txBody>
       </p:sp>
@@ -29195,7 +29194,7 @@
           <a:graphicData uri="http://schemas.openxmlformats.org/presentationml/2006/ole">
             <mc:AlternateContent xmlns:mc="http://schemas.openxmlformats.org/markup-compatibility/2006">
               <mc:Choice xmlns:v="urn:schemas-microsoft-com:vml" Requires="v">
-                <p:oleObj spid="_x0000_s1114" name="Equation" r:id="rId4" imgW="3022600" imgH="444500" progId="Equation.3">
+                <p:oleObj spid="_x0000_s1121" name="Equation" r:id="rId4" imgW="3022600" imgH="444500" progId="Equation.3">
                   <p:embed/>
                 </p:oleObj>
               </mc:Choice>
@@ -29252,7 +29251,7 @@
           <a:graphicData uri="http://schemas.openxmlformats.org/presentationml/2006/ole">
             <mc:AlternateContent xmlns:mc="http://schemas.openxmlformats.org/markup-compatibility/2006">
               <mc:Choice xmlns:v="urn:schemas-microsoft-com:vml" Requires="v">
-                <p:oleObj spid="_x0000_s1115" name="Equation" r:id="rId6" imgW="3289300" imgH="254000" progId="Equation.3">
+                <p:oleObj spid="_x0000_s1122" name="Equation" r:id="rId6" imgW="3289300" imgH="254000" progId="Equation.3">
                   <p:embed/>
                 </p:oleObj>
               </mc:Choice>
@@ -29309,7 +29308,7 @@
           <a:graphicData uri="http://schemas.openxmlformats.org/presentationml/2006/ole">
             <mc:AlternateContent xmlns:mc="http://schemas.openxmlformats.org/markup-compatibility/2006">
               <mc:Choice xmlns:v="urn:schemas-microsoft-com:vml" Requires="v">
-                <p:oleObj spid="_x0000_s1116" name="Equation" r:id="rId8" imgW="2197100" imgH="457200" progId="Equation.3">
+                <p:oleObj spid="_x0000_s1123" name="Equation" r:id="rId8" imgW="2197100" imgH="457200" progId="Equation.3">
                   <p:embed/>
                 </p:oleObj>
               </mc:Choice>
@@ -29373,11 +29372,6 @@
               </a:rPr>
               <a:t>Equation</a:t>
             </a:r>
-            <a:endParaRPr lang="en-US" dirty="0">
-              <a:solidFill>
-                <a:srgbClr val="0000FF"/>
-              </a:solidFill>
-            </a:endParaRPr>
           </a:p>
         </p:txBody>
       </p:sp>
@@ -29603,14 +29597,14 @@
           <p:nvPr>
             <p:extLst>
               <p:ext uri="{D42A27DB-BD31-4B8C-83A1-F6EECF244321}">
-                <p14:modId xmlns:p14="http://schemas.microsoft.com/office/powerpoint/2010/main" val="2496978708"/>
+                <p14:modId xmlns:p14="http://schemas.microsoft.com/office/powerpoint/2010/main" val="1716042311"/>
               </p:ext>
             </p:extLst>
           </p:nvPr>
         </p:nvGraphicFramePr>
         <p:xfrm>
           <a:off x="218954" y="3502039"/>
-          <a:ext cx="5013338" cy="3132881"/>
+          <a:ext cx="5013338" cy="3510196"/>
         </p:xfrm>
         <a:graphic>
           <a:graphicData uri="http://schemas.openxmlformats.org/drawingml/2006/table">
@@ -29677,7 +29671,7 @@
                       </a:r>
                       <a:r>
                         <a:rPr lang="en-US" sz="1600" baseline="30000" dirty="0" err="1" smtClean="0"/>
-                        <a:t>s</a:t>
+                        <a:t>e</a:t>
                       </a:r>
                       <a:r>
                         <a:rPr lang="en-US" sz="1600" baseline="-25000" dirty="0" err="1" smtClean="0"/>
@@ -29947,7 +29941,7 @@
                     <a:p>
                       <a:r>
                         <a:rPr lang="en-US" sz="1600" dirty="0" err="1" smtClean="0"/>
-                        <a:t>Peak_tko</a:t>
+                        <a:t>Peak_wt</a:t>
                       </a:r>
                       <a:r>
                         <a:rPr lang="en-US" sz="1600" dirty="0" smtClean="0"/>
@@ -29955,7 +29949,7 @@
                       </a:r>
                       <a:r>
                         <a:rPr lang="en-US" sz="1600" dirty="0" err="1" smtClean="0"/>
-                        <a:t>Peak_wt</a:t>
+                        <a:t>Peak_mko</a:t>
                       </a:r>
                       <a:endParaRPr lang="en-US" sz="1600" dirty="0"/>
                     </a:p>
@@ -29969,7 +29963,7 @@
                     <a:p>
                       <a:r>
                         <a:rPr lang="en-US" sz="1600" dirty="0" smtClean="0"/>
-                        <a:t>1.4</a:t>
+                        <a:t>0.68</a:t>
                       </a:r>
                       <a:endParaRPr lang="en-US" sz="1600" dirty="0"/>
                     </a:p>
@@ -29983,7 +29977,7 @@
                     <a:p>
                       <a:r>
                         <a:rPr lang="en-US" sz="1600" dirty="0" smtClean="0"/>
-                        <a:t>0.4</a:t>
+                        <a:t>0.11</a:t>
                       </a:r>
                       <a:endParaRPr lang="en-US" sz="1600" dirty="0"/>
                     </a:p>
@@ -30013,7 +30007,7 @@
                     <a:p>
                       <a:r>
                         <a:rPr lang="en-US" sz="1600" dirty="0" err="1" smtClean="0"/>
-                        <a:t>Peak_mko</a:t>
+                        <a:t>Peak_wt</a:t>
                       </a:r>
                       <a:r>
                         <a:rPr lang="en-US" sz="1600" dirty="0" smtClean="0"/>
@@ -30035,7 +30029,7 @@
                     <a:p>
                       <a:r>
                         <a:rPr lang="en-US" sz="1600" dirty="0" smtClean="0"/>
-                        <a:t>1.05</a:t>
+                        <a:t>0.75</a:t>
                       </a:r>
                       <a:endParaRPr lang="en-US" sz="1600" dirty="0"/>
                     </a:p>
@@ -30049,7 +30043,7 @@
                     <a:p>
                       <a:r>
                         <a:rPr lang="en-US" sz="1600" dirty="0" smtClean="0"/>
-                        <a:t>0.01</a:t>
+                        <a:t>0.22</a:t>
                       </a:r>
                       <a:endParaRPr lang="en-US" sz="1600" dirty="0"/>
                     </a:p>
@@ -30083,11 +30077,15 @@
                       </a:r>
                       <a:r>
                         <a:rPr lang="en-US" sz="1600" dirty="0" err="1" smtClean="0"/>
-                        <a:t>mean_kos</a:t>
+                        <a:t>tko</a:t>
                       </a:r>
                       <a:r>
                         <a:rPr lang="en-US" sz="1600" dirty="0" smtClean="0"/>
-                        <a:t>(60)</a:t>
+                        <a:t>(</a:t>
+                      </a:r>
+                      <a:r>
+                        <a:rPr lang="en-US" sz="1600" dirty="0" smtClean="0"/>
+                        <a:t>60)</a:t>
                       </a:r>
                       <a:endParaRPr lang="en-US" sz="1600" dirty="0"/>
                     </a:p>
@@ -30101,7 +30099,7 @@
                     <a:p>
                       <a:r>
                         <a:rPr lang="en-US" sz="1600" dirty="0" smtClean="0"/>
-                        <a:t>0.75</a:t>
+                        <a:t>1.55</a:t>
                       </a:r>
                       <a:endParaRPr lang="en-US" sz="1600" dirty="0"/>
                     </a:p>
@@ -30115,7 +30113,7 @@
                     <a:p>
                       <a:r>
                         <a:rPr lang="en-US" sz="1600" dirty="0" smtClean="0"/>
-                        <a:t>0.15</a:t>
+                        <a:t>0.67</a:t>
                       </a:r>
                       <a:endParaRPr lang="en-US" sz="1600" dirty="0"/>
                     </a:p>
@@ -30132,6 +30130,88 @@
                       <a:r>
                         <a:rPr lang="en-US" sz="1600" dirty="0" smtClean="0"/>
                         <a:t>7</a:t>
+                      </a:r>
+                      <a:endParaRPr lang="en-US" sz="1600" dirty="0"/>
+                    </a:p>
+                  </a:txBody>
+                  <a:tcPr/>
+                </a:tc>
+                <a:tc>
+                  <a:txBody>
+                    <a:bodyPr/>
+                    <a:lstStyle/>
+                    <a:p>
+                      <a:pPr marL="0" marR="0" indent="0" algn="l" defTabSz="457200" rtl="0" eaLnBrk="1" fontAlgn="auto" latinLnBrk="0" hangingPunct="1">
+                        <a:lnSpc>
+                          <a:spcPct val="100000"/>
+                        </a:lnSpc>
+                        <a:spcBef>
+                          <a:spcPts val="0"/>
+                        </a:spcBef>
+                        <a:spcAft>
+                          <a:spcPts val="0"/>
+                        </a:spcAft>
+                        <a:buClrTx/>
+                        <a:buSzTx/>
+                        <a:buFontTx/>
+                        <a:buNone/>
+                        <a:tabLst/>
+                        <a:defRPr/>
+                      </a:pPr>
+                      <a:r>
+                        <a:rPr lang="en-US" sz="1600" dirty="0" smtClean="0"/>
+                        <a:t>Wt_60/</a:t>
+                      </a:r>
+                      <a:r>
+                        <a:rPr lang="en-US" sz="1600" dirty="0" err="1" smtClean="0"/>
+                        <a:t>mko</a:t>
+                      </a:r>
+                      <a:r>
+                        <a:rPr lang="en-US" sz="1600" dirty="0" smtClean="0"/>
+                        <a:t>(60)</a:t>
+                      </a:r>
+                    </a:p>
+                  </a:txBody>
+                  <a:tcPr/>
+                </a:tc>
+                <a:tc>
+                  <a:txBody>
+                    <a:bodyPr/>
+                    <a:lstStyle/>
+                    <a:p>
+                      <a:r>
+                        <a:rPr lang="en-US" sz="1600" dirty="0" smtClean="0"/>
+                        <a:t>0.59</a:t>
+                      </a:r>
+                      <a:endParaRPr lang="en-US" sz="1600" dirty="0"/>
+                    </a:p>
+                  </a:txBody>
+                  <a:tcPr/>
+                </a:tc>
+                <a:tc>
+                  <a:txBody>
+                    <a:bodyPr/>
+                    <a:lstStyle/>
+                    <a:p>
+                      <a:r>
+                        <a:rPr lang="en-US" sz="1600" dirty="0" smtClean="0"/>
+                        <a:t>0.07</a:t>
+                      </a:r>
+                      <a:endParaRPr lang="en-US" sz="1600" dirty="0"/>
+                    </a:p>
+                  </a:txBody>
+                  <a:tcPr/>
+                </a:tc>
+              </a:tr>
+              <a:tr h="377315">
+                <a:tc>
+                  <a:txBody>
+                    <a:bodyPr/>
+                    <a:lstStyle/>
+                    <a:p>
+                      <a:r>
+                        <a:rPr lang="en-US" sz="1600" dirty="0" smtClean="0"/>
+                        <a:t>8</a:t>
                       </a:r>
                       <a:endParaRPr lang="en-US" sz="1600" dirty="0"/>
                     </a:p>
@@ -30167,7 +30247,7 @@
                     <a:p>
                       <a:r>
                         <a:rPr lang="en-US" sz="1600" dirty="0" smtClean="0"/>
-                        <a:t>0.75</a:t>
+                        <a:t>0.78</a:t>
                       </a:r>
                       <a:endParaRPr lang="en-US" sz="1600" dirty="0"/>
                     </a:p>
@@ -30181,7 +30261,7 @@
                     <a:p>
                       <a:r>
                         <a:rPr lang="en-US" sz="1600" dirty="0" smtClean="0"/>
-                        <a:t>0</a:t>
+                        <a:t>0.29</a:t>
                       </a:r>
                       <a:endParaRPr lang="en-US" sz="1600" dirty="0"/>
                     </a:p>
@@ -30197,7 +30277,25 @@
                     <a:p>
                       <a:r>
                         <a:rPr lang="en-US" sz="1600" dirty="0" smtClean="0"/>
-                        <a:t>8</a:t>
+                        <a:t>9</a:t>
+                      </a:r>
+                      <a:endParaRPr lang="en-US" sz="1600" dirty="0"/>
+                    </a:p>
+                  </a:txBody>
+                  <a:tcPr/>
+                </a:tc>
+                <a:tc>
+                  <a:txBody>
+                    <a:bodyPr/>
+                    <a:lstStyle/>
+                    <a:p>
+                      <a:r>
+                        <a:rPr lang="en-US" sz="1600" dirty="0" err="1" smtClean="0"/>
+                        <a:t>Wt_peak</a:t>
+                      </a:r>
+                      <a:r>
+                        <a:rPr lang="en-US" sz="1600" dirty="0" smtClean="0"/>
+                        <a:t>/wt_120</a:t>
                       </a:r>
                       <a:endParaRPr lang="en-US" sz="1600" dirty="0"/>
                     </a:p>
@@ -30211,11 +30309,7 @@
                     <a:p>
                       <a:r>
                         <a:rPr lang="en-US" sz="1600" dirty="0" smtClean="0"/>
-                        <a:t>Wt_120/</a:t>
-                      </a:r>
-                      <a:r>
-                        <a:rPr lang="en-US" sz="1600" dirty="0" err="1" smtClean="0"/>
-                        <a:t>wt_peak</a:t>
+                        <a:t>2.22</a:t>
                       </a:r>
                       <a:endParaRPr lang="en-US" sz="1600" dirty="0"/>
                     </a:p>
@@ -30229,21 +30323,7 @@
                     <a:p>
                       <a:r>
                         <a:rPr lang="en-US" sz="1600" dirty="0" smtClean="0"/>
-                        <a:t>6</a:t>
-                      </a:r>
-                      <a:endParaRPr lang="en-US" sz="1600" dirty="0"/>
-                    </a:p>
-                  </a:txBody>
-                  <a:tcPr/>
-                </a:tc>
-                <a:tc>
-                  <a:txBody>
-                    <a:bodyPr/>
-                    <a:lstStyle/>
-                    <a:p>
-                      <a:r>
-                        <a:rPr lang="en-US" sz="1600" dirty="0" smtClean="0"/>
-                        <a:t>1</a:t>
+                        <a:t>0.94</a:t>
                       </a:r>
                       <a:endParaRPr lang="en-US" sz="1600" dirty="0"/>
                     </a:p>
@@ -30264,20 +30344,20 @@
           <p:nvPr>
             <p:extLst>
               <p:ext uri="{D42A27DB-BD31-4B8C-83A1-F6EECF244321}">
-                <p14:modId xmlns:p14="http://schemas.microsoft.com/office/powerpoint/2010/main" val="967887228"/>
+                <p14:modId xmlns:p14="http://schemas.microsoft.com/office/powerpoint/2010/main" val="1986766200"/>
               </p:ext>
             </p:extLst>
           </p:nvPr>
         </p:nvGraphicFramePr>
         <p:xfrm>
-          <a:off x="5560536" y="3533148"/>
+          <a:off x="5573856" y="1149299"/>
           <a:ext cx="3055927" cy="801211"/>
         </p:xfrm>
         <a:graphic>
           <a:graphicData uri="http://schemas.openxmlformats.org/presentationml/2006/ole">
             <mc:AlternateContent xmlns:mc="http://schemas.openxmlformats.org/markup-compatibility/2006">
               <mc:Choice xmlns:v="urn:schemas-microsoft-com:vml" Requires="v">
-                <p:oleObj spid="_x0000_s6157" name="Equation" r:id="rId4" imgW="1790700" imgH="469900" progId="Equation.3">
+                <p:oleObj spid="_x0000_s6168" name="Equation" r:id="rId4" imgW="1790700" imgH="469900" progId="Equation.3">
                   <p:embed/>
                 </p:oleObj>
               </mc:Choice>
@@ -30298,7 +30378,7 @@
                     </p:blipFill>
                     <p:spPr>
                       <a:xfrm>
-                        <a:off x="5560536" y="3533148"/>
+                        <a:off x="5573856" y="1149299"/>
                         <a:ext cx="3055927" cy="801211"/>
                       </a:xfrm>
                       <a:prstGeom prst="rect">
@@ -30320,7 +30400,7 @@
         </p:nvSpPr>
         <p:spPr>
           <a:xfrm>
-            <a:off x="218954" y="2968476"/>
+            <a:off x="218954" y="3153142"/>
             <a:ext cx="2404812" cy="369332"/>
           </a:xfrm>
           <a:prstGeom prst="rect">
@@ -30363,7 +30443,7 @@
                   <a:srgbClr val="0000FF"/>
                 </a:solidFill>
               </a:rPr>
-              <a:t>=9)</a:t>
+              <a:t>=8)</a:t>
             </a:r>
             <a:endParaRPr lang="en-US" b="1" dirty="0">
               <a:solidFill>
@@ -30381,7 +30461,7 @@
         </p:nvSpPr>
         <p:spPr>
           <a:xfrm>
-            <a:off x="5560536" y="3035483"/>
+            <a:off x="5567196" y="395416"/>
             <a:ext cx="3649068" cy="369332"/>
           </a:xfrm>
           <a:prstGeom prst="rect">
@@ -30419,20 +30499,20 @@
           <p:nvPr>
             <p:extLst>
               <p:ext uri="{D42A27DB-BD31-4B8C-83A1-F6EECF244321}">
-                <p14:modId xmlns:p14="http://schemas.microsoft.com/office/powerpoint/2010/main" val="3042324749"/>
+                <p14:modId xmlns:p14="http://schemas.microsoft.com/office/powerpoint/2010/main" val="3982599595"/>
               </p:ext>
             </p:extLst>
           </p:nvPr>
         </p:nvGraphicFramePr>
         <p:xfrm>
-          <a:off x="5553876" y="4804420"/>
+          <a:off x="5567196" y="2420571"/>
           <a:ext cx="3055927" cy="801211"/>
         </p:xfrm>
         <a:graphic>
           <a:graphicData uri="http://schemas.openxmlformats.org/presentationml/2006/ole">
             <mc:AlternateContent xmlns:mc="http://schemas.openxmlformats.org/markup-compatibility/2006">
               <mc:Choice xmlns:v="urn:schemas-microsoft-com:vml" Requires="v">
-                <p:oleObj spid="_x0000_s6158" name="Equation" r:id="rId6" imgW="1790700" imgH="469900" progId="Equation.3">
+                <p:oleObj spid="_x0000_s6169" name="Equation" r:id="rId6" imgW="1790700" imgH="469900" progId="Equation.3">
                   <p:embed/>
                 </p:oleObj>
               </mc:Choice>
@@ -30453,7 +30533,7 @@
                     </p:blipFill>
                     <p:spPr>
                       <a:xfrm>
-                        <a:off x="5553876" y="4804420"/>
+                        <a:off x="5567196" y="2420571"/>
                         <a:ext cx="3055927" cy="801211"/>
                       </a:xfrm>
                       <a:prstGeom prst="rect">
@@ -30488,7 +30568,7 @@
         </p:blipFill>
         <p:spPr>
           <a:xfrm>
-            <a:off x="1008496" y="-177134"/>
+            <a:off x="815669" y="-32147"/>
             <a:ext cx="3616193" cy="3436962"/>
           </a:xfrm>
           <a:prstGeom prst="rect">
@@ -32231,7 +32311,7 @@
           <a:graphicData uri="http://schemas.openxmlformats.org/presentationml/2006/ole">
             <mc:AlternateContent xmlns:mc="http://schemas.openxmlformats.org/markup-compatibility/2006">
               <mc:Choice xmlns:v="urn:schemas-microsoft-com:vml" Requires="v">
-                <p:oleObj spid="_x0000_s2112" name="Equation" r:id="rId4" imgW="2641600" imgH="393700" progId="Equation.3">
+                <p:oleObj spid="_x0000_s2117" name="Equation" r:id="rId4" imgW="2641600" imgH="393700" progId="Equation.3">
                   <p:embed/>
                 </p:oleObj>
               </mc:Choice>
@@ -32288,7 +32368,7 @@
           <a:graphicData uri="http://schemas.openxmlformats.org/presentationml/2006/ole">
             <mc:AlternateContent xmlns:mc="http://schemas.openxmlformats.org/markup-compatibility/2006">
               <mc:Choice xmlns:v="urn:schemas-microsoft-com:vml" Requires="v">
-                <p:oleObj spid="_x0000_s2113" name="Equation" r:id="rId6" imgW="3429000" imgH="584200" progId="Equation.3">
+                <p:oleObj spid="_x0000_s2118" name="Equation" r:id="rId6" imgW="3429000" imgH="584200" progId="Equation.3">
                   <p:embed/>
                 </p:oleObj>
               </mc:Choice>
@@ -32447,16 +32527,657 @@
           </a:prstGeom>
         </p:spPr>
       </p:pic>
+      <p:graphicFrame>
+        <p:nvGraphicFramePr>
+          <p:cNvPr id="7" name="Table 6"/>
+          <p:cNvGraphicFramePr>
+            <a:graphicFrameLocks noGrp="1"/>
+          </p:cNvGraphicFramePr>
+          <p:nvPr>
+            <p:extLst>
+              <p:ext uri="{D42A27DB-BD31-4B8C-83A1-F6EECF244321}">
+                <p14:modId xmlns:p14="http://schemas.microsoft.com/office/powerpoint/2010/main" val="1976035423"/>
+              </p:ext>
+            </p:extLst>
+          </p:nvPr>
+        </p:nvGraphicFramePr>
+        <p:xfrm>
+          <a:off x="218954" y="3502039"/>
+          <a:ext cx="5013338" cy="3174916"/>
+        </p:xfrm>
+        <a:graphic>
+          <a:graphicData uri="http://schemas.openxmlformats.org/drawingml/2006/table">
+            <a:tbl>
+              <a:tblPr firstRow="1" bandRow="1">
+                <a:tableStyleId>{5C22544A-7EE6-4342-B048-85BDC9FD1C3A}</a:tableStyleId>
+              </a:tblPr>
+              <a:tblGrid>
+                <a:gridCol w="824131"/>
+                <a:gridCol w="2339995"/>
+                <a:gridCol w="973256"/>
+                <a:gridCol w="875956"/>
+              </a:tblGrid>
+              <a:tr h="330934">
+                <a:tc>
+                  <a:txBody>
+                    <a:bodyPr/>
+                    <a:lstStyle/>
+                    <a:p>
+                      <a:r>
+                        <a:rPr lang="en-US" sz="1600" dirty="0" smtClean="0"/>
+                        <a:t>Index(</a:t>
+                      </a:r>
+                      <a:r>
+                        <a:rPr lang="en-US" sz="1600" dirty="0" err="1" smtClean="0"/>
+                        <a:t>i</a:t>
+                      </a:r>
+                      <a:r>
+                        <a:rPr lang="en-US" sz="1600" dirty="0" smtClean="0"/>
+                        <a:t>)</a:t>
+                      </a:r>
+                      <a:endParaRPr lang="en-US" sz="1600" dirty="0"/>
+                    </a:p>
+                  </a:txBody>
+                  <a:tcPr/>
+                </a:tc>
+                <a:tc>
+                  <a:txBody>
+                    <a:bodyPr/>
+                    <a:lstStyle/>
+                    <a:p>
+                      <a:r>
+                        <a:rPr lang="en-US" sz="1600" dirty="0" smtClean="0"/>
+                        <a:t>Feature</a:t>
+                      </a:r>
+                      <a:endParaRPr lang="en-US" sz="1600" dirty="0"/>
+                    </a:p>
+                  </a:txBody>
+                  <a:tcPr/>
+                </a:tc>
+                <a:tc>
+                  <a:txBody>
+                    <a:bodyPr/>
+                    <a:lstStyle/>
+                    <a:p>
+                      <a:pPr algn="l"/>
+                      <a:r>
+                        <a:rPr lang="en-US" sz="1600" dirty="0" smtClean="0"/>
+                        <a:t>Value(</a:t>
+                      </a:r>
+                      <a:r>
+                        <a:rPr lang="en-US" sz="1600" dirty="0" err="1" smtClean="0"/>
+                        <a:t>F</a:t>
+                      </a:r>
+                      <a:r>
+                        <a:rPr lang="en-US" sz="1600" baseline="30000" dirty="0" err="1" smtClean="0"/>
+                        <a:t>s</a:t>
+                      </a:r>
+                      <a:r>
+                        <a:rPr lang="en-US" sz="1600" baseline="-25000" dirty="0" err="1" smtClean="0"/>
+                        <a:t>i</a:t>
+                      </a:r>
+                      <a:r>
+                        <a:rPr lang="en-US" sz="1600" baseline="0" dirty="0" smtClean="0"/>
+                        <a:t>)</a:t>
+                      </a:r>
+                      <a:endParaRPr lang="en-US" sz="1600" dirty="0"/>
+                    </a:p>
+                  </a:txBody>
+                  <a:tcPr/>
+                </a:tc>
+                <a:tc>
+                  <a:txBody>
+                    <a:bodyPr/>
+                    <a:lstStyle/>
+                    <a:p>
+                      <a:r>
+                        <a:rPr lang="en-US" sz="1600" dirty="0" smtClean="0"/>
+                        <a:t>Error(</a:t>
+                      </a:r>
+                      <a:r>
+                        <a:rPr lang="en-US" sz="1600" dirty="0" err="1" smtClean="0"/>
+                        <a:t>σ</a:t>
+                      </a:r>
+                      <a:r>
+                        <a:rPr lang="en-US" sz="1600" baseline="-25000" dirty="0" err="1" smtClean="0"/>
+                        <a:t>i</a:t>
+                      </a:r>
+                      <a:r>
+                        <a:rPr lang="en-US" sz="1600" dirty="0" smtClean="0"/>
+                        <a:t>)</a:t>
+                      </a:r>
+                      <a:endParaRPr lang="en-US" sz="1600" dirty="0"/>
+                    </a:p>
+                  </a:txBody>
+                  <a:tcPr/>
+                </a:tc>
+              </a:tr>
+              <a:tr h="330934">
+                <a:tc>
+                  <a:txBody>
+                    <a:bodyPr/>
+                    <a:lstStyle/>
+                    <a:p>
+                      <a:r>
+                        <a:rPr lang="en-US" sz="1600" dirty="0" smtClean="0"/>
+                        <a:t>1</a:t>
+                      </a:r>
+                      <a:endParaRPr lang="en-US" sz="1600" dirty="0"/>
+                    </a:p>
+                  </a:txBody>
+                  <a:tcPr/>
+                </a:tc>
+                <a:tc>
+                  <a:txBody>
+                    <a:bodyPr/>
+                    <a:lstStyle/>
+                    <a:p>
+                      <a:r>
+                        <a:rPr lang="en-US" sz="1600" dirty="0" smtClean="0"/>
+                        <a:t>Peak time (</a:t>
+                      </a:r>
+                      <a:r>
+                        <a:rPr lang="en-US" sz="1600" dirty="0" err="1" smtClean="0"/>
+                        <a:t>wt</a:t>
+                      </a:r>
+                      <a:r>
+                        <a:rPr lang="en-US" sz="1600" dirty="0" smtClean="0"/>
+                        <a:t>)</a:t>
+                      </a:r>
+                      <a:endParaRPr lang="en-US" sz="1600" dirty="0"/>
+                    </a:p>
+                  </a:txBody>
+                  <a:tcPr/>
+                </a:tc>
+                <a:tc>
+                  <a:txBody>
+                    <a:bodyPr/>
+                    <a:lstStyle/>
+                    <a:p>
+                      <a:r>
+                        <a:rPr lang="en-US" sz="1600" dirty="0" smtClean="0"/>
+                        <a:t>60 </a:t>
+                      </a:r>
+                      <a:r>
+                        <a:rPr lang="en-US" sz="1600" dirty="0" smtClean="0"/>
+                        <a:t>min</a:t>
+                      </a:r>
+                      <a:endParaRPr lang="en-US" sz="1600" dirty="0"/>
+                    </a:p>
+                  </a:txBody>
+                  <a:tcPr/>
+                </a:tc>
+                <a:tc>
+                  <a:txBody>
+                    <a:bodyPr/>
+                    <a:lstStyle/>
+                    <a:p>
+                      <a:r>
+                        <a:rPr lang="en-US" sz="1600" dirty="0" smtClean="0"/>
+                        <a:t>10 </a:t>
+                      </a:r>
+                      <a:r>
+                        <a:rPr lang="en-US" sz="1600" dirty="0" smtClean="0"/>
+                        <a:t>min</a:t>
+                      </a:r>
+                      <a:endParaRPr lang="en-US" sz="1600" dirty="0"/>
+                    </a:p>
+                  </a:txBody>
+                  <a:tcPr/>
+                </a:tc>
+              </a:tr>
+              <a:tr h="330934">
+                <a:tc>
+                  <a:txBody>
+                    <a:bodyPr/>
+                    <a:lstStyle/>
+                    <a:p>
+                      <a:r>
+                        <a:rPr lang="en-US" sz="1600" dirty="0" smtClean="0"/>
+                        <a:t>2</a:t>
+                      </a:r>
+                      <a:endParaRPr lang="en-US" sz="1600" dirty="0"/>
+                    </a:p>
+                  </a:txBody>
+                  <a:tcPr/>
+                </a:tc>
+                <a:tc>
+                  <a:txBody>
+                    <a:bodyPr/>
+                    <a:lstStyle/>
+                    <a:p>
+                      <a:r>
+                        <a:rPr lang="en-US" sz="1600" dirty="0" smtClean="0"/>
+                        <a:t>Peak</a:t>
+                      </a:r>
+                      <a:r>
+                        <a:rPr lang="en-US" sz="1600" baseline="0" dirty="0" smtClean="0"/>
+                        <a:t> time (</a:t>
+                      </a:r>
+                      <a:r>
+                        <a:rPr lang="en-US" sz="1600" baseline="0" dirty="0" err="1" smtClean="0"/>
+                        <a:t>mko</a:t>
+                      </a:r>
+                      <a:r>
+                        <a:rPr lang="en-US" sz="1600" baseline="0" dirty="0" smtClean="0"/>
+                        <a:t>)</a:t>
+                      </a:r>
+                      <a:endParaRPr lang="en-US" sz="1600" dirty="0"/>
+                    </a:p>
+                  </a:txBody>
+                  <a:tcPr/>
+                </a:tc>
+                <a:tc>
+                  <a:txBody>
+                    <a:bodyPr/>
+                    <a:lstStyle/>
+                    <a:p>
+                      <a:r>
+                        <a:rPr lang="en-US" sz="1600" dirty="0" smtClean="0"/>
+                        <a:t>60 min</a:t>
+                      </a:r>
+                      <a:endParaRPr lang="en-US" sz="1600" dirty="0"/>
+                    </a:p>
+                  </a:txBody>
+                  <a:tcPr/>
+                </a:tc>
+                <a:tc>
+                  <a:txBody>
+                    <a:bodyPr/>
+                    <a:lstStyle/>
+                    <a:p>
+                      <a:r>
+                        <a:rPr lang="en-US" sz="1600" dirty="0" smtClean="0"/>
+                        <a:t>10 min</a:t>
+                      </a:r>
+                      <a:endParaRPr lang="en-US" sz="1600" dirty="0"/>
+                    </a:p>
+                  </a:txBody>
+                  <a:tcPr/>
+                </a:tc>
+              </a:tr>
+              <a:tr h="330934">
+                <a:tc>
+                  <a:txBody>
+                    <a:bodyPr/>
+                    <a:lstStyle/>
+                    <a:p>
+                      <a:r>
+                        <a:rPr lang="en-US" sz="1600" dirty="0" smtClean="0"/>
+                        <a:t>3</a:t>
+                      </a:r>
+                      <a:endParaRPr lang="en-US" sz="1600" dirty="0"/>
+                    </a:p>
+                  </a:txBody>
+                  <a:tcPr/>
+                </a:tc>
+                <a:tc>
+                  <a:txBody>
+                    <a:bodyPr/>
+                    <a:lstStyle/>
+                    <a:p>
+                      <a:r>
+                        <a:rPr lang="en-US" sz="1600" dirty="0" smtClean="0"/>
+                        <a:t>Peak time (</a:t>
+                      </a:r>
+                      <a:r>
+                        <a:rPr lang="en-US" sz="1600" dirty="0" err="1" smtClean="0"/>
+                        <a:t>tko</a:t>
+                      </a:r>
+                      <a:r>
+                        <a:rPr lang="en-US" sz="1600" dirty="0" smtClean="0"/>
+                        <a:t>) </a:t>
+                      </a:r>
+                      <a:endParaRPr lang="en-US" sz="1600" dirty="0"/>
+                    </a:p>
+                  </a:txBody>
+                  <a:tcPr/>
+                </a:tc>
+                <a:tc>
+                  <a:txBody>
+                    <a:bodyPr/>
+                    <a:lstStyle/>
+                    <a:p>
+                      <a:r>
+                        <a:rPr lang="en-US" sz="1600" dirty="0" smtClean="0"/>
+                        <a:t>60</a:t>
+                      </a:r>
+                      <a:r>
+                        <a:rPr lang="en-US" sz="1600" baseline="0" dirty="0" smtClean="0"/>
+                        <a:t> </a:t>
+                      </a:r>
+                      <a:r>
+                        <a:rPr lang="en-US" sz="1600" baseline="0" dirty="0" smtClean="0"/>
+                        <a:t>min</a:t>
+                      </a:r>
+                      <a:endParaRPr lang="en-US" sz="1600" dirty="0"/>
+                    </a:p>
+                  </a:txBody>
+                  <a:tcPr/>
+                </a:tc>
+                <a:tc>
+                  <a:txBody>
+                    <a:bodyPr/>
+                    <a:lstStyle/>
+                    <a:p>
+                      <a:r>
+                        <a:rPr lang="en-US" sz="1600" dirty="0" smtClean="0"/>
+                        <a:t>10 </a:t>
+                      </a:r>
+                      <a:r>
+                        <a:rPr lang="en-US" sz="1600" dirty="0" smtClean="0"/>
+                        <a:t>min</a:t>
+                      </a:r>
+                      <a:endParaRPr lang="en-US" sz="1600" dirty="0"/>
+                    </a:p>
+                  </a:txBody>
+                  <a:tcPr/>
+                </a:tc>
+              </a:tr>
+              <a:tr h="355134">
+                <a:tc>
+                  <a:txBody>
+                    <a:bodyPr/>
+                    <a:lstStyle/>
+                    <a:p>
+                      <a:r>
+                        <a:rPr lang="en-US" sz="1600" dirty="0" smtClean="0"/>
+                        <a:t>4</a:t>
+                      </a:r>
+                      <a:endParaRPr lang="en-US" sz="1600" dirty="0"/>
+                    </a:p>
+                  </a:txBody>
+                  <a:tcPr/>
+                </a:tc>
+                <a:tc>
+                  <a:txBody>
+                    <a:bodyPr/>
+                    <a:lstStyle/>
+                    <a:p>
+                      <a:r>
+                        <a:rPr lang="en-US" sz="1600" dirty="0" err="1" smtClean="0"/>
+                        <a:t>Peak_tko</a:t>
+                      </a:r>
+                      <a:r>
+                        <a:rPr lang="en-US" sz="1600" dirty="0" smtClean="0"/>
+                        <a:t>/</a:t>
+                      </a:r>
+                      <a:r>
+                        <a:rPr lang="en-US" sz="1600" dirty="0" err="1" smtClean="0"/>
+                        <a:t>Peak_wt</a:t>
+                      </a:r>
+                      <a:endParaRPr lang="en-US" sz="1600" dirty="0"/>
+                    </a:p>
+                  </a:txBody>
+                  <a:tcPr/>
+                </a:tc>
+                <a:tc>
+                  <a:txBody>
+                    <a:bodyPr/>
+                    <a:lstStyle/>
+                    <a:p>
+                      <a:r>
+                        <a:rPr lang="en-US" sz="1600" dirty="0" smtClean="0"/>
+                        <a:t>0.73</a:t>
+                      </a:r>
+                      <a:endParaRPr lang="en-US" sz="1600" dirty="0"/>
+                    </a:p>
+                  </a:txBody>
+                  <a:tcPr/>
+                </a:tc>
+                <a:tc>
+                  <a:txBody>
+                    <a:bodyPr/>
+                    <a:lstStyle/>
+                    <a:p>
+                      <a:r>
+                        <a:rPr lang="en-US" sz="1600" dirty="0" smtClean="0"/>
+                        <a:t>0.05</a:t>
+                      </a:r>
+                      <a:endParaRPr lang="en-US" sz="1600" dirty="0"/>
+                    </a:p>
+                  </a:txBody>
+                  <a:tcPr/>
+                </a:tc>
+              </a:tr>
+              <a:tr h="346717">
+                <a:tc>
+                  <a:txBody>
+                    <a:bodyPr/>
+                    <a:lstStyle/>
+                    <a:p>
+                      <a:r>
+                        <a:rPr lang="en-US" sz="1600" dirty="0" smtClean="0"/>
+                        <a:t>5</a:t>
+                      </a:r>
+                      <a:endParaRPr lang="en-US" sz="1600" dirty="0"/>
+                    </a:p>
+                  </a:txBody>
+                  <a:tcPr/>
+                </a:tc>
+                <a:tc>
+                  <a:txBody>
+                    <a:bodyPr/>
+                    <a:lstStyle/>
+                    <a:p>
+                      <a:r>
+                        <a:rPr lang="en-US" sz="1600" dirty="0" err="1" smtClean="0"/>
+                        <a:t>Peak_mko</a:t>
+                      </a:r>
+                      <a:r>
+                        <a:rPr lang="en-US" sz="1600" dirty="0" smtClean="0"/>
+                        <a:t>/</a:t>
+                      </a:r>
+                      <a:r>
+                        <a:rPr lang="en-US" sz="1600" dirty="0" err="1" smtClean="0"/>
+                        <a:t>peak_tko</a:t>
+                      </a:r>
+                      <a:endParaRPr lang="en-US" sz="1600" dirty="0"/>
+                    </a:p>
+                  </a:txBody>
+                  <a:tcPr/>
+                </a:tc>
+                <a:tc>
+                  <a:txBody>
+                    <a:bodyPr/>
+                    <a:lstStyle/>
+                    <a:p>
+                      <a:r>
+                        <a:rPr lang="en-US" sz="1600" dirty="0" smtClean="0"/>
+                        <a:t>0.50</a:t>
+                      </a:r>
+                      <a:endParaRPr lang="en-US" sz="1600" dirty="0"/>
+                    </a:p>
+                  </a:txBody>
+                  <a:tcPr/>
+                </a:tc>
+                <a:tc>
+                  <a:txBody>
+                    <a:bodyPr/>
+                    <a:lstStyle/>
+                    <a:p>
+                      <a:r>
+                        <a:rPr lang="en-US" sz="1600" dirty="0" smtClean="0"/>
+                        <a:t>0.06</a:t>
+                      </a:r>
+                      <a:endParaRPr lang="en-US" sz="1600" dirty="0"/>
+                    </a:p>
+                  </a:txBody>
+                  <a:tcPr/>
+                </a:tc>
+              </a:tr>
+              <a:tr h="377315">
+                <a:tc>
+                  <a:txBody>
+                    <a:bodyPr/>
+                    <a:lstStyle/>
+                    <a:p>
+                      <a:r>
+                        <a:rPr lang="en-US" sz="1600" dirty="0" smtClean="0"/>
+                        <a:t>6</a:t>
+                      </a:r>
+                      <a:endParaRPr lang="en-US" sz="1600" dirty="0"/>
+                    </a:p>
+                  </a:txBody>
+                  <a:tcPr/>
+                </a:tc>
+                <a:tc>
+                  <a:txBody>
+                    <a:bodyPr/>
+                    <a:lstStyle/>
+                    <a:p>
+                      <a:r>
+                        <a:rPr lang="en-US" sz="1600" dirty="0" smtClean="0"/>
+                        <a:t>wt_120/mko_120</a:t>
+                      </a:r>
+                      <a:endParaRPr lang="en-US" sz="1600" dirty="0"/>
+                    </a:p>
+                  </a:txBody>
+                  <a:tcPr/>
+                </a:tc>
+                <a:tc>
+                  <a:txBody>
+                    <a:bodyPr/>
+                    <a:lstStyle/>
+                    <a:p>
+                      <a:r>
+                        <a:rPr lang="en-US" sz="1600" dirty="0" smtClean="0"/>
+                        <a:t>1.98</a:t>
+                      </a:r>
+                      <a:endParaRPr lang="en-US" sz="1600" dirty="0"/>
+                    </a:p>
+                  </a:txBody>
+                  <a:tcPr/>
+                </a:tc>
+                <a:tc>
+                  <a:txBody>
+                    <a:bodyPr/>
+                    <a:lstStyle/>
+                    <a:p>
+                      <a:r>
+                        <a:rPr lang="en-US" sz="1600" dirty="0" smtClean="0"/>
+                        <a:t>0.23</a:t>
+                      </a:r>
+                      <a:endParaRPr lang="en-US" sz="1600" dirty="0"/>
+                    </a:p>
+                  </a:txBody>
+                  <a:tcPr/>
+                </a:tc>
+              </a:tr>
+              <a:tr h="377315">
+                <a:tc>
+                  <a:txBody>
+                    <a:bodyPr/>
+                    <a:lstStyle/>
+                    <a:p>
+                      <a:r>
+                        <a:rPr lang="en-US" sz="1600" dirty="0" smtClean="0"/>
+                        <a:t>7</a:t>
+                      </a:r>
+                      <a:endParaRPr lang="en-US" sz="1600" dirty="0"/>
+                    </a:p>
+                  </a:txBody>
+                  <a:tcPr/>
+                </a:tc>
+                <a:tc>
+                  <a:txBody>
+                    <a:bodyPr/>
+                    <a:lstStyle/>
+                    <a:p>
+                      <a:r>
+                        <a:rPr lang="en-US" sz="1600" dirty="0" smtClean="0"/>
+                        <a:t>Wt_120/tko_120</a:t>
+                      </a:r>
+                      <a:endParaRPr lang="en-US" sz="1600" dirty="0"/>
+                    </a:p>
+                  </a:txBody>
+                  <a:tcPr/>
+                </a:tc>
+                <a:tc>
+                  <a:txBody>
+                    <a:bodyPr/>
+                    <a:lstStyle/>
+                    <a:p>
+                      <a:r>
+                        <a:rPr lang="en-US" sz="1600" dirty="0" smtClean="0"/>
+                        <a:t>1.17</a:t>
+                      </a:r>
+                      <a:endParaRPr lang="en-US" sz="1600" dirty="0"/>
+                    </a:p>
+                  </a:txBody>
+                  <a:tcPr/>
+                </a:tc>
+                <a:tc>
+                  <a:txBody>
+                    <a:bodyPr/>
+                    <a:lstStyle/>
+                    <a:p>
+                      <a:r>
+                        <a:rPr lang="en-US" sz="1600" dirty="0" smtClean="0"/>
+                        <a:t>0.14</a:t>
+                      </a:r>
+                      <a:endParaRPr lang="en-US" sz="1600" dirty="0"/>
+                    </a:p>
+                  </a:txBody>
+                  <a:tcPr/>
+                </a:tc>
+              </a:tr>
+              <a:tr h="377315">
+                <a:tc>
+                  <a:txBody>
+                    <a:bodyPr/>
+                    <a:lstStyle/>
+                    <a:p>
+                      <a:endParaRPr lang="en-US" sz="1600" dirty="0"/>
+                    </a:p>
+                  </a:txBody>
+                  <a:tcPr/>
+                </a:tc>
+                <a:tc>
+                  <a:txBody>
+                    <a:bodyPr/>
+                    <a:lstStyle/>
+                    <a:p>
+                      <a:endParaRPr lang="en-US" sz="1600" dirty="0"/>
+                    </a:p>
+                  </a:txBody>
+                  <a:tcPr/>
+                </a:tc>
+                <a:tc>
+                  <a:txBody>
+                    <a:bodyPr/>
+                    <a:lstStyle/>
+                    <a:p>
+                      <a:endParaRPr lang="en-US" sz="1600" dirty="0"/>
+                    </a:p>
+                  </a:txBody>
+                  <a:tcPr/>
+                </a:tc>
+                <a:tc>
+                  <a:txBody>
+                    <a:bodyPr/>
+                    <a:lstStyle/>
+                    <a:p>
+                      <a:endParaRPr lang="en-US" sz="1600" dirty="0"/>
+                    </a:p>
+                  </a:txBody>
+                  <a:tcPr/>
+                </a:tc>
+              </a:tr>
+            </a:tbl>
+          </a:graphicData>
+        </a:graphic>
+      </p:graphicFrame>
       <p:sp>
         <p:nvSpPr>
-          <p:cNvPr id="4" name="Rectangle 3"/>
+          <p:cNvPr id="8" name="Rectangle 7"/>
           <p:cNvSpPr/>
           <p:nvPr/>
         </p:nvSpPr>
         <p:spPr>
           <a:xfrm>
-            <a:off x="582515" y="3012320"/>
-            <a:ext cx="2339102" cy="646331"/>
+            <a:off x="269895" y="3030272"/>
+            <a:ext cx="2404812" cy="369332"/>
           </a:xfrm>
           <a:prstGeom prst="rect">
             <a:avLst/>
@@ -32469,95 +33190,45 @@
           <a:lstStyle/>
           <a:p>
             <a:r>
-              <a:rPr lang="en-US" dirty="0"/>
-              <a:t>Score function</a:t>
+              <a:rPr lang="en-US" b="1" dirty="0" smtClean="0">
+                <a:solidFill>
+                  <a:srgbClr val="0000FF"/>
+                </a:solidFill>
+              </a:rPr>
+              <a:t>Table of features (</a:t>
             </a:r>
             <a:r>
-              <a:rPr lang="en-US" dirty="0" smtClean="0"/>
-              <a:t>:</a:t>
-            </a:r>
-          </a:p>
-          <a:p>
-            <a:pPr marL="342900" indent="-342900">
-              <a:buFont typeface="Arial"/>
-              <a:buChar char="•"/>
-            </a:pPr>
-            <a:r>
-              <a:rPr lang="en-US" dirty="0" smtClean="0"/>
-              <a:t>RMSD/(</a:t>
+              <a:rPr lang="en-US" b="1" dirty="0" err="1" smtClean="0">
+                <a:solidFill>
+                  <a:srgbClr val="0000FF"/>
+                </a:solidFill>
+              </a:rPr>
+              <a:t>n</a:t>
             </a:r>
             <a:r>
-              <a:rPr lang="en-US" dirty="0" err="1" smtClean="0"/>
-              <a:t>RMSD_line</a:t>
+              <a:rPr lang="en-US" b="1" baseline="-25000" dirty="0" err="1" smtClean="0">
+                <a:solidFill>
+                  <a:srgbClr val="0000FF"/>
+                </a:solidFill>
+              </a:rPr>
+              <a:t>F</a:t>
             </a:r>
             <a:r>
-              <a:rPr lang="en-US" dirty="0" smtClean="0"/>
-              <a:t>)</a:t>
+              <a:rPr lang="en-US" b="1" dirty="0" smtClean="0">
+                <a:solidFill>
+                  <a:srgbClr val="0000FF"/>
+                </a:solidFill>
+              </a:rPr>
+              <a:t>=9)</a:t>
             </a:r>
-            <a:endParaRPr lang="en-US" dirty="0"/>
+            <a:endParaRPr lang="en-US" b="1" dirty="0">
+              <a:solidFill>
+                <a:srgbClr val="0000FF"/>
+              </a:solidFill>
+            </a:endParaRPr>
           </a:p>
         </p:txBody>
       </p:sp>
-      <p:pic>
-        <p:nvPicPr>
-          <p:cNvPr id="5" name="Picture 4" descr="fig3s.pdf"/>
-          <p:cNvPicPr>
-            <a:picLocks noChangeAspect="1"/>
-          </p:cNvPicPr>
-          <p:nvPr/>
-        </p:nvPicPr>
-        <p:blipFill>
-          <a:blip r:embed="rId3">
-            <a:extLst>
-              <a:ext uri="{28A0092B-C50C-407E-A947-70E740481C1C}">
-                <a14:useLocalDpi xmlns:a14="http://schemas.microsoft.com/office/drawing/2010/main" val="0"/>
-              </a:ext>
-            </a:extLst>
-          </a:blip>
-          <a:stretch>
-            <a:fillRect/>
-          </a:stretch>
-        </p:blipFill>
-        <p:spPr>
-          <a:xfrm>
-            <a:off x="4313007" y="1631356"/>
-            <a:ext cx="5299364" cy="6858000"/>
-          </a:xfrm>
-          <a:prstGeom prst="rect">
-            <a:avLst/>
-          </a:prstGeom>
-        </p:spPr>
-      </p:pic>
-      <p:pic>
-        <p:nvPicPr>
-          <p:cNvPr id="6" name="Picture 5" descr="bestFit.pdf"/>
-          <p:cNvPicPr>
-            <a:picLocks noChangeAspect="1"/>
-          </p:cNvPicPr>
-          <p:nvPr/>
-        </p:nvPicPr>
-        <p:blipFill>
-          <a:blip r:embed="rId4">
-            <a:extLst>
-              <a:ext uri="{28A0092B-C50C-407E-A947-70E740481C1C}">
-                <a14:useLocalDpi xmlns:a14="http://schemas.microsoft.com/office/drawing/2010/main" val="0"/>
-              </a:ext>
-            </a:extLst>
-          </a:blip>
-          <a:stretch>
-            <a:fillRect/>
-          </a:stretch>
-        </p:blipFill>
-        <p:spPr>
-          <a:xfrm>
-            <a:off x="434923" y="2519628"/>
-            <a:ext cx="4173033" cy="5400395"/>
-          </a:xfrm>
-          <a:prstGeom prst="rect">
-            <a:avLst/>
-          </a:prstGeom>
-        </p:spPr>
-      </p:pic>
     </p:spTree>
     <p:extLst>
       <p:ext uri="{BB962C8B-B14F-4D97-AF65-F5344CB8AC3E}">
@@ -34573,7 +35244,7 @@
           <a:graphicData uri="http://schemas.openxmlformats.org/presentationml/2006/ole">
             <mc:AlternateContent xmlns:mc="http://schemas.openxmlformats.org/markup-compatibility/2006">
               <mc:Choice xmlns:v="urn:schemas-microsoft-com:vml" Requires="v">
-                <p:oleObj spid="_x0000_s5159" name="Equation" r:id="rId4" imgW="3479800" imgH="800100" progId="Equation.3">
+                <p:oleObj spid="_x0000_s5164" name="Equation" r:id="rId4" imgW="3479800" imgH="800100" progId="Equation.3">
                   <p:embed/>
                 </p:oleObj>
               </mc:Choice>
@@ -34630,7 +35301,7 @@
           <a:graphicData uri="http://schemas.openxmlformats.org/presentationml/2006/ole">
             <mc:AlternateContent xmlns:mc="http://schemas.openxmlformats.org/markup-compatibility/2006">
               <mc:Choice xmlns:v="urn:schemas-microsoft-com:vml" Requires="v">
-                <p:oleObj spid="_x0000_s5160" name="Equation" r:id="rId6" imgW="3086100" imgH="254000" progId="Equation.3">
+                <p:oleObj spid="_x0000_s5165" name="Equation" r:id="rId6" imgW="3086100" imgH="254000" progId="Equation.3">
                   <p:embed/>
                 </p:oleObj>
               </mc:Choice>

</xml_diff>

<commit_message>
Put a little trick for the TRIF tnf transcription.
1. double the threshold for TNF transcription for mko condition.
</commit_message>
<xml_diff>
--- a/TNF_Slides.pptx
+++ b/TNF_Slides.pptx
@@ -200,7 +200,7 @@
           <a:p>
             <a:fld id="{C16E61BC-9AFB-7443-B919-0FEFC506D3C0}" type="datetimeFigureOut">
               <a:rPr lang="en-US" smtClean="0"/>
-              <a:t>1/13/14</a:t>
+              <a:t>1/14/14</a:t>
             </a:fld>
             <a:endParaRPr lang="en-US"/>
           </a:p>
@@ -1322,7 +1322,7 @@
             <a:fld id="{0DA042B0-5508-8A40-9A09-F8377543C8AB}" type="datetimeFigureOut">
               <a:rPr lang="en-US" smtClean="0"/>
               <a:pPr/>
-              <a:t>1/13/14</a:t>
+              <a:t>1/14/14</a:t>
             </a:fld>
             <a:endParaRPr lang="en-US" dirty="0"/>
           </a:p>
@@ -1494,7 +1494,7 @@
             <a:fld id="{0DA042B0-5508-8A40-9A09-F8377543C8AB}" type="datetimeFigureOut">
               <a:rPr lang="en-US" smtClean="0"/>
               <a:pPr/>
-              <a:t>1/13/14</a:t>
+              <a:t>1/14/14</a:t>
             </a:fld>
             <a:endParaRPr lang="en-US" dirty="0"/>
           </a:p>
@@ -1676,7 +1676,7 @@
             <a:fld id="{0DA042B0-5508-8A40-9A09-F8377543C8AB}" type="datetimeFigureOut">
               <a:rPr lang="en-US" smtClean="0"/>
               <a:pPr/>
-              <a:t>1/13/14</a:t>
+              <a:t>1/14/14</a:t>
             </a:fld>
             <a:endParaRPr lang="en-US" dirty="0"/>
           </a:p>
@@ -1848,7 +1848,7 @@
             <a:fld id="{0DA042B0-5508-8A40-9A09-F8377543C8AB}" type="datetimeFigureOut">
               <a:rPr lang="en-US" smtClean="0"/>
               <a:pPr/>
-              <a:t>1/13/14</a:t>
+              <a:t>1/14/14</a:t>
             </a:fld>
             <a:endParaRPr lang="en-US" dirty="0"/>
           </a:p>
@@ -2096,7 +2096,7 @@
             <a:fld id="{0DA042B0-5508-8A40-9A09-F8377543C8AB}" type="datetimeFigureOut">
               <a:rPr lang="en-US" smtClean="0"/>
               <a:pPr/>
-              <a:t>1/13/14</a:t>
+              <a:t>1/14/14</a:t>
             </a:fld>
             <a:endParaRPr lang="en-US" dirty="0"/>
           </a:p>
@@ -2386,7 +2386,7 @@
             <a:fld id="{0DA042B0-5508-8A40-9A09-F8377543C8AB}" type="datetimeFigureOut">
               <a:rPr lang="en-US" smtClean="0"/>
               <a:pPr/>
-              <a:t>1/13/14</a:t>
+              <a:t>1/14/14</a:t>
             </a:fld>
             <a:endParaRPr lang="en-US" dirty="0"/>
           </a:p>
@@ -2810,7 +2810,7 @@
             <a:fld id="{0DA042B0-5508-8A40-9A09-F8377543C8AB}" type="datetimeFigureOut">
               <a:rPr lang="en-US" smtClean="0"/>
               <a:pPr/>
-              <a:t>1/13/14</a:t>
+              <a:t>1/14/14</a:t>
             </a:fld>
             <a:endParaRPr lang="en-US" dirty="0"/>
           </a:p>
@@ -2930,7 +2930,7 @@
             <a:fld id="{0DA042B0-5508-8A40-9A09-F8377543C8AB}" type="datetimeFigureOut">
               <a:rPr lang="en-US" smtClean="0"/>
               <a:pPr/>
-              <a:t>1/13/14</a:t>
+              <a:t>1/14/14</a:t>
             </a:fld>
             <a:endParaRPr lang="en-US" dirty="0"/>
           </a:p>
@@ -3027,7 +3027,7 @@
             <a:fld id="{0DA042B0-5508-8A40-9A09-F8377543C8AB}" type="datetimeFigureOut">
               <a:rPr lang="en-US" smtClean="0"/>
               <a:pPr/>
-              <a:t>1/13/14</a:t>
+              <a:t>1/14/14</a:t>
             </a:fld>
             <a:endParaRPr lang="en-US" dirty="0"/>
           </a:p>
@@ -3306,7 +3306,7 @@
             <a:fld id="{0DA042B0-5508-8A40-9A09-F8377543C8AB}" type="datetimeFigureOut">
               <a:rPr lang="en-US" smtClean="0"/>
               <a:pPr/>
-              <a:t>1/13/14</a:t>
+              <a:t>1/14/14</a:t>
             </a:fld>
             <a:endParaRPr lang="en-US" dirty="0"/>
           </a:p>
@@ -3565,7 +3565,7 @@
             <a:fld id="{0DA042B0-5508-8A40-9A09-F8377543C8AB}" type="datetimeFigureOut">
               <a:rPr lang="en-US" smtClean="0"/>
               <a:pPr/>
-              <a:t>1/13/14</a:t>
+              <a:t>1/14/14</a:t>
             </a:fld>
             <a:endParaRPr lang="en-US" dirty="0"/>
           </a:p>
@@ -3780,7 +3780,7 @@
             <a:fld id="{0DA042B0-5508-8A40-9A09-F8377543C8AB}" type="datetimeFigureOut">
               <a:rPr lang="en-US" smtClean="0"/>
               <a:pPr/>
-              <a:t>1/13/14</a:t>
+              <a:t>1/14/14</a:t>
             </a:fld>
             <a:endParaRPr lang="en-US" dirty="0"/>
           </a:p>
@@ -12328,7 +12328,7 @@
           <a:graphicData uri="http://schemas.openxmlformats.org/presentationml/2006/ole">
             <mc:AlternateContent xmlns:mc="http://schemas.openxmlformats.org/markup-compatibility/2006">
               <mc:Choice xmlns:v="urn:schemas-microsoft-com:vml" Requires="v">
-                <p:oleObj spid="_x0000_s1136" name="Equation" r:id="rId4" imgW="3098800" imgH="444500" progId="Equation.3">
+                <p:oleObj spid="_x0000_s1140" name="Equation" r:id="rId4" imgW="3098800" imgH="444500" progId="Equation.3">
                   <p:embed/>
                 </p:oleObj>
               </mc:Choice>
@@ -12385,7 +12385,7 @@
           <a:graphicData uri="http://schemas.openxmlformats.org/presentationml/2006/ole">
             <mc:AlternateContent xmlns:mc="http://schemas.openxmlformats.org/markup-compatibility/2006">
               <mc:Choice xmlns:v="urn:schemas-microsoft-com:vml" Requires="v">
-                <p:oleObj spid="_x0000_s1137" name="Equation" r:id="rId6" imgW="4406900" imgH="584200" progId="Equation.3">
+                <p:oleObj spid="_x0000_s1141" name="Equation" r:id="rId6" imgW="4406900" imgH="584200" progId="Equation.3">
                   <p:embed/>
                 </p:oleObj>
               </mc:Choice>
@@ -12442,7 +12442,7 @@
           <a:graphicData uri="http://schemas.openxmlformats.org/presentationml/2006/ole">
             <mc:AlternateContent xmlns:mc="http://schemas.openxmlformats.org/markup-compatibility/2006">
               <mc:Choice xmlns:v="urn:schemas-microsoft-com:vml" Requires="v">
-                <p:oleObj spid="_x0000_s1138" name="Equation" r:id="rId8" imgW="2197100" imgH="457200" progId="Equation.3">
+                <p:oleObj spid="_x0000_s1142" name="Equation" r:id="rId8" imgW="2197100" imgH="457200" progId="Equation.3">
                   <p:embed/>
                 </p:oleObj>
               </mc:Choice>
@@ -13406,11 +13406,7 @@
                     <a:p>
                       <a:r>
                         <a:rPr lang="en-US" sz="1600" dirty="0" smtClean="0"/>
-                        <a:t>60 </a:t>
-                      </a:r>
-                      <a:r>
-                        <a:rPr lang="en-US" sz="1600" dirty="0" smtClean="0"/>
-                        <a:t>min</a:t>
+                        <a:t>60 min</a:t>
                       </a:r>
                       <a:endParaRPr lang="en-US" sz="1600" dirty="0"/>
                     </a:p>
@@ -13424,11 +13420,7 @@
                     <a:p>
                       <a:r>
                         <a:rPr lang="en-US" sz="1600" dirty="0" smtClean="0"/>
-                        <a:t>10 </a:t>
-                      </a:r>
-                      <a:r>
-                        <a:rPr lang="en-US" sz="1600" dirty="0" smtClean="0"/>
-                        <a:t>min</a:t>
+                        <a:t>10 min</a:t>
                       </a:r>
                       <a:endParaRPr lang="en-US" sz="1600" dirty="0"/>
                     </a:p>
@@ -13554,11 +13546,7 @@
                       </a:r>
                       <a:r>
                         <a:rPr lang="en-US" sz="1600" baseline="0" dirty="0" smtClean="0"/>
-                        <a:t> </a:t>
-                      </a:r>
-                      <a:r>
-                        <a:rPr lang="en-US" sz="1600" baseline="0" dirty="0" smtClean="0"/>
-                        <a:t>min</a:t>
+                        <a:t> min</a:t>
                       </a:r>
                       <a:endParaRPr lang="en-US" sz="1600" dirty="0"/>
                     </a:p>
@@ -13572,11 +13560,7 @@
                     <a:p>
                       <a:r>
                         <a:rPr lang="en-US" sz="1600" dirty="0" smtClean="0"/>
-                        <a:t>10 </a:t>
-                      </a:r>
-                      <a:r>
-                        <a:rPr lang="en-US" sz="1600" dirty="0" smtClean="0"/>
-                        <a:t>min</a:t>
+                        <a:t>10 min</a:t>
                       </a:r>
                       <a:endParaRPr lang="en-US" sz="1600" dirty="0"/>
                     </a:p>
@@ -13961,7 +13945,7 @@
           <a:graphicData uri="http://schemas.openxmlformats.org/presentationml/2006/ole">
             <mc:AlternateContent xmlns:mc="http://schemas.openxmlformats.org/markup-compatibility/2006">
               <mc:Choice xmlns:v="urn:schemas-microsoft-com:vml" Requires="v">
-                <p:oleObj spid="_x0000_s9220" name="Equation" r:id="rId4" imgW="1790700" imgH="469900" progId="Equation.3">
+                <p:oleObj spid="_x0000_s9222" name="Equation" r:id="rId4" imgW="1790700" imgH="469900" progId="Equation.3">
                   <p:embed/>
                 </p:oleObj>
               </mc:Choice>
@@ -16020,11 +16004,7 @@
           <a:p>
             <a:r>
               <a:rPr lang="en-US" sz="2400" b="1" dirty="0" smtClean="0"/>
-              <a:t>Step2: </a:t>
-            </a:r>
-            <a:r>
-              <a:rPr lang="en-US" sz="2400" b="1" dirty="0" smtClean="0"/>
-              <a:t>Translation + Secretion</a:t>
+              <a:t>Step2: Translation + Secretion</a:t>
             </a:r>
             <a:endParaRPr lang="en-US" sz="2400" b="1" dirty="0"/>
           </a:p>
@@ -16052,7 +16032,7 @@
           <a:graphicData uri="http://schemas.openxmlformats.org/presentationml/2006/ole">
             <mc:AlternateContent xmlns:mc="http://schemas.openxmlformats.org/markup-compatibility/2006">
               <mc:Choice xmlns:v="urn:schemas-microsoft-com:vml" Requires="v">
-                <p:oleObj spid="_x0000_s5174" name="Equation" r:id="rId4" imgW="3479800" imgH="800100" progId="Equation.3">
+                <p:oleObj spid="_x0000_s5177" name="Equation" r:id="rId4" imgW="3479800" imgH="800100" progId="Equation.3">
                   <p:embed/>
                 </p:oleObj>
               </mc:Choice>
@@ -16109,7 +16089,7 @@
           <a:graphicData uri="http://schemas.openxmlformats.org/presentationml/2006/ole">
             <mc:AlternateContent xmlns:mc="http://schemas.openxmlformats.org/markup-compatibility/2006">
               <mc:Choice xmlns:v="urn:schemas-microsoft-com:vml" Requires="v">
-                <p:oleObj spid="_x0000_s5175" name="Equation" r:id="rId6" imgW="3086100" imgH="254000" progId="Equation.3">
+                <p:oleObj spid="_x0000_s5178" name="Equation" r:id="rId6" imgW="3086100" imgH="254000" progId="Equation.3">
                   <p:embed/>
                 </p:oleObj>
               </mc:Choice>

</xml_diff>

<commit_message>
Wt mRNA basal too high in Fig3.
To be solved.
</commit_message>
<xml_diff>
--- a/TNF_Slides.pptx
+++ b/TNF_Slides.pptx
@@ -21945,7 +21945,7 @@
           <a:graphicData uri="http://schemas.openxmlformats.org/presentationml/2006/ole">
             <mc:AlternateContent xmlns:mc="http://schemas.openxmlformats.org/markup-compatibility/2006">
               <mc:Choice xmlns:v="urn:schemas-microsoft-com:vml" Requires="v">
-                <p:oleObj spid="_x0000_s12322" name="Equation" r:id="rId4" imgW="3022600" imgH="444500" progId="Equation.3">
+                <p:oleObj spid="_x0000_s12328" name="Equation" r:id="rId4" imgW="3022600" imgH="444500" progId="Equation.3">
                   <p:embed/>
                 </p:oleObj>
               </mc:Choice>
@@ -22002,7 +22002,7 @@
           <a:graphicData uri="http://schemas.openxmlformats.org/presentationml/2006/ole">
             <mc:AlternateContent xmlns:mc="http://schemas.openxmlformats.org/markup-compatibility/2006">
               <mc:Choice xmlns:v="urn:schemas-microsoft-com:vml" Requires="v">
-                <p:oleObj spid="_x0000_s12323" name="Equation" r:id="rId6" imgW="3937000" imgH="254000" progId="Equation.3">
+                <p:oleObj spid="_x0000_s12329" name="Equation" r:id="rId6" imgW="3937000" imgH="254000" progId="Equation.3">
                   <p:embed/>
                 </p:oleObj>
               </mc:Choice>
@@ -22059,7 +22059,7 @@
           <a:graphicData uri="http://schemas.openxmlformats.org/presentationml/2006/ole">
             <mc:AlternateContent xmlns:mc="http://schemas.openxmlformats.org/markup-compatibility/2006">
               <mc:Choice xmlns:v="urn:schemas-microsoft-com:vml" Requires="v">
-                <p:oleObj spid="_x0000_s12324" name="Equation" r:id="rId8" imgW="2197100" imgH="457200" progId="Equation.3">
+                <p:oleObj spid="_x0000_s12330" name="Equation" r:id="rId8" imgW="2197100" imgH="457200" progId="Equation.3">
                   <p:embed/>
                 </p:oleObj>
               </mc:Choice>
@@ -23128,7 +23128,7 @@
           <a:graphicData uri="http://schemas.openxmlformats.org/presentationml/2006/ole">
             <mc:AlternateContent xmlns:mc="http://schemas.openxmlformats.org/markup-compatibility/2006">
               <mc:Choice xmlns:v="urn:schemas-microsoft-com:vml" Requires="v">
-                <p:oleObj spid="_x0000_s13324" name="Equation" r:id="rId4" imgW="1790700" imgH="469900" progId="Equation.3">
+                <p:oleObj spid="_x0000_s13326" name="Equation" r:id="rId4" imgW="1790700" imgH="469900" progId="Equation.3">
                   <p:embed/>
                 </p:oleObj>
               </mc:Choice>
@@ -23508,7 +23508,7 @@
         </p:nvGrpSpPr>
         <p:grpSpPr>
           <a:xfrm>
-            <a:off x="1565234" y="4338281"/>
+            <a:off x="1974551" y="2840033"/>
             <a:ext cx="1901349" cy="95433"/>
             <a:chOff x="4591050" y="5183654"/>
             <a:chExt cx="1901349" cy="95433"/>
@@ -23948,7 +23948,7 @@
         </p:nvSpPr>
         <p:spPr>
           <a:xfrm>
-            <a:off x="1906864" y="3458584"/>
+            <a:off x="2316181" y="1960336"/>
             <a:ext cx="444500" cy="95433"/>
           </a:xfrm>
           <a:prstGeom prst="rect">
@@ -23995,7 +23995,7 @@
         </p:nvSpPr>
         <p:spPr>
           <a:xfrm>
-            <a:off x="2338664" y="3458584"/>
+            <a:off x="2747981" y="1960336"/>
             <a:ext cx="274320" cy="95433"/>
           </a:xfrm>
           <a:prstGeom prst="rect">
@@ -24042,7 +24042,7 @@
         </p:nvSpPr>
         <p:spPr>
           <a:xfrm>
-            <a:off x="2615683" y="3458584"/>
+            <a:off x="3025000" y="1960336"/>
             <a:ext cx="444500" cy="95433"/>
           </a:xfrm>
           <a:prstGeom prst="rect">
@@ -24091,7 +24091,7 @@
         </p:nvSpPr>
         <p:spPr bwMode="auto">
           <a:xfrm flipV="1">
-            <a:off x="1748114" y="3510880"/>
+            <a:off x="2157431" y="2012632"/>
             <a:ext cx="182880" cy="0"/>
           </a:xfrm>
           <a:prstGeom prst="line">
@@ -24162,7 +24162,7 @@
         </p:nvSpPr>
         <p:spPr bwMode="auto">
           <a:xfrm flipV="1">
-            <a:off x="3060183" y="3510880"/>
+            <a:off x="3469500" y="2012632"/>
             <a:ext cx="182880" cy="0"/>
           </a:xfrm>
           <a:prstGeom prst="line">
@@ -24233,7 +24233,7 @@
         </p:nvSpPr>
         <p:spPr bwMode="auto">
           <a:xfrm flipV="1">
-            <a:off x="2471329" y="3662257"/>
+            <a:off x="2880646" y="2164009"/>
             <a:ext cx="0" cy="519443"/>
           </a:xfrm>
           <a:prstGeom prst="line">
@@ -24304,7 +24304,7 @@
         </p:nvGrpSpPr>
         <p:grpSpPr>
           <a:xfrm>
-            <a:off x="3852709" y="3348320"/>
+            <a:off x="4262026" y="1850072"/>
             <a:ext cx="274320" cy="274320"/>
             <a:chOff x="5321855" y="1947584"/>
             <a:chExt cx="596345" cy="1028700"/>
@@ -24437,7 +24437,7 @@
         </p:nvSpPr>
         <p:spPr bwMode="auto">
           <a:xfrm rot="5400000" flipV="1">
-            <a:off x="3581811" y="3246149"/>
+            <a:off x="3991128" y="1747901"/>
             <a:ext cx="0" cy="519443"/>
           </a:xfrm>
           <a:prstGeom prst="line">
@@ -24506,7 +24506,7 @@
         </p:nvSpPr>
         <p:spPr>
           <a:xfrm>
-            <a:off x="2506304" y="3812316"/>
+            <a:off x="2915621" y="2314068"/>
             <a:ext cx="1187895" cy="276999"/>
           </a:xfrm>
           <a:prstGeom prst="rect">
@@ -24535,7 +24535,7 @@
         </p:nvGrpSpPr>
         <p:grpSpPr>
           <a:xfrm>
-            <a:off x="352585" y="3269211"/>
+            <a:off x="761902" y="1770963"/>
             <a:ext cx="544159" cy="563066"/>
             <a:chOff x="2925328" y="357827"/>
             <a:chExt cx="583027" cy="645514"/>
@@ -24671,7 +24671,7 @@
         </p:nvSpPr>
         <p:spPr>
           <a:xfrm flipH="1">
-            <a:off x="651484" y="3981566"/>
+            <a:off x="1060801" y="2483318"/>
             <a:ext cx="403444" cy="175846"/>
           </a:xfrm>
           <a:prstGeom prst="snip2DiagRect">
@@ -24721,7 +24721,7 @@
         </p:nvSpPr>
         <p:spPr>
           <a:xfrm flipH="1">
-            <a:off x="582053" y="3984104"/>
+            <a:off x="991370" y="2485856"/>
             <a:ext cx="515570" cy="195575"/>
           </a:xfrm>
           <a:prstGeom prst="rect">
@@ -24757,7 +24757,7 @@
         </p:nvSpPr>
         <p:spPr>
           <a:xfrm>
-            <a:off x="189761" y="3987230"/>
+            <a:off x="599078" y="2488982"/>
             <a:ext cx="409651" cy="173313"/>
           </a:xfrm>
           <a:prstGeom prst="round2DiagRect">
@@ -24807,7 +24807,7 @@
         </p:nvSpPr>
         <p:spPr>
           <a:xfrm>
-            <a:off x="187278" y="3981566"/>
+            <a:off x="596595" y="2483318"/>
             <a:ext cx="414230" cy="195575"/>
           </a:xfrm>
           <a:prstGeom prst="rect">
@@ -24839,7 +24839,7 @@
         </p:nvSpPr>
         <p:spPr>
           <a:xfrm>
-            <a:off x="96081" y="3926755"/>
+            <a:off x="505398" y="2428507"/>
             <a:ext cx="1034606" cy="274320"/>
           </a:xfrm>
           <a:prstGeom prst="rect">
@@ -24886,7 +24886,7 @@
         </p:nvSpPr>
         <p:spPr bwMode="auto">
           <a:xfrm flipV="1">
-            <a:off x="1261149" y="4066628"/>
+            <a:off x="1670466" y="2568380"/>
             <a:ext cx="854710" cy="0"/>
           </a:xfrm>
           <a:prstGeom prst="line">
@@ -24957,7 +24957,7 @@
         </p:nvSpPr>
         <p:spPr bwMode="auto">
           <a:xfrm flipV="1">
-            <a:off x="1245909" y="3615746"/>
+            <a:off x="1655226" y="2117498"/>
             <a:ext cx="2170965" cy="371483"/>
           </a:xfrm>
           <a:prstGeom prst="line">
@@ -25064,20 +25064,20 @@
           <p:nvPr>
             <p:extLst>
               <p:ext uri="{D42A27DB-BD31-4B8C-83A1-F6EECF244321}">
-                <p14:modId xmlns:p14="http://schemas.microsoft.com/office/powerpoint/2010/main" val="2172091376"/>
+                <p14:modId xmlns:p14="http://schemas.microsoft.com/office/powerpoint/2010/main" val="4036062483"/>
               </p:ext>
             </p:extLst>
           </p:nvPr>
         </p:nvGraphicFramePr>
         <p:xfrm>
-          <a:off x="222162" y="5202237"/>
+          <a:off x="472599" y="4374250"/>
           <a:ext cx="3687762" cy="549275"/>
         </p:xfrm>
         <a:graphic>
           <a:graphicData uri="http://schemas.openxmlformats.org/presentationml/2006/ole">
             <mc:AlternateContent xmlns:mc="http://schemas.openxmlformats.org/markup-compatibility/2006">
               <mc:Choice xmlns:v="urn:schemas-microsoft-com:vml" Requires="v">
-                <p:oleObj spid="_x0000_s1043" name="Equation" r:id="rId4" imgW="2641600" imgH="393700" progId="Equation.3">
+                <p:oleObj spid="_x0000_s1047" name="Equation" r:id="rId4" imgW="2641600" imgH="393700" progId="Equation.3">
                   <p:embed/>
                 </p:oleObj>
               </mc:Choice>
@@ -25098,7 +25098,7 @@
                     </p:blipFill>
                     <p:spPr>
                       <a:xfrm>
-                        <a:off x="222162" y="5202237"/>
+                        <a:off x="472599" y="4374250"/>
                         <a:ext cx="3687762" cy="549275"/>
                       </a:xfrm>
                       <a:prstGeom prst="rect">
@@ -25121,20 +25121,20 @@
           <p:nvPr>
             <p:extLst>
               <p:ext uri="{D42A27DB-BD31-4B8C-83A1-F6EECF244321}">
-                <p14:modId xmlns:p14="http://schemas.microsoft.com/office/powerpoint/2010/main" val="1824393711"/>
+                <p14:modId xmlns:p14="http://schemas.microsoft.com/office/powerpoint/2010/main" val="2101602277"/>
               </p:ext>
             </p:extLst>
           </p:nvPr>
         </p:nvGraphicFramePr>
         <p:xfrm>
-          <a:off x="130965" y="5821603"/>
+          <a:off x="381402" y="4993616"/>
           <a:ext cx="4618835" cy="785572"/>
         </p:xfrm>
         <a:graphic>
           <a:graphicData uri="http://schemas.openxmlformats.org/presentationml/2006/ole">
             <mc:AlternateContent xmlns:mc="http://schemas.openxmlformats.org/markup-compatibility/2006">
               <mc:Choice xmlns:v="urn:schemas-microsoft-com:vml" Requires="v">
-                <p:oleObj spid="_x0000_s1044" name="Equation" r:id="rId6" imgW="3429000" imgH="584200" progId="Equation.3">
+                <p:oleObj spid="_x0000_s1048" name="Equation" r:id="rId6" imgW="3429000" imgH="584200" progId="Equation.3">
                   <p:embed/>
                 </p:oleObj>
               </mc:Choice>
@@ -25155,7 +25155,7 @@
                     </p:blipFill>
                     <p:spPr>
                       <a:xfrm>
-                        <a:off x="130965" y="5821603"/>
+                        <a:off x="381402" y="4993616"/>
                         <a:ext cx="4618835" cy="785572"/>
                       </a:xfrm>
                       <a:prstGeom prst="rect">
@@ -25169,35 +25169,6 @@
           </a:graphicData>
         </a:graphic>
       </p:graphicFrame>
-      <p:sp>
-        <p:nvSpPr>
-          <p:cNvPr id="37" name="Rectangle 36"/>
-          <p:cNvSpPr/>
-          <p:nvPr/>
-        </p:nvSpPr>
-        <p:spPr>
-          <a:xfrm>
-            <a:off x="6722" y="4389418"/>
-            <a:ext cx="503413" cy="369332"/>
-          </a:xfrm>
-          <a:prstGeom prst="rect">
-            <a:avLst/>
-          </a:prstGeom>
-        </p:spPr>
-        <p:txBody>
-          <a:bodyPr wrap="none">
-            <a:spAutoFit/>
-          </a:bodyPr>
-          <a:lstStyle/>
-          <a:p>
-            <a:r>
-              <a:rPr lang="en-US" dirty="0" smtClean="0"/>
-              <a:t>(2):</a:t>
-            </a:r>
-            <a:endParaRPr lang="en-US" dirty="0"/>
-          </a:p>
-        </p:txBody>
-      </p:sp>
       <p:pic>
         <p:nvPicPr>
           <p:cNvPr id="3" name="Picture 2" descr="fig3.pdf"/>
@@ -25220,7 +25191,7 @@
         </p:blipFill>
         <p:spPr>
           <a:xfrm>
-            <a:off x="5181600" y="1065459"/>
+            <a:off x="5816562" y="869950"/>
             <a:ext cx="2743200" cy="5486400"/>
           </a:xfrm>
           <a:prstGeom prst="rect">
@@ -25228,6 +25199,54 @@
           </a:prstGeom>
         </p:spPr>
       </p:pic>
+      <p:sp>
+        <p:nvSpPr>
+          <p:cNvPr id="39" name="Rectangle 38"/>
+          <p:cNvSpPr/>
+          <p:nvPr/>
+        </p:nvSpPr>
+        <p:spPr>
+          <a:xfrm>
+            <a:off x="333563" y="1055891"/>
+            <a:ext cx="4464900" cy="2684563"/>
+          </a:xfrm>
+          <a:prstGeom prst="rect">
+            <a:avLst/>
+          </a:prstGeom>
+          <a:noFill/>
+          <a:ln w="38100" cmpd="sng">
+            <a:solidFill>
+              <a:srgbClr val="000000"/>
+            </a:solidFill>
+          </a:ln>
+        </p:spPr>
+        <p:style>
+          <a:lnRef idx="1">
+            <a:schemeClr val="accent1"/>
+          </a:lnRef>
+          <a:fillRef idx="3">
+            <a:schemeClr val="accent1"/>
+          </a:fillRef>
+          <a:effectRef idx="2">
+            <a:schemeClr val="accent1"/>
+          </a:effectRef>
+          <a:fontRef idx="minor">
+            <a:schemeClr val="lt1"/>
+          </a:fontRef>
+        </p:style>
+        <p:txBody>
+          <a:bodyPr rtlCol="0" anchor="ctr"/>
+          <a:lstStyle/>
+          <a:p>
+            <a:pPr algn="ctr"/>
+            <a:endParaRPr lang="en-US">
+              <a:solidFill>
+                <a:srgbClr val="0000FF"/>
+              </a:solidFill>
+            </a:endParaRPr>
+          </a:p>
+        </p:txBody>
+      </p:sp>
     </p:spTree>
     <p:extLst>
       <p:ext uri="{BB962C8B-B14F-4D97-AF65-F5344CB8AC3E}">
@@ -26002,7 +26021,7 @@
           <a:graphicData uri="http://schemas.openxmlformats.org/presentationml/2006/ole">
             <mc:AlternateContent xmlns:mc="http://schemas.openxmlformats.org/markup-compatibility/2006">
               <mc:Choice xmlns:v="urn:schemas-microsoft-com:vml" Requires="v">
-                <p:oleObj spid="_x0000_s9233" name="Equation" r:id="rId4" imgW="1790700" imgH="469900" progId="Equation.3">
+                <p:oleObj spid="_x0000_s9235" name="Equation" r:id="rId4" imgW="1790700" imgH="469900" progId="Equation.3">
                   <p:embed/>
                 </p:oleObj>
               </mc:Choice>
@@ -28089,7 +28108,7 @@
           <a:graphicData uri="http://schemas.openxmlformats.org/presentationml/2006/ole">
             <mc:AlternateContent xmlns:mc="http://schemas.openxmlformats.org/markup-compatibility/2006">
               <mc:Choice xmlns:v="urn:schemas-microsoft-com:vml" Requires="v">
-                <p:oleObj spid="_x0000_s5198" name="Equation" r:id="rId4" imgW="3479800" imgH="800100" progId="Equation.3">
+                <p:oleObj spid="_x0000_s5202" name="Equation" r:id="rId4" imgW="3479800" imgH="800100" progId="Equation.3">
                   <p:embed/>
                 </p:oleObj>
               </mc:Choice>
@@ -28146,7 +28165,7 @@
           <a:graphicData uri="http://schemas.openxmlformats.org/presentationml/2006/ole">
             <mc:AlternateContent xmlns:mc="http://schemas.openxmlformats.org/markup-compatibility/2006">
               <mc:Choice xmlns:v="urn:schemas-microsoft-com:vml" Requires="v">
-                <p:oleObj spid="_x0000_s5199" name="Equation" r:id="rId6" imgW="3086100" imgH="254000" progId="Equation.3">
+                <p:oleObj spid="_x0000_s5203" name="Equation" r:id="rId6" imgW="3086100" imgH="254000" progId="Equation.3">
                   <p:embed/>
                 </p:oleObj>
               </mc:Choice>

</xml_diff>

<commit_message>
corrected axis error in Fig2s.
</commit_message>
<xml_diff>
--- a/TNF_Slides.pptx
+++ b/TNF_Slides.pptx
@@ -26054,7 +26054,7 @@
           <a:graphicData uri="http://schemas.openxmlformats.org/presentationml/2006/ole">
             <mc:AlternateContent xmlns:mc="http://schemas.openxmlformats.org/markup-compatibility/2006">
               <mc:Choice xmlns:v="urn:schemas-microsoft-com:vml" Requires="v">
-                <p:oleObj spid="_x0000_s12335" name="Equation" r:id="rId4" imgW="3022600" imgH="444500" progId="Equation.3">
+                <p:oleObj spid="_x0000_s12341" name="Equation" r:id="rId4" imgW="3022600" imgH="444500" progId="Equation.3">
                   <p:embed/>
                 </p:oleObj>
               </mc:Choice>
@@ -26111,7 +26111,7 @@
           <a:graphicData uri="http://schemas.openxmlformats.org/presentationml/2006/ole">
             <mc:AlternateContent xmlns:mc="http://schemas.openxmlformats.org/markup-compatibility/2006">
               <mc:Choice xmlns:v="urn:schemas-microsoft-com:vml" Requires="v">
-                <p:oleObj spid="_x0000_s12336" name="Equation" r:id="rId6" imgW="4381500" imgH="254000" progId="Equation.DSMT4">
+                <p:oleObj spid="_x0000_s12342" name="Equation" r:id="rId6" imgW="4381500" imgH="254000" progId="Equation.DSMT4">
                   <p:embed/>
                 </p:oleObj>
               </mc:Choice>
@@ -26168,7 +26168,7 @@
           <a:graphicData uri="http://schemas.openxmlformats.org/presentationml/2006/ole">
             <mc:AlternateContent xmlns:mc="http://schemas.openxmlformats.org/markup-compatibility/2006">
               <mc:Choice xmlns:v="urn:schemas-microsoft-com:vml" Requires="v">
-                <p:oleObj spid="_x0000_s12337" name="Equation" r:id="rId8" imgW="2197100" imgH="457200" progId="Equation.3">
+                <p:oleObj spid="_x0000_s12343" name="Equation" r:id="rId8" imgW="2197100" imgH="457200" progId="Equation.3">
                   <p:embed/>
                 </p:oleObj>
               </mc:Choice>
@@ -27233,7 +27233,7 @@
           <a:graphicData uri="http://schemas.openxmlformats.org/presentationml/2006/ole">
             <mc:AlternateContent xmlns:mc="http://schemas.openxmlformats.org/markup-compatibility/2006">
               <mc:Choice xmlns:v="urn:schemas-microsoft-com:vml" Requires="v">
-                <p:oleObj spid="_x0000_s13329" name="Equation" r:id="rId4" imgW="1790700" imgH="469900" progId="Equation.3">
+                <p:oleObj spid="_x0000_s13331" name="Equation" r:id="rId4" imgW="1790700" imgH="469900" progId="Equation.3">
                   <p:embed/>
                 </p:oleObj>
               </mc:Choice>
@@ -27434,7 +27434,7 @@
       </p:grpSpPr>
       <p:pic>
         <p:nvPicPr>
-          <p:cNvPr id="6" name="Picture 5" descr="fig2s_otherk_heatmap_large_region.pdf"/>
+          <p:cNvPr id="3" name="Picture 2" descr="fig2s1.pdf"/>
           <p:cNvPicPr>
             <a:picLocks noChangeAspect="1"/>
           </p:cNvPicPr>
@@ -27454,37 +27454,7 @@
         </p:blipFill>
         <p:spPr>
           <a:xfrm>
-            <a:off x="6473536" y="4202206"/>
-            <a:ext cx="2670464" cy="3455894"/>
-          </a:xfrm>
-          <a:prstGeom prst="rect">
-            <a:avLst/>
-          </a:prstGeom>
-        </p:spPr>
-      </p:pic>
-      <p:pic>
-        <p:nvPicPr>
-          <p:cNvPr id="3" name="Picture 2" descr="fig2s1.pdf"/>
-          <p:cNvPicPr>
-            <a:picLocks noChangeAspect="1"/>
-          </p:cNvPicPr>
-          <p:nvPr/>
-        </p:nvPicPr>
-        <p:blipFill>
-          <a:blip r:embed="rId3">
-            <a:extLst>
-              <a:ext uri="{28A0092B-C50C-407E-A947-70E740481C1C}">
-                <a14:useLocalDpi xmlns:a14="http://schemas.microsoft.com/office/drawing/2010/main" val="0"/>
-              </a:ext>
-            </a:extLst>
-          </a:blip>
-          <a:stretch>
-            <a:fillRect/>
-          </a:stretch>
-        </p:blipFill>
-        <p:spPr>
-          <a:xfrm>
-            <a:off x="0" y="0"/>
+            <a:off x="-244695" y="-279621"/>
             <a:ext cx="5299364" cy="6858000"/>
           </a:xfrm>
           <a:prstGeom prst="rect">
@@ -27523,14 +27493,14 @@
       </p:sp>
       <p:pic>
         <p:nvPicPr>
-          <p:cNvPr id="5" name="Picture 4" descr="fig2s2.pdf"/>
+          <p:cNvPr id="2" name="Picture 1" descr="fig2s2.pdf"/>
           <p:cNvPicPr>
             <a:picLocks noChangeAspect="1"/>
           </p:cNvPicPr>
           <p:nvPr/>
         </p:nvPicPr>
         <p:blipFill>
-          <a:blip r:embed="rId4">
+          <a:blip r:embed="rId3">
             <a:extLst>
               <a:ext uri="{28A0092B-C50C-407E-A947-70E740481C1C}">
                 <a14:useLocalDpi xmlns:a14="http://schemas.microsoft.com/office/drawing/2010/main" val="0"/>
@@ -27543,8 +27513,37 @@
         </p:blipFill>
         <p:spPr>
           <a:xfrm>
-            <a:off x="4225636" y="0"/>
+            <a:off x="3996113" y="-314574"/>
             <a:ext cx="5299364" cy="6858000"/>
+          </a:xfrm>
+          <a:prstGeom prst="rect">
+            <a:avLst/>
+          </a:prstGeom>
+        </p:spPr>
+      </p:pic>
+      <p:pic>
+        <p:nvPicPr>
+          <p:cNvPr id="7" name="Picture 6" descr="fig2s_otherk_heatmap_large_region.pdf"/>
+          <p:cNvPicPr>
+            <a:picLocks noChangeAspect="1"/>
+          </p:cNvPicPr>
+          <p:nvPr/>
+        </p:nvPicPr>
+        <p:blipFill rotWithShape="1">
+          <a:blip r:embed="rId4">
+            <a:extLst>
+              <a:ext uri="{28A0092B-C50C-407E-A947-70E740481C1C}">
+                <a14:useLocalDpi xmlns:a14="http://schemas.microsoft.com/office/drawing/2010/main" val="0"/>
+              </a:ext>
+            </a:extLst>
+          </a:blip>
+          <a:srcRect l="30211" t="36526" r="30650" b="39181"/>
+          <a:stretch/>
+        </p:blipFill>
+        <p:spPr>
+          <a:xfrm>
+            <a:off x="5544058" y="5079784"/>
+            <a:ext cx="2074077" cy="1666078"/>
           </a:xfrm>
           <a:prstGeom prst="rect">
             <a:avLst/>
@@ -29182,7 +29181,7 @@
           <a:graphicData uri="http://schemas.openxmlformats.org/presentationml/2006/ole">
             <mc:AlternateContent xmlns:mc="http://schemas.openxmlformats.org/markup-compatibility/2006">
               <mc:Choice xmlns:v="urn:schemas-microsoft-com:vml" Requires="v">
-                <p:oleObj spid="_x0000_s1054" name="Equation" r:id="rId4" imgW="2667000" imgH="393700" progId="Equation.DSMT4">
+                <p:oleObj spid="_x0000_s1058" name="Equation" r:id="rId4" imgW="2667000" imgH="393700" progId="Equation.DSMT4">
                   <p:embed/>
                 </p:oleObj>
               </mc:Choice>
@@ -29239,7 +29238,7 @@
           <a:graphicData uri="http://schemas.openxmlformats.org/presentationml/2006/ole">
             <mc:AlternateContent xmlns:mc="http://schemas.openxmlformats.org/markup-compatibility/2006">
               <mc:Choice xmlns:v="urn:schemas-microsoft-com:vml" Requires="v">
-                <p:oleObj spid="_x0000_s1055" name="Equation" r:id="rId6" imgW="4991100" imgH="584200" progId="Equation.DSMT4">
+                <p:oleObj spid="_x0000_s1059" name="Equation" r:id="rId6" imgW="4991100" imgH="584200" progId="Equation.DSMT4">
                   <p:embed/>
                 </p:oleObj>
               </mc:Choice>
@@ -30219,7 +30218,7 @@
           <a:graphicData uri="http://schemas.openxmlformats.org/presentationml/2006/ole">
             <mc:AlternateContent xmlns:mc="http://schemas.openxmlformats.org/markup-compatibility/2006">
               <mc:Choice xmlns:v="urn:schemas-microsoft-com:vml" Requires="v">
-                <p:oleObj spid="_x0000_s9238" name="Equation" r:id="rId4" imgW="1790700" imgH="469900" progId="Equation.3">
+                <p:oleObj spid="_x0000_s9240" name="Equation" r:id="rId4" imgW="1790700" imgH="469900" progId="Equation.3">
                   <p:embed/>
                 </p:oleObj>
               </mc:Choice>
@@ -32366,7 +32365,7 @@
           <a:graphicData uri="http://schemas.openxmlformats.org/presentationml/2006/ole">
             <mc:AlternateContent xmlns:mc="http://schemas.openxmlformats.org/markup-compatibility/2006">
               <mc:Choice xmlns:v="urn:schemas-microsoft-com:vml" Requires="v">
-                <p:oleObj spid="_x0000_s5207" name="Equation" r:id="rId4" imgW="3479800" imgH="800100" progId="Equation.3">
+                <p:oleObj spid="_x0000_s5211" name="Equation" r:id="rId4" imgW="3479800" imgH="800100" progId="Equation.3">
                   <p:embed/>
                 </p:oleObj>
               </mc:Choice>
@@ -32423,7 +32422,7 @@
           <a:graphicData uri="http://schemas.openxmlformats.org/presentationml/2006/ole">
             <mc:AlternateContent xmlns:mc="http://schemas.openxmlformats.org/markup-compatibility/2006">
               <mc:Choice xmlns:v="urn:schemas-microsoft-com:vml" Requires="v">
-                <p:oleObj spid="_x0000_s5208" name="Equation" r:id="rId6" imgW="3086100" imgH="254000" progId="Equation.3">
+                <p:oleObj spid="_x0000_s5212" name="Equation" r:id="rId6" imgW="3086100" imgH="254000" progId="Equation.3">
                   <p:embed/>
                 </p:oleObj>
               </mc:Choice>

</xml_diff>

<commit_message>
Cleaned up Fig4 folder.
</commit_message>
<xml_diff>
--- a/TNF_Slides.pptx
+++ b/TNF_Slides.pptx
@@ -5,7 +5,7 @@
     <p:sldMasterId id="2147483648" r:id="rId1"/>
   </p:sldMasterIdLst>
   <p:notesMasterIdLst>
-    <p:notesMasterId r:id="rId14"/>
+    <p:notesMasterId r:id="rId15"/>
   </p:notesMasterIdLst>
   <p:sldIdLst>
     <p:sldId id="257" r:id="rId2"/>
@@ -15,11 +15,12 @@
     <p:sldId id="271" r:id="rId6"/>
     <p:sldId id="267" r:id="rId7"/>
     <p:sldId id="273" r:id="rId8"/>
-    <p:sldId id="260" r:id="rId9"/>
-    <p:sldId id="268" r:id="rId10"/>
-    <p:sldId id="261" r:id="rId11"/>
-    <p:sldId id="263" r:id="rId12"/>
-    <p:sldId id="264" r:id="rId13"/>
+    <p:sldId id="274" r:id="rId9"/>
+    <p:sldId id="260" r:id="rId10"/>
+    <p:sldId id="268" r:id="rId11"/>
+    <p:sldId id="261" r:id="rId12"/>
+    <p:sldId id="263" r:id="rId13"/>
+    <p:sldId id="264" r:id="rId14"/>
   </p:sldIdLst>
   <p:sldSz cx="9144000" cy="6858000" type="screen4x3"/>
   <p:notesSz cx="6858000" cy="9144000"/>
@@ -1178,7 +1179,7 @@
           <a:p>
             <a:fld id="{837A9C9D-08EC-C64D-9F61-949AA1F45D5D}" type="slidenum">
               <a:rPr lang="en-US" smtClean="0"/>
-              <a:t>8</a:t>
+              <a:t>9</a:t>
             </a:fld>
             <a:endParaRPr lang="en-US"/>
           </a:p>
@@ -1274,7 +1275,7 @@
           <a:p>
             <a:fld id="{837A9C9D-08EC-C64D-9F61-949AA1F45D5D}" type="slidenum">
               <a:rPr lang="en-US" smtClean="0"/>
-              <a:t>9</a:t>
+              <a:t>10</a:t>
             </a:fld>
             <a:endParaRPr lang="en-US"/>
           </a:p>
@@ -1370,7 +1371,7 @@
           <a:p>
             <a:fld id="{837A9C9D-08EC-C64D-9F61-949AA1F45D5D}" type="slidenum">
               <a:rPr lang="en-US" smtClean="0"/>
-              <a:t>10</a:t>
+              <a:t>11</a:t>
             </a:fld>
             <a:endParaRPr lang="en-US"/>
           </a:p>
@@ -1462,7 +1463,7 @@
           <a:p>
             <a:fld id="{837A9C9D-08EC-C64D-9F61-949AA1F45D5D}" type="slidenum">
               <a:rPr lang="en-US" smtClean="0"/>
-              <a:t>11</a:t>
+              <a:t>12</a:t>
             </a:fld>
             <a:endParaRPr lang="en-US"/>
           </a:p>
@@ -11358,6 +11359,285 @@
           </a:p>
         </p:txBody>
       </p:sp>
+      <p:pic>
+        <p:nvPicPr>
+          <p:cNvPr id="6" name="Picture 5" descr="fig4.pdf"/>
+          <p:cNvPicPr>
+            <a:picLocks noChangeAspect="1"/>
+          </p:cNvPicPr>
+          <p:nvPr/>
+        </p:nvPicPr>
+        <p:blipFill rotWithShape="1">
+          <a:blip r:embed="rId3">
+            <a:extLst>
+              <a:ext uri="{28A0092B-C50C-407E-A947-70E740481C1C}">
+                <a14:useLocalDpi xmlns:a14="http://schemas.microsoft.com/office/drawing/2010/main" val="0"/>
+              </a:ext>
+            </a:extLst>
+          </a:blip>
+          <a:srcRect l="64219" t="33515" r="1196" b="30553"/>
+          <a:stretch/>
+        </p:blipFill>
+        <p:spPr>
+          <a:xfrm>
+            <a:off x="284638" y="869950"/>
+            <a:ext cx="4080521" cy="5486400"/>
+          </a:xfrm>
+          <a:prstGeom prst="rect">
+            <a:avLst/>
+          </a:prstGeom>
+        </p:spPr>
+      </p:pic>
+      <p:sp>
+        <p:nvSpPr>
+          <p:cNvPr id="50" name="Rectangle 49"/>
+          <p:cNvSpPr/>
+          <p:nvPr/>
+        </p:nvSpPr>
+        <p:spPr>
+          <a:xfrm>
+            <a:off x="4088491" y="869950"/>
+            <a:ext cx="5055509" cy="2585323"/>
+          </a:xfrm>
+          <a:prstGeom prst="rect">
+            <a:avLst/>
+          </a:prstGeom>
+        </p:spPr>
+        <p:txBody>
+          <a:bodyPr wrap="square">
+            <a:spAutoFit/>
+          </a:bodyPr>
+          <a:lstStyle/>
+          <a:p>
+            <a:r>
+              <a:rPr lang="en-US" dirty="0"/>
+              <a:t>Score function</a:t>
+            </a:r>
+            <a:r>
+              <a:rPr lang="en-US" dirty="0" smtClean="0"/>
+              <a:t>:</a:t>
+            </a:r>
+          </a:p>
+          <a:p>
+            <a:pPr marL="342900" indent="-342900">
+              <a:buAutoNum type="arabicPeriod"/>
+            </a:pPr>
+            <a:r>
+              <a:rPr lang="en-US" dirty="0" smtClean="0"/>
+              <a:t>Peak: </a:t>
+            </a:r>
+            <a:r>
+              <a:rPr lang="en-US" dirty="0" err="1" smtClean="0"/>
+              <a:t>wt</a:t>
+            </a:r>
+            <a:r>
+              <a:rPr lang="en-US" dirty="0" smtClean="0"/>
+              <a:t> (60 min +/- 20 min), </a:t>
+            </a:r>
+            <a:r>
+              <a:rPr lang="en-US" dirty="0" err="1" smtClean="0"/>
+              <a:t>mko</a:t>
+            </a:r>
+            <a:r>
+              <a:rPr lang="en-US" dirty="0" smtClean="0"/>
+              <a:t> (60min +/- 20min), </a:t>
+            </a:r>
+            <a:r>
+              <a:rPr lang="en-US" dirty="0" err="1" smtClean="0"/>
+              <a:t>tko</a:t>
+            </a:r>
+            <a:r>
+              <a:rPr lang="en-US" dirty="0" smtClean="0"/>
+              <a:t> (60 +/- 20 min)</a:t>
+            </a:r>
+          </a:p>
+          <a:p>
+            <a:pPr marL="342900" indent="-342900">
+              <a:buAutoNum type="arabicPeriod"/>
+            </a:pPr>
+            <a:r>
+              <a:rPr lang="en-US" dirty="0" err="1" smtClean="0"/>
+              <a:t>Peak_wt</a:t>
+            </a:r>
+            <a:r>
+              <a:rPr lang="en-US" dirty="0" smtClean="0"/>
+              <a:t> / </a:t>
+            </a:r>
+            <a:r>
+              <a:rPr lang="en-US" dirty="0" err="1" smtClean="0"/>
+              <a:t>peak_tko</a:t>
+            </a:r>
+            <a:r>
+              <a:rPr lang="en-US" dirty="0" smtClean="0"/>
+              <a:t> = 3 +/- 0.5 fold </a:t>
+            </a:r>
+          </a:p>
+          <a:p>
+            <a:pPr marL="342900" indent="-342900">
+              <a:buAutoNum type="arabicPeriod"/>
+            </a:pPr>
+            <a:r>
+              <a:rPr lang="en-US" dirty="0" err="1" smtClean="0"/>
+              <a:t>Peak_tko</a:t>
+            </a:r>
+            <a:r>
+              <a:rPr lang="en-US" dirty="0" smtClean="0"/>
+              <a:t>/</a:t>
+            </a:r>
+            <a:r>
+              <a:rPr lang="en-US" dirty="0" err="1" smtClean="0"/>
+              <a:t>peak_mko</a:t>
+            </a:r>
+            <a:r>
+              <a:rPr lang="en-US" dirty="0" smtClean="0"/>
+              <a:t> = 1.2 -/+ 0.2</a:t>
+            </a:r>
+          </a:p>
+          <a:p>
+            <a:pPr marL="342900" indent="-342900">
+              <a:buAutoNum type="arabicPeriod"/>
+            </a:pPr>
+            <a:r>
+              <a:rPr lang="en-US" dirty="0" err="1" smtClean="0"/>
+              <a:t>Wt</a:t>
+            </a:r>
+            <a:r>
+              <a:rPr lang="en-US" dirty="0" smtClean="0"/>
+              <a:t>(60)/</a:t>
+            </a:r>
+            <a:r>
+              <a:rPr lang="en-US" dirty="0" err="1" smtClean="0"/>
+              <a:t>mean_kos</a:t>
+            </a:r>
+            <a:r>
+              <a:rPr lang="en-US" dirty="0" smtClean="0"/>
+              <a:t>(60) = 0.75 +/- 0.15</a:t>
+            </a:r>
+          </a:p>
+          <a:p>
+            <a:pPr marL="342900" indent="-342900">
+              <a:buFontTx/>
+              <a:buAutoNum type="arabicPeriod"/>
+            </a:pPr>
+            <a:r>
+              <a:rPr lang="en-US" dirty="0" err="1" smtClean="0"/>
+              <a:t>Wt</a:t>
+            </a:r>
+            <a:r>
+              <a:rPr lang="en-US" dirty="0" smtClean="0"/>
+              <a:t>(120</a:t>
+            </a:r>
+            <a:r>
+              <a:rPr lang="en-US" dirty="0"/>
+              <a:t>)/</a:t>
+            </a:r>
+            <a:r>
+              <a:rPr lang="en-US" dirty="0" err="1"/>
+              <a:t>mean_kos</a:t>
+            </a:r>
+            <a:r>
+              <a:rPr lang="en-US" dirty="0" smtClean="0"/>
+              <a:t>(120</a:t>
+            </a:r>
+            <a:r>
+              <a:rPr lang="en-US" dirty="0"/>
+              <a:t>) = 0.75 +/- 0.15</a:t>
+            </a:r>
+          </a:p>
+          <a:p>
+            <a:pPr marL="342900" indent="-342900">
+              <a:buAutoNum type="arabicPeriod"/>
+            </a:pPr>
+            <a:r>
+              <a:rPr lang="en-US" dirty="0" smtClean="0"/>
+              <a:t>60min ~ 120 min: </a:t>
+            </a:r>
+            <a:r>
+              <a:rPr lang="en-US" dirty="0" err="1" smtClean="0"/>
+              <a:t>wt</a:t>
+            </a:r>
+            <a:r>
+              <a:rPr lang="en-US" dirty="0" smtClean="0"/>
+              <a:t> decrease 6+/-1</a:t>
+            </a:r>
+          </a:p>
+          <a:p>
+            <a:pPr marL="342900" indent="-342900">
+              <a:buAutoNum type="arabicPeriod"/>
+            </a:pPr>
+            <a:r>
+              <a:rPr lang="en-US" dirty="0" err="1" smtClean="0"/>
+              <a:t>Peak_tko</a:t>
+            </a:r>
+            <a:r>
+              <a:rPr lang="en-US" dirty="0" smtClean="0"/>
+              <a:t> = 25 +/- 2</a:t>
+            </a:r>
+            <a:endParaRPr lang="en-US" dirty="0"/>
+          </a:p>
+        </p:txBody>
+      </p:sp>
+    </p:spTree>
+    <p:extLst>
+      <p:ext uri="{BB962C8B-B14F-4D97-AF65-F5344CB8AC3E}">
+        <p14:creationId xmlns:p14="http://schemas.microsoft.com/office/powerpoint/2010/main" val="3232202549"/>
+      </p:ext>
+    </p:extLst>
+  </p:cSld>
+  <p:clrMapOvr>
+    <a:masterClrMapping/>
+  </p:clrMapOvr>
+  <p:timing>
+    <p:tnLst>
+      <p:par>
+        <p:cTn xmlns:p14="http://schemas.microsoft.com/office/powerpoint/2010/main" id="1" dur="indefinite" restart="never" nodeType="tmRoot"/>
+      </p:par>
+    </p:tnLst>
+  </p:timing>
+</p:sld>
+</file>
+
+<file path=ppt/slides/slide11.xml><?xml version="1.0" encoding="utf-8"?>
+<p:sld xmlns:a="http://schemas.openxmlformats.org/drawingml/2006/main" xmlns:r="http://schemas.openxmlformats.org/officeDocument/2006/relationships" xmlns:p="http://schemas.openxmlformats.org/presentationml/2006/main">
+  <p:cSld>
+    <p:spTree>
+      <p:nvGrpSpPr>
+        <p:cNvPr id="1" name=""/>
+        <p:cNvGrpSpPr/>
+        <p:nvPr/>
+      </p:nvGrpSpPr>
+      <p:grpSpPr>
+        <a:xfrm>
+          <a:off x="0" y="0"/>
+          <a:ext cx="0" cy="0"/>
+          <a:chOff x="0" y="0"/>
+          <a:chExt cx="0" cy="0"/>
+        </a:xfrm>
+      </p:grpSpPr>
+      <p:sp>
+        <p:nvSpPr>
+          <p:cNvPr id="2" name="Slide Number Placeholder 1"/>
+          <p:cNvSpPr>
+            <a:spLocks noGrp="1"/>
+          </p:cNvSpPr>
+          <p:nvPr>
+            <p:ph type="sldNum" sz="quarter" idx="12"/>
+          </p:nvPr>
+        </p:nvSpPr>
+        <p:spPr/>
+        <p:txBody>
+          <a:bodyPr/>
+          <a:lstStyle/>
+          <a:p>
+            <a:fld id="{B374BE6F-4675-E040-83E7-950933BE75D0}" type="slidenum">
+              <a:rPr lang="en-US" smtClean="0"/>
+              <a:pPr/>
+              <a:t>11</a:t>
+            </a:fld>
+            <a:endParaRPr lang="en-US" dirty="0"/>
+          </a:p>
+        </p:txBody>
+      </p:sp>
       <p:sp>
         <p:nvSpPr>
           <p:cNvPr id="6" name="Rectangle 5"/>
@@ -15425,7 +15705,7 @@
 </p:sld>
 </file>
 
-<file path=ppt/slides/slide11.xml><?xml version="1.0" encoding="utf-8"?>
+<file path=ppt/slides/slide12.xml><?xml version="1.0" encoding="utf-8"?>
 <p:sld xmlns:a="http://schemas.openxmlformats.org/drawingml/2006/main" xmlns:r="http://schemas.openxmlformats.org/officeDocument/2006/relationships" xmlns:p="http://schemas.openxmlformats.org/presentationml/2006/main">
   <p:cSld>
     <p:spTree>
@@ -15460,7 +15740,7 @@
             <a:fld id="{B374BE6F-4675-E040-83E7-950933BE75D0}" type="slidenum">
               <a:rPr lang="en-US" smtClean="0"/>
               <a:pPr/>
-              <a:t>11</a:t>
+              <a:t>12</a:t>
             </a:fld>
             <a:endParaRPr lang="en-US" dirty="0"/>
           </a:p>
@@ -19783,7 +20063,7 @@
 </p:sld>
 </file>
 
-<file path=ppt/slides/slide12.xml><?xml version="1.0" encoding="utf-8"?>
+<file path=ppt/slides/slide13.xml><?xml version="1.0" encoding="utf-8"?>
 <p:sld xmlns:a="http://schemas.openxmlformats.org/drawingml/2006/main" xmlns:r="http://schemas.openxmlformats.org/officeDocument/2006/relationships" xmlns:p="http://schemas.openxmlformats.org/presentationml/2006/main">
   <p:cSld>
     <p:spTree>
@@ -19818,7 +20098,7 @@
             <a:fld id="{B374BE6F-4675-E040-83E7-950933BE75D0}" type="slidenum">
               <a:rPr lang="en-US" smtClean="0"/>
               <a:pPr/>
-              <a:t>12</a:t>
+              <a:t>13</a:t>
             </a:fld>
             <a:endParaRPr lang="en-US" dirty="0"/>
           </a:p>
@@ -26170,7 +26450,7 @@
           <a:graphicData uri="http://schemas.openxmlformats.org/presentationml/2006/ole">
             <mc:AlternateContent xmlns:mc="http://schemas.openxmlformats.org/markup-compatibility/2006">
               <mc:Choice xmlns:v="urn:schemas-microsoft-com:vml" Requires="v">
-                <p:oleObj spid="_x0000_s12360" name="Equation" r:id="rId4" imgW="3022600" imgH="444500" progId="Equation.3">
+                <p:oleObj spid="_x0000_s12366" name="Equation" r:id="rId4" imgW="3022600" imgH="444500" progId="Equation.3">
                   <p:embed/>
                 </p:oleObj>
               </mc:Choice>
@@ -26227,7 +26507,7 @@
           <a:graphicData uri="http://schemas.openxmlformats.org/presentationml/2006/ole">
             <mc:AlternateContent xmlns:mc="http://schemas.openxmlformats.org/markup-compatibility/2006">
               <mc:Choice xmlns:v="urn:schemas-microsoft-com:vml" Requires="v">
-                <p:oleObj spid="_x0000_s12361" name="Equation" r:id="rId6" imgW="4635500" imgH="431800" progId="Equation.DSMT4">
+                <p:oleObj spid="_x0000_s12367" name="Equation" r:id="rId6" imgW="4635500" imgH="431800" progId="Equation.DSMT4">
                   <p:embed/>
                 </p:oleObj>
               </mc:Choice>
@@ -26284,7 +26564,7 @@
           <a:graphicData uri="http://schemas.openxmlformats.org/presentationml/2006/ole">
             <mc:AlternateContent xmlns:mc="http://schemas.openxmlformats.org/markup-compatibility/2006">
               <mc:Choice xmlns:v="urn:schemas-microsoft-com:vml" Requires="v">
-                <p:oleObj spid="_x0000_s12362" name="Equation" r:id="rId8" imgW="2197100" imgH="457200" progId="Equation.3">
+                <p:oleObj spid="_x0000_s12368" name="Equation" r:id="rId8" imgW="2197100" imgH="457200" progId="Equation.3">
                   <p:embed/>
                 </p:oleObj>
               </mc:Choice>
@@ -27349,7 +27629,7 @@
           <a:graphicData uri="http://schemas.openxmlformats.org/presentationml/2006/ole">
             <mc:AlternateContent xmlns:mc="http://schemas.openxmlformats.org/markup-compatibility/2006">
               <mc:Choice xmlns:v="urn:schemas-microsoft-com:vml" Requires="v">
-                <p:oleObj spid="_x0000_s13337" name="Equation" r:id="rId4" imgW="1790700" imgH="469900" progId="Equation.3">
+                <p:oleObj spid="_x0000_s13339" name="Equation" r:id="rId4" imgW="1790700" imgH="469900" progId="Equation.3">
                   <p:embed/>
                 </p:oleObj>
               </mc:Choice>
@@ -29247,7 +29527,7 @@
         <p:spPr>
           <a:xfrm>
             <a:off x="510135" y="123487"/>
-            <a:ext cx="4888478" cy="461665"/>
+            <a:ext cx="5384857" cy="461665"/>
           </a:xfrm>
           <a:prstGeom prst="rect">
             <a:avLst/>
@@ -29261,7 +29541,7 @@
           <a:p>
             <a:r>
               <a:rPr lang="en-US" sz="2400" b="1" dirty="0" smtClean="0"/>
-              <a:t>Step2: </a:t>
+              <a:t>Module 2: </a:t>
             </a:r>
             <a:r>
               <a:rPr lang="en-US" sz="2400" b="1" dirty="0"/>
@@ -29297,7 +29577,7 @@
           <a:graphicData uri="http://schemas.openxmlformats.org/presentationml/2006/ole">
             <mc:AlternateContent xmlns:mc="http://schemas.openxmlformats.org/markup-compatibility/2006">
               <mc:Choice xmlns:v="urn:schemas-microsoft-com:vml" Requires="v">
-                <p:oleObj spid="_x0000_s1075" name="Equation" r:id="rId4" imgW="2667000" imgH="393700" progId="Equation.DSMT4">
+                <p:oleObj spid="_x0000_s1081" name="Equation" r:id="rId4" imgW="2667000" imgH="393700" progId="Equation.DSMT4">
                   <p:embed/>
                 </p:oleObj>
               </mc:Choice>
@@ -29354,7 +29634,7 @@
           <a:graphicData uri="http://schemas.openxmlformats.org/presentationml/2006/ole">
             <mc:AlternateContent xmlns:mc="http://schemas.openxmlformats.org/markup-compatibility/2006">
               <mc:Choice xmlns:v="urn:schemas-microsoft-com:vml" Requires="v">
-                <p:oleObj spid="_x0000_s1076" name="Equation" r:id="rId6" imgW="8089900" imgH="1168400" progId="Equation.DSMT4">
+                <p:oleObj spid="_x0000_s1082" name="Equation" r:id="rId6" imgW="8089900" imgH="1168400" progId="Equation.DSMT4">
                   <p:embed/>
                 </p:oleObj>
               </mc:Choice>
@@ -29582,7 +29862,7 @@
           <a:graphicData uri="http://schemas.openxmlformats.org/presentationml/2006/ole">
             <mc:AlternateContent xmlns:mc="http://schemas.openxmlformats.org/markup-compatibility/2006">
               <mc:Choice xmlns:v="urn:schemas-microsoft-com:vml" Requires="v">
-                <p:oleObj spid="_x0000_s1077" name="Equation" r:id="rId9" imgW="2032000" imgH="457200" progId="Equation.DSMT4">
+                <p:oleObj spid="_x0000_s1083" name="Equation" r:id="rId9" imgW="2032000" imgH="457200" progId="Equation.DSMT4">
                   <p:embed/>
                 </p:oleObj>
               </mc:Choice>
@@ -30386,7 +30666,7 @@
           <a:graphicData uri="http://schemas.openxmlformats.org/presentationml/2006/ole">
             <mc:AlternateContent xmlns:mc="http://schemas.openxmlformats.org/markup-compatibility/2006">
               <mc:Choice xmlns:v="urn:schemas-microsoft-com:vml" Requires="v">
-                <p:oleObj spid="_x0000_s9247" name="Equation" r:id="rId4" imgW="1790700" imgH="469900" progId="Equation.3">
+                <p:oleObj spid="_x0000_s9249" name="Equation" r:id="rId4" imgW="1790700" imgH="469900" progId="Equation.3">
                   <p:embed/>
                 </p:oleObj>
               </mc:Choice>
@@ -30639,6 +30919,95 @@
       </p:grpSpPr>
       <p:sp>
         <p:nvSpPr>
+          <p:cNvPr id="2" name="Rectangle 1"/>
+          <p:cNvSpPr/>
+          <p:nvPr/>
+        </p:nvSpPr>
+        <p:spPr>
+          <a:xfrm>
+            <a:off x="510135" y="123487"/>
+            <a:ext cx="3223959" cy="461665"/>
+          </a:xfrm>
+          <a:prstGeom prst="rect">
+            <a:avLst/>
+          </a:prstGeom>
+        </p:spPr>
+        <p:txBody>
+          <a:bodyPr wrap="none">
+            <a:spAutoFit/>
+          </a:bodyPr>
+          <a:lstStyle/>
+          <a:p>
+            <a:r>
+              <a:rPr lang="en-US" sz="2400" b="1" dirty="0" smtClean="0"/>
+              <a:t>Module  1 and 2: mRNA</a:t>
+            </a:r>
+            <a:endParaRPr lang="en-US" sz="2400" b="1" dirty="0"/>
+          </a:p>
+        </p:txBody>
+      </p:sp>
+      <p:pic>
+        <p:nvPicPr>
+          <p:cNvPr id="3" name="Picture 2" descr="fig2_3.pdf"/>
+          <p:cNvPicPr>
+            <a:picLocks noChangeAspect="1"/>
+          </p:cNvPicPr>
+          <p:nvPr/>
+        </p:nvPicPr>
+        <p:blipFill>
+          <a:blip r:embed="rId2">
+            <a:extLst>
+              <a:ext uri="{28A0092B-C50C-407E-A947-70E740481C1C}">
+                <a14:useLocalDpi xmlns:a14="http://schemas.microsoft.com/office/drawing/2010/main" val="0"/>
+              </a:ext>
+            </a:extLst>
+          </a:blip>
+          <a:stretch>
+            <a:fillRect/>
+          </a:stretch>
+        </p:blipFill>
+        <p:spPr>
+          <a:xfrm>
+            <a:off x="1045673" y="-995447"/>
+            <a:ext cx="7065819" cy="9144000"/>
+          </a:xfrm>
+          <a:prstGeom prst="rect">
+            <a:avLst/>
+          </a:prstGeom>
+        </p:spPr>
+      </p:pic>
+    </p:spTree>
+    <p:extLst>
+      <p:ext uri="{BB962C8B-B14F-4D97-AF65-F5344CB8AC3E}">
+        <p14:creationId xmlns:p14="http://schemas.microsoft.com/office/powerpoint/2010/main" val="3194998993"/>
+      </p:ext>
+    </p:extLst>
+  </p:cSld>
+  <p:clrMapOvr>
+    <a:masterClrMapping/>
+  </p:clrMapOvr>
+</p:sld>
+</file>
+
+<file path=ppt/slides/slide9.xml><?xml version="1.0" encoding="utf-8"?>
+<p:sld xmlns:a="http://schemas.openxmlformats.org/drawingml/2006/main" xmlns:r="http://schemas.openxmlformats.org/officeDocument/2006/relationships" xmlns:p="http://schemas.openxmlformats.org/presentationml/2006/main">
+  <p:cSld>
+    <p:spTree>
+      <p:nvGrpSpPr>
+        <p:cNvPr id="1" name=""/>
+        <p:cNvGrpSpPr/>
+        <p:nvPr/>
+      </p:nvGrpSpPr>
+      <p:grpSpPr>
+        <a:xfrm>
+          <a:off x="0" y="0"/>
+          <a:ext cx="0" cy="0"/>
+          <a:chOff x="0" y="0"/>
+          <a:chExt cx="0" cy="0"/>
+        </a:xfrm>
+      </p:grpSpPr>
+      <p:sp>
+        <p:nvSpPr>
           <p:cNvPr id="2" name="Slide Number Placeholder 1"/>
           <p:cNvSpPr>
             <a:spLocks noGrp="1"/>
@@ -30655,7 +31024,7 @@
             <a:fld id="{B374BE6F-4675-E040-83E7-950933BE75D0}" type="slidenum">
               <a:rPr lang="en-US" smtClean="0"/>
               <a:pPr/>
-              <a:t>8</a:t>
+              <a:t>9</a:t>
             </a:fld>
             <a:endParaRPr lang="en-US" dirty="0"/>
           </a:p>
@@ -32622,7 +32991,7 @@
           <a:graphicData uri="http://schemas.openxmlformats.org/presentationml/2006/ole">
             <mc:AlternateContent xmlns:mc="http://schemas.openxmlformats.org/markup-compatibility/2006">
               <mc:Choice xmlns:v="urn:schemas-microsoft-com:vml" Requires="v">
-                <p:oleObj spid="_x0000_s5222" name="Equation" r:id="rId4" imgW="3479800" imgH="800100" progId="Equation.3">
+                <p:oleObj spid="_x0000_s5226" name="Equation" r:id="rId4" imgW="3479800" imgH="800100" progId="Equation.3">
                   <p:embed/>
                 </p:oleObj>
               </mc:Choice>
@@ -32679,7 +33048,7 @@
           <a:graphicData uri="http://schemas.openxmlformats.org/presentationml/2006/ole">
             <mc:AlternateContent xmlns:mc="http://schemas.openxmlformats.org/markup-compatibility/2006">
               <mc:Choice xmlns:v="urn:schemas-microsoft-com:vml" Requires="v">
-                <p:oleObj spid="_x0000_s5223" name="Equation" r:id="rId6" imgW="3086100" imgH="254000" progId="Equation.3">
+                <p:oleObj spid="_x0000_s5227" name="Equation" r:id="rId6" imgW="3086100" imgH="254000" progId="Equation.3">
                   <p:embed/>
                 </p:oleObj>
               </mc:Choice>
@@ -32747,285 +33116,6 @@
     <p:extLst>
       <p:ext uri="{BB962C8B-B14F-4D97-AF65-F5344CB8AC3E}">
         <p14:creationId xmlns:p14="http://schemas.microsoft.com/office/powerpoint/2010/main" val="276226263"/>
-      </p:ext>
-    </p:extLst>
-  </p:cSld>
-  <p:clrMapOvr>
-    <a:masterClrMapping/>
-  </p:clrMapOvr>
-  <p:timing>
-    <p:tnLst>
-      <p:par>
-        <p:cTn xmlns:p14="http://schemas.microsoft.com/office/powerpoint/2010/main" id="1" dur="indefinite" restart="never" nodeType="tmRoot"/>
-      </p:par>
-    </p:tnLst>
-  </p:timing>
-</p:sld>
-</file>
-
-<file path=ppt/slides/slide9.xml><?xml version="1.0" encoding="utf-8"?>
-<p:sld xmlns:a="http://schemas.openxmlformats.org/drawingml/2006/main" xmlns:r="http://schemas.openxmlformats.org/officeDocument/2006/relationships" xmlns:p="http://schemas.openxmlformats.org/presentationml/2006/main">
-  <p:cSld>
-    <p:spTree>
-      <p:nvGrpSpPr>
-        <p:cNvPr id="1" name=""/>
-        <p:cNvGrpSpPr/>
-        <p:nvPr/>
-      </p:nvGrpSpPr>
-      <p:grpSpPr>
-        <a:xfrm>
-          <a:off x="0" y="0"/>
-          <a:ext cx="0" cy="0"/>
-          <a:chOff x="0" y="0"/>
-          <a:chExt cx="0" cy="0"/>
-        </a:xfrm>
-      </p:grpSpPr>
-      <p:sp>
-        <p:nvSpPr>
-          <p:cNvPr id="2" name="Slide Number Placeholder 1"/>
-          <p:cNvSpPr>
-            <a:spLocks noGrp="1"/>
-          </p:cNvSpPr>
-          <p:nvPr>
-            <p:ph type="sldNum" sz="quarter" idx="12"/>
-          </p:nvPr>
-        </p:nvSpPr>
-        <p:spPr/>
-        <p:txBody>
-          <a:bodyPr/>
-          <a:lstStyle/>
-          <a:p>
-            <a:fld id="{B374BE6F-4675-E040-83E7-950933BE75D0}" type="slidenum">
-              <a:rPr lang="en-US" smtClean="0"/>
-              <a:pPr/>
-              <a:t>9</a:t>
-            </a:fld>
-            <a:endParaRPr lang="en-US" dirty="0"/>
-          </a:p>
-        </p:txBody>
-      </p:sp>
-      <p:pic>
-        <p:nvPicPr>
-          <p:cNvPr id="6" name="Picture 5" descr="fig4.pdf"/>
-          <p:cNvPicPr>
-            <a:picLocks noChangeAspect="1"/>
-          </p:cNvPicPr>
-          <p:nvPr/>
-        </p:nvPicPr>
-        <p:blipFill rotWithShape="1">
-          <a:blip r:embed="rId3">
-            <a:extLst>
-              <a:ext uri="{28A0092B-C50C-407E-A947-70E740481C1C}">
-                <a14:useLocalDpi xmlns:a14="http://schemas.microsoft.com/office/drawing/2010/main" val="0"/>
-              </a:ext>
-            </a:extLst>
-          </a:blip>
-          <a:srcRect l="64219" t="33515" r="1196" b="30553"/>
-          <a:stretch/>
-        </p:blipFill>
-        <p:spPr>
-          <a:xfrm>
-            <a:off x="284638" y="869950"/>
-            <a:ext cx="4080521" cy="5486400"/>
-          </a:xfrm>
-          <a:prstGeom prst="rect">
-            <a:avLst/>
-          </a:prstGeom>
-        </p:spPr>
-      </p:pic>
-      <p:sp>
-        <p:nvSpPr>
-          <p:cNvPr id="50" name="Rectangle 49"/>
-          <p:cNvSpPr/>
-          <p:nvPr/>
-        </p:nvSpPr>
-        <p:spPr>
-          <a:xfrm>
-            <a:off x="4088491" y="869950"/>
-            <a:ext cx="5055509" cy="2585323"/>
-          </a:xfrm>
-          <a:prstGeom prst="rect">
-            <a:avLst/>
-          </a:prstGeom>
-        </p:spPr>
-        <p:txBody>
-          <a:bodyPr wrap="square">
-            <a:spAutoFit/>
-          </a:bodyPr>
-          <a:lstStyle/>
-          <a:p>
-            <a:r>
-              <a:rPr lang="en-US" dirty="0"/>
-              <a:t>Score function</a:t>
-            </a:r>
-            <a:r>
-              <a:rPr lang="en-US" dirty="0" smtClean="0"/>
-              <a:t>:</a:t>
-            </a:r>
-          </a:p>
-          <a:p>
-            <a:pPr marL="342900" indent="-342900">
-              <a:buAutoNum type="arabicPeriod"/>
-            </a:pPr>
-            <a:r>
-              <a:rPr lang="en-US" dirty="0" smtClean="0"/>
-              <a:t>Peak: </a:t>
-            </a:r>
-            <a:r>
-              <a:rPr lang="en-US" dirty="0" err="1" smtClean="0"/>
-              <a:t>wt</a:t>
-            </a:r>
-            <a:r>
-              <a:rPr lang="en-US" dirty="0" smtClean="0"/>
-              <a:t> (60 min +/- 20 min), </a:t>
-            </a:r>
-            <a:r>
-              <a:rPr lang="en-US" dirty="0" err="1" smtClean="0"/>
-              <a:t>mko</a:t>
-            </a:r>
-            <a:r>
-              <a:rPr lang="en-US" dirty="0" smtClean="0"/>
-              <a:t> (60min +/- 20min), </a:t>
-            </a:r>
-            <a:r>
-              <a:rPr lang="en-US" dirty="0" err="1" smtClean="0"/>
-              <a:t>tko</a:t>
-            </a:r>
-            <a:r>
-              <a:rPr lang="en-US" dirty="0" smtClean="0"/>
-              <a:t> (60 +/- 20 min)</a:t>
-            </a:r>
-          </a:p>
-          <a:p>
-            <a:pPr marL="342900" indent="-342900">
-              <a:buAutoNum type="arabicPeriod"/>
-            </a:pPr>
-            <a:r>
-              <a:rPr lang="en-US" dirty="0" err="1" smtClean="0"/>
-              <a:t>Peak_wt</a:t>
-            </a:r>
-            <a:r>
-              <a:rPr lang="en-US" dirty="0" smtClean="0"/>
-              <a:t> / </a:t>
-            </a:r>
-            <a:r>
-              <a:rPr lang="en-US" dirty="0" err="1" smtClean="0"/>
-              <a:t>peak_tko</a:t>
-            </a:r>
-            <a:r>
-              <a:rPr lang="en-US" dirty="0" smtClean="0"/>
-              <a:t> = 3 +/- 0.5 fold </a:t>
-            </a:r>
-          </a:p>
-          <a:p>
-            <a:pPr marL="342900" indent="-342900">
-              <a:buAutoNum type="arabicPeriod"/>
-            </a:pPr>
-            <a:r>
-              <a:rPr lang="en-US" dirty="0" err="1" smtClean="0"/>
-              <a:t>Peak_tko</a:t>
-            </a:r>
-            <a:r>
-              <a:rPr lang="en-US" dirty="0" smtClean="0"/>
-              <a:t>/</a:t>
-            </a:r>
-            <a:r>
-              <a:rPr lang="en-US" dirty="0" err="1" smtClean="0"/>
-              <a:t>peak_mko</a:t>
-            </a:r>
-            <a:r>
-              <a:rPr lang="en-US" dirty="0" smtClean="0"/>
-              <a:t> = 1.2 -/+ 0.2</a:t>
-            </a:r>
-          </a:p>
-          <a:p>
-            <a:pPr marL="342900" indent="-342900">
-              <a:buAutoNum type="arabicPeriod"/>
-            </a:pPr>
-            <a:r>
-              <a:rPr lang="en-US" dirty="0" err="1" smtClean="0"/>
-              <a:t>Wt</a:t>
-            </a:r>
-            <a:r>
-              <a:rPr lang="en-US" dirty="0" smtClean="0"/>
-              <a:t>(60)/</a:t>
-            </a:r>
-            <a:r>
-              <a:rPr lang="en-US" dirty="0" err="1" smtClean="0"/>
-              <a:t>mean_kos</a:t>
-            </a:r>
-            <a:r>
-              <a:rPr lang="en-US" dirty="0" smtClean="0"/>
-              <a:t>(60) = 0.75 +/- 0.15</a:t>
-            </a:r>
-          </a:p>
-          <a:p>
-            <a:pPr marL="342900" indent="-342900">
-              <a:buFontTx/>
-              <a:buAutoNum type="arabicPeriod"/>
-            </a:pPr>
-            <a:r>
-              <a:rPr lang="en-US" dirty="0" err="1" smtClean="0"/>
-              <a:t>Wt</a:t>
-            </a:r>
-            <a:r>
-              <a:rPr lang="en-US" dirty="0" smtClean="0"/>
-              <a:t>(120</a:t>
-            </a:r>
-            <a:r>
-              <a:rPr lang="en-US" dirty="0"/>
-              <a:t>)/</a:t>
-            </a:r>
-            <a:r>
-              <a:rPr lang="en-US" dirty="0" err="1"/>
-              <a:t>mean_kos</a:t>
-            </a:r>
-            <a:r>
-              <a:rPr lang="en-US" dirty="0" smtClean="0"/>
-              <a:t>(120</a:t>
-            </a:r>
-            <a:r>
-              <a:rPr lang="en-US" dirty="0"/>
-              <a:t>) = 0.75 +/- 0.15</a:t>
-            </a:r>
-          </a:p>
-          <a:p>
-            <a:pPr marL="342900" indent="-342900">
-              <a:buAutoNum type="arabicPeriod"/>
-            </a:pPr>
-            <a:r>
-              <a:rPr lang="en-US" dirty="0" smtClean="0"/>
-              <a:t>60min ~ 120 min: </a:t>
-            </a:r>
-            <a:r>
-              <a:rPr lang="en-US" dirty="0" err="1" smtClean="0"/>
-              <a:t>wt</a:t>
-            </a:r>
-            <a:r>
-              <a:rPr lang="en-US" dirty="0" smtClean="0"/>
-              <a:t> decrease 6+/-1</a:t>
-            </a:r>
-          </a:p>
-          <a:p>
-            <a:pPr marL="342900" indent="-342900">
-              <a:buAutoNum type="arabicPeriod"/>
-            </a:pPr>
-            <a:r>
-              <a:rPr lang="en-US" dirty="0" err="1" smtClean="0"/>
-              <a:t>Peak_tko</a:t>
-            </a:r>
-            <a:r>
-              <a:rPr lang="en-US" dirty="0" smtClean="0"/>
-              <a:t> = 25 +/- 2</a:t>
-            </a:r>
-            <a:endParaRPr lang="en-US" dirty="0"/>
-          </a:p>
-        </p:txBody>
-      </p:sp>
-    </p:spTree>
-    <p:extLst>
-      <p:ext uri="{BB962C8B-B14F-4D97-AF65-F5344CB8AC3E}">
-        <p14:creationId xmlns:p14="http://schemas.microsoft.com/office/powerpoint/2010/main" val="3232202549"/>
       </p:ext>
     </p:extLst>
   </p:cSld>

</xml_diff>

<commit_message>
edited Fig4 and create fig2_4
</commit_message>
<xml_diff>
--- a/TNF_Slides.pptx
+++ b/TNF_Slides.pptx
@@ -26450,7 +26450,7 @@
           <a:graphicData uri="http://schemas.openxmlformats.org/presentationml/2006/ole">
             <mc:AlternateContent xmlns:mc="http://schemas.openxmlformats.org/markup-compatibility/2006">
               <mc:Choice xmlns:v="urn:schemas-microsoft-com:vml" Requires="v">
-                <p:oleObj spid="_x0000_s12366" name="Equation" r:id="rId4" imgW="3022600" imgH="444500" progId="Equation.3">
+                <p:oleObj spid="_x0000_s12369" name="Equation" r:id="rId4" imgW="3022600" imgH="444500" progId="Equation.3">
                   <p:embed/>
                 </p:oleObj>
               </mc:Choice>
@@ -26507,7 +26507,7 @@
           <a:graphicData uri="http://schemas.openxmlformats.org/presentationml/2006/ole">
             <mc:AlternateContent xmlns:mc="http://schemas.openxmlformats.org/markup-compatibility/2006">
               <mc:Choice xmlns:v="urn:schemas-microsoft-com:vml" Requires="v">
-                <p:oleObj spid="_x0000_s12367" name="Equation" r:id="rId6" imgW="4635500" imgH="431800" progId="Equation.DSMT4">
+                <p:oleObj spid="_x0000_s12370" name="Equation" r:id="rId6" imgW="4635500" imgH="431800" progId="Equation.DSMT4">
                   <p:embed/>
                 </p:oleObj>
               </mc:Choice>
@@ -26564,7 +26564,7 @@
           <a:graphicData uri="http://schemas.openxmlformats.org/presentationml/2006/ole">
             <mc:AlternateContent xmlns:mc="http://schemas.openxmlformats.org/markup-compatibility/2006">
               <mc:Choice xmlns:v="urn:schemas-microsoft-com:vml" Requires="v">
-                <p:oleObj spid="_x0000_s12368" name="Equation" r:id="rId8" imgW="2197100" imgH="457200" progId="Equation.3">
+                <p:oleObj spid="_x0000_s12371" name="Equation" r:id="rId8" imgW="2197100" imgH="457200" progId="Equation.3">
                   <p:embed/>
                 </p:oleObj>
               </mc:Choice>
@@ -27629,7 +27629,7 @@
           <a:graphicData uri="http://schemas.openxmlformats.org/presentationml/2006/ole">
             <mc:AlternateContent xmlns:mc="http://schemas.openxmlformats.org/markup-compatibility/2006">
               <mc:Choice xmlns:v="urn:schemas-microsoft-com:vml" Requires="v">
-                <p:oleObj spid="_x0000_s13339" name="Equation" r:id="rId4" imgW="1790700" imgH="469900" progId="Equation.3">
+                <p:oleObj spid="_x0000_s13340" name="Equation" r:id="rId4" imgW="1790700" imgH="469900" progId="Equation.3">
                   <p:embed/>
                 </p:oleObj>
               </mc:Choice>
@@ -29577,7 +29577,7 @@
           <a:graphicData uri="http://schemas.openxmlformats.org/presentationml/2006/ole">
             <mc:AlternateContent xmlns:mc="http://schemas.openxmlformats.org/markup-compatibility/2006">
               <mc:Choice xmlns:v="urn:schemas-microsoft-com:vml" Requires="v">
-                <p:oleObj spid="_x0000_s1081" name="Equation" r:id="rId4" imgW="2667000" imgH="393700" progId="Equation.DSMT4">
+                <p:oleObj spid="_x0000_s1087" name="Equation" r:id="rId4" imgW="2667000" imgH="393700" progId="Equation.DSMT4">
                   <p:embed/>
                 </p:oleObj>
               </mc:Choice>
@@ -29634,7 +29634,7 @@
           <a:graphicData uri="http://schemas.openxmlformats.org/presentationml/2006/ole">
             <mc:AlternateContent xmlns:mc="http://schemas.openxmlformats.org/markup-compatibility/2006">
               <mc:Choice xmlns:v="urn:schemas-microsoft-com:vml" Requires="v">
-                <p:oleObj spid="_x0000_s1082" name="Equation" r:id="rId6" imgW="8089900" imgH="1168400" progId="Equation.DSMT4">
+                <p:oleObj spid="_x0000_s1088" name="Equation" r:id="rId6" imgW="8089900" imgH="1168400" progId="Equation.DSMT4">
                   <p:embed/>
                 </p:oleObj>
               </mc:Choice>
@@ -29862,7 +29862,7 @@
           <a:graphicData uri="http://schemas.openxmlformats.org/presentationml/2006/ole">
             <mc:AlternateContent xmlns:mc="http://schemas.openxmlformats.org/markup-compatibility/2006">
               <mc:Choice xmlns:v="urn:schemas-microsoft-com:vml" Requires="v">
-                <p:oleObj spid="_x0000_s1083" name="Equation" r:id="rId9" imgW="2032000" imgH="457200" progId="Equation.DSMT4">
+                <p:oleObj spid="_x0000_s1089" name="Equation" r:id="rId9" imgW="2032000" imgH="457200" progId="Equation.DSMT4">
                   <p:embed/>
                 </p:oleObj>
               </mc:Choice>
@@ -30666,7 +30666,7 @@
           <a:graphicData uri="http://schemas.openxmlformats.org/presentationml/2006/ole">
             <mc:AlternateContent xmlns:mc="http://schemas.openxmlformats.org/markup-compatibility/2006">
               <mc:Choice xmlns:v="urn:schemas-microsoft-com:vml" Requires="v">
-                <p:oleObj spid="_x0000_s9249" name="Equation" r:id="rId4" imgW="1790700" imgH="469900" progId="Equation.3">
+                <p:oleObj spid="_x0000_s9250" name="Equation" r:id="rId4" imgW="1790700" imgH="469900" progId="Equation.3">
                   <p:embed/>
                 </p:oleObj>
               </mc:Choice>
@@ -32949,7 +32949,7 @@
         <p:spPr>
           <a:xfrm>
             <a:off x="459335" y="9187"/>
-            <a:ext cx="3974466" cy="461665"/>
+            <a:ext cx="4470845" cy="461665"/>
           </a:xfrm>
           <a:prstGeom prst="rect">
             <a:avLst/>
@@ -32963,7 +32963,11 @@
           <a:p>
             <a:r>
               <a:rPr lang="en-US" sz="2400" b="1" dirty="0" smtClean="0"/>
-              <a:t>Step2: Translation + Secretion</a:t>
+              <a:t>Module 3: </a:t>
+            </a:r>
+            <a:r>
+              <a:rPr lang="en-US" sz="2400" b="1" dirty="0" smtClean="0"/>
+              <a:t>Translation + Secretion</a:t>
             </a:r>
             <a:endParaRPr lang="en-US" sz="2400" b="1" dirty="0"/>
           </a:p>
@@ -32978,25 +32982,25 @@
           <p:nvPr>
             <p:extLst>
               <p:ext uri="{D42A27DB-BD31-4B8C-83A1-F6EECF244321}">
-                <p14:modId xmlns:p14="http://schemas.microsoft.com/office/powerpoint/2010/main" val="866331940"/>
+                <p14:modId xmlns:p14="http://schemas.microsoft.com/office/powerpoint/2010/main" val="3211822780"/>
               </p:ext>
             </p:extLst>
           </p:nvPr>
         </p:nvGraphicFramePr>
         <p:xfrm>
-          <a:off x="308744" y="796344"/>
-          <a:ext cx="4857750" cy="1116012"/>
+          <a:off x="280988" y="744538"/>
+          <a:ext cx="4911725" cy="1222375"/>
         </p:xfrm>
         <a:graphic>
           <a:graphicData uri="http://schemas.openxmlformats.org/presentationml/2006/ole">
             <mc:AlternateContent xmlns:mc="http://schemas.openxmlformats.org/markup-compatibility/2006">
               <mc:Choice xmlns:v="urn:schemas-microsoft-com:vml" Requires="v">
-                <p:oleObj spid="_x0000_s5226" name="Equation" r:id="rId4" imgW="3479800" imgH="800100" progId="Equation.3">
+                <p:oleObj spid="_x0000_s5230" name="Equation" r:id="rId4" imgW="3517900" imgH="876300" progId="Equation.DSMT4">
                   <p:embed/>
                 </p:oleObj>
               </mc:Choice>
               <mc:Fallback>
-                <p:oleObj name="Equation" r:id="rId4" imgW="3479800" imgH="800100" progId="Equation.3">
+                <p:oleObj name="Equation" r:id="rId4" imgW="3517900" imgH="876300" progId="Equation.DSMT4">
                   <p:embed/>
                   <p:pic>
                     <p:nvPicPr>
@@ -33012,8 +33016,8 @@
                     </p:blipFill>
                     <p:spPr>
                       <a:xfrm>
-                        <a:off x="308744" y="796344"/>
-                        <a:ext cx="4857750" cy="1116012"/>
+                        <a:off x="280988" y="744538"/>
+                        <a:ext cx="4911725" cy="1222375"/>
                       </a:xfrm>
                       <a:prstGeom prst="rect">
                         <a:avLst/>
@@ -33035,25 +33039,25 @@
           <p:nvPr>
             <p:extLst>
               <p:ext uri="{D42A27DB-BD31-4B8C-83A1-F6EECF244321}">
-                <p14:modId xmlns:p14="http://schemas.microsoft.com/office/powerpoint/2010/main" val="2251729096"/>
+                <p14:modId xmlns:p14="http://schemas.microsoft.com/office/powerpoint/2010/main" val="4011584949"/>
               </p:ext>
             </p:extLst>
           </p:nvPr>
         </p:nvGraphicFramePr>
         <p:xfrm>
-          <a:off x="289497" y="2035175"/>
-          <a:ext cx="4391025" cy="360363"/>
+          <a:off x="361950" y="2035175"/>
+          <a:ext cx="4826000" cy="360363"/>
         </p:xfrm>
         <a:graphic>
           <a:graphicData uri="http://schemas.openxmlformats.org/presentationml/2006/ole">
             <mc:AlternateContent xmlns:mc="http://schemas.openxmlformats.org/markup-compatibility/2006">
               <mc:Choice xmlns:v="urn:schemas-microsoft-com:vml" Requires="v">
-                <p:oleObj spid="_x0000_s5227" name="Equation" r:id="rId6" imgW="3086100" imgH="254000" progId="Equation.3">
+                <p:oleObj spid="_x0000_s5231" name="Equation" r:id="rId6" imgW="3390900" imgH="254000" progId="Equation.DSMT4">
                   <p:embed/>
                 </p:oleObj>
               </mc:Choice>
               <mc:Fallback>
-                <p:oleObj name="Equation" r:id="rId6" imgW="3086100" imgH="254000" progId="Equation.3">
+                <p:oleObj name="Equation" r:id="rId6" imgW="3390900" imgH="254000" progId="Equation.DSMT4">
                   <p:embed/>
                   <p:pic>
                     <p:nvPicPr>
@@ -33069,8 +33073,8 @@
                     </p:blipFill>
                     <p:spPr>
                       <a:xfrm>
-                        <a:off x="289497" y="2035175"/>
-                        <a:ext cx="4391025" cy="360363"/>
+                        <a:off x="361950" y="2035175"/>
+                        <a:ext cx="4826000" cy="360363"/>
                       </a:xfrm>
                       <a:prstGeom prst="rect">
                         <a:avLst/>

</xml_diff>

<commit_message>
Fig2_4 got an uniform parameter set
</commit_message>
<xml_diff>
--- a/TNF_Slides.pptx
+++ b/TNF_Slides.pptx
@@ -5,7 +5,7 @@
     <p:sldMasterId id="2147483648" r:id="rId1"/>
   </p:sldMasterIdLst>
   <p:notesMasterIdLst>
-    <p:notesMasterId r:id="rId15"/>
+    <p:notesMasterId r:id="rId16"/>
   </p:notesMasterIdLst>
   <p:sldIdLst>
     <p:sldId id="257" r:id="rId2"/>
@@ -17,10 +17,11 @@
     <p:sldId id="273" r:id="rId8"/>
     <p:sldId id="260" r:id="rId9"/>
     <p:sldId id="268" r:id="rId10"/>
-    <p:sldId id="275" r:id="rId11"/>
-    <p:sldId id="261" r:id="rId12"/>
-    <p:sldId id="263" r:id="rId13"/>
-    <p:sldId id="264" r:id="rId14"/>
+    <p:sldId id="276" r:id="rId11"/>
+    <p:sldId id="275" r:id="rId12"/>
+    <p:sldId id="261" r:id="rId13"/>
+    <p:sldId id="263" r:id="rId14"/>
+    <p:sldId id="264" r:id="rId15"/>
   </p:sldIdLst>
   <p:sldSz cx="9144000" cy="6858000" type="screen4x3"/>
   <p:notesSz cx="6858000" cy="9144000"/>
@@ -1147,17 +1148,61 @@
           <a:lstStyle/>
           <a:p>
             <a:r>
+              <a:rPr lang="en-US" b="1" dirty="0" err="1" smtClean="0"/>
+              <a:t>proTNF</a:t>
+            </a:r>
+            <a:r>
+              <a:rPr lang="en-US" b="1" dirty="0" smtClean="0"/>
+              <a:t> half-life</a:t>
+            </a:r>
+            <a:r>
+              <a:rPr lang="en-US" b="1" baseline="0" dirty="0" smtClean="0"/>
+              <a:t>: less than 15 mins; </a:t>
+            </a:r>
+          </a:p>
+          <a:p>
+            <a:r>
               <a:rPr lang="en-US" dirty="0" smtClean="0"/>
-              <a:t>f(</a:t>
+              <a:t>J </a:t>
             </a:r>
             <a:r>
               <a:rPr lang="en-US" dirty="0" err="1" smtClean="0"/>
-              <a:t>NFkB</a:t>
+              <a:t>Immunol</a:t>
             </a:r>
             <a:r>
               <a:rPr lang="en-US" dirty="0" smtClean="0"/>
-              <a:t>)</a:t>
+              <a:t>. 1997 Nov 1;159(9):4524-31.</a:t>
             </a:r>
+          </a:p>
+          <a:p>
+            <a:r>
+              <a:rPr lang="en-US" dirty="0" smtClean="0"/>
+              <a:t>The fate of pro-TNF-alpha following inhibition of </a:t>
+            </a:r>
+            <a:r>
+              <a:rPr lang="en-US" dirty="0" err="1" smtClean="0"/>
+              <a:t>metalloprotease</a:t>
+            </a:r>
+            <a:r>
+              <a:rPr lang="en-US" dirty="0" smtClean="0"/>
+              <a:t>-dependent processing to soluble TNF-alpha in human monocytes.</a:t>
+            </a:r>
+          </a:p>
+          <a:p>
+            <a:r>
+              <a:rPr lang="en-US" dirty="0" smtClean="0"/>
+              <a:t>Solomon KA, Covington MB, </a:t>
+            </a:r>
+            <a:r>
+              <a:rPr lang="en-US" dirty="0" err="1" smtClean="0"/>
+              <a:t>DeCicco</a:t>
+            </a:r>
+            <a:r>
+              <a:rPr lang="en-US" dirty="0" smtClean="0"/>
+              <a:t> CP, Newton RC.</a:t>
+            </a:r>
+          </a:p>
+          <a:p>
             <a:endParaRPr lang="en-US" dirty="0"/>
           </a:p>
         </p:txBody>
@@ -1371,7 +1416,7 @@
           <a:p>
             <a:fld id="{837A9C9D-08EC-C64D-9F61-949AA1F45D5D}" type="slidenum">
               <a:rPr lang="en-US" smtClean="0"/>
-              <a:t>11</a:t>
+              <a:t>12</a:t>
             </a:fld>
             <a:endParaRPr lang="en-US"/>
           </a:p>
@@ -1463,7 +1508,7 @@
           <a:p>
             <a:fld id="{837A9C9D-08EC-C64D-9F61-949AA1F45D5D}" type="slidenum">
               <a:rPr lang="en-US" smtClean="0"/>
-              <a:t>12</a:t>
+              <a:t>13</a:t>
             </a:fld>
             <a:endParaRPr lang="en-US"/>
           </a:p>
@@ -11335,6 +11380,96 @@
           <a:chExt cx="0" cy="0"/>
         </a:xfrm>
       </p:grpSpPr>
+      <p:pic>
+        <p:nvPicPr>
+          <p:cNvPr id="2" name="Picture 1" descr="fig4s1.pdf"/>
+          <p:cNvPicPr>
+            <a:picLocks noChangeAspect="1"/>
+          </p:cNvPicPr>
+          <p:nvPr/>
+        </p:nvPicPr>
+        <p:blipFill>
+          <a:blip r:embed="rId2">
+            <a:extLst>
+              <a:ext uri="{28A0092B-C50C-407E-A947-70E740481C1C}">
+                <a14:useLocalDpi xmlns:a14="http://schemas.microsoft.com/office/drawing/2010/main" val="0"/>
+              </a:ext>
+            </a:extLst>
+          </a:blip>
+          <a:stretch>
+            <a:fillRect/>
+          </a:stretch>
+        </p:blipFill>
+        <p:spPr>
+          <a:xfrm>
+            <a:off x="-167044" y="331816"/>
+            <a:ext cx="5299364" cy="6858000"/>
+          </a:xfrm>
+          <a:prstGeom prst="rect">
+            <a:avLst/>
+          </a:prstGeom>
+        </p:spPr>
+      </p:pic>
+      <p:pic>
+        <p:nvPicPr>
+          <p:cNvPr id="3" name="Picture 2" descr="fig4s2b.pdf"/>
+          <p:cNvPicPr>
+            <a:picLocks noChangeAspect="1"/>
+          </p:cNvPicPr>
+          <p:nvPr/>
+        </p:nvPicPr>
+        <p:blipFill>
+          <a:blip r:embed="rId3">
+            <a:extLst>
+              <a:ext uri="{28A0092B-C50C-407E-A947-70E740481C1C}">
+                <a14:useLocalDpi xmlns:a14="http://schemas.microsoft.com/office/drawing/2010/main" val="0"/>
+              </a:ext>
+            </a:extLst>
+          </a:blip>
+          <a:stretch>
+            <a:fillRect/>
+          </a:stretch>
+        </p:blipFill>
+        <p:spPr>
+          <a:xfrm>
+            <a:off x="4267942" y="331816"/>
+            <a:ext cx="5299364" cy="6858000"/>
+          </a:xfrm>
+          <a:prstGeom prst="rect">
+            <a:avLst/>
+          </a:prstGeom>
+        </p:spPr>
+      </p:pic>
+    </p:spTree>
+    <p:extLst>
+      <p:ext uri="{BB962C8B-B14F-4D97-AF65-F5344CB8AC3E}">
+        <p14:creationId xmlns:p14="http://schemas.microsoft.com/office/powerpoint/2010/main" val="2882353874"/>
+      </p:ext>
+    </p:extLst>
+  </p:cSld>
+  <p:clrMapOvr>
+    <a:masterClrMapping/>
+  </p:clrMapOvr>
+</p:sld>
+</file>
+
+<file path=ppt/slides/slide11.xml><?xml version="1.0" encoding="utf-8"?>
+<p:sld xmlns:a="http://schemas.openxmlformats.org/drawingml/2006/main" xmlns:r="http://schemas.openxmlformats.org/officeDocument/2006/relationships" xmlns:p="http://schemas.openxmlformats.org/presentationml/2006/main">
+  <p:cSld>
+    <p:spTree>
+      <p:nvGrpSpPr>
+        <p:cNvPr id="1" name=""/>
+        <p:cNvGrpSpPr/>
+        <p:nvPr/>
+      </p:nvGrpSpPr>
+      <p:grpSpPr>
+        <a:xfrm>
+          <a:off x="0" y="0"/>
+          <a:ext cx="0" cy="0"/>
+          <a:chOff x="0" y="0"/>
+          <a:chExt cx="0" cy="0"/>
+        </a:xfrm>
+      </p:grpSpPr>
       <p:sp>
         <p:nvSpPr>
           <p:cNvPr id="3" name="Rectangle 2"/>
@@ -11385,7 +11520,7 @@
         </p:blipFill>
         <p:spPr>
           <a:xfrm>
-            <a:off x="1065093" y="1143000"/>
+            <a:off x="801956" y="1291745"/>
             <a:ext cx="7013814" cy="4572000"/>
           </a:xfrm>
           <a:prstGeom prst="rect">
@@ -11406,7 +11541,7 @@
 </p:sld>
 </file>
 
-<file path=ppt/slides/slide11.xml><?xml version="1.0" encoding="utf-8"?>
+<file path=ppt/slides/slide12.xml><?xml version="1.0" encoding="utf-8"?>
 <p:sld xmlns:a="http://schemas.openxmlformats.org/drawingml/2006/main" xmlns:r="http://schemas.openxmlformats.org/officeDocument/2006/relationships" xmlns:p="http://schemas.openxmlformats.org/presentationml/2006/main">
   <p:cSld>
     <p:spTree>
@@ -11441,7 +11576,7 @@
             <a:fld id="{B374BE6F-4675-E040-83E7-950933BE75D0}" type="slidenum">
               <a:rPr lang="en-US" smtClean="0"/>
               <a:pPr/>
-              <a:t>11</a:t>
+              <a:t>12</a:t>
             </a:fld>
             <a:endParaRPr lang="en-US" dirty="0"/>
           </a:p>
@@ -15514,7 +15649,7 @@
 </p:sld>
 </file>
 
-<file path=ppt/slides/slide12.xml><?xml version="1.0" encoding="utf-8"?>
+<file path=ppt/slides/slide13.xml><?xml version="1.0" encoding="utf-8"?>
 <p:sld xmlns:a="http://schemas.openxmlformats.org/drawingml/2006/main" xmlns:r="http://schemas.openxmlformats.org/officeDocument/2006/relationships" xmlns:p="http://schemas.openxmlformats.org/presentationml/2006/main">
   <p:cSld>
     <p:spTree>
@@ -15549,7 +15684,7 @@
             <a:fld id="{B374BE6F-4675-E040-83E7-950933BE75D0}" type="slidenum">
               <a:rPr lang="en-US" smtClean="0"/>
               <a:pPr/>
-              <a:t>12</a:t>
+              <a:t>13</a:t>
             </a:fld>
             <a:endParaRPr lang="en-US" dirty="0"/>
           </a:p>
@@ -19872,7 +20007,7 @@
 </p:sld>
 </file>
 
-<file path=ppt/slides/slide13.xml><?xml version="1.0" encoding="utf-8"?>
+<file path=ppt/slides/slide14.xml><?xml version="1.0" encoding="utf-8"?>
 <p:sld xmlns:a="http://schemas.openxmlformats.org/drawingml/2006/main" xmlns:r="http://schemas.openxmlformats.org/officeDocument/2006/relationships" xmlns:p="http://schemas.openxmlformats.org/presentationml/2006/main">
   <p:cSld>
     <p:spTree>
@@ -19907,7 +20042,7 @@
             <a:fld id="{B374BE6F-4675-E040-83E7-950933BE75D0}" type="slidenum">
               <a:rPr lang="en-US" smtClean="0"/>
               <a:pPr/>
-              <a:t>13</a:t>
+              <a:t>14</a:t>
             </a:fld>
             <a:endParaRPr lang="en-US" dirty="0"/>
           </a:p>
@@ -26259,7 +26394,7 @@
           <a:graphicData uri="http://schemas.openxmlformats.org/presentationml/2006/ole">
             <mc:AlternateContent xmlns:mc="http://schemas.openxmlformats.org/markup-compatibility/2006">
               <mc:Choice xmlns:v="urn:schemas-microsoft-com:vml" Requires="v">
-                <p:oleObj spid="_x0000_s12390" name="Equation" r:id="rId4" imgW="3022600" imgH="444500" progId="Equation.3">
+                <p:oleObj spid="_x0000_s12399" name="Equation" r:id="rId4" imgW="3022600" imgH="444500" progId="Equation.3">
                   <p:embed/>
                 </p:oleObj>
               </mc:Choice>
@@ -26316,7 +26451,7 @@
           <a:graphicData uri="http://schemas.openxmlformats.org/presentationml/2006/ole">
             <mc:AlternateContent xmlns:mc="http://schemas.openxmlformats.org/markup-compatibility/2006">
               <mc:Choice xmlns:v="urn:schemas-microsoft-com:vml" Requires="v">
-                <p:oleObj spid="_x0000_s12391" name="Equation" r:id="rId6" imgW="4635500" imgH="431800" progId="Equation.DSMT4">
+                <p:oleObj spid="_x0000_s12400" name="Equation" r:id="rId6" imgW="4635500" imgH="431800" progId="Equation.DSMT4">
                   <p:embed/>
                 </p:oleObj>
               </mc:Choice>
@@ -26373,7 +26508,7 @@
           <a:graphicData uri="http://schemas.openxmlformats.org/presentationml/2006/ole">
             <mc:AlternateContent xmlns:mc="http://schemas.openxmlformats.org/markup-compatibility/2006">
               <mc:Choice xmlns:v="urn:schemas-microsoft-com:vml" Requires="v">
-                <p:oleObj spid="_x0000_s12392" name="Equation" r:id="rId8" imgW="2197100" imgH="457200" progId="Equation.3">
+                <p:oleObj spid="_x0000_s12401" name="Equation" r:id="rId8" imgW="2197100" imgH="457200" progId="Equation.3">
                   <p:embed/>
                 </p:oleObj>
               </mc:Choice>
@@ -27438,7 +27573,7 @@
           <a:graphicData uri="http://schemas.openxmlformats.org/presentationml/2006/ole">
             <mc:AlternateContent xmlns:mc="http://schemas.openxmlformats.org/markup-compatibility/2006">
               <mc:Choice xmlns:v="urn:schemas-microsoft-com:vml" Requires="v">
-                <p:oleObj spid="_x0000_s13347" name="Equation" r:id="rId4" imgW="1790700" imgH="469900" progId="Equation.3">
+                <p:oleObj spid="_x0000_s13350" name="Equation" r:id="rId4" imgW="1790700" imgH="469900" progId="Equation.3">
                   <p:embed/>
                 </p:oleObj>
               </mc:Choice>
@@ -29386,7 +29521,7 @@
           <a:graphicData uri="http://schemas.openxmlformats.org/presentationml/2006/ole">
             <mc:AlternateContent xmlns:mc="http://schemas.openxmlformats.org/markup-compatibility/2006">
               <mc:Choice xmlns:v="urn:schemas-microsoft-com:vml" Requires="v">
-                <p:oleObj spid="_x0000_s1108" name="Equation" r:id="rId4" imgW="2667000" imgH="393700" progId="Equation.DSMT4">
+                <p:oleObj spid="_x0000_s1117" name="Equation" r:id="rId4" imgW="2667000" imgH="393700" progId="Equation.DSMT4">
                   <p:embed/>
                 </p:oleObj>
               </mc:Choice>
@@ -29443,7 +29578,7 @@
           <a:graphicData uri="http://schemas.openxmlformats.org/presentationml/2006/ole">
             <mc:AlternateContent xmlns:mc="http://schemas.openxmlformats.org/markup-compatibility/2006">
               <mc:Choice xmlns:v="urn:schemas-microsoft-com:vml" Requires="v">
-                <p:oleObj spid="_x0000_s1109" name="Equation" r:id="rId6" imgW="8089900" imgH="1168400" progId="Equation.DSMT4">
+                <p:oleObj spid="_x0000_s1118" name="Equation" r:id="rId6" imgW="8089900" imgH="1168400" progId="Equation.DSMT4">
                   <p:embed/>
                 </p:oleObj>
               </mc:Choice>
@@ -29671,7 +29806,7 @@
           <a:graphicData uri="http://schemas.openxmlformats.org/presentationml/2006/ole">
             <mc:AlternateContent xmlns:mc="http://schemas.openxmlformats.org/markup-compatibility/2006">
               <mc:Choice xmlns:v="urn:schemas-microsoft-com:vml" Requires="v">
-                <p:oleObj spid="_x0000_s1110" name="Equation" r:id="rId9" imgW="2032000" imgH="457200" progId="Equation.DSMT4">
+                <p:oleObj spid="_x0000_s1119" name="Equation" r:id="rId9" imgW="2032000" imgH="457200" progId="Equation.DSMT4">
                   <p:embed/>
                 </p:oleObj>
               </mc:Choice>
@@ -30475,7 +30610,7 @@
           <a:graphicData uri="http://schemas.openxmlformats.org/presentationml/2006/ole">
             <mc:AlternateContent xmlns:mc="http://schemas.openxmlformats.org/markup-compatibility/2006">
               <mc:Choice xmlns:v="urn:schemas-microsoft-com:vml" Requires="v">
-                <p:oleObj spid="_x0000_s9258" name="Equation" r:id="rId4" imgW="1790700" imgH="469900" progId="Equation.3">
+                <p:oleObj spid="_x0000_s9261" name="Equation" r:id="rId4" imgW="1790700" imgH="469900" progId="Equation.3">
                   <p:embed/>
                 </p:oleObj>
               </mc:Choice>
@@ -32715,7 +32850,7 @@
           <a:graphicData uri="http://schemas.openxmlformats.org/presentationml/2006/ole">
             <mc:AlternateContent xmlns:mc="http://schemas.openxmlformats.org/markup-compatibility/2006">
               <mc:Choice xmlns:v="urn:schemas-microsoft-com:vml" Requires="v">
-                <p:oleObj spid="_x0000_s5246" name="Equation" r:id="rId4" imgW="3517900" imgH="876300" progId="Equation.DSMT4">
+                <p:oleObj spid="_x0000_s5256" name="Equation" r:id="rId4" imgW="3517900" imgH="876300" progId="Equation.DSMT4">
                   <p:embed/>
                 </p:oleObj>
               </mc:Choice>
@@ -32772,7 +32907,7 @@
           <a:graphicData uri="http://schemas.openxmlformats.org/presentationml/2006/ole">
             <mc:AlternateContent xmlns:mc="http://schemas.openxmlformats.org/markup-compatibility/2006">
               <mc:Choice xmlns:v="urn:schemas-microsoft-com:vml" Requires="v">
-                <p:oleObj spid="_x0000_s5247" name="Equation" r:id="rId6" imgW="3251200" imgH="838200" progId="Equation.DSMT4">
+                <p:oleObj spid="_x0000_s5257" name="Equation" r:id="rId6" imgW="3251200" imgH="838200" progId="Equation.DSMT4">
                   <p:embed/>
                 </p:oleObj>
               </mc:Choice>
@@ -32883,7 +33018,12 @@
             <p:ph type="sldNum" sz="quarter" idx="12"/>
           </p:nvPr>
         </p:nvSpPr>
-        <p:spPr/>
+        <p:spPr>
+          <a:xfrm>
+            <a:off x="6553200" y="6482212"/>
+            <a:ext cx="2133600" cy="365125"/>
+          </a:xfrm>
+        </p:spPr>
         <p:txBody>
           <a:bodyPr/>
           <a:lstStyle/>
@@ -32918,7 +33058,7 @@
         </p:blipFill>
         <p:spPr>
           <a:xfrm>
-            <a:off x="284638" y="869950"/>
+            <a:off x="284638" y="995812"/>
             <a:ext cx="4080521" cy="5486400"/>
           </a:xfrm>
           <a:prstGeom prst="rect">
@@ -32935,14 +33075,14 @@
           <p:nvPr>
             <p:extLst>
               <p:ext uri="{D42A27DB-BD31-4B8C-83A1-F6EECF244321}">
-                <p14:modId xmlns:p14="http://schemas.microsoft.com/office/powerpoint/2010/main" val="2482735733"/>
+                <p14:modId xmlns:p14="http://schemas.microsoft.com/office/powerpoint/2010/main" val="1357287589"/>
               </p:ext>
             </p:extLst>
           </p:nvPr>
         </p:nvGraphicFramePr>
         <p:xfrm>
-          <a:off x="4046531" y="352753"/>
-          <a:ext cx="5013338" cy="3174916"/>
+          <a:off x="4046531" y="226893"/>
+          <a:ext cx="5013338" cy="3552231"/>
         </p:xfrm>
         <a:graphic>
           <a:graphicData uri="http://schemas.openxmlformats.org/drawingml/2006/table">
@@ -33587,6 +33727,80 @@
                   <a:tcPr/>
                 </a:tc>
               </a:tr>
+              <a:tr h="377315">
+                <a:tc>
+                  <a:txBody>
+                    <a:bodyPr/>
+                    <a:lstStyle/>
+                    <a:p>
+                      <a:r>
+                        <a:rPr lang="en-US" sz="1600" dirty="0" smtClean="0"/>
+                        <a:t>9</a:t>
+                      </a:r>
+                      <a:endParaRPr lang="en-US" sz="1600" dirty="0"/>
+                    </a:p>
+                  </a:txBody>
+                  <a:tcPr/>
+                </a:tc>
+                <a:tc>
+                  <a:txBody>
+                    <a:bodyPr/>
+                    <a:lstStyle/>
+                    <a:p>
+                      <a:pPr marL="0" marR="0" indent="0" algn="l" defTabSz="457200" rtl="0" eaLnBrk="1" fontAlgn="auto" latinLnBrk="0" hangingPunct="1">
+                        <a:lnSpc>
+                          <a:spcPct val="100000"/>
+                        </a:lnSpc>
+                        <a:spcBef>
+                          <a:spcPts val="0"/>
+                        </a:spcBef>
+                        <a:spcAft>
+                          <a:spcPts val="0"/>
+                        </a:spcAft>
+                        <a:buClrTx/>
+                        <a:buSzTx/>
+                        <a:buFontTx/>
+                        <a:buNone/>
+                        <a:tabLst/>
+                        <a:defRPr/>
+                      </a:pPr>
+                      <a:r>
+                        <a:rPr lang="en-US" sz="1600" dirty="0" smtClean="0"/>
+                        <a:t>Tko_30/mko_30</a:t>
+                      </a:r>
+                    </a:p>
+                  </a:txBody>
+                  <a:tcPr/>
+                </a:tc>
+                <a:tc>
+                  <a:txBody>
+                    <a:bodyPr/>
+                    <a:lstStyle/>
+                    <a:p>
+                      <a:r>
+                        <a:rPr lang="en-US" sz="1600" dirty="0" smtClean="0"/>
+                        <a:t>0.75</a:t>
+                      </a:r>
+                      <a:endParaRPr lang="en-US" sz="1600" dirty="0"/>
+                    </a:p>
+                  </a:txBody>
+                  <a:tcPr/>
+                </a:tc>
+                <a:tc>
+                  <a:txBody>
+                    <a:bodyPr/>
+                    <a:lstStyle/>
+                    <a:p>
+                      <a:r>
+                        <a:rPr lang="en-US" sz="1600" dirty="0" smtClean="0"/>
+                        <a:t>0.12</a:t>
+                      </a:r>
+                      <a:endParaRPr lang="en-US" sz="1600" dirty="0"/>
+                    </a:p>
+                  </a:txBody>
+                  <a:tcPr/>
+                </a:tc>
+              </a:tr>
             </a:tbl>
           </a:graphicData>
         </a:graphic>
@@ -33600,13 +33814,13 @@
           <p:nvPr>
             <p:extLst>
               <p:ext uri="{D42A27DB-BD31-4B8C-83A1-F6EECF244321}">
-                <p14:modId xmlns:p14="http://schemas.microsoft.com/office/powerpoint/2010/main" val="1351358200"/>
+                <p14:modId xmlns:p14="http://schemas.microsoft.com/office/powerpoint/2010/main" val="150061507"/>
               </p:ext>
             </p:extLst>
           </p:nvPr>
         </p:nvGraphicFramePr>
         <p:xfrm>
-          <a:off x="4046531" y="3844979"/>
+          <a:off x="4046531" y="3970841"/>
           <a:ext cx="5013338" cy="2042971"/>
         </p:xfrm>
         <a:graphic>

</xml_diff>

<commit_message>
Fig 5b now turns to good
1) increase the TNF feedback strength by 4 fold (in the i(85)) so that
the later phase become good for tko NFkB
</commit_message>
<xml_diff>
--- a/TNF_Slides.pptx
+++ b/TNF_Slides.pptx
@@ -580,6 +580,98 @@
     <p:extLst>
       <p:ext uri="{BB962C8B-B14F-4D97-AF65-F5344CB8AC3E}">
         <p14:creationId xmlns:p14="http://schemas.microsoft.com/office/powerpoint/2010/main" val="1814554214"/>
+      </p:ext>
+    </p:extLst>
+  </p:cSld>
+  <p:clrMapOvr>
+    <a:masterClrMapping/>
+  </p:clrMapOvr>
+</p:notes>
+</file>
+
+<file path=ppt/notesSlides/notesSlide10.xml><?xml version="1.0" encoding="utf-8"?>
+<p:notes xmlns:a="http://schemas.openxmlformats.org/drawingml/2006/main" xmlns:r="http://schemas.openxmlformats.org/officeDocument/2006/relationships" xmlns:p="http://schemas.openxmlformats.org/presentationml/2006/main">
+  <p:cSld>
+    <p:spTree>
+      <p:nvGrpSpPr>
+        <p:cNvPr id="1" name=""/>
+        <p:cNvGrpSpPr/>
+        <p:nvPr/>
+      </p:nvGrpSpPr>
+      <p:grpSpPr>
+        <a:xfrm>
+          <a:off x="0" y="0"/>
+          <a:ext cx="0" cy="0"/>
+          <a:chOff x="0" y="0"/>
+          <a:chExt cx="0" cy="0"/>
+        </a:xfrm>
+      </p:grpSpPr>
+      <p:sp>
+        <p:nvSpPr>
+          <p:cNvPr id="2" name="Slide Image Placeholder 1"/>
+          <p:cNvSpPr>
+            <a:spLocks noGrp="1" noRot="1" noChangeAspect="1"/>
+          </p:cNvSpPr>
+          <p:nvPr>
+            <p:ph type="sldImg"/>
+          </p:nvPr>
+        </p:nvSpPr>
+        <p:spPr/>
+      </p:sp>
+      <p:sp>
+        <p:nvSpPr>
+          <p:cNvPr id="3" name="Notes Placeholder 2"/>
+          <p:cNvSpPr>
+            <a:spLocks noGrp="1"/>
+          </p:cNvSpPr>
+          <p:nvPr>
+            <p:ph type="body" idx="1"/>
+          </p:nvPr>
+        </p:nvSpPr>
+        <p:spPr/>
+        <p:txBody>
+          <a:bodyPr/>
+          <a:lstStyle/>
+          <a:p>
+            <a:r>
+              <a:rPr lang="en-US" dirty="0" err="1" smtClean="0"/>
+              <a:t>TNFr</a:t>
+            </a:r>
+            <a:r>
+              <a:rPr lang="en-US" dirty="0" smtClean="0"/>
+              <a:t> synthesis </a:t>
+            </a:r>
+            <a:endParaRPr lang="en-US" dirty="0"/>
+          </a:p>
+        </p:txBody>
+      </p:sp>
+      <p:sp>
+        <p:nvSpPr>
+          <p:cNvPr id="4" name="Slide Number Placeholder 3"/>
+          <p:cNvSpPr>
+            <a:spLocks noGrp="1"/>
+          </p:cNvSpPr>
+          <p:nvPr>
+            <p:ph type="sldNum" sz="quarter" idx="10"/>
+          </p:nvPr>
+        </p:nvSpPr>
+        <p:spPr/>
+        <p:txBody>
+          <a:bodyPr/>
+          <a:lstStyle/>
+          <a:p>
+            <a:fld id="{837A9C9D-08EC-C64D-9F61-949AA1F45D5D}" type="slidenum">
+              <a:rPr lang="en-US" smtClean="0"/>
+              <a:t>13</a:t>
+            </a:fld>
+            <a:endParaRPr lang="en-US"/>
+          </a:p>
+        </p:txBody>
+      </p:sp>
+    </p:spTree>
+    <p:extLst>
+      <p:ext uri="{BB962C8B-B14F-4D97-AF65-F5344CB8AC3E}">
+        <p14:creationId xmlns:p14="http://schemas.microsoft.com/office/powerpoint/2010/main" val="1738040238"/>
       </p:ext>
     </p:extLst>
   </p:cSld>
@@ -1385,15 +1477,7 @@
           <a:p>
             <a:r>
               <a:rPr lang="en-US" dirty="0" smtClean="0"/>
-              <a:t>f(</a:t>
-            </a:r>
-            <a:r>
-              <a:rPr lang="en-US" dirty="0" err="1" smtClean="0"/>
-              <a:t>NFkB</a:t>
-            </a:r>
-            <a:r>
-              <a:rPr lang="en-US" dirty="0" smtClean="0"/>
-              <a:t>)</a:t>
+              <a:t>Tw</a:t>
             </a:r>
             <a:endParaRPr lang="en-US" dirty="0"/>
           </a:p>
@@ -1414,9 +1498,9 @@
           <a:bodyPr/>
           <a:lstStyle/>
           <a:p>
-            <a:fld id="{837A9C9D-08EC-C64D-9F61-949AA1F45D5D}" type="slidenum">
+            <a:fld id="{713CF423-7E80-1241-A999-021D08102ECF}" type="slidenum">
               <a:rPr lang="en-US" smtClean="0"/>
-              <a:t>12</a:t>
+              <a:t>11</a:t>
             </a:fld>
             <a:endParaRPr lang="en-US"/>
           </a:p>
@@ -1425,7 +1509,7 @@
     </p:spTree>
     <p:extLst>
       <p:ext uri="{BB962C8B-B14F-4D97-AF65-F5344CB8AC3E}">
-        <p14:creationId xmlns:p14="http://schemas.microsoft.com/office/powerpoint/2010/main" val="1738040238"/>
+        <p14:creationId xmlns:p14="http://schemas.microsoft.com/office/powerpoint/2010/main" val="3079422344"/>
       </p:ext>
     </p:extLst>
   </p:cSld>
@@ -1480,14 +1564,63 @@
           <a:lstStyle/>
           <a:p>
             <a:r>
-              <a:rPr lang="en-US" dirty="0" err="1" smtClean="0"/>
-              <a:t>TNFr</a:t>
+              <a:rPr lang="en-US" dirty="0" smtClean="0"/>
+              <a:t>Two ways of match</a:t>
             </a:r>
             <a:r>
-              <a:rPr lang="en-US" dirty="0" smtClean="0"/>
-              <a:t> synthesis </a:t>
+              <a:rPr lang="en-US" baseline="0" dirty="0" smtClean="0"/>
+              <a:t> mRNA and nascent profiles:</a:t>
             </a:r>
-            <a:endParaRPr lang="en-US" dirty="0"/>
+          </a:p>
+          <a:p>
+            <a:pPr marL="228600" indent="-228600">
+              <a:buAutoNum type="arabicPeriod"/>
+            </a:pPr>
+            <a:r>
+              <a:rPr lang="en-US" baseline="0" dirty="0" smtClean="0"/>
+              <a:t>Increase the contribution of TNF feedback to the </a:t>
+            </a:r>
+            <a:r>
+              <a:rPr lang="en-US" baseline="0" dirty="0" err="1" smtClean="0"/>
+              <a:t>tko</a:t>
+            </a:r>
+            <a:r>
+              <a:rPr lang="en-US" baseline="0" dirty="0" smtClean="0"/>
+              <a:t> late phase </a:t>
+            </a:r>
+          </a:p>
+          <a:p>
+            <a:pPr marL="228600" indent="-228600">
+              <a:buAutoNum type="arabicPeriod"/>
+            </a:pPr>
+            <a:r>
+              <a:rPr lang="en-US" baseline="0" dirty="0" smtClean="0"/>
+              <a:t>Adjust the </a:t>
+            </a:r>
+            <a:r>
+              <a:rPr lang="en-US" baseline="0" dirty="0" err="1" smtClean="0"/>
+              <a:t>NFkB</a:t>
+            </a:r>
+            <a:r>
+              <a:rPr lang="en-US" baseline="0" dirty="0" smtClean="0"/>
+              <a:t> threshold changes in the </a:t>
+            </a:r>
+            <a:r>
+              <a:rPr lang="en-US" baseline="0" dirty="0" err="1" smtClean="0"/>
+              <a:t>mko</a:t>
+            </a:r>
+            <a:r>
+              <a:rPr lang="en-US" baseline="0" dirty="0" smtClean="0"/>
+              <a:t> with processing rate changes in </a:t>
+            </a:r>
+            <a:r>
+              <a:rPr lang="en-US" baseline="0" dirty="0" err="1" smtClean="0"/>
+              <a:t>mko</a:t>
+            </a:r>
+            <a:r>
+              <a:rPr lang="en-US" baseline="0" smtClean="0"/>
+              <a:t>. </a:t>
+            </a:r>
           </a:p>
         </p:txBody>
       </p:sp>
@@ -1508,7 +1641,7 @@
           <a:p>
             <a:fld id="{837A9C9D-08EC-C64D-9F61-949AA1F45D5D}" type="slidenum">
               <a:rPr lang="en-US" smtClean="0"/>
-              <a:t>13</a:t>
+              <a:t>12</a:t>
             </a:fld>
             <a:endParaRPr lang="en-US"/>
           </a:p>
@@ -11402,7 +11535,7 @@
         </p:blipFill>
         <p:spPr>
           <a:xfrm>
-            <a:off x="-167044" y="331816"/>
+            <a:off x="-350100" y="331816"/>
             <a:ext cx="5299364" cy="6858000"/>
           </a:xfrm>
           <a:prstGeom prst="rect">
@@ -11479,7 +11612,7 @@
         <p:spPr>
           <a:xfrm>
             <a:off x="510135" y="123487"/>
-            <a:ext cx="2039441" cy="461665"/>
+            <a:ext cx="4056670" cy="461665"/>
           </a:xfrm>
           <a:prstGeom prst="rect">
             <a:avLst/>
@@ -11493,7 +11626,27 @@
           <a:p>
             <a:r>
               <a:rPr lang="en-US" sz="2400" b="1" dirty="0" smtClean="0"/>
-              <a:t>Module  1 to 3</a:t>
+              <a:t>Module  1 to 3 (</a:t>
+            </a:r>
+            <a:r>
+              <a:rPr lang="en-US" sz="2400" b="1" dirty="0" err="1" smtClean="0">
+                <a:solidFill>
+                  <a:srgbClr val="0000FF"/>
+                </a:solidFill>
+              </a:rPr>
+              <a:t>NFkB</a:t>
+            </a:r>
+            <a:r>
+              <a:rPr lang="en-US" sz="2400" b="1" dirty="0" smtClean="0">
+                <a:solidFill>
+                  <a:srgbClr val="0000FF"/>
+                </a:solidFill>
+              </a:rPr>
+              <a:t> as input</a:t>
+            </a:r>
+            <a:r>
+              <a:rPr lang="en-US" sz="2400" b="1" dirty="0" smtClean="0"/>
+              <a:t>)</a:t>
             </a:r>
             <a:endParaRPr lang="en-US" sz="2400" b="1" dirty="0"/>
           </a:p>
@@ -11508,7 +11661,7 @@
           <p:nvPr/>
         </p:nvPicPr>
         <p:blipFill rotWithShape="1">
-          <a:blip r:embed="rId2">
+          <a:blip r:embed="rId3">
             <a:extLst>
               <a:ext uri="{28A0092B-C50C-407E-A947-70E740481C1C}">
                 <a14:useLocalDpi xmlns:a14="http://schemas.microsoft.com/office/drawing/2010/main" val="0"/>
@@ -11520,7 +11673,7 @@
         </p:blipFill>
         <p:spPr>
           <a:xfrm>
-            <a:off x="801956" y="1291745"/>
+            <a:off x="0" y="1291745"/>
             <a:ext cx="7013814" cy="4572000"/>
           </a:xfrm>
           <a:prstGeom prst="rect">
@@ -11528,6 +11681,935 @@
           </a:prstGeom>
         </p:spPr>
       </p:pic>
+      <p:graphicFrame>
+        <p:nvGraphicFramePr>
+          <p:cNvPr id="8" name="Table 7"/>
+          <p:cNvGraphicFramePr>
+            <a:graphicFrameLocks noGrp="1"/>
+          </p:cNvGraphicFramePr>
+          <p:nvPr>
+            <p:extLst>
+              <p:ext uri="{D42A27DB-BD31-4B8C-83A1-F6EECF244321}">
+                <p14:modId xmlns:p14="http://schemas.microsoft.com/office/powerpoint/2010/main" val="2958796743"/>
+              </p:ext>
+            </p:extLst>
+          </p:nvPr>
+        </p:nvGraphicFramePr>
+        <p:xfrm>
+          <a:off x="7324448" y="1397000"/>
+          <a:ext cx="1590182" cy="5191760"/>
+        </p:xfrm>
+        <a:graphic>
+          <a:graphicData uri="http://schemas.openxmlformats.org/drawingml/2006/table">
+            <a:tbl>
+              <a:tblPr firstRow="1" bandRow="1">
+                <a:tableStyleId>{5C22544A-7EE6-4342-B048-85BDC9FD1C3A}</a:tableStyleId>
+              </a:tblPr>
+              <a:tblGrid>
+                <a:gridCol w="179884"/>
+                <a:gridCol w="815380"/>
+                <a:gridCol w="594918"/>
+              </a:tblGrid>
+              <a:tr h="370840">
+                <a:tc>
+                  <a:txBody>
+                    <a:bodyPr/>
+                    <a:lstStyle/>
+                    <a:p>
+                      <a:pPr algn="r" fontAlgn="b"/>
+                      <a:r>
+                        <a:rPr lang="en-US" sz="1200" b="1" i="0" u="none" strike="noStrike" dirty="0" smtClean="0">
+                          <a:solidFill>
+                            <a:srgbClr val="000000"/>
+                          </a:solidFill>
+                          <a:effectLst/>
+                          <a:latin typeface="Calibri"/>
+                        </a:rPr>
+                        <a:t>ID</a:t>
+                      </a:r>
+                      <a:endParaRPr lang="en-US" sz="1200" b="1" i="0" u="none" strike="noStrike" dirty="0">
+                        <a:solidFill>
+                          <a:srgbClr val="000000"/>
+                        </a:solidFill>
+                        <a:effectLst/>
+                        <a:latin typeface="Calibri"/>
+                      </a:endParaRPr>
+                    </a:p>
+                  </a:txBody>
+                  <a:tcPr marL="12700" marR="12700" marT="12700" marB="0" anchor="b"/>
+                </a:tc>
+                <a:tc>
+                  <a:txBody>
+                    <a:bodyPr/>
+                    <a:lstStyle/>
+                    <a:p>
+                      <a:pPr algn="l" fontAlgn="b"/>
+                      <a:r>
+                        <a:rPr lang="en-US" sz="1200" b="1" i="0" u="none" strike="noStrike" dirty="0" smtClean="0">
+                          <a:solidFill>
+                            <a:srgbClr val="000000"/>
+                          </a:solidFill>
+                          <a:effectLst/>
+                          <a:latin typeface="Calibri"/>
+                        </a:rPr>
+                        <a:t>Name</a:t>
+                      </a:r>
+                      <a:endParaRPr lang="en-US" sz="1200" b="1" i="0" u="none" strike="noStrike" dirty="0">
+                        <a:solidFill>
+                          <a:srgbClr val="000000"/>
+                        </a:solidFill>
+                        <a:effectLst/>
+                        <a:latin typeface="Calibri"/>
+                      </a:endParaRPr>
+                    </a:p>
+                  </a:txBody>
+                  <a:tcPr marL="12700" marR="12700" marT="12700" marB="0" anchor="b"/>
+                </a:tc>
+                <a:tc>
+                  <a:txBody>
+                    <a:bodyPr/>
+                    <a:lstStyle/>
+                    <a:p>
+                      <a:pPr algn="r" fontAlgn="b"/>
+                      <a:r>
+                        <a:rPr lang="en-US" sz="1200" b="1" i="0" u="none" strike="noStrike" dirty="0" smtClean="0">
+                          <a:solidFill>
+                            <a:srgbClr val="000000"/>
+                          </a:solidFill>
+                          <a:effectLst/>
+                          <a:latin typeface="Calibri"/>
+                        </a:rPr>
+                        <a:t>Values</a:t>
+                      </a:r>
+                      <a:endParaRPr lang="en-US" sz="1200" b="1" i="0" u="none" strike="noStrike" dirty="0">
+                        <a:solidFill>
+                          <a:srgbClr val="000000"/>
+                        </a:solidFill>
+                        <a:effectLst/>
+                        <a:latin typeface="Calibri"/>
+                      </a:endParaRPr>
+                    </a:p>
+                  </a:txBody>
+                  <a:tcPr marL="12700" marR="12700" marT="12700" marB="0" anchor="b"/>
+                </a:tc>
+              </a:tr>
+              <a:tr h="370840">
+                <a:tc>
+                  <a:txBody>
+                    <a:bodyPr/>
+                    <a:lstStyle/>
+                    <a:p>
+                      <a:pPr algn="r" fontAlgn="b"/>
+                      <a:r>
+                        <a:rPr lang="en-US" sz="1200" b="0" i="0" u="none" strike="noStrike" dirty="0">
+                          <a:solidFill>
+                            <a:srgbClr val="000000"/>
+                          </a:solidFill>
+                          <a:effectLst/>
+                          <a:latin typeface="Calibri"/>
+                        </a:rPr>
+                        <a:t>1</a:t>
+                      </a:r>
+                    </a:p>
+                  </a:txBody>
+                  <a:tcPr marL="12700" marR="12700" marT="12700" marB="0" anchor="b"/>
+                </a:tc>
+                <a:tc>
+                  <a:txBody>
+                    <a:bodyPr/>
+                    <a:lstStyle/>
+                    <a:p>
+                      <a:pPr algn="l" fontAlgn="b"/>
+                      <a:r>
+                        <a:rPr lang="en-US" sz="1200" b="0" i="0" u="none" strike="noStrike">
+                          <a:solidFill>
+                            <a:srgbClr val="000000"/>
+                          </a:solidFill>
+                          <a:effectLst/>
+                          <a:latin typeface="Calibri"/>
+                        </a:rPr>
+                        <a:t>Km_tr</a:t>
+                      </a:r>
+                    </a:p>
+                  </a:txBody>
+                  <a:tcPr marL="12700" marR="12700" marT="12700" marB="0" anchor="b"/>
+                </a:tc>
+                <a:tc>
+                  <a:txBody>
+                    <a:bodyPr/>
+                    <a:lstStyle/>
+                    <a:p>
+                      <a:pPr algn="r" fontAlgn="b"/>
+                      <a:r>
+                        <a:rPr lang="en-US" sz="1200" b="0" i="0" u="none" strike="noStrike">
+                          <a:solidFill>
+                            <a:srgbClr val="000000"/>
+                          </a:solidFill>
+                          <a:effectLst/>
+                          <a:latin typeface="Calibri"/>
+                        </a:rPr>
+                        <a:t>0.65</a:t>
+                      </a:r>
+                    </a:p>
+                  </a:txBody>
+                  <a:tcPr marL="12700" marR="12700" marT="12700" marB="0" anchor="b"/>
+                </a:tc>
+              </a:tr>
+              <a:tr h="370840">
+                <a:tc>
+                  <a:txBody>
+                    <a:bodyPr/>
+                    <a:lstStyle/>
+                    <a:p>
+                      <a:pPr algn="r" fontAlgn="b"/>
+                      <a:r>
+                        <a:rPr lang="en-US" sz="1200" b="0" i="0" u="none" strike="noStrike">
+                          <a:solidFill>
+                            <a:srgbClr val="000000"/>
+                          </a:solidFill>
+                          <a:effectLst/>
+                          <a:latin typeface="Calibri"/>
+                        </a:rPr>
+                        <a:t>2</a:t>
+                      </a:r>
+                    </a:p>
+                  </a:txBody>
+                  <a:tcPr marL="12700" marR="12700" marT="12700" marB="0" anchor="b"/>
+                </a:tc>
+                <a:tc>
+                  <a:txBody>
+                    <a:bodyPr/>
+                    <a:lstStyle/>
+                    <a:p>
+                      <a:pPr algn="l" fontAlgn="b"/>
+                      <a:r>
+                        <a:rPr lang="en-US" sz="1200" b="0" i="0" u="none" strike="noStrike">
+                          <a:solidFill>
+                            <a:srgbClr val="000000"/>
+                          </a:solidFill>
+                          <a:effectLst/>
+                          <a:latin typeface="Calibri"/>
+                        </a:rPr>
+                        <a:t>Km_tr_fold</a:t>
+                      </a:r>
+                    </a:p>
+                  </a:txBody>
+                  <a:tcPr marL="12700" marR="12700" marT="12700" marB="0" anchor="b"/>
+                </a:tc>
+                <a:tc>
+                  <a:txBody>
+                    <a:bodyPr/>
+                    <a:lstStyle/>
+                    <a:p>
+                      <a:pPr algn="r" fontAlgn="b"/>
+                      <a:r>
+                        <a:rPr lang="en-US" sz="1200" b="0" i="0" u="none" strike="noStrike">
+                          <a:solidFill>
+                            <a:srgbClr val="000000"/>
+                          </a:solidFill>
+                          <a:effectLst/>
+                          <a:latin typeface="Calibri"/>
+                        </a:rPr>
+                        <a:t>2</a:t>
+                      </a:r>
+                    </a:p>
+                  </a:txBody>
+                  <a:tcPr marL="12700" marR="12700" marT="12700" marB="0" anchor="b"/>
+                </a:tc>
+              </a:tr>
+              <a:tr h="370840">
+                <a:tc>
+                  <a:txBody>
+                    <a:bodyPr/>
+                    <a:lstStyle/>
+                    <a:p>
+                      <a:pPr algn="r" fontAlgn="b"/>
+                      <a:r>
+                        <a:rPr lang="en-US" sz="1200" b="0" i="0" u="none" strike="noStrike">
+                          <a:solidFill>
+                            <a:srgbClr val="000000"/>
+                          </a:solidFill>
+                          <a:effectLst/>
+                          <a:latin typeface="Calibri"/>
+                        </a:rPr>
+                        <a:t>3</a:t>
+                      </a:r>
+                    </a:p>
+                  </a:txBody>
+                  <a:tcPr marL="12700" marR="12700" marT="12700" marB="0" anchor="b"/>
+                </a:tc>
+                <a:tc>
+                  <a:txBody>
+                    <a:bodyPr/>
+                    <a:lstStyle/>
+                    <a:p>
+                      <a:pPr algn="l" fontAlgn="b"/>
+                      <a:r>
+                        <a:rPr lang="en-US" sz="1200" b="0" i="0" u="none" strike="noStrike">
+                          <a:solidFill>
+                            <a:srgbClr val="000000"/>
+                          </a:solidFill>
+                          <a:effectLst/>
+                          <a:latin typeface="Calibri"/>
+                        </a:rPr>
+                        <a:t>V_tr</a:t>
+                      </a:r>
+                    </a:p>
+                  </a:txBody>
+                  <a:tcPr marL="12700" marR="12700" marT="12700" marB="0" anchor="b"/>
+                </a:tc>
+                <a:tc>
+                  <a:txBody>
+                    <a:bodyPr/>
+                    <a:lstStyle/>
+                    <a:p>
+                      <a:pPr algn="r" fontAlgn="b"/>
+                      <a:r>
+                        <a:rPr lang="en-US" sz="1200" b="0" i="0" u="none" strike="noStrike">
+                          <a:solidFill>
+                            <a:srgbClr val="000000"/>
+                          </a:solidFill>
+                          <a:effectLst/>
+                          <a:latin typeface="Calibri"/>
+                        </a:rPr>
+                        <a:t>1</a:t>
+                      </a:r>
+                    </a:p>
+                  </a:txBody>
+                  <a:tcPr marL="12700" marR="12700" marT="12700" marB="0" anchor="b"/>
+                </a:tc>
+              </a:tr>
+              <a:tr h="370840">
+                <a:tc>
+                  <a:txBody>
+                    <a:bodyPr/>
+                    <a:lstStyle/>
+                    <a:p>
+                      <a:pPr algn="r" fontAlgn="b"/>
+                      <a:r>
+                        <a:rPr lang="en-US" sz="1200" b="0" i="0" u="none" strike="noStrike">
+                          <a:solidFill>
+                            <a:srgbClr val="000000"/>
+                          </a:solidFill>
+                          <a:effectLst/>
+                          <a:latin typeface="Calibri"/>
+                        </a:rPr>
+                        <a:t>4</a:t>
+                      </a:r>
+                    </a:p>
+                  </a:txBody>
+                  <a:tcPr marL="12700" marR="12700" marT="12700" marB="0" anchor="b"/>
+                </a:tc>
+                <a:tc>
+                  <a:txBody>
+                    <a:bodyPr/>
+                    <a:lstStyle/>
+                    <a:p>
+                      <a:pPr algn="l" fontAlgn="b"/>
+                      <a:r>
+                        <a:rPr lang="en-US" sz="1200" b="0" i="0" u="none" strike="noStrike">
+                          <a:solidFill>
+                            <a:srgbClr val="000000"/>
+                          </a:solidFill>
+                          <a:effectLst/>
+                          <a:latin typeface="Calibri"/>
+                        </a:rPr>
+                        <a:t>k_pr</a:t>
+                      </a:r>
+                    </a:p>
+                  </a:txBody>
+                  <a:tcPr marL="12700" marR="12700" marT="12700" marB="0" anchor="b"/>
+                </a:tc>
+                <a:tc>
+                  <a:txBody>
+                    <a:bodyPr/>
+                    <a:lstStyle/>
+                    <a:p>
+                      <a:pPr algn="r" fontAlgn="b"/>
+                      <a:r>
+                        <a:rPr lang="en-US" sz="1200" b="0" i="0" u="none" strike="noStrike" dirty="0">
+                          <a:solidFill>
+                            <a:srgbClr val="000000"/>
+                          </a:solidFill>
+                          <a:effectLst/>
+                          <a:latin typeface="Calibri"/>
+                        </a:rPr>
+                        <a:t>0.4</a:t>
+                      </a:r>
+                    </a:p>
+                  </a:txBody>
+                  <a:tcPr marL="12700" marR="12700" marT="12700" marB="0" anchor="b"/>
+                </a:tc>
+              </a:tr>
+              <a:tr h="370840">
+                <a:tc>
+                  <a:txBody>
+                    <a:bodyPr/>
+                    <a:lstStyle/>
+                    <a:p>
+                      <a:pPr algn="r" fontAlgn="b"/>
+                      <a:r>
+                        <a:rPr lang="en-US" sz="1200" b="0" i="0" u="none" strike="noStrike">
+                          <a:solidFill>
+                            <a:srgbClr val="000000"/>
+                          </a:solidFill>
+                          <a:effectLst/>
+                          <a:latin typeface="Calibri"/>
+                        </a:rPr>
+                        <a:t>5</a:t>
+                      </a:r>
+                    </a:p>
+                  </a:txBody>
+                  <a:tcPr marL="12700" marR="12700" marT="12700" marB="0" anchor="b"/>
+                </a:tc>
+                <a:tc>
+                  <a:txBody>
+                    <a:bodyPr/>
+                    <a:lstStyle/>
+                    <a:p>
+                      <a:pPr algn="l" fontAlgn="b"/>
+                      <a:r>
+                        <a:rPr lang="en-US" sz="1200" b="0" i="0" u="none" strike="noStrike">
+                          <a:solidFill>
+                            <a:srgbClr val="000000"/>
+                          </a:solidFill>
+                          <a:effectLst/>
+                          <a:latin typeface="Calibri"/>
+                        </a:rPr>
+                        <a:t>k_sec</a:t>
+                      </a:r>
+                    </a:p>
+                  </a:txBody>
+                  <a:tcPr marL="12700" marR="12700" marT="12700" marB="0" anchor="b"/>
+                </a:tc>
+                <a:tc>
+                  <a:txBody>
+                    <a:bodyPr/>
+                    <a:lstStyle/>
+                    <a:p>
+                      <a:pPr algn="r" fontAlgn="b"/>
+                      <a:r>
+                        <a:rPr lang="en-US" sz="1200" b="0" i="0" u="none" strike="noStrike">
+                          <a:solidFill>
+                            <a:srgbClr val="000000"/>
+                          </a:solidFill>
+                          <a:effectLst/>
+                          <a:latin typeface="Calibri"/>
+                        </a:rPr>
+                        <a:t>0.07</a:t>
+                      </a:r>
+                    </a:p>
+                  </a:txBody>
+                  <a:tcPr marL="12700" marR="12700" marT="12700" marB="0" anchor="b"/>
+                </a:tc>
+              </a:tr>
+              <a:tr h="370840">
+                <a:tc>
+                  <a:txBody>
+                    <a:bodyPr/>
+                    <a:lstStyle/>
+                    <a:p>
+                      <a:pPr algn="r" fontAlgn="b"/>
+                      <a:r>
+                        <a:rPr lang="en-US" sz="1200" b="0" i="0" u="none" strike="noStrike">
+                          <a:solidFill>
+                            <a:srgbClr val="000000"/>
+                          </a:solidFill>
+                          <a:effectLst/>
+                          <a:latin typeface="Calibri"/>
+                        </a:rPr>
+                        <a:t>6</a:t>
+                      </a:r>
+                    </a:p>
+                  </a:txBody>
+                  <a:tcPr marL="12700" marR="12700" marT="12700" marB="0" anchor="b"/>
+                </a:tc>
+                <a:tc>
+                  <a:txBody>
+                    <a:bodyPr/>
+                    <a:lstStyle/>
+                    <a:p>
+                      <a:pPr algn="l" fontAlgn="b"/>
+                      <a:r>
+                        <a:rPr lang="en-US" sz="1200" b="0" i="0" u="none" strike="noStrike">
+                          <a:solidFill>
+                            <a:srgbClr val="000000"/>
+                          </a:solidFill>
+                          <a:effectLst/>
+                          <a:latin typeface="Calibri"/>
+                        </a:rPr>
+                        <a:t>k_tl</a:t>
+                      </a:r>
+                    </a:p>
+                  </a:txBody>
+                  <a:tcPr marL="12700" marR="12700" marT="12700" marB="0" anchor="b"/>
+                </a:tc>
+                <a:tc>
+                  <a:txBody>
+                    <a:bodyPr/>
+                    <a:lstStyle/>
+                    <a:p>
+                      <a:pPr algn="r" fontAlgn="b"/>
+                      <a:r>
+                        <a:rPr lang="en-US" sz="1200" b="0" i="0" u="none" strike="noStrike">
+                          <a:solidFill>
+                            <a:srgbClr val="000000"/>
+                          </a:solidFill>
+                          <a:effectLst/>
+                          <a:latin typeface="Calibri"/>
+                        </a:rPr>
+                        <a:t>0.05</a:t>
+                      </a:r>
+                    </a:p>
+                  </a:txBody>
+                  <a:tcPr marL="12700" marR="12700" marT="12700" marB="0" anchor="b"/>
+                </a:tc>
+              </a:tr>
+              <a:tr h="370840">
+                <a:tc>
+                  <a:txBody>
+                    <a:bodyPr/>
+                    <a:lstStyle/>
+                    <a:p>
+                      <a:pPr algn="r" fontAlgn="b"/>
+                      <a:r>
+                        <a:rPr lang="en-US" sz="1200" b="0" i="0" u="none" strike="noStrike">
+                          <a:solidFill>
+                            <a:srgbClr val="000000"/>
+                          </a:solidFill>
+                          <a:effectLst/>
+                          <a:latin typeface="Calibri"/>
+                        </a:rPr>
+                        <a:t>7</a:t>
+                      </a:r>
+                    </a:p>
+                  </a:txBody>
+                  <a:tcPr marL="12700" marR="12700" marT="12700" marB="0" anchor="b"/>
+                </a:tc>
+                <a:tc>
+                  <a:txBody>
+                    <a:bodyPr/>
+                    <a:lstStyle/>
+                    <a:p>
+                      <a:pPr algn="l" fontAlgn="b"/>
+                      <a:r>
+                        <a:rPr lang="en-US" sz="1200" b="0" i="0" u="none" strike="noStrike" dirty="0" err="1">
+                          <a:solidFill>
+                            <a:srgbClr val="000000"/>
+                          </a:solidFill>
+                          <a:effectLst/>
+                          <a:latin typeface="Calibri"/>
+                        </a:rPr>
+                        <a:t>kdeg_m</a:t>
+                      </a:r>
+                      <a:endParaRPr lang="en-US" sz="1200" b="0" i="0" u="none" strike="noStrike" dirty="0">
+                        <a:solidFill>
+                          <a:srgbClr val="000000"/>
+                        </a:solidFill>
+                        <a:effectLst/>
+                        <a:latin typeface="Calibri"/>
+                      </a:endParaRPr>
+                    </a:p>
+                  </a:txBody>
+                  <a:tcPr marL="12700" marR="12700" marT="12700" marB="0" anchor="b"/>
+                </a:tc>
+                <a:tc>
+                  <a:txBody>
+                    <a:bodyPr/>
+                    <a:lstStyle/>
+                    <a:p>
+                      <a:pPr algn="r" fontAlgn="b"/>
+                      <a:r>
+                        <a:rPr lang="en-US" sz="1200" b="0" i="0" u="none" strike="noStrike">
+                          <a:solidFill>
+                            <a:srgbClr val="000000"/>
+                          </a:solidFill>
+                          <a:effectLst/>
+                          <a:latin typeface="Calibri"/>
+                        </a:rPr>
+                        <a:t>0.02</a:t>
+                      </a:r>
+                    </a:p>
+                  </a:txBody>
+                  <a:tcPr marL="12700" marR="12700" marT="12700" marB="0" anchor="b"/>
+                </a:tc>
+              </a:tr>
+              <a:tr h="370840">
+                <a:tc>
+                  <a:txBody>
+                    <a:bodyPr/>
+                    <a:lstStyle/>
+                    <a:p>
+                      <a:pPr algn="r" fontAlgn="b"/>
+                      <a:r>
+                        <a:rPr lang="en-US" sz="1200" b="0" i="0" u="none" strike="noStrike">
+                          <a:solidFill>
+                            <a:srgbClr val="000000"/>
+                          </a:solidFill>
+                          <a:effectLst/>
+                          <a:latin typeface="Calibri"/>
+                        </a:rPr>
+                        <a:t>8</a:t>
+                      </a:r>
+                    </a:p>
+                  </a:txBody>
+                  <a:tcPr marL="12700" marR="12700" marT="12700" marB="0" anchor="b"/>
+                </a:tc>
+                <a:tc>
+                  <a:txBody>
+                    <a:bodyPr/>
+                    <a:lstStyle/>
+                    <a:p>
+                      <a:pPr algn="l" fontAlgn="b"/>
+                      <a:r>
+                        <a:rPr lang="en-US" sz="1200" b="0" i="0" u="none" strike="noStrike">
+                          <a:solidFill>
+                            <a:srgbClr val="000000"/>
+                          </a:solidFill>
+                          <a:effectLst/>
+                          <a:latin typeface="Calibri"/>
+                        </a:rPr>
+                        <a:t>kdeg_p</a:t>
+                      </a:r>
+                    </a:p>
+                  </a:txBody>
+                  <a:tcPr marL="12700" marR="12700" marT="12700" marB="0" anchor="b"/>
+                </a:tc>
+                <a:tc>
+                  <a:txBody>
+                    <a:bodyPr/>
+                    <a:lstStyle/>
+                    <a:p>
+                      <a:pPr algn="r" fontAlgn="b"/>
+                      <a:r>
+                        <a:rPr lang="en-US" sz="1200" b="0" i="0" u="none" strike="noStrike">
+                          <a:solidFill>
+                            <a:srgbClr val="000000"/>
+                          </a:solidFill>
+                          <a:effectLst/>
+                          <a:latin typeface="Calibri"/>
+                        </a:rPr>
+                        <a:t>0.07</a:t>
+                      </a:r>
+                    </a:p>
+                  </a:txBody>
+                  <a:tcPr marL="12700" marR="12700" marT="12700" marB="0" anchor="b"/>
+                </a:tc>
+              </a:tr>
+              <a:tr h="370840">
+                <a:tc>
+                  <a:txBody>
+                    <a:bodyPr/>
+                    <a:lstStyle/>
+                    <a:p>
+                      <a:pPr algn="r" fontAlgn="b"/>
+                      <a:r>
+                        <a:rPr lang="en-US" sz="1200" b="0" i="0" u="none" strike="noStrike">
+                          <a:solidFill>
+                            <a:srgbClr val="000000"/>
+                          </a:solidFill>
+                          <a:effectLst/>
+                          <a:latin typeface="Calibri"/>
+                        </a:rPr>
+                        <a:t>9</a:t>
+                      </a:r>
+                    </a:p>
+                  </a:txBody>
+                  <a:tcPr marL="12700" marR="12700" marT="12700" marB="0" anchor="b"/>
+                </a:tc>
+                <a:tc>
+                  <a:txBody>
+                    <a:bodyPr/>
+                    <a:lstStyle/>
+                    <a:p>
+                      <a:pPr algn="l" fontAlgn="b"/>
+                      <a:r>
+                        <a:rPr lang="en-US" sz="1200" b="0" i="0" u="none" strike="noStrike">
+                          <a:solidFill>
+                            <a:srgbClr val="000000"/>
+                          </a:solidFill>
+                          <a:effectLst/>
+                          <a:latin typeface="Calibri"/>
+                        </a:rPr>
+                        <a:t>n</a:t>
+                      </a:r>
+                    </a:p>
+                  </a:txBody>
+                  <a:tcPr marL="12700" marR="12700" marT="12700" marB="0" anchor="b"/>
+                </a:tc>
+                <a:tc>
+                  <a:txBody>
+                    <a:bodyPr/>
+                    <a:lstStyle/>
+                    <a:p>
+                      <a:pPr algn="r" fontAlgn="b"/>
+                      <a:r>
+                        <a:rPr lang="en-US" sz="1200" b="0" i="0" u="none" strike="noStrike">
+                          <a:solidFill>
+                            <a:srgbClr val="000000"/>
+                          </a:solidFill>
+                          <a:effectLst/>
+                          <a:latin typeface="Calibri"/>
+                        </a:rPr>
+                        <a:t>2</a:t>
+                      </a:r>
+                    </a:p>
+                  </a:txBody>
+                  <a:tcPr marL="12700" marR="12700" marT="12700" marB="0" anchor="b"/>
+                </a:tc>
+              </a:tr>
+              <a:tr h="370840">
+                <a:tc>
+                  <a:txBody>
+                    <a:bodyPr/>
+                    <a:lstStyle/>
+                    <a:p>
+                      <a:pPr algn="r" fontAlgn="b"/>
+                      <a:r>
+                        <a:rPr lang="en-US" sz="1200" b="0" i="0" u="none" strike="noStrike">
+                          <a:solidFill>
+                            <a:srgbClr val="000000"/>
+                          </a:solidFill>
+                          <a:effectLst/>
+                          <a:latin typeface="Calibri"/>
+                        </a:rPr>
+                        <a:t>10</a:t>
+                      </a:r>
+                    </a:p>
+                  </a:txBody>
+                  <a:tcPr marL="12700" marR="12700" marT="12700" marB="0" anchor="b"/>
+                </a:tc>
+                <a:tc>
+                  <a:txBody>
+                    <a:bodyPr/>
+                    <a:lstStyle/>
+                    <a:p>
+                      <a:pPr algn="l" fontAlgn="b"/>
+                      <a:r>
+                        <a:rPr lang="en-US" sz="1200" b="0" i="0" u="none" strike="noStrike">
+                          <a:solidFill>
+                            <a:srgbClr val="000000"/>
+                          </a:solidFill>
+                          <a:effectLst/>
+                          <a:latin typeface="Calibri"/>
+                        </a:rPr>
+                        <a:t>pr_fold_mko</a:t>
+                      </a:r>
+                    </a:p>
+                  </a:txBody>
+                  <a:tcPr marL="12700" marR="12700" marT="12700" marB="0" anchor="b"/>
+                </a:tc>
+                <a:tc>
+                  <a:txBody>
+                    <a:bodyPr/>
+                    <a:lstStyle/>
+                    <a:p>
+                      <a:pPr algn="r" fontAlgn="b"/>
+                      <a:r>
+                        <a:rPr lang="en-US" sz="1200" b="0" i="0" u="none" strike="noStrike">
+                          <a:solidFill>
+                            <a:srgbClr val="000000"/>
+                          </a:solidFill>
+                          <a:effectLst/>
+                          <a:latin typeface="Calibri"/>
+                        </a:rPr>
+                        <a:t>4.2</a:t>
+                      </a:r>
+                    </a:p>
+                  </a:txBody>
+                  <a:tcPr marL="12700" marR="12700" marT="12700" marB="0" anchor="b"/>
+                </a:tc>
+              </a:tr>
+              <a:tr h="370840">
+                <a:tc>
+                  <a:txBody>
+                    <a:bodyPr/>
+                    <a:lstStyle/>
+                    <a:p>
+                      <a:pPr algn="r" fontAlgn="b"/>
+                      <a:r>
+                        <a:rPr lang="en-US" sz="1200" b="0" i="0" u="none" strike="noStrike">
+                          <a:solidFill>
+                            <a:srgbClr val="000000"/>
+                          </a:solidFill>
+                          <a:effectLst/>
+                          <a:latin typeface="Calibri"/>
+                        </a:rPr>
+                        <a:t>11</a:t>
+                      </a:r>
+                    </a:p>
+                  </a:txBody>
+                  <a:tcPr marL="12700" marR="12700" marT="12700" marB="0" anchor="b"/>
+                </a:tc>
+                <a:tc>
+                  <a:txBody>
+                    <a:bodyPr/>
+                    <a:lstStyle/>
+                    <a:p>
+                      <a:pPr algn="l" fontAlgn="b"/>
+                      <a:r>
+                        <a:rPr lang="en-US" sz="1200" b="0" i="0" u="none" strike="noStrike">
+                          <a:solidFill>
+                            <a:srgbClr val="000000"/>
+                          </a:solidFill>
+                          <a:effectLst/>
+                          <a:latin typeface="Calibri"/>
+                        </a:rPr>
+                        <a:t>pr_fold_tko</a:t>
+                      </a:r>
+                    </a:p>
+                  </a:txBody>
+                  <a:tcPr marL="12700" marR="12700" marT="12700" marB="0" anchor="b"/>
+                </a:tc>
+                <a:tc>
+                  <a:txBody>
+                    <a:bodyPr/>
+                    <a:lstStyle/>
+                    <a:p>
+                      <a:pPr algn="r" fontAlgn="b"/>
+                      <a:r>
+                        <a:rPr lang="en-US" sz="1200" b="0" i="0" u="none" strike="noStrike">
+                          <a:solidFill>
+                            <a:srgbClr val="000000"/>
+                          </a:solidFill>
+                          <a:effectLst/>
+                          <a:latin typeface="Calibri"/>
+                        </a:rPr>
+                        <a:t>1.5</a:t>
+                      </a:r>
+                    </a:p>
+                  </a:txBody>
+                  <a:tcPr marL="12700" marR="12700" marT="12700" marB="0" anchor="b"/>
+                </a:tc>
+              </a:tr>
+              <a:tr h="370840">
+                <a:tc>
+                  <a:txBody>
+                    <a:bodyPr/>
+                    <a:lstStyle/>
+                    <a:p>
+                      <a:pPr algn="r" fontAlgn="b"/>
+                      <a:r>
+                        <a:rPr lang="en-US" sz="1200" b="0" i="0" u="none" strike="noStrike">
+                          <a:solidFill>
+                            <a:srgbClr val="000000"/>
+                          </a:solidFill>
+                          <a:effectLst/>
+                          <a:latin typeface="Calibri"/>
+                        </a:rPr>
+                        <a:t>12</a:t>
+                      </a:r>
+                    </a:p>
+                  </a:txBody>
+                  <a:tcPr marL="12700" marR="12700" marT="12700" marB="0" anchor="b"/>
+                </a:tc>
+                <a:tc>
+                  <a:txBody>
+                    <a:bodyPr/>
+                    <a:lstStyle/>
+                    <a:p>
+                      <a:pPr algn="l" fontAlgn="b"/>
+                      <a:r>
+                        <a:rPr lang="en-US" sz="1200" b="0" i="0" u="none" strike="noStrike">
+                          <a:solidFill>
+                            <a:srgbClr val="000000"/>
+                          </a:solidFill>
+                          <a:effectLst/>
+                          <a:latin typeface="Calibri"/>
+                        </a:rPr>
+                        <a:t>sec_fold</a:t>
+                      </a:r>
+                    </a:p>
+                  </a:txBody>
+                  <a:tcPr marL="12700" marR="12700" marT="12700" marB="0" anchor="b"/>
+                </a:tc>
+                <a:tc>
+                  <a:txBody>
+                    <a:bodyPr/>
+                    <a:lstStyle/>
+                    <a:p>
+                      <a:pPr algn="r" fontAlgn="b"/>
+                      <a:r>
+                        <a:rPr lang="en-US" sz="1200" b="0" i="0" u="none" strike="noStrike">
+                          <a:solidFill>
+                            <a:srgbClr val="000000"/>
+                          </a:solidFill>
+                          <a:effectLst/>
+                          <a:latin typeface="Calibri"/>
+                        </a:rPr>
+                        <a:t>5</a:t>
+                      </a:r>
+                    </a:p>
+                  </a:txBody>
+                  <a:tcPr marL="12700" marR="12700" marT="12700" marB="0" anchor="b"/>
+                </a:tc>
+              </a:tr>
+              <a:tr h="370840">
+                <a:tc>
+                  <a:txBody>
+                    <a:bodyPr/>
+                    <a:lstStyle/>
+                    <a:p>
+                      <a:pPr algn="r" fontAlgn="b"/>
+                      <a:r>
+                        <a:rPr lang="en-US" sz="1200" b="0" i="0" u="none" strike="noStrike">
+                          <a:solidFill>
+                            <a:srgbClr val="000000"/>
+                          </a:solidFill>
+                          <a:effectLst/>
+                          <a:latin typeface="Calibri"/>
+                        </a:rPr>
+                        <a:t>13</a:t>
+                      </a:r>
+                    </a:p>
+                  </a:txBody>
+                  <a:tcPr marL="12700" marR="12700" marT="12700" marB="0" anchor="b"/>
+                </a:tc>
+                <a:tc>
+                  <a:txBody>
+                    <a:bodyPr/>
+                    <a:lstStyle/>
+                    <a:p>
+                      <a:pPr algn="l" fontAlgn="b"/>
+                      <a:r>
+                        <a:rPr lang="en-US" sz="1200" b="0" i="0" u="none" strike="noStrike">
+                          <a:solidFill>
+                            <a:srgbClr val="000000"/>
+                          </a:solidFill>
+                          <a:effectLst/>
+                          <a:latin typeface="Calibri"/>
+                        </a:rPr>
+                        <a:t>tl_fold</a:t>
+                      </a:r>
+                    </a:p>
+                  </a:txBody>
+                  <a:tcPr marL="12700" marR="12700" marT="12700" marB="0" anchor="b"/>
+                </a:tc>
+                <a:tc>
+                  <a:txBody>
+                    <a:bodyPr/>
+                    <a:lstStyle/>
+                    <a:p>
+                      <a:pPr algn="r" fontAlgn="b"/>
+                      <a:r>
+                        <a:rPr lang="en-US" sz="1200" b="0" i="0" u="none" strike="noStrike" dirty="0">
+                          <a:solidFill>
+                            <a:srgbClr val="000000"/>
+                          </a:solidFill>
+                          <a:effectLst/>
+                          <a:latin typeface="Calibri"/>
+                        </a:rPr>
+                        <a:t>1.5</a:t>
+                      </a:r>
+                    </a:p>
+                  </a:txBody>
+                  <a:tcPr marL="12700" marR="12700" marT="12700" marB="0" anchor="b"/>
+                </a:tc>
+              </a:tr>
+            </a:tbl>
+          </a:graphicData>
+        </a:graphic>
+      </p:graphicFrame>
     </p:spTree>
     <p:extLst>
       <p:ext uri="{BB962C8B-B14F-4D97-AF65-F5344CB8AC3E}">
@@ -26394,7 +27476,7 @@
           <a:graphicData uri="http://schemas.openxmlformats.org/presentationml/2006/ole">
             <mc:AlternateContent xmlns:mc="http://schemas.openxmlformats.org/markup-compatibility/2006">
               <mc:Choice xmlns:v="urn:schemas-microsoft-com:vml" Requires="v">
-                <p:oleObj spid="_x0000_s12399" name="Equation" r:id="rId4" imgW="3022600" imgH="444500" progId="Equation.3">
+                <p:oleObj spid="_x0000_s12408" name="Equation" r:id="rId4" imgW="3022600" imgH="444500" progId="Equation.3">
                   <p:embed/>
                 </p:oleObj>
               </mc:Choice>
@@ -26451,7 +27533,7 @@
           <a:graphicData uri="http://schemas.openxmlformats.org/presentationml/2006/ole">
             <mc:AlternateContent xmlns:mc="http://schemas.openxmlformats.org/markup-compatibility/2006">
               <mc:Choice xmlns:v="urn:schemas-microsoft-com:vml" Requires="v">
-                <p:oleObj spid="_x0000_s12400" name="Equation" r:id="rId6" imgW="4635500" imgH="431800" progId="Equation.DSMT4">
+                <p:oleObj spid="_x0000_s12409" name="Equation" r:id="rId6" imgW="4635500" imgH="431800" progId="Equation.DSMT4">
                   <p:embed/>
                 </p:oleObj>
               </mc:Choice>
@@ -26508,7 +27590,7 @@
           <a:graphicData uri="http://schemas.openxmlformats.org/presentationml/2006/ole">
             <mc:AlternateContent xmlns:mc="http://schemas.openxmlformats.org/markup-compatibility/2006">
               <mc:Choice xmlns:v="urn:schemas-microsoft-com:vml" Requires="v">
-                <p:oleObj spid="_x0000_s12401" name="Equation" r:id="rId8" imgW="2197100" imgH="457200" progId="Equation.3">
+                <p:oleObj spid="_x0000_s12410" name="Equation" r:id="rId8" imgW="2197100" imgH="457200" progId="Equation.3">
                   <p:embed/>
                 </p:oleObj>
               </mc:Choice>
@@ -27573,7 +28655,7 @@
           <a:graphicData uri="http://schemas.openxmlformats.org/presentationml/2006/ole">
             <mc:AlternateContent xmlns:mc="http://schemas.openxmlformats.org/markup-compatibility/2006">
               <mc:Choice xmlns:v="urn:schemas-microsoft-com:vml" Requires="v">
-                <p:oleObj spid="_x0000_s13350" name="Equation" r:id="rId4" imgW="1790700" imgH="469900" progId="Equation.3">
+                <p:oleObj spid="_x0000_s13353" name="Equation" r:id="rId4" imgW="1790700" imgH="469900" progId="Equation.3">
                   <p:embed/>
                 </p:oleObj>
               </mc:Choice>
@@ -29521,7 +30603,7 @@
           <a:graphicData uri="http://schemas.openxmlformats.org/presentationml/2006/ole">
             <mc:AlternateContent xmlns:mc="http://schemas.openxmlformats.org/markup-compatibility/2006">
               <mc:Choice xmlns:v="urn:schemas-microsoft-com:vml" Requires="v">
-                <p:oleObj spid="_x0000_s1117" name="Equation" r:id="rId4" imgW="2667000" imgH="393700" progId="Equation.DSMT4">
+                <p:oleObj spid="_x0000_s1126" name="Equation" r:id="rId4" imgW="2667000" imgH="393700" progId="Equation.DSMT4">
                   <p:embed/>
                 </p:oleObj>
               </mc:Choice>
@@ -29578,7 +30660,7 @@
           <a:graphicData uri="http://schemas.openxmlformats.org/presentationml/2006/ole">
             <mc:AlternateContent xmlns:mc="http://schemas.openxmlformats.org/markup-compatibility/2006">
               <mc:Choice xmlns:v="urn:schemas-microsoft-com:vml" Requires="v">
-                <p:oleObj spid="_x0000_s1118" name="Equation" r:id="rId6" imgW="8089900" imgH="1168400" progId="Equation.DSMT4">
+                <p:oleObj spid="_x0000_s1127" name="Equation" r:id="rId6" imgW="8089900" imgH="1168400" progId="Equation.DSMT4">
                   <p:embed/>
                 </p:oleObj>
               </mc:Choice>
@@ -29806,7 +30888,7 @@
           <a:graphicData uri="http://schemas.openxmlformats.org/presentationml/2006/ole">
             <mc:AlternateContent xmlns:mc="http://schemas.openxmlformats.org/markup-compatibility/2006">
               <mc:Choice xmlns:v="urn:schemas-microsoft-com:vml" Requires="v">
-                <p:oleObj spid="_x0000_s1119" name="Equation" r:id="rId9" imgW="2032000" imgH="457200" progId="Equation.DSMT4">
+                <p:oleObj spid="_x0000_s1128" name="Equation" r:id="rId9" imgW="2032000" imgH="457200" progId="Equation.DSMT4">
                   <p:embed/>
                 </p:oleObj>
               </mc:Choice>
@@ -30610,7 +31692,7 @@
           <a:graphicData uri="http://schemas.openxmlformats.org/presentationml/2006/ole">
             <mc:AlternateContent xmlns:mc="http://schemas.openxmlformats.org/markup-compatibility/2006">
               <mc:Choice xmlns:v="urn:schemas-microsoft-com:vml" Requires="v">
-                <p:oleObj spid="_x0000_s9261" name="Equation" r:id="rId4" imgW="1790700" imgH="469900" progId="Equation.3">
+                <p:oleObj spid="_x0000_s9264" name="Equation" r:id="rId4" imgW="1790700" imgH="469900" progId="Equation.3">
                   <p:embed/>
                 </p:oleObj>
               </mc:Choice>
@@ -32850,7 +33932,7 @@
           <a:graphicData uri="http://schemas.openxmlformats.org/presentationml/2006/ole">
             <mc:AlternateContent xmlns:mc="http://schemas.openxmlformats.org/markup-compatibility/2006">
               <mc:Choice xmlns:v="urn:schemas-microsoft-com:vml" Requires="v">
-                <p:oleObj spid="_x0000_s5256" name="Equation" r:id="rId4" imgW="3517900" imgH="876300" progId="Equation.DSMT4">
+                <p:oleObj spid="_x0000_s5262" name="Equation" r:id="rId4" imgW="3517900" imgH="876300" progId="Equation.DSMT4">
                   <p:embed/>
                 </p:oleObj>
               </mc:Choice>
@@ -32907,7 +33989,7 @@
           <a:graphicData uri="http://schemas.openxmlformats.org/presentationml/2006/ole">
             <mc:AlternateContent xmlns:mc="http://schemas.openxmlformats.org/markup-compatibility/2006">
               <mc:Choice xmlns:v="urn:schemas-microsoft-com:vml" Requires="v">
-                <p:oleObj spid="_x0000_s5257" name="Equation" r:id="rId6" imgW="3251200" imgH="838200" progId="Equation.DSMT4">
+                <p:oleObj spid="_x0000_s5263" name="Equation" r:id="rId6" imgW="3251200" imgH="838200" progId="Equation.DSMT4">
                   <p:embed/>
                 </p:oleObj>
               </mc:Choice>

</xml_diff>

<commit_message>
Fixed CpG profiles by speed up receptor dynamics.
</commit_message>
<xml_diff>
--- a/TNF_Slides.pptx
+++ b/TNF_Slides.pptx
@@ -204,7 +204,7 @@
           <a:p>
             <a:fld id="{C16E61BC-9AFB-7443-B919-0FEFC506D3C0}" type="datetimeFigureOut">
               <a:rPr lang="en-US" smtClean="0"/>
-              <a:t>1/24/14</a:t>
+              <a:t>2/3/14</a:t>
             </a:fld>
             <a:endParaRPr lang="en-US"/>
           </a:p>
@@ -1427,7 +1427,6 @@
               <a:rPr lang="en-US" baseline="0" dirty="0" smtClean="0"/>
               <a:t>Dashed lines: without TNF feedback</a:t>
             </a:r>
-            <a:endParaRPr lang="en-US" baseline="0" dirty="0" smtClean="0"/>
           </a:p>
         </p:txBody>
       </p:sp>
@@ -1741,7 +1740,7 @@
             <a:fld id="{0DA042B0-5508-8A40-9A09-F8377543C8AB}" type="datetimeFigureOut">
               <a:rPr lang="en-US" smtClean="0"/>
               <a:pPr/>
-              <a:t>1/24/14</a:t>
+              <a:t>2/3/14</a:t>
             </a:fld>
             <a:endParaRPr lang="en-US" dirty="0"/>
           </a:p>
@@ -1913,7 +1912,7 @@
             <a:fld id="{0DA042B0-5508-8A40-9A09-F8377543C8AB}" type="datetimeFigureOut">
               <a:rPr lang="en-US" smtClean="0"/>
               <a:pPr/>
-              <a:t>1/24/14</a:t>
+              <a:t>2/3/14</a:t>
             </a:fld>
             <a:endParaRPr lang="en-US" dirty="0"/>
           </a:p>
@@ -2095,7 +2094,7 @@
             <a:fld id="{0DA042B0-5508-8A40-9A09-F8377543C8AB}" type="datetimeFigureOut">
               <a:rPr lang="en-US" smtClean="0"/>
               <a:pPr/>
-              <a:t>1/24/14</a:t>
+              <a:t>2/3/14</a:t>
             </a:fld>
             <a:endParaRPr lang="en-US" dirty="0"/>
           </a:p>
@@ -2267,7 +2266,7 @@
             <a:fld id="{0DA042B0-5508-8A40-9A09-F8377543C8AB}" type="datetimeFigureOut">
               <a:rPr lang="en-US" smtClean="0"/>
               <a:pPr/>
-              <a:t>1/24/14</a:t>
+              <a:t>2/3/14</a:t>
             </a:fld>
             <a:endParaRPr lang="en-US" dirty="0"/>
           </a:p>
@@ -2515,7 +2514,7 @@
             <a:fld id="{0DA042B0-5508-8A40-9A09-F8377543C8AB}" type="datetimeFigureOut">
               <a:rPr lang="en-US" smtClean="0"/>
               <a:pPr/>
-              <a:t>1/24/14</a:t>
+              <a:t>2/3/14</a:t>
             </a:fld>
             <a:endParaRPr lang="en-US" dirty="0"/>
           </a:p>
@@ -2805,7 +2804,7 @@
             <a:fld id="{0DA042B0-5508-8A40-9A09-F8377543C8AB}" type="datetimeFigureOut">
               <a:rPr lang="en-US" smtClean="0"/>
               <a:pPr/>
-              <a:t>1/24/14</a:t>
+              <a:t>2/3/14</a:t>
             </a:fld>
             <a:endParaRPr lang="en-US" dirty="0"/>
           </a:p>
@@ -3229,7 +3228,7 @@
             <a:fld id="{0DA042B0-5508-8A40-9A09-F8377543C8AB}" type="datetimeFigureOut">
               <a:rPr lang="en-US" smtClean="0"/>
               <a:pPr/>
-              <a:t>1/24/14</a:t>
+              <a:t>2/3/14</a:t>
             </a:fld>
             <a:endParaRPr lang="en-US" dirty="0"/>
           </a:p>
@@ -3349,7 +3348,7 @@
             <a:fld id="{0DA042B0-5508-8A40-9A09-F8377543C8AB}" type="datetimeFigureOut">
               <a:rPr lang="en-US" smtClean="0"/>
               <a:pPr/>
-              <a:t>1/24/14</a:t>
+              <a:t>2/3/14</a:t>
             </a:fld>
             <a:endParaRPr lang="en-US" dirty="0"/>
           </a:p>
@@ -3446,7 +3445,7 @@
             <a:fld id="{0DA042B0-5508-8A40-9A09-F8377543C8AB}" type="datetimeFigureOut">
               <a:rPr lang="en-US" smtClean="0"/>
               <a:pPr/>
-              <a:t>1/24/14</a:t>
+              <a:t>2/3/14</a:t>
             </a:fld>
             <a:endParaRPr lang="en-US" dirty="0"/>
           </a:p>
@@ -3725,7 +3724,7 @@
             <a:fld id="{0DA042B0-5508-8A40-9A09-F8377543C8AB}" type="datetimeFigureOut">
               <a:rPr lang="en-US" smtClean="0"/>
               <a:pPr/>
-              <a:t>1/24/14</a:t>
+              <a:t>2/3/14</a:t>
             </a:fld>
             <a:endParaRPr lang="en-US" dirty="0"/>
           </a:p>
@@ -3984,7 +3983,7 @@
             <a:fld id="{0DA042B0-5508-8A40-9A09-F8377543C8AB}" type="datetimeFigureOut">
               <a:rPr lang="en-US" smtClean="0"/>
               <a:pPr/>
-              <a:t>1/24/14</a:t>
+              <a:t>2/3/14</a:t>
             </a:fld>
             <a:endParaRPr lang="en-US" dirty="0"/>
           </a:p>
@@ -4199,7 +4198,7 @@
             <a:fld id="{0DA042B0-5508-8A40-9A09-F8377543C8AB}" type="datetimeFigureOut">
               <a:rPr lang="en-US" smtClean="0"/>
               <a:pPr/>
-              <a:t>1/24/14</a:t>
+              <a:t>2/3/14</a:t>
             </a:fld>
             <a:endParaRPr lang="en-US" dirty="0"/>
           </a:p>
@@ -6445,7 +6444,7 @@
           <a:graphicData uri="http://schemas.openxmlformats.org/presentationml/2006/ole">
             <mc:AlternateContent xmlns:mc="http://schemas.openxmlformats.org/markup-compatibility/2006">
               <mc:Choice xmlns:v="urn:schemas-microsoft-com:vml" Requires="v">
-                <p:oleObj spid="_x0000_s12456" name="Equation" r:id="rId4" imgW="3022600" imgH="444500" progId="Equation.3">
+                <p:oleObj spid="_x0000_s12460" name="Equation" r:id="rId4" imgW="3022600" imgH="444500" progId="Equation.3">
                   <p:embed/>
                 </p:oleObj>
               </mc:Choice>
@@ -6502,7 +6501,7 @@
           <a:graphicData uri="http://schemas.openxmlformats.org/presentationml/2006/ole">
             <mc:AlternateContent xmlns:mc="http://schemas.openxmlformats.org/markup-compatibility/2006">
               <mc:Choice xmlns:v="urn:schemas-microsoft-com:vml" Requires="v">
-                <p:oleObj spid="_x0000_s12457" name="Equation" r:id="rId6" imgW="4724400" imgH="431800" progId="Equation.DSMT4">
+                <p:oleObj spid="_x0000_s12461" name="Equation" r:id="rId6" imgW="4724400" imgH="431800" progId="Equation.DSMT4">
                   <p:embed/>
                 </p:oleObj>
               </mc:Choice>
@@ -6559,7 +6558,7 @@
           <a:graphicData uri="http://schemas.openxmlformats.org/presentationml/2006/ole">
             <mc:AlternateContent xmlns:mc="http://schemas.openxmlformats.org/markup-compatibility/2006">
               <mc:Choice xmlns:v="urn:schemas-microsoft-com:vml" Requires="v">
-                <p:oleObj spid="_x0000_s12458" name="Equation" r:id="rId8" imgW="2197100" imgH="457200" progId="Equation.3">
+                <p:oleObj spid="_x0000_s12462" name="Equation" r:id="rId8" imgW="2197100" imgH="457200" progId="Equation.3">
                   <p:embed/>
                 </p:oleObj>
               </mc:Choice>
@@ -7923,11 +7922,7 @@
           <a:p>
             <a:r>
               <a:rPr lang="en-US" sz="2400" b="1" dirty="0" smtClean="0"/>
-              <a:t>Linking </a:t>
-            </a:r>
-            <a:r>
-              <a:rPr lang="en-US" sz="2400" b="1" dirty="0" smtClean="0"/>
-              <a:t>with TLR4 model</a:t>
+              <a:t>Linking with TLR4 model</a:t>
             </a:r>
             <a:endParaRPr lang="en-US" sz="2400" b="1" dirty="0"/>
           </a:p>
@@ -8201,11 +8196,7 @@
             </a:r>
             <a:r>
               <a:rPr lang="en-US" sz="2400" b="1" dirty="0" smtClean="0"/>
-              <a:t> and </a:t>
-            </a:r>
-            <a:r>
-              <a:rPr lang="en-US" sz="2400" b="1" dirty="0" smtClean="0"/>
-              <a:t>PIC stimulation (with / without TNF feedback)</a:t>
+              <a:t> and PIC stimulation (with / without TNF feedback)</a:t>
             </a:r>
             <a:endParaRPr lang="en-US" sz="2400" b="1" dirty="0"/>
           </a:p>
@@ -8245,7 +8236,7 @@
       </p:sp>
       <p:pic>
         <p:nvPicPr>
-          <p:cNvPr id="16" name="Picture 15" descr="Fig5c.pdf"/>
+          <p:cNvPr id="3" name="Picture 2" descr="Fig5c.pdf"/>
           <p:cNvPicPr>
             <a:picLocks noChangeAspect="1"/>
           </p:cNvPicPr>
@@ -8265,8 +8256,8 @@
         </p:blipFill>
         <p:spPr>
           <a:xfrm>
-            <a:off x="1450753" y="-652189"/>
-            <a:ext cx="6858000" cy="8875058"/>
+            <a:off x="1583387" y="-503445"/>
+            <a:ext cx="6400800" cy="8283388"/>
           </a:xfrm>
           <a:prstGeom prst="rect">
             <a:avLst/>
@@ -8334,36 +8325,6 @@
           </a:p>
         </p:txBody>
       </p:sp>
-      <p:pic>
-        <p:nvPicPr>
-          <p:cNvPr id="86" name="Picture 85" descr="Fig6.pdf"/>
-          <p:cNvPicPr>
-            <a:picLocks noChangeAspect="1"/>
-          </p:cNvPicPr>
-          <p:nvPr/>
-        </p:nvPicPr>
-        <p:blipFill>
-          <a:blip r:embed="rId2">
-            <a:extLst>
-              <a:ext uri="{28A0092B-C50C-407E-A947-70E740481C1C}">
-                <a14:useLocalDpi xmlns:a14="http://schemas.microsoft.com/office/drawing/2010/main" val="0"/>
-              </a:ext>
-            </a:extLst>
-          </a:blip>
-          <a:stretch>
-            <a:fillRect/>
-          </a:stretch>
-        </p:blipFill>
-        <p:spPr>
-          <a:xfrm>
-            <a:off x="676314" y="-1677265"/>
-            <a:ext cx="8229600" cy="10650070"/>
-          </a:xfrm>
-          <a:prstGeom prst="rect">
-            <a:avLst/>
-          </a:prstGeom>
-        </p:spPr>
-      </p:pic>
       <p:sp>
         <p:nvSpPr>
           <p:cNvPr id="102" name="Rectangle 101"/>
@@ -8395,16 +8356,41 @@
             </a:r>
             <a:r>
               <a:rPr lang="en-US" sz="2400" b="1" dirty="0" smtClean="0"/>
-              <a:t> and </a:t>
-            </a:r>
-            <a:r>
-              <a:rPr lang="en-US" sz="2400" b="1" dirty="0" smtClean="0"/>
-              <a:t>PIC stimulation (with / without TNF feedback)</a:t>
+              <a:t> and PIC stimulation (with / without TNF feedback)</a:t>
             </a:r>
             <a:endParaRPr lang="en-US" sz="2400" b="1" dirty="0"/>
           </a:p>
         </p:txBody>
       </p:sp>
+      <p:pic>
+        <p:nvPicPr>
+          <p:cNvPr id="4" name="Picture 3" descr="Fig6.pdf"/>
+          <p:cNvPicPr>
+            <a:picLocks noChangeAspect="1"/>
+          </p:cNvPicPr>
+          <p:nvPr/>
+        </p:nvPicPr>
+        <p:blipFill rotWithShape="1">
+          <a:blip r:embed="rId2">
+            <a:extLst>
+              <a:ext uri="{28A0092B-C50C-407E-A947-70E740481C1C}">
+                <a14:useLocalDpi xmlns:a14="http://schemas.microsoft.com/office/drawing/2010/main" val="0"/>
+              </a:ext>
+            </a:extLst>
+          </a:blip>
+          <a:srcRect l="4754" t="20173" r="5161" b="41018"/>
+          <a:stretch/>
+        </p:blipFill>
+        <p:spPr>
+          <a:xfrm>
+            <a:off x="1555938" y="1487450"/>
+            <a:ext cx="6400800" cy="3568481"/>
+          </a:xfrm>
+          <a:prstGeom prst="rect">
+            <a:avLst/>
+          </a:prstGeom>
+        </p:spPr>
+      </p:pic>
     </p:spTree>
     <p:extLst>
       <p:ext uri="{BB962C8B-B14F-4D97-AF65-F5344CB8AC3E}">
@@ -9227,7 +9213,7 @@
           <a:graphicData uri="http://schemas.openxmlformats.org/presentationml/2006/ole">
             <mc:AlternateContent xmlns:mc="http://schemas.openxmlformats.org/markup-compatibility/2006">
               <mc:Choice xmlns:v="urn:schemas-microsoft-com:vml" Requires="v">
-                <p:oleObj spid="_x0000_s13368" name="Equation" r:id="rId4" imgW="1790700" imgH="469900" progId="Equation.3">
+                <p:oleObj spid="_x0000_s13370" name="Equation" r:id="rId4" imgW="1790700" imgH="469900" progId="Equation.3">
                   <p:embed/>
                 </p:oleObj>
               </mc:Choice>
@@ -9479,11 +9465,7 @@
           <a:p>
             <a:r>
               <a:rPr lang="en-US" sz="2400" b="1" dirty="0" smtClean="0"/>
-              <a:t>How well the model capture the features</a:t>
-            </a:r>
-            <a:r>
-              <a:rPr lang="en-US" sz="2400" b="1" dirty="0" smtClean="0"/>
-              <a:t>.</a:t>
+              <a:t>How well the model capture the features.</a:t>
             </a:r>
           </a:p>
           <a:p>
@@ -11185,7 +11167,7 @@
           <a:graphicData uri="http://schemas.openxmlformats.org/presentationml/2006/ole">
             <mc:AlternateContent xmlns:mc="http://schemas.openxmlformats.org/markup-compatibility/2006">
               <mc:Choice xmlns:v="urn:schemas-microsoft-com:vml" Requires="v">
-                <p:oleObj spid="_x0000_s1171" name="Equation" r:id="rId4" imgW="2667000" imgH="393700" progId="Equation.DSMT4">
+                <p:oleObj spid="_x0000_s1175" name="Equation" r:id="rId4" imgW="2667000" imgH="393700" progId="Equation.DSMT4">
                   <p:embed/>
                 </p:oleObj>
               </mc:Choice>
@@ -11242,7 +11224,7 @@
           <a:graphicData uri="http://schemas.openxmlformats.org/presentationml/2006/ole">
             <mc:AlternateContent xmlns:mc="http://schemas.openxmlformats.org/markup-compatibility/2006">
               <mc:Choice xmlns:v="urn:schemas-microsoft-com:vml" Requires="v">
-                <p:oleObj spid="_x0000_s1172" name="Equation" r:id="rId6" imgW="8089900" imgH="1168400" progId="Equation.DSMT4">
+                <p:oleObj spid="_x0000_s1176" name="Equation" r:id="rId6" imgW="8089900" imgH="1168400" progId="Equation.DSMT4">
                   <p:embed/>
                 </p:oleObj>
               </mc:Choice>
@@ -11470,7 +11452,7 @@
           <a:graphicData uri="http://schemas.openxmlformats.org/presentationml/2006/ole">
             <mc:AlternateContent xmlns:mc="http://schemas.openxmlformats.org/markup-compatibility/2006">
               <mc:Choice xmlns:v="urn:schemas-microsoft-com:vml" Requires="v">
-                <p:oleObj spid="_x0000_s1173" name="Equation" r:id="rId9" imgW="2032000" imgH="457200" progId="Equation.DSMT4">
+                <p:oleObj spid="_x0000_s1177" name="Equation" r:id="rId9" imgW="2032000" imgH="457200" progId="Equation.DSMT4">
                   <p:embed/>
                 </p:oleObj>
               </mc:Choice>
@@ -12274,7 +12256,7 @@
           <a:graphicData uri="http://schemas.openxmlformats.org/presentationml/2006/ole">
             <mc:AlternateContent xmlns:mc="http://schemas.openxmlformats.org/markup-compatibility/2006">
               <mc:Choice xmlns:v="urn:schemas-microsoft-com:vml" Requires="v">
-                <p:oleObj spid="_x0000_s9279" name="Equation" r:id="rId4" imgW="1790700" imgH="469900" progId="Equation.3">
+                <p:oleObj spid="_x0000_s9281" name="Equation" r:id="rId4" imgW="1790700" imgH="469900" progId="Equation.3">
                   <p:embed/>
                 </p:oleObj>
               </mc:Choice>
@@ -12462,7 +12444,6 @@
               <a:rPr lang="en-US" dirty="0"/>
               <a:t>rate. </a:t>
             </a:r>
-            <a:endParaRPr lang="en-US" dirty="0"/>
           </a:p>
         </p:txBody>
       </p:sp>
@@ -12518,11 +12499,7 @@
           <a:p>
             <a:r>
               <a:rPr lang="en-US" sz="2400" b="1" dirty="0" smtClean="0"/>
-              <a:t>How well the model capture the features</a:t>
-            </a:r>
-            <a:r>
-              <a:rPr lang="en-US" sz="2400" b="1" dirty="0" smtClean="0"/>
-              <a:t>.</a:t>
+              <a:t>How well the model capture the features.</a:t>
             </a:r>
           </a:p>
           <a:p>
@@ -14521,11 +14498,7 @@
           <a:p>
             <a:r>
               <a:rPr lang="en-US" sz="2400" b="1" dirty="0" smtClean="0"/>
-              <a:t>Module 3: </a:t>
-            </a:r>
-            <a:r>
-              <a:rPr lang="en-US" sz="2400" b="1" dirty="0" smtClean="0"/>
-              <a:t>Translation + Secretion</a:t>
+              <a:t>Module 3: Translation + Secretion</a:t>
             </a:r>
             <a:endParaRPr lang="en-US" sz="2400" b="1" dirty="0"/>
           </a:p>
@@ -14553,7 +14526,7 @@
           <a:graphicData uri="http://schemas.openxmlformats.org/presentationml/2006/ole">
             <mc:AlternateContent xmlns:mc="http://schemas.openxmlformats.org/markup-compatibility/2006">
               <mc:Choice xmlns:v="urn:schemas-microsoft-com:vml" Requires="v">
-                <p:oleObj spid="_x0000_s5294" name="Equation" r:id="rId4" imgW="3517900" imgH="876300" progId="Equation.DSMT4">
+                <p:oleObj spid="_x0000_s5297" name="Equation" r:id="rId4" imgW="3517900" imgH="876300" progId="Equation.DSMT4">
                   <p:embed/>
                 </p:oleObj>
               </mc:Choice>
@@ -14610,7 +14583,7 @@
           <a:graphicData uri="http://schemas.openxmlformats.org/presentationml/2006/ole">
             <mc:AlternateContent xmlns:mc="http://schemas.openxmlformats.org/markup-compatibility/2006">
               <mc:Choice xmlns:v="urn:schemas-microsoft-com:vml" Requires="v">
-                <p:oleObj spid="_x0000_s5295" name="Equation" r:id="rId6" imgW="3098800" imgH="838200" progId="Equation.DSMT4">
+                <p:oleObj spid="_x0000_s5298" name="Equation" r:id="rId6" imgW="3098800" imgH="838200" progId="Equation.DSMT4">
                   <p:embed/>
                 </p:oleObj>
               </mc:Choice>
@@ -15254,11 +15227,7 @@
                     <a:p>
                       <a:r>
                         <a:rPr lang="en-US" sz="1600" dirty="0" smtClean="0"/>
-                        <a:t>wt_120</a:t>
-                      </a:r>
-                      <a:r>
-                        <a:rPr lang="en-US" sz="1600" dirty="0" smtClean="0"/>
-                        <a:t>/</a:t>
+                        <a:t>wt_120/</a:t>
                       </a:r>
                       <a:r>
                         <a:rPr lang="en-US" sz="1600" dirty="0" err="1" smtClean="0"/>
@@ -15771,15 +15740,7 @@
                     <a:p>
                       <a:r>
                         <a:rPr lang="en-US" sz="1600" dirty="0" smtClean="0"/>
-                        <a:t>Tko_120</a:t>
-                      </a:r>
-                      <a:r>
-                        <a:rPr lang="en-US" sz="1600" dirty="0" smtClean="0"/>
-                        <a:t>/</a:t>
-                      </a:r>
-                      <a:r>
-                        <a:rPr lang="en-US" sz="1600" dirty="0" smtClean="0"/>
-                        <a:t>wt_120</a:t>
+                        <a:t>Tko_120/wt_120</a:t>
                       </a:r>
                       <a:endParaRPr lang="en-US" sz="1600" dirty="0"/>
                     </a:p>
@@ -15837,15 +15798,7 @@
                     <a:p>
                       <a:r>
                         <a:rPr lang="en-US" sz="1600" dirty="0" smtClean="0"/>
-                        <a:t>Mko_120</a:t>
-                      </a:r>
-                      <a:r>
-                        <a:rPr lang="en-US" sz="1600" dirty="0" smtClean="0"/>
-                        <a:t>/</a:t>
-                      </a:r>
-                      <a:r>
-                        <a:rPr lang="en-US" sz="1600" dirty="0" smtClean="0"/>
-                        <a:t>tko_120</a:t>
+                        <a:t>Mko_120/tko_120</a:t>
                       </a:r>
                       <a:endParaRPr lang="en-US" sz="1600" dirty="0"/>
                     </a:p>
@@ -16080,11 +16033,7 @@
           <a:p>
             <a:r>
               <a:rPr lang="en-US" sz="2400" b="1" dirty="0" smtClean="0"/>
-              <a:t>How well the model capture the features</a:t>
-            </a:r>
-            <a:r>
-              <a:rPr lang="en-US" sz="2400" b="1" dirty="0" smtClean="0"/>
-              <a:t>.</a:t>
+              <a:t>How well the model capture the features.</a:t>
             </a:r>
           </a:p>
           <a:p>

</xml_diff>

<commit_message>
Updated to Andrew and Alex.
</commit_message>
<xml_diff>
--- a/TNF_Slides.pptx
+++ b/TNF_Slides.pptx
@@ -204,7 +204,7 @@
           <a:p>
             <a:fld id="{C16E61BC-9AFB-7443-B919-0FEFC506D3C0}" type="datetimeFigureOut">
               <a:rPr lang="en-US" smtClean="0"/>
-              <a:t>2/3/14</a:t>
+              <a:t>2/7/14</a:t>
             </a:fld>
             <a:endParaRPr lang="en-US"/>
           </a:p>
@@ -1740,7 +1740,7 @@
             <a:fld id="{0DA042B0-5508-8A40-9A09-F8377543C8AB}" type="datetimeFigureOut">
               <a:rPr lang="en-US" smtClean="0"/>
               <a:pPr/>
-              <a:t>2/3/14</a:t>
+              <a:t>2/7/14</a:t>
             </a:fld>
             <a:endParaRPr lang="en-US" dirty="0"/>
           </a:p>
@@ -1912,7 +1912,7 @@
             <a:fld id="{0DA042B0-5508-8A40-9A09-F8377543C8AB}" type="datetimeFigureOut">
               <a:rPr lang="en-US" smtClean="0"/>
               <a:pPr/>
-              <a:t>2/3/14</a:t>
+              <a:t>2/7/14</a:t>
             </a:fld>
             <a:endParaRPr lang="en-US" dirty="0"/>
           </a:p>
@@ -2094,7 +2094,7 @@
             <a:fld id="{0DA042B0-5508-8A40-9A09-F8377543C8AB}" type="datetimeFigureOut">
               <a:rPr lang="en-US" smtClean="0"/>
               <a:pPr/>
-              <a:t>2/3/14</a:t>
+              <a:t>2/7/14</a:t>
             </a:fld>
             <a:endParaRPr lang="en-US" dirty="0"/>
           </a:p>
@@ -2266,7 +2266,7 @@
             <a:fld id="{0DA042B0-5508-8A40-9A09-F8377543C8AB}" type="datetimeFigureOut">
               <a:rPr lang="en-US" smtClean="0"/>
               <a:pPr/>
-              <a:t>2/3/14</a:t>
+              <a:t>2/7/14</a:t>
             </a:fld>
             <a:endParaRPr lang="en-US" dirty="0"/>
           </a:p>
@@ -2514,7 +2514,7 @@
             <a:fld id="{0DA042B0-5508-8A40-9A09-F8377543C8AB}" type="datetimeFigureOut">
               <a:rPr lang="en-US" smtClean="0"/>
               <a:pPr/>
-              <a:t>2/3/14</a:t>
+              <a:t>2/7/14</a:t>
             </a:fld>
             <a:endParaRPr lang="en-US" dirty="0"/>
           </a:p>
@@ -2804,7 +2804,7 @@
             <a:fld id="{0DA042B0-5508-8A40-9A09-F8377543C8AB}" type="datetimeFigureOut">
               <a:rPr lang="en-US" smtClean="0"/>
               <a:pPr/>
-              <a:t>2/3/14</a:t>
+              <a:t>2/7/14</a:t>
             </a:fld>
             <a:endParaRPr lang="en-US" dirty="0"/>
           </a:p>
@@ -3228,7 +3228,7 @@
             <a:fld id="{0DA042B0-5508-8A40-9A09-F8377543C8AB}" type="datetimeFigureOut">
               <a:rPr lang="en-US" smtClean="0"/>
               <a:pPr/>
-              <a:t>2/3/14</a:t>
+              <a:t>2/7/14</a:t>
             </a:fld>
             <a:endParaRPr lang="en-US" dirty="0"/>
           </a:p>
@@ -3348,7 +3348,7 @@
             <a:fld id="{0DA042B0-5508-8A40-9A09-F8377543C8AB}" type="datetimeFigureOut">
               <a:rPr lang="en-US" smtClean="0"/>
               <a:pPr/>
-              <a:t>2/3/14</a:t>
+              <a:t>2/7/14</a:t>
             </a:fld>
             <a:endParaRPr lang="en-US" dirty="0"/>
           </a:p>
@@ -3445,7 +3445,7 @@
             <a:fld id="{0DA042B0-5508-8A40-9A09-F8377543C8AB}" type="datetimeFigureOut">
               <a:rPr lang="en-US" smtClean="0"/>
               <a:pPr/>
-              <a:t>2/3/14</a:t>
+              <a:t>2/7/14</a:t>
             </a:fld>
             <a:endParaRPr lang="en-US" dirty="0"/>
           </a:p>
@@ -3724,7 +3724,7 @@
             <a:fld id="{0DA042B0-5508-8A40-9A09-F8377543C8AB}" type="datetimeFigureOut">
               <a:rPr lang="en-US" smtClean="0"/>
               <a:pPr/>
-              <a:t>2/3/14</a:t>
+              <a:t>2/7/14</a:t>
             </a:fld>
             <a:endParaRPr lang="en-US" dirty="0"/>
           </a:p>
@@ -3983,7 +3983,7 @@
             <a:fld id="{0DA042B0-5508-8A40-9A09-F8377543C8AB}" type="datetimeFigureOut">
               <a:rPr lang="en-US" smtClean="0"/>
               <a:pPr/>
-              <a:t>2/3/14</a:t>
+              <a:t>2/7/14</a:t>
             </a:fld>
             <a:endParaRPr lang="en-US" dirty="0"/>
           </a:p>
@@ -4198,7 +4198,7 @@
             <a:fld id="{0DA042B0-5508-8A40-9A09-F8377543C8AB}" type="datetimeFigureOut">
               <a:rPr lang="en-US" smtClean="0"/>
               <a:pPr/>
-              <a:t>2/3/14</a:t>
+              <a:t>2/7/14</a:t>
             </a:fld>
             <a:endParaRPr lang="en-US" dirty="0"/>
           </a:p>
@@ -6444,7 +6444,7 @@
           <a:graphicData uri="http://schemas.openxmlformats.org/presentationml/2006/ole">
             <mc:AlternateContent xmlns:mc="http://schemas.openxmlformats.org/markup-compatibility/2006">
               <mc:Choice xmlns:v="urn:schemas-microsoft-com:vml" Requires="v">
-                <p:oleObj spid="_x0000_s12460" name="Equation" r:id="rId4" imgW="3022600" imgH="444500" progId="Equation.3">
+                <p:oleObj spid="_x0000_s12476" name="Equation" r:id="rId4" imgW="3022600" imgH="444500" progId="Equation.3">
                   <p:embed/>
                 </p:oleObj>
               </mc:Choice>
@@ -6501,7 +6501,7 @@
           <a:graphicData uri="http://schemas.openxmlformats.org/presentationml/2006/ole">
             <mc:AlternateContent xmlns:mc="http://schemas.openxmlformats.org/markup-compatibility/2006">
               <mc:Choice xmlns:v="urn:schemas-microsoft-com:vml" Requires="v">
-                <p:oleObj spid="_x0000_s12461" name="Equation" r:id="rId6" imgW="4724400" imgH="431800" progId="Equation.DSMT4">
+                <p:oleObj spid="_x0000_s12477" name="Equation" r:id="rId6" imgW="4724400" imgH="431800" progId="Equation.DSMT4">
                   <p:embed/>
                 </p:oleObj>
               </mc:Choice>
@@ -6558,7 +6558,7 @@
           <a:graphicData uri="http://schemas.openxmlformats.org/presentationml/2006/ole">
             <mc:AlternateContent xmlns:mc="http://schemas.openxmlformats.org/markup-compatibility/2006">
               <mc:Choice xmlns:v="urn:schemas-microsoft-com:vml" Requires="v">
-                <p:oleObj spid="_x0000_s12462" name="Equation" r:id="rId8" imgW="2197100" imgH="457200" progId="Equation.3">
+                <p:oleObj spid="_x0000_s12478" name="Equation" r:id="rId8" imgW="2197100" imgH="457200" progId="Equation.3">
                   <p:embed/>
                 </p:oleObj>
               </mc:Choice>
@@ -8383,8 +8383,8 @@
         </p:blipFill>
         <p:spPr>
           <a:xfrm>
-            <a:off x="1555938" y="1487450"/>
-            <a:ext cx="6400800" cy="3568481"/>
+            <a:off x="527585" y="938238"/>
+            <a:ext cx="8168320" cy="4553883"/>
           </a:xfrm>
           <a:prstGeom prst="rect">
             <a:avLst/>
@@ -9213,7 +9213,7 @@
           <a:graphicData uri="http://schemas.openxmlformats.org/presentationml/2006/ole">
             <mc:AlternateContent xmlns:mc="http://schemas.openxmlformats.org/markup-compatibility/2006">
               <mc:Choice xmlns:v="urn:schemas-microsoft-com:vml" Requires="v">
-                <p:oleObj spid="_x0000_s13370" name="Equation" r:id="rId4" imgW="1790700" imgH="469900" progId="Equation.3">
+                <p:oleObj spid="_x0000_s13376" name="Equation" r:id="rId4" imgW="1790700" imgH="469900" progId="Equation.3">
                   <p:embed/>
                 </p:oleObj>
               </mc:Choice>
@@ -11167,7 +11167,7 @@
           <a:graphicData uri="http://schemas.openxmlformats.org/presentationml/2006/ole">
             <mc:AlternateContent xmlns:mc="http://schemas.openxmlformats.org/markup-compatibility/2006">
               <mc:Choice xmlns:v="urn:schemas-microsoft-com:vml" Requires="v">
-                <p:oleObj spid="_x0000_s1175" name="Equation" r:id="rId4" imgW="2667000" imgH="393700" progId="Equation.DSMT4">
+                <p:oleObj spid="_x0000_s1191" name="Equation" r:id="rId4" imgW="2667000" imgH="393700" progId="Equation.DSMT4">
                   <p:embed/>
                 </p:oleObj>
               </mc:Choice>
@@ -11224,7 +11224,7 @@
           <a:graphicData uri="http://schemas.openxmlformats.org/presentationml/2006/ole">
             <mc:AlternateContent xmlns:mc="http://schemas.openxmlformats.org/markup-compatibility/2006">
               <mc:Choice xmlns:v="urn:schemas-microsoft-com:vml" Requires="v">
-                <p:oleObj spid="_x0000_s1176" name="Equation" r:id="rId6" imgW="8089900" imgH="1168400" progId="Equation.DSMT4">
+                <p:oleObj spid="_x0000_s1192" name="Equation" r:id="rId6" imgW="8089900" imgH="1168400" progId="Equation.DSMT4">
                   <p:embed/>
                 </p:oleObj>
               </mc:Choice>
@@ -11452,7 +11452,7 @@
           <a:graphicData uri="http://schemas.openxmlformats.org/presentationml/2006/ole">
             <mc:AlternateContent xmlns:mc="http://schemas.openxmlformats.org/markup-compatibility/2006">
               <mc:Choice xmlns:v="urn:schemas-microsoft-com:vml" Requires="v">
-                <p:oleObj spid="_x0000_s1177" name="Equation" r:id="rId9" imgW="2032000" imgH="457200" progId="Equation.DSMT4">
+                <p:oleObj spid="_x0000_s1193" name="Equation" r:id="rId9" imgW="2032000" imgH="457200" progId="Equation.DSMT4">
                   <p:embed/>
                 </p:oleObj>
               </mc:Choice>
@@ -12256,7 +12256,7 @@
           <a:graphicData uri="http://schemas.openxmlformats.org/presentationml/2006/ole">
             <mc:AlternateContent xmlns:mc="http://schemas.openxmlformats.org/markup-compatibility/2006">
               <mc:Choice xmlns:v="urn:schemas-microsoft-com:vml" Requires="v">
-                <p:oleObj spid="_x0000_s9281" name="Equation" r:id="rId4" imgW="1790700" imgH="469900" progId="Equation.3">
+                <p:oleObj spid="_x0000_s9287" name="Equation" r:id="rId4" imgW="1790700" imgH="469900" progId="Equation.3">
                   <p:embed/>
                 </p:oleObj>
               </mc:Choice>
@@ -14526,7 +14526,7 @@
           <a:graphicData uri="http://schemas.openxmlformats.org/presentationml/2006/ole">
             <mc:AlternateContent xmlns:mc="http://schemas.openxmlformats.org/markup-compatibility/2006">
               <mc:Choice xmlns:v="urn:schemas-microsoft-com:vml" Requires="v">
-                <p:oleObj spid="_x0000_s5297" name="Equation" r:id="rId4" imgW="3517900" imgH="876300" progId="Equation.DSMT4">
+                <p:oleObj spid="_x0000_s5308" name="Equation" r:id="rId4" imgW="3517900" imgH="876300" progId="Equation.DSMT4">
                   <p:embed/>
                 </p:oleObj>
               </mc:Choice>
@@ -14583,7 +14583,7 @@
           <a:graphicData uri="http://schemas.openxmlformats.org/presentationml/2006/ole">
             <mc:AlternateContent xmlns:mc="http://schemas.openxmlformats.org/markup-compatibility/2006">
               <mc:Choice xmlns:v="urn:schemas-microsoft-com:vml" Requires="v">
-                <p:oleObj spid="_x0000_s5298" name="Equation" r:id="rId6" imgW="3098800" imgH="838200" progId="Equation.DSMT4">
+                <p:oleObj spid="_x0000_s5309" name="Equation" r:id="rId6" imgW="3098800" imgH="838200" progId="Equation.DSMT4">
                   <p:embed/>
                 </p:oleObj>
               </mc:Choice>

</xml_diff>

<commit_message>
Updated to Andrew for his gm last week.
</commit_message>
<xml_diff>
--- a/TNF_Slides.pptx
+++ b/TNF_Slides.pptx
@@ -6444,7 +6444,7 @@
           <a:graphicData uri="http://schemas.openxmlformats.org/presentationml/2006/ole">
             <mc:AlternateContent xmlns:mc="http://schemas.openxmlformats.org/markup-compatibility/2006">
               <mc:Choice xmlns:v="urn:schemas-microsoft-com:vml" Requires="v">
-                <p:oleObj spid="_x0000_s12476" name="Equation" r:id="rId4" imgW="3022600" imgH="444500" progId="Equation.3">
+                <p:oleObj spid="_x0000_s12479" name="Equation" r:id="rId4" imgW="3022600" imgH="444500" progId="Equation.3">
                   <p:embed/>
                 </p:oleObj>
               </mc:Choice>
@@ -6501,7 +6501,7 @@
           <a:graphicData uri="http://schemas.openxmlformats.org/presentationml/2006/ole">
             <mc:AlternateContent xmlns:mc="http://schemas.openxmlformats.org/markup-compatibility/2006">
               <mc:Choice xmlns:v="urn:schemas-microsoft-com:vml" Requires="v">
-                <p:oleObj spid="_x0000_s12477" name="Equation" r:id="rId6" imgW="4724400" imgH="431800" progId="Equation.DSMT4">
+                <p:oleObj spid="_x0000_s12480" name="Equation" r:id="rId6" imgW="4724400" imgH="431800" progId="Equation.DSMT4">
                   <p:embed/>
                 </p:oleObj>
               </mc:Choice>
@@ -6558,7 +6558,7 @@
           <a:graphicData uri="http://schemas.openxmlformats.org/presentationml/2006/ole">
             <mc:AlternateContent xmlns:mc="http://schemas.openxmlformats.org/markup-compatibility/2006">
               <mc:Choice xmlns:v="urn:schemas-microsoft-com:vml" Requires="v">
-                <p:oleObj spid="_x0000_s12478" name="Equation" r:id="rId8" imgW="2197100" imgH="457200" progId="Equation.3">
+                <p:oleObj spid="_x0000_s12481" name="Equation" r:id="rId8" imgW="2197100" imgH="457200" progId="Equation.3">
                   <p:embed/>
                 </p:oleObj>
               </mc:Choice>
@@ -9213,7 +9213,7 @@
           <a:graphicData uri="http://schemas.openxmlformats.org/presentationml/2006/ole">
             <mc:AlternateContent xmlns:mc="http://schemas.openxmlformats.org/markup-compatibility/2006">
               <mc:Choice xmlns:v="urn:schemas-microsoft-com:vml" Requires="v">
-                <p:oleObj spid="_x0000_s13376" name="Equation" r:id="rId4" imgW="1790700" imgH="469900" progId="Equation.3">
+                <p:oleObj spid="_x0000_s13377" name="Equation" r:id="rId4" imgW="1790700" imgH="469900" progId="Equation.3">
                   <p:embed/>
                 </p:oleObj>
               </mc:Choice>
@@ -11167,7 +11167,7 @@
           <a:graphicData uri="http://schemas.openxmlformats.org/presentationml/2006/ole">
             <mc:AlternateContent xmlns:mc="http://schemas.openxmlformats.org/markup-compatibility/2006">
               <mc:Choice xmlns:v="urn:schemas-microsoft-com:vml" Requires="v">
-                <p:oleObj spid="_x0000_s1191" name="Equation" r:id="rId4" imgW="2667000" imgH="393700" progId="Equation.DSMT4">
+                <p:oleObj spid="_x0000_s1194" name="Equation" r:id="rId4" imgW="2667000" imgH="393700" progId="Equation.DSMT4">
                   <p:embed/>
                 </p:oleObj>
               </mc:Choice>
@@ -11224,7 +11224,7 @@
           <a:graphicData uri="http://schemas.openxmlformats.org/presentationml/2006/ole">
             <mc:AlternateContent xmlns:mc="http://schemas.openxmlformats.org/markup-compatibility/2006">
               <mc:Choice xmlns:v="urn:schemas-microsoft-com:vml" Requires="v">
-                <p:oleObj spid="_x0000_s1192" name="Equation" r:id="rId6" imgW="8089900" imgH="1168400" progId="Equation.DSMT4">
+                <p:oleObj spid="_x0000_s1195" name="Equation" r:id="rId6" imgW="8089900" imgH="1168400" progId="Equation.DSMT4">
                   <p:embed/>
                 </p:oleObj>
               </mc:Choice>
@@ -11452,7 +11452,7 @@
           <a:graphicData uri="http://schemas.openxmlformats.org/presentationml/2006/ole">
             <mc:AlternateContent xmlns:mc="http://schemas.openxmlformats.org/markup-compatibility/2006">
               <mc:Choice xmlns:v="urn:schemas-microsoft-com:vml" Requires="v">
-                <p:oleObj spid="_x0000_s1193" name="Equation" r:id="rId9" imgW="2032000" imgH="457200" progId="Equation.DSMT4">
+                <p:oleObj spid="_x0000_s1196" name="Equation" r:id="rId9" imgW="2032000" imgH="457200" progId="Equation.DSMT4">
                   <p:embed/>
                 </p:oleObj>
               </mc:Choice>
@@ -12256,7 +12256,7 @@
           <a:graphicData uri="http://schemas.openxmlformats.org/presentationml/2006/ole">
             <mc:AlternateContent xmlns:mc="http://schemas.openxmlformats.org/markup-compatibility/2006">
               <mc:Choice xmlns:v="urn:schemas-microsoft-com:vml" Requires="v">
-                <p:oleObj spid="_x0000_s9287" name="Equation" r:id="rId4" imgW="1790700" imgH="469900" progId="Equation.3">
+                <p:oleObj spid="_x0000_s9288" name="Equation" r:id="rId4" imgW="1790700" imgH="469900" progId="Equation.3">
                   <p:embed/>
                 </p:oleObj>
               </mc:Choice>
@@ -14526,7 +14526,7 @@
           <a:graphicData uri="http://schemas.openxmlformats.org/presentationml/2006/ole">
             <mc:AlternateContent xmlns:mc="http://schemas.openxmlformats.org/markup-compatibility/2006">
               <mc:Choice xmlns:v="urn:schemas-microsoft-com:vml" Requires="v">
-                <p:oleObj spid="_x0000_s5308" name="Equation" r:id="rId4" imgW="3517900" imgH="876300" progId="Equation.DSMT4">
+                <p:oleObj spid="_x0000_s5310" name="Equation" r:id="rId4" imgW="3517900" imgH="876300" progId="Equation.DSMT4">
                   <p:embed/>
                 </p:oleObj>
               </mc:Choice>
@@ -14583,7 +14583,7 @@
           <a:graphicData uri="http://schemas.openxmlformats.org/presentationml/2006/ole">
             <mc:AlternateContent xmlns:mc="http://schemas.openxmlformats.org/markup-compatibility/2006">
               <mc:Choice xmlns:v="urn:schemas-microsoft-com:vml" Requires="v">
-                <p:oleObj spid="_x0000_s5309" name="Equation" r:id="rId6" imgW="3098800" imgH="838200" progId="Equation.DSMT4">
+                <p:oleObj spid="_x0000_s5311" name="Equation" r:id="rId6" imgW="3098800" imgH="838200" progId="Equation.DSMT4">
                   <p:embed/>
                 </p:oleObj>
               </mc:Choice>

</xml_diff>

<commit_message>
updated for the TLR4 grant
</commit_message>
<xml_diff>
--- a/TNF_Slides.pptx
+++ b/TNF_Slides.pptx
@@ -5,7 +5,7 @@
     <p:sldMasterId id="2147483648" r:id="rId1"/>
   </p:sldMasterIdLst>
   <p:notesMasterIdLst>
-    <p:notesMasterId r:id="rId15"/>
+    <p:notesMasterId r:id="rId16"/>
   </p:notesMasterIdLst>
   <p:sldIdLst>
     <p:sldId id="269" r:id="rId2"/>
@@ -18,9 +18,10 @@
     <p:sldId id="268" r:id="rId9"/>
     <p:sldId id="276" r:id="rId10"/>
     <p:sldId id="275" r:id="rId11"/>
-    <p:sldId id="261" r:id="rId12"/>
-    <p:sldId id="263" r:id="rId13"/>
-    <p:sldId id="264" r:id="rId14"/>
+    <p:sldId id="277" r:id="rId12"/>
+    <p:sldId id="261" r:id="rId13"/>
+    <p:sldId id="263" r:id="rId14"/>
+    <p:sldId id="264" r:id="rId15"/>
   </p:sldIdLst>
   <p:sldSz cx="9144000" cy="6858000" type="screen4x3"/>
   <p:notesSz cx="6858000" cy="9144000"/>
@@ -204,7 +205,7 @@
           <a:p>
             <a:fld id="{C16E61BC-9AFB-7443-B919-0FEFC506D3C0}" type="datetimeFigureOut">
               <a:rPr lang="en-US" smtClean="0"/>
-              <a:t>2/7/14</a:t>
+              <a:t>2/19/14</a:t>
             </a:fld>
             <a:endParaRPr lang="en-US"/>
           </a:p>
@@ -560,6 +561,254 @@
 </p:notes>
 </file>
 
+<file path=ppt/notesSlides/notesSlide10.xml><?xml version="1.0" encoding="utf-8"?>
+<p:notes xmlns:a="http://schemas.openxmlformats.org/drawingml/2006/main" xmlns:r="http://schemas.openxmlformats.org/officeDocument/2006/relationships" xmlns:p="http://schemas.openxmlformats.org/presentationml/2006/main">
+  <p:cSld>
+    <p:spTree>
+      <p:nvGrpSpPr>
+        <p:cNvPr id="1" name=""/>
+        <p:cNvGrpSpPr/>
+        <p:nvPr/>
+      </p:nvGrpSpPr>
+      <p:grpSpPr>
+        <a:xfrm>
+          <a:off x="0" y="0"/>
+          <a:ext cx="0" cy="0"/>
+          <a:chOff x="0" y="0"/>
+          <a:chExt cx="0" cy="0"/>
+        </a:xfrm>
+      </p:grpSpPr>
+      <p:sp>
+        <p:nvSpPr>
+          <p:cNvPr id="2" name="Slide Image Placeholder 1"/>
+          <p:cNvSpPr>
+            <a:spLocks noGrp="1" noRot="1" noChangeAspect="1"/>
+          </p:cNvSpPr>
+          <p:nvPr>
+            <p:ph type="sldImg"/>
+          </p:nvPr>
+        </p:nvSpPr>
+        <p:spPr/>
+      </p:sp>
+      <p:sp>
+        <p:nvSpPr>
+          <p:cNvPr id="3" name="Notes Placeholder 2"/>
+          <p:cNvSpPr>
+            <a:spLocks noGrp="1"/>
+          </p:cNvSpPr>
+          <p:nvPr>
+            <p:ph type="body" idx="1"/>
+          </p:nvPr>
+        </p:nvSpPr>
+        <p:spPr/>
+        <p:txBody>
+          <a:bodyPr/>
+          <a:lstStyle/>
+          <a:p>
+            <a:r>
+              <a:rPr lang="en-US" dirty="0" smtClean="0"/>
+              <a:t>Two ways of match</a:t>
+            </a:r>
+            <a:r>
+              <a:rPr lang="en-US" baseline="0" dirty="0" smtClean="0"/>
+              <a:t> mRNA and nascent profiles:</a:t>
+            </a:r>
+          </a:p>
+          <a:p>
+            <a:pPr marL="228600" indent="-228600">
+              <a:buAutoNum type="arabicPeriod"/>
+            </a:pPr>
+            <a:r>
+              <a:rPr lang="en-US" baseline="0" dirty="0" smtClean="0"/>
+              <a:t>Increase the contribution of TNF feedback to the </a:t>
+            </a:r>
+            <a:r>
+              <a:rPr lang="en-US" baseline="0" dirty="0" err="1" smtClean="0"/>
+              <a:t>tko</a:t>
+            </a:r>
+            <a:r>
+              <a:rPr lang="en-US" baseline="0" dirty="0" smtClean="0"/>
+              <a:t> late phase </a:t>
+            </a:r>
+          </a:p>
+          <a:p>
+            <a:pPr marL="228600" indent="-228600">
+              <a:buAutoNum type="arabicPeriod"/>
+            </a:pPr>
+            <a:r>
+              <a:rPr lang="en-US" baseline="0" dirty="0" smtClean="0"/>
+              <a:t>Adjust the </a:t>
+            </a:r>
+            <a:r>
+              <a:rPr lang="en-US" baseline="0" dirty="0" err="1" smtClean="0"/>
+              <a:t>NFkB</a:t>
+            </a:r>
+            <a:r>
+              <a:rPr lang="en-US" baseline="0" dirty="0" smtClean="0"/>
+              <a:t> threshold changes in the </a:t>
+            </a:r>
+            <a:r>
+              <a:rPr lang="en-US" baseline="0" dirty="0" err="1" smtClean="0"/>
+              <a:t>mko</a:t>
+            </a:r>
+            <a:r>
+              <a:rPr lang="en-US" baseline="0" dirty="0" smtClean="0"/>
+              <a:t> with processing rate changes in </a:t>
+            </a:r>
+            <a:r>
+              <a:rPr lang="en-US" baseline="0" dirty="0" err="1" smtClean="0"/>
+              <a:t>mko</a:t>
+            </a:r>
+            <a:r>
+              <a:rPr lang="en-US" baseline="0" dirty="0" smtClean="0"/>
+              <a:t>. </a:t>
+            </a:r>
+          </a:p>
+          <a:p>
+            <a:pPr marL="228600" indent="-228600">
+              <a:buAutoNum type="arabicPeriod"/>
+            </a:pPr>
+            <a:endParaRPr lang="en-US" baseline="0" dirty="0" smtClean="0"/>
+          </a:p>
+          <a:p>
+            <a:pPr marL="0" indent="0">
+              <a:buNone/>
+            </a:pPr>
+            <a:r>
+              <a:rPr lang="en-US" baseline="0" dirty="0" smtClean="0"/>
+              <a:t>Dashed lines: without TNF feedback</a:t>
+            </a:r>
+          </a:p>
+        </p:txBody>
+      </p:sp>
+      <p:sp>
+        <p:nvSpPr>
+          <p:cNvPr id="4" name="Slide Number Placeholder 3"/>
+          <p:cNvSpPr>
+            <a:spLocks noGrp="1"/>
+          </p:cNvSpPr>
+          <p:nvPr>
+            <p:ph type="sldNum" sz="quarter" idx="10"/>
+          </p:nvPr>
+        </p:nvSpPr>
+        <p:spPr/>
+        <p:txBody>
+          <a:bodyPr/>
+          <a:lstStyle/>
+          <a:p>
+            <a:fld id="{837A9C9D-08EC-C64D-9F61-949AA1F45D5D}" type="slidenum">
+              <a:rPr lang="en-US" smtClean="0"/>
+              <a:t>12</a:t>
+            </a:fld>
+            <a:endParaRPr lang="en-US"/>
+          </a:p>
+        </p:txBody>
+      </p:sp>
+    </p:spTree>
+    <p:extLst>
+      <p:ext uri="{BB962C8B-B14F-4D97-AF65-F5344CB8AC3E}">
+        <p14:creationId xmlns:p14="http://schemas.microsoft.com/office/powerpoint/2010/main" val="1738040238"/>
+      </p:ext>
+    </p:extLst>
+  </p:cSld>
+  <p:clrMapOvr>
+    <a:masterClrMapping/>
+  </p:clrMapOvr>
+</p:notes>
+</file>
+
+<file path=ppt/notesSlides/notesSlide11.xml><?xml version="1.0" encoding="utf-8"?>
+<p:notes xmlns:a="http://schemas.openxmlformats.org/drawingml/2006/main" xmlns:r="http://schemas.openxmlformats.org/officeDocument/2006/relationships" xmlns:p="http://schemas.openxmlformats.org/presentationml/2006/main">
+  <p:cSld>
+    <p:spTree>
+      <p:nvGrpSpPr>
+        <p:cNvPr id="1" name=""/>
+        <p:cNvGrpSpPr/>
+        <p:nvPr/>
+      </p:nvGrpSpPr>
+      <p:grpSpPr>
+        <a:xfrm>
+          <a:off x="0" y="0"/>
+          <a:ext cx="0" cy="0"/>
+          <a:chOff x="0" y="0"/>
+          <a:chExt cx="0" cy="0"/>
+        </a:xfrm>
+      </p:grpSpPr>
+      <p:sp>
+        <p:nvSpPr>
+          <p:cNvPr id="2" name="Slide Image Placeholder 1"/>
+          <p:cNvSpPr>
+            <a:spLocks noGrp="1" noRot="1" noChangeAspect="1"/>
+          </p:cNvSpPr>
+          <p:nvPr>
+            <p:ph type="sldImg"/>
+          </p:nvPr>
+        </p:nvSpPr>
+        <p:spPr/>
+      </p:sp>
+      <p:sp>
+        <p:nvSpPr>
+          <p:cNvPr id="3" name="Notes Placeholder 2"/>
+          <p:cNvSpPr>
+            <a:spLocks noGrp="1"/>
+          </p:cNvSpPr>
+          <p:nvPr>
+            <p:ph type="body" idx="1"/>
+          </p:nvPr>
+        </p:nvSpPr>
+        <p:spPr/>
+        <p:txBody>
+          <a:bodyPr/>
+          <a:lstStyle/>
+          <a:p>
+            <a:r>
+              <a:rPr lang="en-US" dirty="0" err="1" smtClean="0"/>
+              <a:t>TNFr</a:t>
+            </a:r>
+            <a:r>
+              <a:rPr lang="en-US" dirty="0" smtClean="0"/>
+              <a:t> synthesis </a:t>
+            </a:r>
+            <a:endParaRPr lang="en-US" dirty="0"/>
+          </a:p>
+        </p:txBody>
+      </p:sp>
+      <p:sp>
+        <p:nvSpPr>
+          <p:cNvPr id="4" name="Slide Number Placeholder 3"/>
+          <p:cNvSpPr>
+            <a:spLocks noGrp="1"/>
+          </p:cNvSpPr>
+          <p:nvPr>
+            <p:ph type="sldNum" sz="quarter" idx="10"/>
+          </p:nvPr>
+        </p:nvSpPr>
+        <p:spPr/>
+        <p:txBody>
+          <a:bodyPr/>
+          <a:lstStyle/>
+          <a:p>
+            <a:fld id="{837A9C9D-08EC-C64D-9F61-949AA1F45D5D}" type="slidenum">
+              <a:rPr lang="en-US" smtClean="0"/>
+              <a:t>13</a:t>
+            </a:fld>
+            <a:endParaRPr lang="en-US"/>
+          </a:p>
+        </p:txBody>
+      </p:sp>
+    </p:spTree>
+    <p:extLst>
+      <p:ext uri="{BB962C8B-B14F-4D97-AF65-F5344CB8AC3E}">
+        <p14:creationId xmlns:p14="http://schemas.microsoft.com/office/powerpoint/2010/main" val="1738040238"/>
+      </p:ext>
+    </p:extLst>
+  </p:cSld>
+  <p:clrMapOvr>
+    <a:masterClrMapping/>
+  </p:clrMapOvr>
+</p:notes>
+</file>
+
 <file path=ppt/notesSlides/notesSlide2.xml><?xml version="1.0" encoding="utf-8"?>
 <p:notes xmlns:a="http://schemas.openxmlformats.org/drawingml/2006/main" xmlns:r="http://schemas.openxmlformats.org/officeDocument/2006/relationships" xmlns:p="http://schemas.openxmlformats.org/presentationml/2006/main">
   <p:cSld>
@@ -814,22 +1063,6 @@
           <a:bodyPr/>
           <a:lstStyle/>
           <a:p>
-            <a:r>
-              <a:rPr lang="en-US" dirty="0" smtClean="0"/>
-              <a:t>6 fold</a:t>
-            </a:r>
-            <a:r>
-              <a:rPr lang="en-US" baseline="0" dirty="0" smtClean="0"/>
-              <a:t> less in MyD88 </a:t>
-            </a:r>
-            <a:r>
-              <a:rPr lang="en-US" baseline="0" dirty="0" err="1" smtClean="0"/>
-              <a:t>ko</a:t>
-            </a:r>
-            <a:r>
-              <a:rPr lang="en-US" baseline="0" dirty="0" smtClean="0"/>
-              <a:t> </a:t>
-            </a:r>
             <a:endParaRPr lang="en-US" dirty="0"/>
           </a:p>
         </p:txBody>
@@ -849,9 +1082,9 @@
           <a:bodyPr/>
           <a:lstStyle/>
           <a:p>
-            <a:fld id="{837A9C9D-08EC-C64D-9F61-949AA1F45D5D}" type="slidenum">
+            <a:fld id="{713CF423-7E80-1241-A999-021D08102ECF}" type="slidenum">
               <a:rPr lang="en-US" smtClean="0"/>
-              <a:t>4</a:t>
+              <a:t>3</a:t>
             </a:fld>
             <a:endParaRPr lang="en-US"/>
           </a:p>
@@ -860,7 +1093,7 @@
     </p:spTree>
     <p:extLst>
       <p:ext uri="{BB962C8B-B14F-4D97-AF65-F5344CB8AC3E}">
-        <p14:creationId xmlns:p14="http://schemas.microsoft.com/office/powerpoint/2010/main" val="1738040238"/>
+        <p14:creationId xmlns:p14="http://schemas.microsoft.com/office/powerpoint/2010/main" val="883620102"/>
       </p:ext>
     </p:extLst>
   </p:cSld>
@@ -916,35 +1149,19 @@
           <a:p>
             <a:r>
               <a:rPr lang="en-US" dirty="0" smtClean="0"/>
-              <a:t>As long</a:t>
+              <a:t>6 fold</a:t>
             </a:r>
             <a:r>
               <a:rPr lang="en-US" baseline="0" dirty="0" smtClean="0"/>
-              <a:t> as keep the same ratios of processing rate between </a:t>
+              <a:t> less in MyD88 </a:t>
             </a:r>
             <a:r>
               <a:rPr lang="en-US" baseline="0" dirty="0" err="1" smtClean="0"/>
-              <a:t>wt</a:t>
+              <a:t>ko</a:t>
             </a:r>
             <a:r>
               <a:rPr lang="en-US" baseline="0" dirty="0" smtClean="0"/>
-              <a:t>, </a:t>
-            </a:r>
-            <a:r>
-              <a:rPr lang="en-US" baseline="0" dirty="0" err="1" smtClean="0"/>
-              <a:t>mko</a:t>
-            </a:r>
-            <a:r>
-              <a:rPr lang="en-US" baseline="0" dirty="0" smtClean="0"/>
-              <a:t> and </a:t>
-            </a:r>
-            <a:r>
-              <a:rPr lang="en-US" baseline="0" dirty="0" err="1" smtClean="0"/>
-              <a:t>tko</a:t>
-            </a:r>
-            <a:r>
-              <a:rPr lang="en-US" baseline="0" dirty="0" smtClean="0"/>
-              <a:t>, the fit doesn’t depend on the process rate. </a:t>
+              <a:t> </a:t>
             </a:r>
             <a:endParaRPr lang="en-US" dirty="0"/>
           </a:p>
@@ -965,9 +1182,9 @@
           <a:bodyPr/>
           <a:lstStyle/>
           <a:p>
-            <a:fld id="{713CF423-7E80-1241-A999-021D08102ECF}" type="slidenum">
+            <a:fld id="{837A9C9D-08EC-C64D-9F61-949AA1F45D5D}" type="slidenum">
               <a:rPr lang="en-US" smtClean="0"/>
-              <a:t>6</a:t>
+              <a:t>4</a:t>
             </a:fld>
             <a:endParaRPr lang="en-US"/>
           </a:p>
@@ -976,7 +1193,7 @@
     </p:spTree>
     <p:extLst>
       <p:ext uri="{BB962C8B-B14F-4D97-AF65-F5344CB8AC3E}">
-        <p14:creationId xmlns:p14="http://schemas.microsoft.com/office/powerpoint/2010/main" val="3961928946"/>
+        <p14:creationId xmlns:p14="http://schemas.microsoft.com/office/powerpoint/2010/main" val="1738040238"/>
       </p:ext>
     </p:extLst>
   </p:cSld>
@@ -1031,61 +1248,37 @@
           <a:lstStyle/>
           <a:p>
             <a:r>
-              <a:rPr lang="en-US" b="1" dirty="0" err="1" smtClean="0"/>
-              <a:t>proTNF</a:t>
-            </a:r>
-            <a:r>
-              <a:rPr lang="en-US" b="1" dirty="0" smtClean="0"/>
-              <a:t> half-life</a:t>
-            </a:r>
-            <a:r>
-              <a:rPr lang="en-US" b="1" baseline="0" dirty="0" smtClean="0"/>
-              <a:t>: less than 15 mins; </a:t>
-            </a:r>
-          </a:p>
-          <a:p>
-            <a:r>
               <a:rPr lang="en-US" dirty="0" smtClean="0"/>
-              <a:t>J </a:t>
-            </a:r>
-            <a:r>
-              <a:rPr lang="en-US" dirty="0" err="1" smtClean="0"/>
-              <a:t>Immunol</a:t>
-            </a:r>
-            <a:r>
-              <a:rPr lang="en-US" dirty="0" smtClean="0"/>
-              <a:t>. 1997 Nov 1;159(9):4524-31.</a:t>
-            </a:r>
-          </a:p>
-          <a:p>
-            <a:r>
-              <a:rPr lang="en-US" dirty="0" smtClean="0"/>
-              <a:t>The fate of pro-TNF-alpha following inhibition of </a:t>
-            </a:r>
-            <a:r>
-              <a:rPr lang="en-US" dirty="0" err="1" smtClean="0"/>
-              <a:t>metalloprotease</a:t>
-            </a:r>
-            <a:r>
-              <a:rPr lang="en-US" dirty="0" smtClean="0"/>
-              <a:t>-dependent processing to soluble TNF-alpha in human monocytes.</a:t>
-            </a:r>
-          </a:p>
-          <a:p>
-            <a:r>
-              <a:rPr lang="en-US" dirty="0" smtClean="0"/>
-              <a:t>Solomon KA, Covington MB, </a:t>
-            </a:r>
-            <a:r>
-              <a:rPr lang="en-US" dirty="0" err="1" smtClean="0"/>
-              <a:t>DeCicco</a:t>
-            </a:r>
-            <a:r>
-              <a:rPr lang="en-US" dirty="0" smtClean="0"/>
-              <a:t> CP, Newton RC.</a:t>
-            </a:r>
-          </a:p>
-          <a:p>
+              <a:t>As long</a:t>
+            </a:r>
+            <a:r>
+              <a:rPr lang="en-US" baseline="0" dirty="0" smtClean="0"/>
+              <a:t> as keep the same ratios of processing rate between </a:t>
+            </a:r>
+            <a:r>
+              <a:rPr lang="en-US" baseline="0" dirty="0" err="1" smtClean="0"/>
+              <a:t>wt</a:t>
+            </a:r>
+            <a:r>
+              <a:rPr lang="en-US" baseline="0" dirty="0" smtClean="0"/>
+              <a:t>, </a:t>
+            </a:r>
+            <a:r>
+              <a:rPr lang="en-US" baseline="0" dirty="0" err="1" smtClean="0"/>
+              <a:t>mko</a:t>
+            </a:r>
+            <a:r>
+              <a:rPr lang="en-US" baseline="0" dirty="0" smtClean="0"/>
+              <a:t> and </a:t>
+            </a:r>
+            <a:r>
+              <a:rPr lang="en-US" baseline="0" dirty="0" err="1" smtClean="0"/>
+              <a:t>tko</a:t>
+            </a:r>
+            <a:r>
+              <a:rPr lang="en-US" baseline="0" dirty="0" smtClean="0"/>
+              <a:t>, the fit doesn’t depend on the process rate. </a:t>
+            </a:r>
             <a:endParaRPr lang="en-US" dirty="0"/>
           </a:p>
         </p:txBody>
@@ -1105,9 +1298,9 @@
           <a:bodyPr/>
           <a:lstStyle/>
           <a:p>
-            <a:fld id="{837A9C9D-08EC-C64D-9F61-949AA1F45D5D}" type="slidenum">
+            <a:fld id="{713CF423-7E80-1241-A999-021D08102ECF}" type="slidenum">
               <a:rPr lang="en-US" smtClean="0"/>
-              <a:t>7</a:t>
+              <a:t>6</a:t>
             </a:fld>
             <a:endParaRPr lang="en-US"/>
           </a:p>
@@ -1116,7 +1309,7 @@
     </p:spTree>
     <p:extLst>
       <p:ext uri="{BB962C8B-B14F-4D97-AF65-F5344CB8AC3E}">
-        <p14:creationId xmlns:p14="http://schemas.microsoft.com/office/powerpoint/2010/main" val="1738040238"/>
+        <p14:creationId xmlns:p14="http://schemas.microsoft.com/office/powerpoint/2010/main" val="3961928946"/>
       </p:ext>
     </p:extLst>
   </p:cSld>
@@ -1171,17 +1364,61 @@
           <a:lstStyle/>
           <a:p>
             <a:r>
+              <a:rPr lang="en-US" b="1" dirty="0" err="1" smtClean="0"/>
+              <a:t>proTNF</a:t>
+            </a:r>
+            <a:r>
+              <a:rPr lang="en-US" b="1" dirty="0" smtClean="0"/>
+              <a:t> half-life</a:t>
+            </a:r>
+            <a:r>
+              <a:rPr lang="en-US" b="1" baseline="0" dirty="0" smtClean="0"/>
+              <a:t>: less than 15 mins; </a:t>
+            </a:r>
+          </a:p>
+          <a:p>
+            <a:r>
               <a:rPr lang="en-US" dirty="0" smtClean="0"/>
-              <a:t>f(</a:t>
+              <a:t>J </a:t>
             </a:r>
             <a:r>
               <a:rPr lang="en-US" dirty="0" err="1" smtClean="0"/>
-              <a:t>NFkB</a:t>
+              <a:t>Immunol</a:t>
             </a:r>
             <a:r>
               <a:rPr lang="en-US" dirty="0" smtClean="0"/>
-              <a:t>)</a:t>
-            </a:r>
+              <a:t>. 1997 Nov 1;159(9):4524-31.</a:t>
+            </a:r>
+          </a:p>
+          <a:p>
+            <a:r>
+              <a:rPr lang="en-US" dirty="0" smtClean="0"/>
+              <a:t>The fate of pro-TNF-alpha following inhibition of </a:t>
+            </a:r>
+            <a:r>
+              <a:rPr lang="en-US" dirty="0" err="1" smtClean="0"/>
+              <a:t>metalloprotease</a:t>
+            </a:r>
+            <a:r>
+              <a:rPr lang="en-US" dirty="0" smtClean="0"/>
+              <a:t>-dependent processing to soluble TNF-alpha in human monocytes.</a:t>
+            </a:r>
+          </a:p>
+          <a:p>
+            <a:r>
+              <a:rPr lang="en-US" dirty="0" smtClean="0"/>
+              <a:t>Solomon KA, Covington MB, </a:t>
+            </a:r>
+            <a:r>
+              <a:rPr lang="en-US" dirty="0" err="1" smtClean="0"/>
+              <a:t>DeCicco</a:t>
+            </a:r>
+            <a:r>
+              <a:rPr lang="en-US" dirty="0" smtClean="0"/>
+              <a:t> CP, Newton RC.</a:t>
+            </a:r>
+          </a:p>
+          <a:p>
             <a:endParaRPr lang="en-US" dirty="0"/>
           </a:p>
         </p:txBody>
@@ -1203,7 +1440,7 @@
           <a:p>
             <a:fld id="{837A9C9D-08EC-C64D-9F61-949AA1F45D5D}" type="slidenum">
               <a:rPr lang="en-US" smtClean="0"/>
-              <a:t>8</a:t>
+              <a:t>7</a:t>
             </a:fld>
             <a:endParaRPr lang="en-US"/>
           </a:p>
@@ -1268,7 +1505,15 @@
           <a:p>
             <a:r>
               <a:rPr lang="en-US" dirty="0" smtClean="0"/>
-              <a:t>Tw</a:t>
+              <a:t>f(</a:t>
+            </a:r>
+            <a:r>
+              <a:rPr lang="en-US" dirty="0" err="1" smtClean="0"/>
+              <a:t>NFkB</a:t>
+            </a:r>
+            <a:r>
+              <a:rPr lang="en-US" dirty="0" smtClean="0"/>
+              <a:t>)</a:t>
             </a:r>
             <a:endParaRPr lang="en-US" dirty="0"/>
           </a:p>
@@ -1289,9 +1534,9 @@
           <a:bodyPr/>
           <a:lstStyle/>
           <a:p>
-            <a:fld id="{713CF423-7E80-1241-A999-021D08102ECF}" type="slidenum">
+            <a:fld id="{837A9C9D-08EC-C64D-9F61-949AA1F45D5D}" type="slidenum">
               <a:rPr lang="en-US" smtClean="0"/>
-              <a:t>10</a:t>
+              <a:t>8</a:t>
             </a:fld>
             <a:endParaRPr lang="en-US"/>
           </a:p>
@@ -1300,7 +1545,7 @@
     </p:spTree>
     <p:extLst>
       <p:ext uri="{BB962C8B-B14F-4D97-AF65-F5344CB8AC3E}">
-        <p14:creationId xmlns:p14="http://schemas.microsoft.com/office/powerpoint/2010/main" val="3079422344"/>
+        <p14:creationId xmlns:p14="http://schemas.microsoft.com/office/powerpoint/2010/main" val="1738040238"/>
       </p:ext>
     </p:extLst>
   </p:cSld>
@@ -1356,77 +1601,9 @@
           <a:p>
             <a:r>
               <a:rPr lang="en-US" dirty="0" smtClean="0"/>
-              <a:t>Two ways of match</a:t>
-            </a:r>
-            <a:r>
-              <a:rPr lang="en-US" baseline="0" dirty="0" smtClean="0"/>
-              <a:t> mRNA and nascent profiles:</a:t>
-            </a:r>
-          </a:p>
-          <a:p>
-            <a:pPr marL="228600" indent="-228600">
-              <a:buAutoNum type="arabicPeriod"/>
-            </a:pPr>
-            <a:r>
-              <a:rPr lang="en-US" baseline="0" dirty="0" smtClean="0"/>
-              <a:t>Increase the contribution of TNF feedback to the </a:t>
-            </a:r>
-            <a:r>
-              <a:rPr lang="en-US" baseline="0" dirty="0" err="1" smtClean="0"/>
-              <a:t>tko</a:t>
-            </a:r>
-            <a:r>
-              <a:rPr lang="en-US" baseline="0" dirty="0" smtClean="0"/>
-              <a:t> late phase </a:t>
-            </a:r>
-          </a:p>
-          <a:p>
-            <a:pPr marL="228600" indent="-228600">
-              <a:buAutoNum type="arabicPeriod"/>
-            </a:pPr>
-            <a:r>
-              <a:rPr lang="en-US" baseline="0" dirty="0" smtClean="0"/>
-              <a:t>Adjust the </a:t>
-            </a:r>
-            <a:r>
-              <a:rPr lang="en-US" baseline="0" dirty="0" err="1" smtClean="0"/>
-              <a:t>NFkB</a:t>
-            </a:r>
-            <a:r>
-              <a:rPr lang="en-US" baseline="0" dirty="0" smtClean="0"/>
-              <a:t> threshold changes in the </a:t>
-            </a:r>
-            <a:r>
-              <a:rPr lang="en-US" baseline="0" dirty="0" err="1" smtClean="0"/>
-              <a:t>mko</a:t>
-            </a:r>
-            <a:r>
-              <a:rPr lang="en-US" baseline="0" dirty="0" smtClean="0"/>
-              <a:t> with processing rate changes in </a:t>
-            </a:r>
-            <a:r>
-              <a:rPr lang="en-US" baseline="0" dirty="0" err="1" smtClean="0"/>
-              <a:t>mko</a:t>
-            </a:r>
-            <a:r>
-              <a:rPr lang="en-US" baseline="0" dirty="0" smtClean="0"/>
-              <a:t>. </a:t>
-            </a:r>
-          </a:p>
-          <a:p>
-            <a:pPr marL="228600" indent="-228600">
-              <a:buAutoNum type="arabicPeriod"/>
-            </a:pPr>
-            <a:endParaRPr lang="en-US" baseline="0" dirty="0" smtClean="0"/>
-          </a:p>
-          <a:p>
-            <a:pPr marL="0" indent="0">
-              <a:buNone/>
-            </a:pPr>
-            <a:r>
-              <a:rPr lang="en-US" baseline="0" dirty="0" smtClean="0"/>
-              <a:t>Dashed lines: without TNF feedback</a:t>
-            </a:r>
+              <a:t>Tw</a:t>
+            </a:r>
+            <a:endParaRPr lang="en-US" dirty="0"/>
           </a:p>
         </p:txBody>
       </p:sp>
@@ -1445,9 +1622,9 @@
           <a:bodyPr/>
           <a:lstStyle/>
           <a:p>
-            <a:fld id="{837A9C9D-08EC-C64D-9F61-949AA1F45D5D}" type="slidenum">
+            <a:fld id="{713CF423-7E80-1241-A999-021D08102ECF}" type="slidenum">
               <a:rPr lang="en-US" smtClean="0"/>
-              <a:t>11</a:t>
+              <a:t>10</a:t>
             </a:fld>
             <a:endParaRPr lang="en-US"/>
           </a:p>
@@ -1456,7 +1633,7 @@
     </p:spTree>
     <p:extLst>
       <p:ext uri="{BB962C8B-B14F-4D97-AF65-F5344CB8AC3E}">
-        <p14:creationId xmlns:p14="http://schemas.microsoft.com/office/powerpoint/2010/main" val="1738040238"/>
+        <p14:creationId xmlns:p14="http://schemas.microsoft.com/office/powerpoint/2010/main" val="3079422344"/>
       </p:ext>
     </p:extLst>
   </p:cSld>
@@ -1511,12 +1688,8 @@
           <a:lstStyle/>
           <a:p>
             <a:r>
-              <a:rPr lang="en-US" dirty="0" err="1" smtClean="0"/>
-              <a:t>TNFr</a:t>
-            </a:r>
-            <a:r>
               <a:rPr lang="en-US" dirty="0" smtClean="0"/>
-              <a:t> synthesis </a:t>
+              <a:t>Tw</a:t>
             </a:r>
             <a:endParaRPr lang="en-US" dirty="0"/>
           </a:p>
@@ -1537,9 +1710,9 @@
           <a:bodyPr/>
           <a:lstStyle/>
           <a:p>
-            <a:fld id="{837A9C9D-08EC-C64D-9F61-949AA1F45D5D}" type="slidenum">
+            <a:fld id="{713CF423-7E80-1241-A999-021D08102ECF}" type="slidenum">
               <a:rPr lang="en-US" smtClean="0"/>
-              <a:t>12</a:t>
+              <a:t>11</a:t>
             </a:fld>
             <a:endParaRPr lang="en-US"/>
           </a:p>
@@ -1548,7 +1721,7 @@
     </p:spTree>
     <p:extLst>
       <p:ext uri="{BB962C8B-B14F-4D97-AF65-F5344CB8AC3E}">
-        <p14:creationId xmlns:p14="http://schemas.microsoft.com/office/powerpoint/2010/main" val="1738040238"/>
+        <p14:creationId xmlns:p14="http://schemas.microsoft.com/office/powerpoint/2010/main" val="3079422344"/>
       </p:ext>
     </p:extLst>
   </p:cSld>
@@ -1740,7 +1913,7 @@
             <a:fld id="{0DA042B0-5508-8A40-9A09-F8377543C8AB}" type="datetimeFigureOut">
               <a:rPr lang="en-US" smtClean="0"/>
               <a:pPr/>
-              <a:t>2/7/14</a:t>
+              <a:t>2/19/14</a:t>
             </a:fld>
             <a:endParaRPr lang="en-US" dirty="0"/>
           </a:p>
@@ -1912,7 +2085,7 @@
             <a:fld id="{0DA042B0-5508-8A40-9A09-F8377543C8AB}" type="datetimeFigureOut">
               <a:rPr lang="en-US" smtClean="0"/>
               <a:pPr/>
-              <a:t>2/7/14</a:t>
+              <a:t>2/19/14</a:t>
             </a:fld>
             <a:endParaRPr lang="en-US" dirty="0"/>
           </a:p>
@@ -2094,7 +2267,7 @@
             <a:fld id="{0DA042B0-5508-8A40-9A09-F8377543C8AB}" type="datetimeFigureOut">
               <a:rPr lang="en-US" smtClean="0"/>
               <a:pPr/>
-              <a:t>2/7/14</a:t>
+              <a:t>2/19/14</a:t>
             </a:fld>
             <a:endParaRPr lang="en-US" dirty="0"/>
           </a:p>
@@ -2266,7 +2439,7 @@
             <a:fld id="{0DA042B0-5508-8A40-9A09-F8377543C8AB}" type="datetimeFigureOut">
               <a:rPr lang="en-US" smtClean="0"/>
               <a:pPr/>
-              <a:t>2/7/14</a:t>
+              <a:t>2/19/14</a:t>
             </a:fld>
             <a:endParaRPr lang="en-US" dirty="0"/>
           </a:p>
@@ -2514,7 +2687,7 @@
             <a:fld id="{0DA042B0-5508-8A40-9A09-F8377543C8AB}" type="datetimeFigureOut">
               <a:rPr lang="en-US" smtClean="0"/>
               <a:pPr/>
-              <a:t>2/7/14</a:t>
+              <a:t>2/19/14</a:t>
             </a:fld>
             <a:endParaRPr lang="en-US" dirty="0"/>
           </a:p>
@@ -2804,7 +2977,7 @@
             <a:fld id="{0DA042B0-5508-8A40-9A09-F8377543C8AB}" type="datetimeFigureOut">
               <a:rPr lang="en-US" smtClean="0"/>
               <a:pPr/>
-              <a:t>2/7/14</a:t>
+              <a:t>2/19/14</a:t>
             </a:fld>
             <a:endParaRPr lang="en-US" dirty="0"/>
           </a:p>
@@ -3228,7 +3401,7 @@
             <a:fld id="{0DA042B0-5508-8A40-9A09-F8377543C8AB}" type="datetimeFigureOut">
               <a:rPr lang="en-US" smtClean="0"/>
               <a:pPr/>
-              <a:t>2/7/14</a:t>
+              <a:t>2/19/14</a:t>
             </a:fld>
             <a:endParaRPr lang="en-US" dirty="0"/>
           </a:p>
@@ -3348,7 +3521,7 @@
             <a:fld id="{0DA042B0-5508-8A40-9A09-F8377543C8AB}" type="datetimeFigureOut">
               <a:rPr lang="en-US" smtClean="0"/>
               <a:pPr/>
-              <a:t>2/7/14</a:t>
+              <a:t>2/19/14</a:t>
             </a:fld>
             <a:endParaRPr lang="en-US" dirty="0"/>
           </a:p>
@@ -3445,7 +3618,7 @@
             <a:fld id="{0DA042B0-5508-8A40-9A09-F8377543C8AB}" type="datetimeFigureOut">
               <a:rPr lang="en-US" smtClean="0"/>
               <a:pPr/>
-              <a:t>2/7/14</a:t>
+              <a:t>2/19/14</a:t>
             </a:fld>
             <a:endParaRPr lang="en-US" dirty="0"/>
           </a:p>
@@ -3724,7 +3897,7 @@
             <a:fld id="{0DA042B0-5508-8A40-9A09-F8377543C8AB}" type="datetimeFigureOut">
               <a:rPr lang="en-US" smtClean="0"/>
               <a:pPr/>
-              <a:t>2/7/14</a:t>
+              <a:t>2/19/14</a:t>
             </a:fld>
             <a:endParaRPr lang="en-US" dirty="0"/>
           </a:p>
@@ -3983,7 +4156,7 @@
             <a:fld id="{0DA042B0-5508-8A40-9A09-F8377543C8AB}" type="datetimeFigureOut">
               <a:rPr lang="en-US" smtClean="0"/>
               <a:pPr/>
-              <a:t>2/7/14</a:t>
+              <a:t>2/19/14</a:t>
             </a:fld>
             <a:endParaRPr lang="en-US" dirty="0"/>
           </a:p>
@@ -4198,7 +4371,7 @@
             <a:fld id="{0DA042B0-5508-8A40-9A09-F8377543C8AB}" type="datetimeFigureOut">
               <a:rPr lang="en-US" smtClean="0"/>
               <a:pPr/>
-              <a:t>2/7/14</a:t>
+              <a:t>2/19/14</a:t>
             </a:fld>
             <a:endParaRPr lang="en-US" dirty="0"/>
           </a:p>
@@ -6444,7 +6617,7 @@
           <a:graphicData uri="http://schemas.openxmlformats.org/presentationml/2006/ole">
             <mc:AlternateContent xmlns:mc="http://schemas.openxmlformats.org/markup-compatibility/2006">
               <mc:Choice xmlns:v="urn:schemas-microsoft-com:vml" Requires="v">
-                <p:oleObj spid="_x0000_s12479" name="Equation" r:id="rId4" imgW="3022600" imgH="444500" progId="Equation.3">
+                <p:oleObj spid="_x0000_s12489" name="Equation" r:id="rId4" imgW="3022600" imgH="444500" progId="Equation.3">
                   <p:embed/>
                 </p:oleObj>
               </mc:Choice>
@@ -6501,7 +6674,7 @@
           <a:graphicData uri="http://schemas.openxmlformats.org/presentationml/2006/ole">
             <mc:AlternateContent xmlns:mc="http://schemas.openxmlformats.org/markup-compatibility/2006">
               <mc:Choice xmlns:v="urn:schemas-microsoft-com:vml" Requires="v">
-                <p:oleObj spid="_x0000_s12480" name="Equation" r:id="rId6" imgW="4724400" imgH="431800" progId="Equation.DSMT4">
+                <p:oleObj spid="_x0000_s12490" name="Equation" r:id="rId6" imgW="4724400" imgH="431800" progId="Equation.DSMT4">
                   <p:embed/>
                 </p:oleObj>
               </mc:Choice>
@@ -6558,7 +6731,7 @@
           <a:graphicData uri="http://schemas.openxmlformats.org/presentationml/2006/ole">
             <mc:AlternateContent xmlns:mc="http://schemas.openxmlformats.org/markup-compatibility/2006">
               <mc:Choice xmlns:v="urn:schemas-microsoft-com:vml" Requires="v">
-                <p:oleObj spid="_x0000_s12481" name="Equation" r:id="rId8" imgW="2197100" imgH="457200" progId="Equation.3">
+                <p:oleObj spid="_x0000_s12491" name="Equation" r:id="rId8" imgW="2197100" imgH="457200" progId="Equation.3">
                   <p:embed/>
                 </p:oleObj>
               </mc:Choice>
@@ -7877,6 +8050,1044 @@
       </p:grpSpPr>
       <p:sp>
         <p:nvSpPr>
+          <p:cNvPr id="3" name="Rectangle 2"/>
+          <p:cNvSpPr/>
+          <p:nvPr/>
+        </p:nvSpPr>
+        <p:spPr>
+          <a:xfrm>
+            <a:off x="510135" y="354319"/>
+            <a:ext cx="5306411" cy="461665"/>
+          </a:xfrm>
+          <a:prstGeom prst="rect">
+            <a:avLst/>
+          </a:prstGeom>
+        </p:spPr>
+        <p:txBody>
+          <a:bodyPr wrap="none">
+            <a:spAutoFit/>
+          </a:bodyPr>
+          <a:lstStyle/>
+          <a:p>
+            <a:r>
+              <a:rPr lang="en-US" sz="2400" b="1" dirty="0" smtClean="0"/>
+              <a:t>Module  1 to 3, together (</a:t>
+            </a:r>
+            <a:r>
+              <a:rPr lang="en-US" sz="2400" b="1" dirty="0" err="1" smtClean="0">
+                <a:solidFill>
+                  <a:srgbClr val="0000FF"/>
+                </a:solidFill>
+              </a:rPr>
+              <a:t>NFkB</a:t>
+            </a:r>
+            <a:r>
+              <a:rPr lang="en-US" sz="2400" b="1" dirty="0" smtClean="0">
+                <a:solidFill>
+                  <a:srgbClr val="0000FF"/>
+                </a:solidFill>
+              </a:rPr>
+              <a:t> as input</a:t>
+            </a:r>
+            <a:r>
+              <a:rPr lang="en-US" sz="2400" b="1" dirty="0" smtClean="0"/>
+              <a:t>)</a:t>
+            </a:r>
+            <a:endParaRPr lang="en-US" sz="2400" b="1" dirty="0"/>
+          </a:p>
+        </p:txBody>
+      </p:sp>
+      <p:graphicFrame>
+        <p:nvGraphicFramePr>
+          <p:cNvPr id="8" name="Table 7"/>
+          <p:cNvGraphicFramePr>
+            <a:graphicFrameLocks noGrp="1"/>
+          </p:cNvGraphicFramePr>
+          <p:nvPr>
+            <p:extLst>
+              <p:ext uri="{D42A27DB-BD31-4B8C-83A1-F6EECF244321}">
+                <p14:modId xmlns:p14="http://schemas.microsoft.com/office/powerpoint/2010/main" val="623746514"/>
+              </p:ext>
+            </p:extLst>
+          </p:nvPr>
+        </p:nvGraphicFramePr>
+        <p:xfrm>
+          <a:off x="7324448" y="1397000"/>
+          <a:ext cx="1590182" cy="5191760"/>
+        </p:xfrm>
+        <a:graphic>
+          <a:graphicData uri="http://schemas.openxmlformats.org/drawingml/2006/table">
+            <a:tbl>
+              <a:tblPr firstRow="1" bandRow="1">
+                <a:tableStyleId>{5C22544A-7EE6-4342-B048-85BDC9FD1C3A}</a:tableStyleId>
+              </a:tblPr>
+              <a:tblGrid>
+                <a:gridCol w="179884"/>
+                <a:gridCol w="815380"/>
+                <a:gridCol w="594918"/>
+              </a:tblGrid>
+              <a:tr h="370840">
+                <a:tc>
+                  <a:txBody>
+                    <a:bodyPr/>
+                    <a:lstStyle/>
+                    <a:p>
+                      <a:pPr algn="r" fontAlgn="b"/>
+                      <a:r>
+                        <a:rPr lang="en-US" sz="1200" b="1" i="0" u="none" strike="noStrike" dirty="0" smtClean="0">
+                          <a:solidFill>
+                            <a:srgbClr val="000000"/>
+                          </a:solidFill>
+                          <a:effectLst/>
+                          <a:latin typeface="Calibri"/>
+                        </a:rPr>
+                        <a:t>ID</a:t>
+                      </a:r>
+                      <a:endParaRPr lang="en-US" sz="1200" b="1" i="0" u="none" strike="noStrike" dirty="0">
+                        <a:solidFill>
+                          <a:srgbClr val="000000"/>
+                        </a:solidFill>
+                        <a:effectLst/>
+                        <a:latin typeface="Calibri"/>
+                      </a:endParaRPr>
+                    </a:p>
+                  </a:txBody>
+                  <a:tcPr marL="12700" marR="12700" marT="12700" marB="0" anchor="b"/>
+                </a:tc>
+                <a:tc>
+                  <a:txBody>
+                    <a:bodyPr/>
+                    <a:lstStyle/>
+                    <a:p>
+                      <a:pPr algn="l" fontAlgn="b"/>
+                      <a:r>
+                        <a:rPr lang="en-US" sz="1200" b="1" i="0" u="none" strike="noStrike" dirty="0" smtClean="0">
+                          <a:solidFill>
+                            <a:srgbClr val="000000"/>
+                          </a:solidFill>
+                          <a:effectLst/>
+                          <a:latin typeface="Calibri"/>
+                        </a:rPr>
+                        <a:t>Name</a:t>
+                      </a:r>
+                      <a:endParaRPr lang="en-US" sz="1200" b="1" i="0" u="none" strike="noStrike" dirty="0">
+                        <a:solidFill>
+                          <a:srgbClr val="000000"/>
+                        </a:solidFill>
+                        <a:effectLst/>
+                        <a:latin typeface="Calibri"/>
+                      </a:endParaRPr>
+                    </a:p>
+                  </a:txBody>
+                  <a:tcPr marL="12700" marR="12700" marT="12700" marB="0" anchor="b"/>
+                </a:tc>
+                <a:tc>
+                  <a:txBody>
+                    <a:bodyPr/>
+                    <a:lstStyle/>
+                    <a:p>
+                      <a:pPr algn="r" fontAlgn="b"/>
+                      <a:r>
+                        <a:rPr lang="en-US" sz="1200" b="1" i="0" u="none" strike="noStrike" dirty="0" smtClean="0">
+                          <a:solidFill>
+                            <a:srgbClr val="000000"/>
+                          </a:solidFill>
+                          <a:effectLst/>
+                          <a:latin typeface="Calibri"/>
+                        </a:rPr>
+                        <a:t>Values</a:t>
+                      </a:r>
+                      <a:endParaRPr lang="en-US" sz="1200" b="1" i="0" u="none" strike="noStrike" dirty="0">
+                        <a:solidFill>
+                          <a:srgbClr val="000000"/>
+                        </a:solidFill>
+                        <a:effectLst/>
+                        <a:latin typeface="Calibri"/>
+                      </a:endParaRPr>
+                    </a:p>
+                  </a:txBody>
+                  <a:tcPr marL="12700" marR="12700" marT="12700" marB="0" anchor="b"/>
+                </a:tc>
+              </a:tr>
+              <a:tr h="370840">
+                <a:tc>
+                  <a:txBody>
+                    <a:bodyPr/>
+                    <a:lstStyle/>
+                    <a:p>
+                      <a:pPr algn="r" fontAlgn="b"/>
+                      <a:r>
+                        <a:rPr lang="en-US" sz="1200" b="0" i="0" u="none" strike="noStrike" dirty="0">
+                          <a:solidFill>
+                            <a:srgbClr val="000000"/>
+                          </a:solidFill>
+                          <a:effectLst/>
+                          <a:latin typeface="Calibri"/>
+                        </a:rPr>
+                        <a:t>1</a:t>
+                      </a:r>
+                    </a:p>
+                  </a:txBody>
+                  <a:tcPr marL="12700" marR="12700" marT="12700" marB="0" anchor="b"/>
+                </a:tc>
+                <a:tc>
+                  <a:txBody>
+                    <a:bodyPr/>
+                    <a:lstStyle/>
+                    <a:p>
+                      <a:pPr algn="l" fontAlgn="b"/>
+                      <a:r>
+                        <a:rPr lang="en-US" sz="1200" b="0" i="0" u="none" strike="noStrike">
+                          <a:solidFill>
+                            <a:srgbClr val="000000"/>
+                          </a:solidFill>
+                          <a:effectLst/>
+                          <a:latin typeface="Calibri"/>
+                        </a:rPr>
+                        <a:t>Km_tr</a:t>
+                      </a:r>
+                    </a:p>
+                  </a:txBody>
+                  <a:tcPr marL="12700" marR="12700" marT="12700" marB="0" anchor="b"/>
+                </a:tc>
+                <a:tc>
+                  <a:txBody>
+                    <a:bodyPr/>
+                    <a:lstStyle/>
+                    <a:p>
+                      <a:pPr algn="r" fontAlgn="b"/>
+                      <a:r>
+                        <a:rPr lang="en-US" sz="1200" b="0" i="0" u="none" strike="noStrike">
+                          <a:solidFill>
+                            <a:srgbClr val="000000"/>
+                          </a:solidFill>
+                          <a:effectLst/>
+                          <a:latin typeface="Calibri"/>
+                        </a:rPr>
+                        <a:t>0.65</a:t>
+                      </a:r>
+                    </a:p>
+                  </a:txBody>
+                  <a:tcPr marL="12700" marR="12700" marT="12700" marB="0" anchor="b"/>
+                </a:tc>
+              </a:tr>
+              <a:tr h="370840">
+                <a:tc>
+                  <a:txBody>
+                    <a:bodyPr/>
+                    <a:lstStyle/>
+                    <a:p>
+                      <a:pPr algn="r" fontAlgn="b"/>
+                      <a:r>
+                        <a:rPr lang="en-US" sz="1200" b="0" i="0" u="none" strike="noStrike">
+                          <a:solidFill>
+                            <a:srgbClr val="000000"/>
+                          </a:solidFill>
+                          <a:effectLst/>
+                          <a:latin typeface="Calibri"/>
+                        </a:rPr>
+                        <a:t>2</a:t>
+                      </a:r>
+                    </a:p>
+                  </a:txBody>
+                  <a:tcPr marL="12700" marR="12700" marT="12700" marB="0" anchor="b"/>
+                </a:tc>
+                <a:tc>
+                  <a:txBody>
+                    <a:bodyPr/>
+                    <a:lstStyle/>
+                    <a:p>
+                      <a:pPr algn="l" fontAlgn="b"/>
+                      <a:r>
+                        <a:rPr lang="en-US" sz="1200" b="0" i="0" u="none" strike="noStrike">
+                          <a:solidFill>
+                            <a:srgbClr val="000000"/>
+                          </a:solidFill>
+                          <a:effectLst/>
+                          <a:latin typeface="Calibri"/>
+                        </a:rPr>
+                        <a:t>Km_tr_fold</a:t>
+                      </a:r>
+                    </a:p>
+                  </a:txBody>
+                  <a:tcPr marL="12700" marR="12700" marT="12700" marB="0" anchor="b"/>
+                </a:tc>
+                <a:tc>
+                  <a:txBody>
+                    <a:bodyPr/>
+                    <a:lstStyle/>
+                    <a:p>
+                      <a:pPr algn="r" fontAlgn="b"/>
+                      <a:r>
+                        <a:rPr lang="en-US" sz="1200" b="0" i="0" u="none" strike="noStrike">
+                          <a:solidFill>
+                            <a:srgbClr val="000000"/>
+                          </a:solidFill>
+                          <a:effectLst/>
+                          <a:latin typeface="Calibri"/>
+                        </a:rPr>
+                        <a:t>2</a:t>
+                      </a:r>
+                    </a:p>
+                  </a:txBody>
+                  <a:tcPr marL="12700" marR="12700" marT="12700" marB="0" anchor="b"/>
+                </a:tc>
+              </a:tr>
+              <a:tr h="370840">
+                <a:tc>
+                  <a:txBody>
+                    <a:bodyPr/>
+                    <a:lstStyle/>
+                    <a:p>
+                      <a:pPr algn="r" fontAlgn="b"/>
+                      <a:r>
+                        <a:rPr lang="en-US" sz="1200" b="0" i="0" u="none" strike="noStrike">
+                          <a:solidFill>
+                            <a:srgbClr val="000000"/>
+                          </a:solidFill>
+                          <a:effectLst/>
+                          <a:latin typeface="Calibri"/>
+                        </a:rPr>
+                        <a:t>3</a:t>
+                      </a:r>
+                    </a:p>
+                  </a:txBody>
+                  <a:tcPr marL="12700" marR="12700" marT="12700" marB="0" anchor="b"/>
+                </a:tc>
+                <a:tc>
+                  <a:txBody>
+                    <a:bodyPr/>
+                    <a:lstStyle/>
+                    <a:p>
+                      <a:pPr algn="l" fontAlgn="b"/>
+                      <a:r>
+                        <a:rPr lang="en-US" sz="1200" b="0" i="0" u="none" strike="noStrike">
+                          <a:solidFill>
+                            <a:srgbClr val="000000"/>
+                          </a:solidFill>
+                          <a:effectLst/>
+                          <a:latin typeface="Calibri"/>
+                        </a:rPr>
+                        <a:t>V_tr</a:t>
+                      </a:r>
+                    </a:p>
+                  </a:txBody>
+                  <a:tcPr marL="12700" marR="12700" marT="12700" marB="0" anchor="b"/>
+                </a:tc>
+                <a:tc>
+                  <a:txBody>
+                    <a:bodyPr/>
+                    <a:lstStyle/>
+                    <a:p>
+                      <a:pPr algn="r" fontAlgn="b"/>
+                      <a:r>
+                        <a:rPr lang="en-US" sz="1200" b="0" i="0" u="none" strike="noStrike">
+                          <a:solidFill>
+                            <a:srgbClr val="000000"/>
+                          </a:solidFill>
+                          <a:effectLst/>
+                          <a:latin typeface="Calibri"/>
+                        </a:rPr>
+                        <a:t>1</a:t>
+                      </a:r>
+                    </a:p>
+                  </a:txBody>
+                  <a:tcPr marL="12700" marR="12700" marT="12700" marB="0" anchor="b"/>
+                </a:tc>
+              </a:tr>
+              <a:tr h="370840">
+                <a:tc>
+                  <a:txBody>
+                    <a:bodyPr/>
+                    <a:lstStyle/>
+                    <a:p>
+                      <a:pPr algn="r" fontAlgn="b"/>
+                      <a:r>
+                        <a:rPr lang="en-US" sz="1200" b="0" i="0" u="none" strike="noStrike">
+                          <a:solidFill>
+                            <a:srgbClr val="000000"/>
+                          </a:solidFill>
+                          <a:effectLst/>
+                          <a:latin typeface="Calibri"/>
+                        </a:rPr>
+                        <a:t>4</a:t>
+                      </a:r>
+                    </a:p>
+                  </a:txBody>
+                  <a:tcPr marL="12700" marR="12700" marT="12700" marB="0" anchor="b"/>
+                </a:tc>
+                <a:tc>
+                  <a:txBody>
+                    <a:bodyPr/>
+                    <a:lstStyle/>
+                    <a:p>
+                      <a:pPr algn="l" fontAlgn="b"/>
+                      <a:r>
+                        <a:rPr lang="en-US" sz="1200" b="0" i="0" u="none" strike="noStrike">
+                          <a:solidFill>
+                            <a:srgbClr val="000000"/>
+                          </a:solidFill>
+                          <a:effectLst/>
+                          <a:latin typeface="Calibri"/>
+                        </a:rPr>
+                        <a:t>k_pr</a:t>
+                      </a:r>
+                    </a:p>
+                  </a:txBody>
+                  <a:tcPr marL="12700" marR="12700" marT="12700" marB="0" anchor="b"/>
+                </a:tc>
+                <a:tc>
+                  <a:txBody>
+                    <a:bodyPr/>
+                    <a:lstStyle/>
+                    <a:p>
+                      <a:pPr algn="r" fontAlgn="b"/>
+                      <a:r>
+                        <a:rPr lang="en-US" sz="1200" b="0" i="0" u="none" strike="noStrike" dirty="0">
+                          <a:solidFill>
+                            <a:srgbClr val="000000"/>
+                          </a:solidFill>
+                          <a:effectLst/>
+                          <a:latin typeface="Calibri"/>
+                        </a:rPr>
+                        <a:t>0.4</a:t>
+                      </a:r>
+                    </a:p>
+                  </a:txBody>
+                  <a:tcPr marL="12700" marR="12700" marT="12700" marB="0" anchor="b"/>
+                </a:tc>
+              </a:tr>
+              <a:tr h="370840">
+                <a:tc>
+                  <a:txBody>
+                    <a:bodyPr/>
+                    <a:lstStyle/>
+                    <a:p>
+                      <a:pPr algn="r" fontAlgn="b"/>
+                      <a:r>
+                        <a:rPr lang="en-US" sz="1200" b="0" i="0" u="none" strike="noStrike">
+                          <a:solidFill>
+                            <a:srgbClr val="000000"/>
+                          </a:solidFill>
+                          <a:effectLst/>
+                          <a:latin typeface="Calibri"/>
+                        </a:rPr>
+                        <a:t>5</a:t>
+                      </a:r>
+                    </a:p>
+                  </a:txBody>
+                  <a:tcPr marL="12700" marR="12700" marT="12700" marB="0" anchor="b"/>
+                </a:tc>
+                <a:tc>
+                  <a:txBody>
+                    <a:bodyPr/>
+                    <a:lstStyle/>
+                    <a:p>
+                      <a:pPr algn="l" fontAlgn="b"/>
+                      <a:r>
+                        <a:rPr lang="en-US" sz="1200" b="0" i="0" u="none" strike="noStrike">
+                          <a:solidFill>
+                            <a:srgbClr val="000000"/>
+                          </a:solidFill>
+                          <a:effectLst/>
+                          <a:latin typeface="Calibri"/>
+                        </a:rPr>
+                        <a:t>k_sec</a:t>
+                      </a:r>
+                    </a:p>
+                  </a:txBody>
+                  <a:tcPr marL="12700" marR="12700" marT="12700" marB="0" anchor="b"/>
+                </a:tc>
+                <a:tc>
+                  <a:txBody>
+                    <a:bodyPr/>
+                    <a:lstStyle/>
+                    <a:p>
+                      <a:pPr algn="r" fontAlgn="b"/>
+                      <a:r>
+                        <a:rPr lang="en-US" sz="1200" b="0" i="0" u="none" strike="noStrike">
+                          <a:solidFill>
+                            <a:srgbClr val="000000"/>
+                          </a:solidFill>
+                          <a:effectLst/>
+                          <a:latin typeface="Calibri"/>
+                        </a:rPr>
+                        <a:t>0.07</a:t>
+                      </a:r>
+                    </a:p>
+                  </a:txBody>
+                  <a:tcPr marL="12700" marR="12700" marT="12700" marB="0" anchor="b"/>
+                </a:tc>
+              </a:tr>
+              <a:tr h="370840">
+                <a:tc>
+                  <a:txBody>
+                    <a:bodyPr/>
+                    <a:lstStyle/>
+                    <a:p>
+                      <a:pPr algn="r" fontAlgn="b"/>
+                      <a:r>
+                        <a:rPr lang="en-US" sz="1200" b="0" i="0" u="none" strike="noStrike">
+                          <a:solidFill>
+                            <a:srgbClr val="000000"/>
+                          </a:solidFill>
+                          <a:effectLst/>
+                          <a:latin typeface="Calibri"/>
+                        </a:rPr>
+                        <a:t>6</a:t>
+                      </a:r>
+                    </a:p>
+                  </a:txBody>
+                  <a:tcPr marL="12700" marR="12700" marT="12700" marB="0" anchor="b"/>
+                </a:tc>
+                <a:tc>
+                  <a:txBody>
+                    <a:bodyPr/>
+                    <a:lstStyle/>
+                    <a:p>
+                      <a:pPr algn="l" fontAlgn="b"/>
+                      <a:r>
+                        <a:rPr lang="en-US" sz="1200" b="0" i="0" u="none" strike="noStrike">
+                          <a:solidFill>
+                            <a:srgbClr val="000000"/>
+                          </a:solidFill>
+                          <a:effectLst/>
+                          <a:latin typeface="Calibri"/>
+                        </a:rPr>
+                        <a:t>k_tl</a:t>
+                      </a:r>
+                    </a:p>
+                  </a:txBody>
+                  <a:tcPr marL="12700" marR="12700" marT="12700" marB="0" anchor="b"/>
+                </a:tc>
+                <a:tc>
+                  <a:txBody>
+                    <a:bodyPr/>
+                    <a:lstStyle/>
+                    <a:p>
+                      <a:pPr algn="r" fontAlgn="b"/>
+                      <a:r>
+                        <a:rPr lang="en-US" sz="1200" b="0" i="0" u="none" strike="noStrike">
+                          <a:solidFill>
+                            <a:srgbClr val="000000"/>
+                          </a:solidFill>
+                          <a:effectLst/>
+                          <a:latin typeface="Calibri"/>
+                        </a:rPr>
+                        <a:t>0.05</a:t>
+                      </a:r>
+                    </a:p>
+                  </a:txBody>
+                  <a:tcPr marL="12700" marR="12700" marT="12700" marB="0" anchor="b"/>
+                </a:tc>
+              </a:tr>
+              <a:tr h="370840">
+                <a:tc>
+                  <a:txBody>
+                    <a:bodyPr/>
+                    <a:lstStyle/>
+                    <a:p>
+                      <a:pPr algn="r" fontAlgn="b"/>
+                      <a:r>
+                        <a:rPr lang="en-US" sz="1200" b="0" i="0" u="none" strike="noStrike">
+                          <a:solidFill>
+                            <a:srgbClr val="000000"/>
+                          </a:solidFill>
+                          <a:effectLst/>
+                          <a:latin typeface="Calibri"/>
+                        </a:rPr>
+                        <a:t>7</a:t>
+                      </a:r>
+                    </a:p>
+                  </a:txBody>
+                  <a:tcPr marL="12700" marR="12700" marT="12700" marB="0" anchor="b"/>
+                </a:tc>
+                <a:tc>
+                  <a:txBody>
+                    <a:bodyPr/>
+                    <a:lstStyle/>
+                    <a:p>
+                      <a:pPr algn="l" fontAlgn="b"/>
+                      <a:r>
+                        <a:rPr lang="en-US" sz="1200" b="0" i="0" u="none" strike="noStrike" dirty="0" err="1">
+                          <a:solidFill>
+                            <a:srgbClr val="000000"/>
+                          </a:solidFill>
+                          <a:effectLst/>
+                          <a:latin typeface="Calibri"/>
+                        </a:rPr>
+                        <a:t>kdeg_m</a:t>
+                      </a:r>
+                      <a:endParaRPr lang="en-US" sz="1200" b="0" i="0" u="none" strike="noStrike" dirty="0">
+                        <a:solidFill>
+                          <a:srgbClr val="000000"/>
+                        </a:solidFill>
+                        <a:effectLst/>
+                        <a:latin typeface="Calibri"/>
+                      </a:endParaRPr>
+                    </a:p>
+                  </a:txBody>
+                  <a:tcPr marL="12700" marR="12700" marT="12700" marB="0" anchor="b"/>
+                </a:tc>
+                <a:tc>
+                  <a:txBody>
+                    <a:bodyPr/>
+                    <a:lstStyle/>
+                    <a:p>
+                      <a:pPr algn="r" fontAlgn="b"/>
+                      <a:r>
+                        <a:rPr lang="en-US" sz="1200" b="0" i="0" u="none" strike="noStrike">
+                          <a:solidFill>
+                            <a:srgbClr val="000000"/>
+                          </a:solidFill>
+                          <a:effectLst/>
+                          <a:latin typeface="Calibri"/>
+                        </a:rPr>
+                        <a:t>0.02</a:t>
+                      </a:r>
+                    </a:p>
+                  </a:txBody>
+                  <a:tcPr marL="12700" marR="12700" marT="12700" marB="0" anchor="b"/>
+                </a:tc>
+              </a:tr>
+              <a:tr h="370840">
+                <a:tc>
+                  <a:txBody>
+                    <a:bodyPr/>
+                    <a:lstStyle/>
+                    <a:p>
+                      <a:pPr algn="r" fontAlgn="b"/>
+                      <a:r>
+                        <a:rPr lang="en-US" sz="1200" b="0" i="0" u="none" strike="noStrike">
+                          <a:solidFill>
+                            <a:srgbClr val="000000"/>
+                          </a:solidFill>
+                          <a:effectLst/>
+                          <a:latin typeface="Calibri"/>
+                        </a:rPr>
+                        <a:t>8</a:t>
+                      </a:r>
+                    </a:p>
+                  </a:txBody>
+                  <a:tcPr marL="12700" marR="12700" marT="12700" marB="0" anchor="b"/>
+                </a:tc>
+                <a:tc>
+                  <a:txBody>
+                    <a:bodyPr/>
+                    <a:lstStyle/>
+                    <a:p>
+                      <a:pPr algn="l" fontAlgn="b"/>
+                      <a:r>
+                        <a:rPr lang="en-US" sz="1200" b="0" i="0" u="none" strike="noStrike">
+                          <a:solidFill>
+                            <a:srgbClr val="000000"/>
+                          </a:solidFill>
+                          <a:effectLst/>
+                          <a:latin typeface="Calibri"/>
+                        </a:rPr>
+                        <a:t>kdeg_p</a:t>
+                      </a:r>
+                    </a:p>
+                  </a:txBody>
+                  <a:tcPr marL="12700" marR="12700" marT="12700" marB="0" anchor="b"/>
+                </a:tc>
+                <a:tc>
+                  <a:txBody>
+                    <a:bodyPr/>
+                    <a:lstStyle/>
+                    <a:p>
+                      <a:pPr algn="r" fontAlgn="b"/>
+                      <a:r>
+                        <a:rPr lang="en-US" sz="1200" b="0" i="0" u="none" strike="noStrike">
+                          <a:solidFill>
+                            <a:srgbClr val="000000"/>
+                          </a:solidFill>
+                          <a:effectLst/>
+                          <a:latin typeface="Calibri"/>
+                        </a:rPr>
+                        <a:t>0.07</a:t>
+                      </a:r>
+                    </a:p>
+                  </a:txBody>
+                  <a:tcPr marL="12700" marR="12700" marT="12700" marB="0" anchor="b"/>
+                </a:tc>
+              </a:tr>
+              <a:tr h="370840">
+                <a:tc>
+                  <a:txBody>
+                    <a:bodyPr/>
+                    <a:lstStyle/>
+                    <a:p>
+                      <a:pPr algn="r" fontAlgn="b"/>
+                      <a:r>
+                        <a:rPr lang="en-US" sz="1200" b="0" i="0" u="none" strike="noStrike">
+                          <a:solidFill>
+                            <a:srgbClr val="000000"/>
+                          </a:solidFill>
+                          <a:effectLst/>
+                          <a:latin typeface="Calibri"/>
+                        </a:rPr>
+                        <a:t>9</a:t>
+                      </a:r>
+                    </a:p>
+                  </a:txBody>
+                  <a:tcPr marL="12700" marR="12700" marT="12700" marB="0" anchor="b"/>
+                </a:tc>
+                <a:tc>
+                  <a:txBody>
+                    <a:bodyPr/>
+                    <a:lstStyle/>
+                    <a:p>
+                      <a:pPr algn="l" fontAlgn="b"/>
+                      <a:r>
+                        <a:rPr lang="en-US" sz="1200" b="0" i="0" u="none" strike="noStrike">
+                          <a:solidFill>
+                            <a:srgbClr val="000000"/>
+                          </a:solidFill>
+                          <a:effectLst/>
+                          <a:latin typeface="Calibri"/>
+                        </a:rPr>
+                        <a:t>n</a:t>
+                      </a:r>
+                    </a:p>
+                  </a:txBody>
+                  <a:tcPr marL="12700" marR="12700" marT="12700" marB="0" anchor="b"/>
+                </a:tc>
+                <a:tc>
+                  <a:txBody>
+                    <a:bodyPr/>
+                    <a:lstStyle/>
+                    <a:p>
+                      <a:pPr algn="r" fontAlgn="b"/>
+                      <a:r>
+                        <a:rPr lang="en-US" sz="1200" b="0" i="0" u="none" strike="noStrike">
+                          <a:solidFill>
+                            <a:srgbClr val="000000"/>
+                          </a:solidFill>
+                          <a:effectLst/>
+                          <a:latin typeface="Calibri"/>
+                        </a:rPr>
+                        <a:t>2</a:t>
+                      </a:r>
+                    </a:p>
+                  </a:txBody>
+                  <a:tcPr marL="12700" marR="12700" marT="12700" marB="0" anchor="b"/>
+                </a:tc>
+              </a:tr>
+              <a:tr h="370840">
+                <a:tc>
+                  <a:txBody>
+                    <a:bodyPr/>
+                    <a:lstStyle/>
+                    <a:p>
+                      <a:pPr algn="r" fontAlgn="b"/>
+                      <a:r>
+                        <a:rPr lang="en-US" sz="1200" b="0" i="0" u="none" strike="noStrike">
+                          <a:solidFill>
+                            <a:srgbClr val="000000"/>
+                          </a:solidFill>
+                          <a:effectLst/>
+                          <a:latin typeface="Calibri"/>
+                        </a:rPr>
+                        <a:t>10</a:t>
+                      </a:r>
+                    </a:p>
+                  </a:txBody>
+                  <a:tcPr marL="12700" marR="12700" marT="12700" marB="0" anchor="b"/>
+                </a:tc>
+                <a:tc>
+                  <a:txBody>
+                    <a:bodyPr/>
+                    <a:lstStyle/>
+                    <a:p>
+                      <a:pPr algn="l" fontAlgn="b"/>
+                      <a:r>
+                        <a:rPr lang="en-US" sz="1200" b="0" i="0" u="none" strike="noStrike">
+                          <a:solidFill>
+                            <a:srgbClr val="000000"/>
+                          </a:solidFill>
+                          <a:effectLst/>
+                          <a:latin typeface="Calibri"/>
+                        </a:rPr>
+                        <a:t>pr_fold_mko</a:t>
+                      </a:r>
+                    </a:p>
+                  </a:txBody>
+                  <a:tcPr marL="12700" marR="12700" marT="12700" marB="0" anchor="b"/>
+                </a:tc>
+                <a:tc>
+                  <a:txBody>
+                    <a:bodyPr/>
+                    <a:lstStyle/>
+                    <a:p>
+                      <a:pPr algn="r" fontAlgn="b"/>
+                      <a:r>
+                        <a:rPr lang="en-US" sz="1200" b="0" i="0" u="none" strike="noStrike">
+                          <a:solidFill>
+                            <a:srgbClr val="000000"/>
+                          </a:solidFill>
+                          <a:effectLst/>
+                          <a:latin typeface="Calibri"/>
+                        </a:rPr>
+                        <a:t>4.2</a:t>
+                      </a:r>
+                    </a:p>
+                  </a:txBody>
+                  <a:tcPr marL="12700" marR="12700" marT="12700" marB="0" anchor="b"/>
+                </a:tc>
+              </a:tr>
+              <a:tr h="370840">
+                <a:tc>
+                  <a:txBody>
+                    <a:bodyPr/>
+                    <a:lstStyle/>
+                    <a:p>
+                      <a:pPr algn="r" fontAlgn="b"/>
+                      <a:r>
+                        <a:rPr lang="en-US" sz="1200" b="0" i="0" u="none" strike="noStrike">
+                          <a:solidFill>
+                            <a:srgbClr val="000000"/>
+                          </a:solidFill>
+                          <a:effectLst/>
+                          <a:latin typeface="Calibri"/>
+                        </a:rPr>
+                        <a:t>11</a:t>
+                      </a:r>
+                    </a:p>
+                  </a:txBody>
+                  <a:tcPr marL="12700" marR="12700" marT="12700" marB="0" anchor="b"/>
+                </a:tc>
+                <a:tc>
+                  <a:txBody>
+                    <a:bodyPr/>
+                    <a:lstStyle/>
+                    <a:p>
+                      <a:pPr algn="l" fontAlgn="b"/>
+                      <a:r>
+                        <a:rPr lang="en-US" sz="1200" b="0" i="0" u="none" strike="noStrike">
+                          <a:solidFill>
+                            <a:srgbClr val="000000"/>
+                          </a:solidFill>
+                          <a:effectLst/>
+                          <a:latin typeface="Calibri"/>
+                        </a:rPr>
+                        <a:t>pr_fold_tko</a:t>
+                      </a:r>
+                    </a:p>
+                  </a:txBody>
+                  <a:tcPr marL="12700" marR="12700" marT="12700" marB="0" anchor="b"/>
+                </a:tc>
+                <a:tc>
+                  <a:txBody>
+                    <a:bodyPr/>
+                    <a:lstStyle/>
+                    <a:p>
+                      <a:pPr algn="r" fontAlgn="b"/>
+                      <a:r>
+                        <a:rPr lang="en-US" sz="1200" b="0" i="0" u="none" strike="noStrike">
+                          <a:solidFill>
+                            <a:srgbClr val="000000"/>
+                          </a:solidFill>
+                          <a:effectLst/>
+                          <a:latin typeface="Calibri"/>
+                        </a:rPr>
+                        <a:t>1.5</a:t>
+                      </a:r>
+                    </a:p>
+                  </a:txBody>
+                  <a:tcPr marL="12700" marR="12700" marT="12700" marB="0" anchor="b"/>
+                </a:tc>
+              </a:tr>
+              <a:tr h="370840">
+                <a:tc>
+                  <a:txBody>
+                    <a:bodyPr/>
+                    <a:lstStyle/>
+                    <a:p>
+                      <a:pPr algn="r" fontAlgn="b"/>
+                      <a:r>
+                        <a:rPr lang="en-US" sz="1200" b="0" i="0" u="none" strike="noStrike">
+                          <a:solidFill>
+                            <a:srgbClr val="000000"/>
+                          </a:solidFill>
+                          <a:effectLst/>
+                          <a:latin typeface="Calibri"/>
+                        </a:rPr>
+                        <a:t>12</a:t>
+                      </a:r>
+                    </a:p>
+                  </a:txBody>
+                  <a:tcPr marL="12700" marR="12700" marT="12700" marB="0" anchor="b"/>
+                </a:tc>
+                <a:tc>
+                  <a:txBody>
+                    <a:bodyPr/>
+                    <a:lstStyle/>
+                    <a:p>
+                      <a:pPr algn="l" fontAlgn="b"/>
+                      <a:r>
+                        <a:rPr lang="en-US" sz="1200" b="0" i="0" u="none" strike="noStrike">
+                          <a:solidFill>
+                            <a:srgbClr val="000000"/>
+                          </a:solidFill>
+                          <a:effectLst/>
+                          <a:latin typeface="Calibri"/>
+                        </a:rPr>
+                        <a:t>sec_fold</a:t>
+                      </a:r>
+                    </a:p>
+                  </a:txBody>
+                  <a:tcPr marL="12700" marR="12700" marT="12700" marB="0" anchor="b"/>
+                </a:tc>
+                <a:tc>
+                  <a:txBody>
+                    <a:bodyPr/>
+                    <a:lstStyle/>
+                    <a:p>
+                      <a:pPr algn="r" fontAlgn="b"/>
+                      <a:r>
+                        <a:rPr lang="en-US" sz="1200" b="0" i="0" u="none" strike="noStrike">
+                          <a:solidFill>
+                            <a:srgbClr val="000000"/>
+                          </a:solidFill>
+                          <a:effectLst/>
+                          <a:latin typeface="Calibri"/>
+                        </a:rPr>
+                        <a:t>5</a:t>
+                      </a:r>
+                    </a:p>
+                  </a:txBody>
+                  <a:tcPr marL="12700" marR="12700" marT="12700" marB="0" anchor="b"/>
+                </a:tc>
+              </a:tr>
+              <a:tr h="370840">
+                <a:tc>
+                  <a:txBody>
+                    <a:bodyPr/>
+                    <a:lstStyle/>
+                    <a:p>
+                      <a:pPr algn="r" fontAlgn="b"/>
+                      <a:r>
+                        <a:rPr lang="en-US" sz="1200" b="0" i="0" u="none" strike="noStrike">
+                          <a:solidFill>
+                            <a:srgbClr val="000000"/>
+                          </a:solidFill>
+                          <a:effectLst/>
+                          <a:latin typeface="Calibri"/>
+                        </a:rPr>
+                        <a:t>13</a:t>
+                      </a:r>
+                    </a:p>
+                  </a:txBody>
+                  <a:tcPr marL="12700" marR="12700" marT="12700" marB="0" anchor="b"/>
+                </a:tc>
+                <a:tc>
+                  <a:txBody>
+                    <a:bodyPr/>
+                    <a:lstStyle/>
+                    <a:p>
+                      <a:pPr algn="l" fontAlgn="b"/>
+                      <a:r>
+                        <a:rPr lang="en-US" sz="1200" b="0" i="0" u="none" strike="noStrike">
+                          <a:solidFill>
+                            <a:srgbClr val="000000"/>
+                          </a:solidFill>
+                          <a:effectLst/>
+                          <a:latin typeface="Calibri"/>
+                        </a:rPr>
+                        <a:t>tl_fold</a:t>
+                      </a:r>
+                    </a:p>
+                  </a:txBody>
+                  <a:tcPr marL="12700" marR="12700" marT="12700" marB="0" anchor="b"/>
+                </a:tc>
+                <a:tc>
+                  <a:txBody>
+                    <a:bodyPr/>
+                    <a:lstStyle/>
+                    <a:p>
+                      <a:pPr algn="r" fontAlgn="b"/>
+                      <a:r>
+                        <a:rPr lang="en-US" sz="1200" b="0" i="0" u="none" strike="noStrike" dirty="0">
+                          <a:solidFill>
+                            <a:srgbClr val="000000"/>
+                          </a:solidFill>
+                          <a:effectLst/>
+                          <a:latin typeface="Calibri"/>
+                        </a:rPr>
+                        <a:t>1.5</a:t>
+                      </a:r>
+                    </a:p>
+                  </a:txBody>
+                  <a:tcPr marL="12700" marR="12700" marT="12700" marB="0" anchor="b"/>
+                </a:tc>
+              </a:tr>
+            </a:tbl>
+          </a:graphicData>
+        </a:graphic>
+      </p:graphicFrame>
+      <p:pic>
+        <p:nvPicPr>
+          <p:cNvPr id="4" name="Picture 3" descr="fig2_4b.pdf"/>
+          <p:cNvPicPr>
+            <a:picLocks noChangeAspect="1"/>
+          </p:cNvPicPr>
+          <p:nvPr/>
+        </p:nvPicPr>
+        <p:blipFill>
+          <a:blip r:embed="rId3">
+            <a:extLst>
+              <a:ext uri="{28A0092B-C50C-407E-A947-70E740481C1C}">
+                <a14:useLocalDpi xmlns:a14="http://schemas.microsoft.com/office/drawing/2010/main" val="0"/>
+              </a:ext>
+            </a:extLst>
+          </a:blip>
+          <a:stretch>
+            <a:fillRect/>
+          </a:stretch>
+        </p:blipFill>
+        <p:spPr>
+          <a:xfrm>
+            <a:off x="0" y="1371600"/>
+            <a:ext cx="7315200" cy="5486400"/>
+          </a:xfrm>
+          <a:prstGeom prst="rect">
+            <a:avLst/>
+          </a:prstGeom>
+        </p:spPr>
+      </p:pic>
+    </p:spTree>
+    <p:extLst>
+      <p:ext uri="{BB962C8B-B14F-4D97-AF65-F5344CB8AC3E}">
+        <p14:creationId xmlns:p14="http://schemas.microsoft.com/office/powerpoint/2010/main" val="4145019019"/>
+      </p:ext>
+    </p:extLst>
+  </p:cSld>
+  <p:clrMapOvr>
+    <a:masterClrMapping/>
+  </p:clrMapOvr>
+</p:sld>
+</file>
+
+<file path=ppt/slides/slide12.xml><?xml version="1.0" encoding="utf-8"?>
+<p:sld xmlns:a="http://schemas.openxmlformats.org/drawingml/2006/main" xmlns:r="http://schemas.openxmlformats.org/officeDocument/2006/relationships" xmlns:p="http://schemas.openxmlformats.org/presentationml/2006/main">
+  <p:cSld>
+    <p:spTree>
+      <p:nvGrpSpPr>
+        <p:cNvPr id="1" name=""/>
+        <p:cNvGrpSpPr/>
+        <p:nvPr/>
+      </p:nvGrpSpPr>
+      <p:grpSpPr>
+        <a:xfrm>
+          <a:off x="0" y="0"/>
+          <a:ext cx="0" cy="0"/>
+          <a:chOff x="0" y="0"/>
+          <a:chExt cx="0" cy="0"/>
+        </a:xfrm>
+      </p:grpSpPr>
+      <p:sp>
+        <p:nvSpPr>
           <p:cNvPr id="2" name="Slide Number Placeholder 1"/>
           <p:cNvSpPr>
             <a:spLocks noGrp="1"/>
@@ -7893,7 +9104,7 @@
             <a:fld id="{B374BE6F-4675-E040-83E7-950933BE75D0}" type="slidenum">
               <a:rPr lang="en-US" smtClean="0"/>
               <a:pPr/>
-              <a:t>11</a:t>
+              <a:t>12</a:t>
             </a:fld>
             <a:endParaRPr lang="en-US" dirty="0"/>
           </a:p>
@@ -8124,7 +9335,7 @@
 </p:sld>
 </file>
 
-<file path=ppt/slides/slide12.xml><?xml version="1.0" encoding="utf-8"?>
+<file path=ppt/slides/slide13.xml><?xml version="1.0" encoding="utf-8"?>
 <p:sld xmlns:a="http://schemas.openxmlformats.org/drawingml/2006/main" xmlns:r="http://schemas.openxmlformats.org/officeDocument/2006/relationships" xmlns:p="http://schemas.openxmlformats.org/presentationml/2006/main">
   <p:cSld>
     <p:spTree>
@@ -8159,7 +9370,7 @@
             <a:fld id="{B374BE6F-4675-E040-83E7-950933BE75D0}" type="slidenum">
               <a:rPr lang="en-US" smtClean="0"/>
               <a:pPr/>
-              <a:t>12</a:t>
+              <a:t>13</a:t>
             </a:fld>
             <a:endParaRPr lang="en-US" dirty="0"/>
           </a:p>
@@ -8284,7 +9495,7 @@
 </p:sld>
 </file>
 
-<file path=ppt/slides/slide13.xml><?xml version="1.0" encoding="utf-8"?>
+<file path=ppt/slides/slide14.xml><?xml version="1.0" encoding="utf-8"?>
 <p:sld xmlns:a="http://schemas.openxmlformats.org/drawingml/2006/main" xmlns:r="http://schemas.openxmlformats.org/officeDocument/2006/relationships" xmlns:p="http://schemas.openxmlformats.org/presentationml/2006/main">
   <p:cSld>
     <p:spTree>
@@ -8319,7 +9530,7 @@
             <a:fld id="{B374BE6F-4675-E040-83E7-950933BE75D0}" type="slidenum">
               <a:rPr lang="en-US" smtClean="0"/>
               <a:pPr/>
-              <a:t>13</a:t>
+              <a:t>14</a:t>
             </a:fld>
             <a:endParaRPr lang="en-US" dirty="0"/>
           </a:p>
@@ -9213,7 +10424,7 @@
           <a:graphicData uri="http://schemas.openxmlformats.org/presentationml/2006/ole">
             <mc:AlternateContent xmlns:mc="http://schemas.openxmlformats.org/markup-compatibility/2006">
               <mc:Choice xmlns:v="urn:schemas-microsoft-com:vml" Requires="v">
-                <p:oleObj spid="_x0000_s13377" name="Equation" r:id="rId4" imgW="1790700" imgH="469900" progId="Equation.3">
+                <p:oleObj spid="_x0000_s13381" name="Equation" r:id="rId4" imgW="1790700" imgH="469900" progId="Equation.3">
                   <p:embed/>
                 </p:oleObj>
               </mc:Choice>
@@ -9421,7 +10632,7 @@
           <p:nvPr/>
         </p:nvPicPr>
         <p:blipFill>
-          <a:blip r:embed="rId2">
+          <a:blip r:embed="rId3">
             <a:extLst>
               <a:ext uri="{28A0092B-C50C-407E-A947-70E740481C1C}">
                 <a14:useLocalDpi xmlns:a14="http://schemas.microsoft.com/office/drawing/2010/main" val="0"/>
@@ -9486,7 +10697,7 @@
           <p:nvPr/>
         </p:nvPicPr>
         <p:blipFill>
-          <a:blip r:embed="rId3">
+          <a:blip r:embed="rId4">
             <a:extLst>
               <a:ext uri="{28A0092B-C50C-407E-A947-70E740481C1C}">
                 <a14:useLocalDpi xmlns:a14="http://schemas.microsoft.com/office/drawing/2010/main" val="0"/>
@@ -9516,7 +10727,7 @@
           <p:nvPr/>
         </p:nvPicPr>
         <p:blipFill rotWithShape="1">
-          <a:blip r:embed="rId4">
+          <a:blip r:embed="rId5">
             <a:extLst>
               <a:ext uri="{28A0092B-C50C-407E-A947-70E740481C1C}">
                 <a14:useLocalDpi xmlns:a14="http://schemas.microsoft.com/office/drawing/2010/main" val="0"/>
@@ -11167,7 +12378,7 @@
           <a:graphicData uri="http://schemas.openxmlformats.org/presentationml/2006/ole">
             <mc:AlternateContent xmlns:mc="http://schemas.openxmlformats.org/markup-compatibility/2006">
               <mc:Choice xmlns:v="urn:schemas-microsoft-com:vml" Requires="v">
-                <p:oleObj spid="_x0000_s1194" name="Equation" r:id="rId4" imgW="2667000" imgH="393700" progId="Equation.DSMT4">
+                <p:oleObj spid="_x0000_s1204" name="Equation" r:id="rId4" imgW="2667000" imgH="393700" progId="Equation.DSMT4">
                   <p:embed/>
                 </p:oleObj>
               </mc:Choice>
@@ -11224,7 +12435,7 @@
           <a:graphicData uri="http://schemas.openxmlformats.org/presentationml/2006/ole">
             <mc:AlternateContent xmlns:mc="http://schemas.openxmlformats.org/markup-compatibility/2006">
               <mc:Choice xmlns:v="urn:schemas-microsoft-com:vml" Requires="v">
-                <p:oleObj spid="_x0000_s1195" name="Equation" r:id="rId6" imgW="8089900" imgH="1168400" progId="Equation.DSMT4">
+                <p:oleObj spid="_x0000_s1205" name="Equation" r:id="rId6" imgW="8089900" imgH="1168400" progId="Equation.DSMT4">
                   <p:embed/>
                 </p:oleObj>
               </mc:Choice>
@@ -11452,7 +12663,7 @@
           <a:graphicData uri="http://schemas.openxmlformats.org/presentationml/2006/ole">
             <mc:AlternateContent xmlns:mc="http://schemas.openxmlformats.org/markup-compatibility/2006">
               <mc:Choice xmlns:v="urn:schemas-microsoft-com:vml" Requires="v">
-                <p:oleObj spid="_x0000_s1196" name="Equation" r:id="rId9" imgW="2032000" imgH="457200" progId="Equation.DSMT4">
+                <p:oleObj spid="_x0000_s1206" name="Equation" r:id="rId9" imgW="2032000" imgH="457200" progId="Equation.DSMT4">
                   <p:embed/>
                 </p:oleObj>
               </mc:Choice>
@@ -12256,7 +13467,7 @@
           <a:graphicData uri="http://schemas.openxmlformats.org/presentationml/2006/ole">
             <mc:AlternateContent xmlns:mc="http://schemas.openxmlformats.org/markup-compatibility/2006">
               <mc:Choice xmlns:v="urn:schemas-microsoft-com:vml" Requires="v">
-                <p:oleObj spid="_x0000_s9288" name="Equation" r:id="rId4" imgW="1790700" imgH="469900" progId="Equation.3">
+                <p:oleObj spid="_x0000_s9292" name="Equation" r:id="rId4" imgW="1790700" imgH="469900" progId="Equation.3">
                   <p:embed/>
                 </p:oleObj>
               </mc:Choice>
@@ -14526,7 +15737,7 @@
           <a:graphicData uri="http://schemas.openxmlformats.org/presentationml/2006/ole">
             <mc:AlternateContent xmlns:mc="http://schemas.openxmlformats.org/markup-compatibility/2006">
               <mc:Choice xmlns:v="urn:schemas-microsoft-com:vml" Requires="v">
-                <p:oleObj spid="_x0000_s5310" name="Equation" r:id="rId4" imgW="3517900" imgH="876300" progId="Equation.DSMT4">
+                <p:oleObj spid="_x0000_s5317" name="Equation" r:id="rId4" imgW="3517900" imgH="876300" progId="Equation.DSMT4">
                   <p:embed/>
                 </p:oleObj>
               </mc:Choice>
@@ -14583,7 +15794,7 @@
           <a:graphicData uri="http://schemas.openxmlformats.org/presentationml/2006/ole">
             <mc:AlternateContent xmlns:mc="http://schemas.openxmlformats.org/markup-compatibility/2006">
               <mc:Choice xmlns:v="urn:schemas-microsoft-com:vml" Requires="v">
-                <p:oleObj spid="_x0000_s5311" name="Equation" r:id="rId6" imgW="3098800" imgH="838200" progId="Equation.DSMT4">
+                <p:oleObj spid="_x0000_s5318" name="Equation" r:id="rId6" imgW="3098800" imgH="838200" progId="Equation.DSMT4">
                   <p:embed/>
                 </p:oleObj>
               </mc:Choice>

</xml_diff>